<commit_message>
Correcting extra tags in OpenAPI fiels
</commit_message>
<xml_diff>
--- a/standard/images/diagrams.pptx
+++ b/standard/images/diagrams.pptx
@@ -6,6 +6,9 @@
   </p:sldMasterIdLst>
   <p:sldIdLst>
     <p:sldId id="256" r:id="rId2"/>
+    <p:sldId id="257" r:id="rId3"/>
+    <p:sldId id="258" r:id="rId4"/>
+    <p:sldId id="259" r:id="rId5"/>
   </p:sldIdLst>
   <p:sldSz cx="9144000" cy="6858000" type="screen4x3"/>
   <p:notesSz cx="6858000" cy="9144000"/>
@@ -3129,7 +3132,6 @@
               <a:rPr lang="en-US" dirty="0" smtClean="0"/>
               <a:t>Map </a:t>
             </a:r>
-            <a:endParaRPr lang="en-US" dirty="0" smtClean="0"/>
           </a:p>
           <a:p>
             <a:pPr algn="ctr"/>
@@ -3773,7 +3775,6 @@
               <a:rPr lang="en-US" dirty="0" smtClean="0"/>
               <a:t>Coverages</a:t>
             </a:r>
-            <a:endParaRPr lang="en-US" dirty="0" smtClean="0"/>
           </a:p>
         </p:txBody>
       </p:sp>
@@ -3816,7 +3817,6 @@
               <a:rPr lang="en-US" dirty="0" smtClean="0"/>
               <a:t>Features</a:t>
             </a:r>
-            <a:endParaRPr lang="en-US" dirty="0" smtClean="0"/>
           </a:p>
         </p:txBody>
       </p:sp>
@@ -4000,7 +4000,6 @@
               <a:rPr lang="en-US" dirty="0" smtClean="0"/>
               <a:t>Tiled features</a:t>
             </a:r>
-            <a:endParaRPr lang="en-US" dirty="0" smtClean="0"/>
           </a:p>
           <a:p>
             <a:pPr algn="ctr"/>
@@ -4046,7 +4045,6 @@
               <a:rPr lang="en-US" dirty="0" smtClean="0"/>
               <a:t>Tiled Map</a:t>
             </a:r>
-            <a:endParaRPr lang="en-US" dirty="0" smtClean="0"/>
           </a:p>
           <a:p>
             <a:pPr algn="ctr"/>
@@ -4092,7 +4090,6 @@
               <a:rPr lang="en-US" dirty="0" smtClean="0"/>
               <a:t>Tiled coverages</a:t>
             </a:r>
-            <a:endParaRPr lang="en-US" dirty="0" smtClean="0"/>
           </a:p>
           <a:p>
             <a:pPr algn="ctr"/>
@@ -4212,6 +4209,303 @@
           </a:fontRef>
         </p:style>
       </p:cxnSp>
+    </p:spTree>
+  </p:cSld>
+  <p:clrMapOvr>
+    <a:masterClrMapping/>
+  </p:clrMapOvr>
+</p:sld>
+</file>
+
+<file path=ppt/slides/slide2.xml><?xml version="1.0" encoding="utf-8"?>
+<p:sld xmlns:a="http://schemas.openxmlformats.org/drawingml/2006/main" xmlns:r="http://schemas.openxmlformats.org/officeDocument/2006/relationships" xmlns:p="http://schemas.openxmlformats.org/presentationml/2006/main">
+  <p:cSld>
+    <p:spTree>
+      <p:nvGrpSpPr>
+        <p:cNvPr id="1" name=""/>
+        <p:cNvGrpSpPr/>
+        <p:nvPr/>
+      </p:nvGrpSpPr>
+      <p:grpSpPr>
+        <a:xfrm>
+          <a:off x="0" y="0"/>
+          <a:ext cx="0" cy="0"/>
+          <a:chOff x="0" y="0"/>
+          <a:chExt cx="0" cy="0"/>
+        </a:xfrm>
+      </p:grpSpPr>
+      <p:pic>
+        <p:nvPicPr>
+          <p:cNvPr id="1026" name="Picture 2"/>
+          <p:cNvPicPr>
+            <a:picLocks noChangeAspect="1" noChangeArrowheads="1"/>
+          </p:cNvPicPr>
+          <p:nvPr/>
+        </p:nvPicPr>
+        <p:blipFill>
+          <a:blip r:embed="rId2" cstate="print"/>
+          <a:srcRect/>
+          <a:stretch>
+            <a:fillRect/>
+          </a:stretch>
+        </p:blipFill>
+        <p:spPr bwMode="auto">
+          <a:xfrm>
+            <a:off x="-1" y="1412776"/>
+            <a:ext cx="9196535" cy="4968552"/>
+          </a:xfrm>
+          <a:prstGeom prst="rect">
+            <a:avLst/>
+          </a:prstGeom>
+          <a:noFill/>
+          <a:ln w="9525">
+            <a:noFill/>
+            <a:miter lim="800000"/>
+            <a:headEnd/>
+            <a:tailEnd/>
+          </a:ln>
+        </p:spPr>
+      </p:pic>
+      <p:sp>
+        <p:nvSpPr>
+          <p:cNvPr id="3" name="2 Título"/>
+          <p:cNvSpPr>
+            <a:spLocks noGrp="1"/>
+          </p:cNvSpPr>
+          <p:nvPr>
+            <p:ph type="title"/>
+          </p:nvPr>
+        </p:nvSpPr>
+        <p:spPr/>
+        <p:txBody>
+          <a:bodyPr>
+            <a:normAutofit/>
+          </a:bodyPr>
+          <a:lstStyle/>
+          <a:p>
+            <a:r>
+              <a:rPr lang="ca-ES" sz="3600" dirty="0" smtClean="0"/>
+              <a:t>ogc-api-tiles-opf-xmp-</a:t>
+            </a:r>
+            <a:r>
+              <a:rPr lang="ca-ES" sz="3600" b="1" dirty="0" smtClean="0"/>
+              <a:t>vt</a:t>
+            </a:r>
+            <a:r>
+              <a:rPr lang="ca-ES" sz="3600" dirty="0" smtClean="0"/>
+              <a:t>-more-1-collection</a:t>
+            </a:r>
+            <a:endParaRPr lang="ca-ES" sz="3600" dirty="0"/>
+          </a:p>
+        </p:txBody>
+      </p:sp>
+    </p:spTree>
+  </p:cSld>
+  <p:clrMapOvr>
+    <a:masterClrMapping/>
+  </p:clrMapOvr>
+  <p:timing>
+    <p:tnLst>
+      <p:par>
+        <p:cTn id="1" dur="indefinite" restart="never" nodeType="tmRoot"/>
+      </p:par>
+    </p:tnLst>
+  </p:timing>
+</p:sld>
+</file>
+
+<file path=ppt/slides/slide3.xml><?xml version="1.0" encoding="utf-8"?>
+<p:sld xmlns:a="http://schemas.openxmlformats.org/drawingml/2006/main" xmlns:r="http://schemas.openxmlformats.org/officeDocument/2006/relationships" xmlns:p="http://schemas.openxmlformats.org/presentationml/2006/main">
+  <p:cSld>
+    <p:spTree>
+      <p:nvGrpSpPr>
+        <p:cNvPr id="1" name=""/>
+        <p:cNvGrpSpPr/>
+        <p:nvPr/>
+      </p:nvGrpSpPr>
+      <p:grpSpPr>
+        <a:xfrm>
+          <a:off x="0" y="0"/>
+          <a:ext cx="0" cy="0"/>
+          <a:chOff x="0" y="0"/>
+          <a:chExt cx="0" cy="0"/>
+        </a:xfrm>
+      </p:grpSpPr>
+      <p:sp>
+        <p:nvSpPr>
+          <p:cNvPr id="2" name="1 Título"/>
+          <p:cNvSpPr>
+            <a:spLocks noGrp="1"/>
+          </p:cNvSpPr>
+          <p:nvPr>
+            <p:ph type="title"/>
+          </p:nvPr>
+        </p:nvSpPr>
+        <p:spPr/>
+        <p:txBody>
+          <a:bodyPr>
+            <a:noAutofit/>
+          </a:bodyPr>
+          <a:lstStyle/>
+          <a:p>
+            <a:r>
+              <a:rPr lang="ca-ES" sz="3200" dirty="0" smtClean="0"/>
+              <a:t>ogc-api-map-tiles-opf-xmp-</a:t>
+            </a:r>
+            <a:r>
+              <a:rPr lang="ca-ES" sz="3200" b="1" dirty="0" smtClean="0"/>
+              <a:t>mt</a:t>
+            </a:r>
+            <a:r>
+              <a:rPr lang="ca-ES" sz="3200" dirty="0" smtClean="0"/>
+              <a:t>-more-1-collection</a:t>
+            </a:r>
+            <a:endParaRPr lang="ca-ES" sz="3200" dirty="0"/>
+          </a:p>
+        </p:txBody>
+      </p:sp>
+      <p:pic>
+        <p:nvPicPr>
+          <p:cNvPr id="2050" name="Picture 2"/>
+          <p:cNvPicPr>
+            <a:picLocks noGrp="1" noChangeAspect="1" noChangeArrowheads="1"/>
+          </p:cNvPicPr>
+          <p:nvPr>
+            <p:ph idx="1"/>
+          </p:nvPr>
+        </p:nvPicPr>
+        <p:blipFill>
+          <a:blip r:embed="rId2" cstate="print"/>
+          <a:srcRect/>
+          <a:stretch>
+            <a:fillRect/>
+          </a:stretch>
+        </p:blipFill>
+        <p:spPr bwMode="auto">
+          <a:xfrm>
+            <a:off x="0" y="1412776"/>
+            <a:ext cx="9144000" cy="4940170"/>
+          </a:xfrm>
+          <a:prstGeom prst="rect">
+            <a:avLst/>
+          </a:prstGeom>
+          <a:noFill/>
+          <a:ln w="9525">
+            <a:noFill/>
+            <a:miter lim="800000"/>
+            <a:headEnd/>
+            <a:tailEnd/>
+          </a:ln>
+        </p:spPr>
+      </p:pic>
+    </p:spTree>
+  </p:cSld>
+  <p:clrMapOvr>
+    <a:masterClrMapping/>
+  </p:clrMapOvr>
+  <p:timing>
+    <p:tnLst>
+      <p:par>
+        <p:cTn id="1" dur="indefinite" restart="never" nodeType="tmRoot"/>
+      </p:par>
+    </p:tnLst>
+  </p:timing>
+</p:sld>
+</file>
+
+<file path=ppt/slides/slide4.xml><?xml version="1.0" encoding="utf-8"?>
+<p:sld xmlns:a="http://schemas.openxmlformats.org/drawingml/2006/main" xmlns:r="http://schemas.openxmlformats.org/officeDocument/2006/relationships" xmlns:p="http://schemas.openxmlformats.org/presentationml/2006/main">
+  <p:cSld>
+    <p:spTree>
+      <p:nvGrpSpPr>
+        <p:cNvPr id="1" name=""/>
+        <p:cNvGrpSpPr/>
+        <p:nvPr/>
+      </p:nvGrpSpPr>
+      <p:grpSpPr>
+        <a:xfrm>
+          <a:off x="0" y="0"/>
+          <a:ext cx="0" cy="0"/>
+          <a:chOff x="0" y="0"/>
+          <a:chExt cx="0" cy="0"/>
+        </a:xfrm>
+      </p:grpSpPr>
+      <p:sp>
+        <p:nvSpPr>
+          <p:cNvPr id="2" name="1 Título"/>
+          <p:cNvSpPr>
+            <a:spLocks noGrp="1"/>
+          </p:cNvSpPr>
+          <p:nvPr>
+            <p:ph type="title"/>
+          </p:nvPr>
+        </p:nvSpPr>
+        <p:spPr/>
+        <p:txBody>
+          <a:bodyPr>
+            <a:normAutofit/>
+          </a:bodyPr>
+          <a:lstStyle/>
+          <a:p>
+            <a:r>
+              <a:rPr lang="ca-ES" sz="3600" dirty="0" smtClean="0"/>
+              <a:t>ogc-api-maps-opf-xmp-more-1-collection</a:t>
+            </a:r>
+            <a:endParaRPr lang="ca-ES" sz="3600" dirty="0"/>
+          </a:p>
+        </p:txBody>
+      </p:sp>
+      <p:sp>
+        <p:nvSpPr>
+          <p:cNvPr id="3" name="2 Marcador de contenido"/>
+          <p:cNvSpPr>
+            <a:spLocks noGrp="1"/>
+          </p:cNvSpPr>
+          <p:nvPr>
+            <p:ph idx="1"/>
+          </p:nvPr>
+        </p:nvSpPr>
+        <p:spPr/>
+        <p:txBody>
+          <a:bodyPr/>
+          <a:lstStyle/>
+          <a:p>
+            <a:endParaRPr lang="ca-ES"/>
+          </a:p>
+        </p:txBody>
+      </p:sp>
+      <p:pic>
+        <p:nvPicPr>
+          <p:cNvPr id="3074" name="Picture 2"/>
+          <p:cNvPicPr>
+            <a:picLocks noChangeAspect="1" noChangeArrowheads="1"/>
+          </p:cNvPicPr>
+          <p:nvPr/>
+        </p:nvPicPr>
+        <p:blipFill>
+          <a:blip r:embed="rId2" cstate="print"/>
+          <a:srcRect/>
+          <a:stretch>
+            <a:fillRect/>
+          </a:stretch>
+        </p:blipFill>
+        <p:spPr bwMode="auto">
+          <a:xfrm>
+            <a:off x="0" y="1484784"/>
+            <a:ext cx="9144000" cy="4940170"/>
+          </a:xfrm>
+          <a:prstGeom prst="rect">
+            <a:avLst/>
+          </a:prstGeom>
+          <a:noFill/>
+          <a:ln w="9525">
+            <a:noFill/>
+            <a:miter lim="800000"/>
+            <a:headEnd/>
+            <a:tailEnd/>
+          </a:ln>
+        </p:spPr>
+      </p:pic>
     </p:spTree>
   </p:cSld>
   <p:clrMapOvr>

</xml_diff>

<commit_message>
Serious work on the standards text starts. Modularity introduced.
</commit_message>
<xml_diff>
--- a/standard/images/diagrams.pptx
+++ b/standard/images/diagrams.pptx
@@ -6,9 +6,16 @@
   </p:sldMasterIdLst>
   <p:sldIdLst>
     <p:sldId id="256" r:id="rId2"/>
-    <p:sldId id="257" r:id="rId3"/>
-    <p:sldId id="258" r:id="rId4"/>
-    <p:sldId id="259" r:id="rId5"/>
+    <p:sldId id="260" r:id="rId3"/>
+    <p:sldId id="261" r:id="rId4"/>
+    <p:sldId id="265" r:id="rId5"/>
+    <p:sldId id="266" r:id="rId6"/>
+    <p:sldId id="262" r:id="rId7"/>
+    <p:sldId id="264" r:id="rId8"/>
+    <p:sldId id="263" r:id="rId9"/>
+    <p:sldId id="257" r:id="rId10"/>
+    <p:sldId id="258" r:id="rId11"/>
+    <p:sldId id="259" r:id="rId12"/>
   </p:sldIdLst>
   <p:sldSz cx="9144000" cy="6858000" type="screen4x3"/>
   <p:notesSz cx="6858000" cy="9144000"/>
@@ -292,7 +299,7 @@
             <a:fld id="{7A847CFC-816F-41D0-AAC0-9BF4FEBC753E}" type="datetimeFigureOut">
               <a:rPr lang="es-ES" smtClean="0"/>
               <a:pPr/>
-              <a:t>19/07/2019</a:t>
+              <a:t>25/07/2019</a:t>
             </a:fld>
             <a:endParaRPr lang="es-ES"/>
           </a:p>
@@ -350,6 +357,530 @@
 </file>
 
 <file path=ppt/slideLayouts/slideLayout10.xml><?xml version="1.0" encoding="utf-8"?>
+<p:sldLayout xmlns:a="http://schemas.openxmlformats.org/drawingml/2006/main" xmlns:r="http://schemas.openxmlformats.org/officeDocument/2006/relationships" xmlns:p="http://schemas.openxmlformats.org/presentationml/2006/main" type="objTx" preserve="1">
+  <p:cSld name="Contenido con título">
+    <p:spTree>
+      <p:nvGrpSpPr>
+        <p:cNvPr id="1" name=""/>
+        <p:cNvGrpSpPr/>
+        <p:nvPr/>
+      </p:nvGrpSpPr>
+      <p:grpSpPr>
+        <a:xfrm>
+          <a:off x="0" y="0"/>
+          <a:ext cx="0" cy="0"/>
+          <a:chOff x="0" y="0"/>
+          <a:chExt cx="0" cy="0"/>
+        </a:xfrm>
+      </p:grpSpPr>
+      <p:sp>
+        <p:nvSpPr>
+          <p:cNvPr id="2" name="1 Título"/>
+          <p:cNvSpPr>
+            <a:spLocks noGrp="1"/>
+          </p:cNvSpPr>
+          <p:nvPr>
+            <p:ph type="title"/>
+          </p:nvPr>
+        </p:nvSpPr>
+        <p:spPr>
+          <a:xfrm>
+            <a:off x="457200" y="273050"/>
+            <a:ext cx="3008313" cy="1162050"/>
+          </a:xfrm>
+        </p:spPr>
+        <p:txBody>
+          <a:bodyPr anchor="b"/>
+          <a:lstStyle>
+            <a:lvl1pPr algn="l">
+              <a:defRPr sz="2000" b="1"/>
+            </a:lvl1pPr>
+          </a:lstStyle>
+          <a:p>
+            <a:r>
+              <a:rPr lang="es-ES" smtClean="0"/>
+              <a:t>Haga clic para modificar el estilo de título del patrón</a:t>
+            </a:r>
+            <a:endParaRPr lang="es-ES"/>
+          </a:p>
+        </p:txBody>
+      </p:sp>
+      <p:sp>
+        <p:nvSpPr>
+          <p:cNvPr id="3" name="2 Marcador de contenido"/>
+          <p:cNvSpPr>
+            <a:spLocks noGrp="1"/>
+          </p:cNvSpPr>
+          <p:nvPr>
+            <p:ph idx="1"/>
+          </p:nvPr>
+        </p:nvSpPr>
+        <p:spPr>
+          <a:xfrm>
+            <a:off x="3575050" y="273050"/>
+            <a:ext cx="5111750" cy="5853113"/>
+          </a:xfrm>
+        </p:spPr>
+        <p:txBody>
+          <a:bodyPr/>
+          <a:lstStyle>
+            <a:lvl1pPr>
+              <a:defRPr sz="3200"/>
+            </a:lvl1pPr>
+            <a:lvl2pPr>
+              <a:defRPr sz="2800"/>
+            </a:lvl2pPr>
+            <a:lvl3pPr>
+              <a:defRPr sz="2400"/>
+            </a:lvl3pPr>
+            <a:lvl4pPr>
+              <a:defRPr sz="2000"/>
+            </a:lvl4pPr>
+            <a:lvl5pPr>
+              <a:defRPr sz="2000"/>
+            </a:lvl5pPr>
+            <a:lvl6pPr>
+              <a:defRPr sz="2000"/>
+            </a:lvl6pPr>
+            <a:lvl7pPr>
+              <a:defRPr sz="2000"/>
+            </a:lvl7pPr>
+            <a:lvl8pPr>
+              <a:defRPr sz="2000"/>
+            </a:lvl8pPr>
+            <a:lvl9pPr>
+              <a:defRPr sz="2000"/>
+            </a:lvl9pPr>
+          </a:lstStyle>
+          <a:p>
+            <a:pPr lvl="0"/>
+            <a:r>
+              <a:rPr lang="es-ES" smtClean="0"/>
+              <a:t>Haga clic para modificar el estilo de texto del patrón</a:t>
+            </a:r>
+          </a:p>
+          <a:p>
+            <a:pPr lvl="1"/>
+            <a:r>
+              <a:rPr lang="es-ES" smtClean="0"/>
+              <a:t>Segundo nivel</a:t>
+            </a:r>
+          </a:p>
+          <a:p>
+            <a:pPr lvl="2"/>
+            <a:r>
+              <a:rPr lang="es-ES" smtClean="0"/>
+              <a:t>Tercer nivel</a:t>
+            </a:r>
+          </a:p>
+          <a:p>
+            <a:pPr lvl="3"/>
+            <a:r>
+              <a:rPr lang="es-ES" smtClean="0"/>
+              <a:t>Cuarto nivel</a:t>
+            </a:r>
+          </a:p>
+          <a:p>
+            <a:pPr lvl="4"/>
+            <a:r>
+              <a:rPr lang="es-ES" smtClean="0"/>
+              <a:t>Quinto nivel</a:t>
+            </a:r>
+            <a:endParaRPr lang="es-ES"/>
+          </a:p>
+        </p:txBody>
+      </p:sp>
+      <p:sp>
+        <p:nvSpPr>
+          <p:cNvPr id="4" name="3 Marcador de texto"/>
+          <p:cNvSpPr>
+            <a:spLocks noGrp="1"/>
+          </p:cNvSpPr>
+          <p:nvPr>
+            <p:ph type="body" sz="half" idx="2"/>
+          </p:nvPr>
+        </p:nvSpPr>
+        <p:spPr>
+          <a:xfrm>
+            <a:off x="457200" y="1435100"/>
+            <a:ext cx="3008313" cy="4691063"/>
+          </a:xfrm>
+        </p:spPr>
+        <p:txBody>
+          <a:bodyPr/>
+          <a:lstStyle>
+            <a:lvl1pPr marL="0" indent="0">
+              <a:buNone/>
+              <a:defRPr sz="1400"/>
+            </a:lvl1pPr>
+            <a:lvl2pPr marL="457200" indent="0">
+              <a:buNone/>
+              <a:defRPr sz="1200"/>
+            </a:lvl2pPr>
+            <a:lvl3pPr marL="914400" indent="0">
+              <a:buNone/>
+              <a:defRPr sz="1000"/>
+            </a:lvl3pPr>
+            <a:lvl4pPr marL="1371600" indent="0">
+              <a:buNone/>
+              <a:defRPr sz="900"/>
+            </a:lvl4pPr>
+            <a:lvl5pPr marL="1828800" indent="0">
+              <a:buNone/>
+              <a:defRPr sz="900"/>
+            </a:lvl5pPr>
+            <a:lvl6pPr marL="2286000" indent="0">
+              <a:buNone/>
+              <a:defRPr sz="900"/>
+            </a:lvl6pPr>
+            <a:lvl7pPr marL="2743200" indent="0">
+              <a:buNone/>
+              <a:defRPr sz="900"/>
+            </a:lvl7pPr>
+            <a:lvl8pPr marL="3200400" indent="0">
+              <a:buNone/>
+              <a:defRPr sz="900"/>
+            </a:lvl8pPr>
+            <a:lvl9pPr marL="3657600" indent="0">
+              <a:buNone/>
+              <a:defRPr sz="900"/>
+            </a:lvl9pPr>
+          </a:lstStyle>
+          <a:p>
+            <a:pPr lvl="0"/>
+            <a:r>
+              <a:rPr lang="es-ES" smtClean="0"/>
+              <a:t>Haga clic para modificar el estilo de texto del patrón</a:t>
+            </a:r>
+          </a:p>
+        </p:txBody>
+      </p:sp>
+      <p:sp>
+        <p:nvSpPr>
+          <p:cNvPr id="5" name="4 Marcador de fecha"/>
+          <p:cNvSpPr>
+            <a:spLocks noGrp="1"/>
+          </p:cNvSpPr>
+          <p:nvPr>
+            <p:ph type="dt" sz="half" idx="10"/>
+          </p:nvPr>
+        </p:nvSpPr>
+        <p:spPr/>
+        <p:txBody>
+          <a:bodyPr/>
+          <a:lstStyle/>
+          <a:p>
+            <a:fld id="{7A847CFC-816F-41D0-AAC0-9BF4FEBC753E}" type="datetimeFigureOut">
+              <a:rPr lang="es-ES" smtClean="0"/>
+              <a:pPr/>
+              <a:t>25/07/2019</a:t>
+            </a:fld>
+            <a:endParaRPr lang="es-ES"/>
+          </a:p>
+        </p:txBody>
+      </p:sp>
+      <p:sp>
+        <p:nvSpPr>
+          <p:cNvPr id="6" name="5 Marcador de pie de página"/>
+          <p:cNvSpPr>
+            <a:spLocks noGrp="1"/>
+          </p:cNvSpPr>
+          <p:nvPr>
+            <p:ph type="ftr" sz="quarter" idx="11"/>
+          </p:nvPr>
+        </p:nvSpPr>
+        <p:spPr/>
+        <p:txBody>
+          <a:bodyPr/>
+          <a:lstStyle/>
+          <a:p>
+            <a:endParaRPr lang="es-ES"/>
+          </a:p>
+        </p:txBody>
+      </p:sp>
+      <p:sp>
+        <p:nvSpPr>
+          <p:cNvPr id="7" name="6 Marcador de número de diapositiva"/>
+          <p:cNvSpPr>
+            <a:spLocks noGrp="1"/>
+          </p:cNvSpPr>
+          <p:nvPr>
+            <p:ph type="sldNum" sz="quarter" idx="12"/>
+          </p:nvPr>
+        </p:nvSpPr>
+        <p:spPr/>
+        <p:txBody>
+          <a:bodyPr/>
+          <a:lstStyle/>
+          <a:p>
+            <a:fld id="{132FADFE-3B8F-471C-ABF0-DBC7717ECBBC}" type="slidenum">
+              <a:rPr lang="es-ES" smtClean="0"/>
+              <a:pPr/>
+              <a:t>‹Nº›</a:t>
+            </a:fld>
+            <a:endParaRPr lang="es-ES"/>
+          </a:p>
+        </p:txBody>
+      </p:sp>
+    </p:spTree>
+  </p:cSld>
+  <p:clrMapOvr>
+    <a:masterClrMapping/>
+  </p:clrMapOvr>
+</p:sldLayout>
+</file>
+
+<file path=ppt/slideLayouts/slideLayout11.xml><?xml version="1.0" encoding="utf-8"?>
+<p:sldLayout xmlns:a="http://schemas.openxmlformats.org/drawingml/2006/main" xmlns:r="http://schemas.openxmlformats.org/officeDocument/2006/relationships" xmlns:p="http://schemas.openxmlformats.org/presentationml/2006/main" type="picTx" preserve="1">
+  <p:cSld name="Imagen con título">
+    <p:spTree>
+      <p:nvGrpSpPr>
+        <p:cNvPr id="1" name=""/>
+        <p:cNvGrpSpPr/>
+        <p:nvPr/>
+      </p:nvGrpSpPr>
+      <p:grpSpPr>
+        <a:xfrm>
+          <a:off x="0" y="0"/>
+          <a:ext cx="0" cy="0"/>
+          <a:chOff x="0" y="0"/>
+          <a:chExt cx="0" cy="0"/>
+        </a:xfrm>
+      </p:grpSpPr>
+      <p:sp>
+        <p:nvSpPr>
+          <p:cNvPr id="2" name="1 Título"/>
+          <p:cNvSpPr>
+            <a:spLocks noGrp="1"/>
+          </p:cNvSpPr>
+          <p:nvPr>
+            <p:ph type="title"/>
+          </p:nvPr>
+        </p:nvSpPr>
+        <p:spPr>
+          <a:xfrm>
+            <a:off x="1792288" y="4800600"/>
+            <a:ext cx="5486400" cy="566738"/>
+          </a:xfrm>
+        </p:spPr>
+        <p:txBody>
+          <a:bodyPr anchor="b"/>
+          <a:lstStyle>
+            <a:lvl1pPr algn="l">
+              <a:defRPr sz="2000" b="1"/>
+            </a:lvl1pPr>
+          </a:lstStyle>
+          <a:p>
+            <a:r>
+              <a:rPr lang="es-ES" smtClean="0"/>
+              <a:t>Haga clic para modificar el estilo de título del patrón</a:t>
+            </a:r>
+            <a:endParaRPr lang="es-ES"/>
+          </a:p>
+        </p:txBody>
+      </p:sp>
+      <p:sp>
+        <p:nvSpPr>
+          <p:cNvPr id="3" name="2 Marcador de posición de imagen"/>
+          <p:cNvSpPr>
+            <a:spLocks noGrp="1"/>
+          </p:cNvSpPr>
+          <p:nvPr>
+            <p:ph type="pic" idx="1"/>
+          </p:nvPr>
+        </p:nvSpPr>
+        <p:spPr>
+          <a:xfrm>
+            <a:off x="1792288" y="612775"/>
+            <a:ext cx="5486400" cy="4114800"/>
+          </a:xfrm>
+        </p:spPr>
+        <p:txBody>
+          <a:bodyPr/>
+          <a:lstStyle>
+            <a:lvl1pPr marL="0" indent="0">
+              <a:buNone/>
+              <a:defRPr sz="3200"/>
+            </a:lvl1pPr>
+            <a:lvl2pPr marL="457200" indent="0">
+              <a:buNone/>
+              <a:defRPr sz="2800"/>
+            </a:lvl2pPr>
+            <a:lvl3pPr marL="914400" indent="0">
+              <a:buNone/>
+              <a:defRPr sz="2400"/>
+            </a:lvl3pPr>
+            <a:lvl4pPr marL="1371600" indent="0">
+              <a:buNone/>
+              <a:defRPr sz="2000"/>
+            </a:lvl4pPr>
+            <a:lvl5pPr marL="1828800" indent="0">
+              <a:buNone/>
+              <a:defRPr sz="2000"/>
+            </a:lvl5pPr>
+            <a:lvl6pPr marL="2286000" indent="0">
+              <a:buNone/>
+              <a:defRPr sz="2000"/>
+            </a:lvl6pPr>
+            <a:lvl7pPr marL="2743200" indent="0">
+              <a:buNone/>
+              <a:defRPr sz="2000"/>
+            </a:lvl7pPr>
+            <a:lvl8pPr marL="3200400" indent="0">
+              <a:buNone/>
+              <a:defRPr sz="2000"/>
+            </a:lvl8pPr>
+            <a:lvl9pPr marL="3657600" indent="0">
+              <a:buNone/>
+              <a:defRPr sz="2000"/>
+            </a:lvl9pPr>
+          </a:lstStyle>
+          <a:p>
+            <a:endParaRPr lang="es-ES"/>
+          </a:p>
+        </p:txBody>
+      </p:sp>
+      <p:sp>
+        <p:nvSpPr>
+          <p:cNvPr id="4" name="3 Marcador de texto"/>
+          <p:cNvSpPr>
+            <a:spLocks noGrp="1"/>
+          </p:cNvSpPr>
+          <p:nvPr>
+            <p:ph type="body" sz="half" idx="2"/>
+          </p:nvPr>
+        </p:nvSpPr>
+        <p:spPr>
+          <a:xfrm>
+            <a:off x="1792288" y="5367338"/>
+            <a:ext cx="5486400" cy="804862"/>
+          </a:xfrm>
+        </p:spPr>
+        <p:txBody>
+          <a:bodyPr/>
+          <a:lstStyle>
+            <a:lvl1pPr marL="0" indent="0">
+              <a:buNone/>
+              <a:defRPr sz="1400"/>
+            </a:lvl1pPr>
+            <a:lvl2pPr marL="457200" indent="0">
+              <a:buNone/>
+              <a:defRPr sz="1200"/>
+            </a:lvl2pPr>
+            <a:lvl3pPr marL="914400" indent="0">
+              <a:buNone/>
+              <a:defRPr sz="1000"/>
+            </a:lvl3pPr>
+            <a:lvl4pPr marL="1371600" indent="0">
+              <a:buNone/>
+              <a:defRPr sz="900"/>
+            </a:lvl4pPr>
+            <a:lvl5pPr marL="1828800" indent="0">
+              <a:buNone/>
+              <a:defRPr sz="900"/>
+            </a:lvl5pPr>
+            <a:lvl6pPr marL="2286000" indent="0">
+              <a:buNone/>
+              <a:defRPr sz="900"/>
+            </a:lvl6pPr>
+            <a:lvl7pPr marL="2743200" indent="0">
+              <a:buNone/>
+              <a:defRPr sz="900"/>
+            </a:lvl7pPr>
+            <a:lvl8pPr marL="3200400" indent="0">
+              <a:buNone/>
+              <a:defRPr sz="900"/>
+            </a:lvl8pPr>
+            <a:lvl9pPr marL="3657600" indent="0">
+              <a:buNone/>
+              <a:defRPr sz="900"/>
+            </a:lvl9pPr>
+          </a:lstStyle>
+          <a:p>
+            <a:pPr lvl="0"/>
+            <a:r>
+              <a:rPr lang="es-ES" smtClean="0"/>
+              <a:t>Haga clic para modificar el estilo de texto del patrón</a:t>
+            </a:r>
+          </a:p>
+        </p:txBody>
+      </p:sp>
+      <p:sp>
+        <p:nvSpPr>
+          <p:cNvPr id="5" name="4 Marcador de fecha"/>
+          <p:cNvSpPr>
+            <a:spLocks noGrp="1"/>
+          </p:cNvSpPr>
+          <p:nvPr>
+            <p:ph type="dt" sz="half" idx="10"/>
+          </p:nvPr>
+        </p:nvSpPr>
+        <p:spPr/>
+        <p:txBody>
+          <a:bodyPr/>
+          <a:lstStyle/>
+          <a:p>
+            <a:fld id="{7A847CFC-816F-41D0-AAC0-9BF4FEBC753E}" type="datetimeFigureOut">
+              <a:rPr lang="es-ES" smtClean="0"/>
+              <a:pPr/>
+              <a:t>25/07/2019</a:t>
+            </a:fld>
+            <a:endParaRPr lang="es-ES"/>
+          </a:p>
+        </p:txBody>
+      </p:sp>
+      <p:sp>
+        <p:nvSpPr>
+          <p:cNvPr id="6" name="5 Marcador de pie de página"/>
+          <p:cNvSpPr>
+            <a:spLocks noGrp="1"/>
+          </p:cNvSpPr>
+          <p:nvPr>
+            <p:ph type="ftr" sz="quarter" idx="11"/>
+          </p:nvPr>
+        </p:nvSpPr>
+        <p:spPr/>
+        <p:txBody>
+          <a:bodyPr/>
+          <a:lstStyle/>
+          <a:p>
+            <a:endParaRPr lang="es-ES"/>
+          </a:p>
+        </p:txBody>
+      </p:sp>
+      <p:sp>
+        <p:nvSpPr>
+          <p:cNvPr id="7" name="6 Marcador de número de diapositiva"/>
+          <p:cNvSpPr>
+            <a:spLocks noGrp="1"/>
+          </p:cNvSpPr>
+          <p:nvPr>
+            <p:ph type="sldNum" sz="quarter" idx="12"/>
+          </p:nvPr>
+        </p:nvSpPr>
+        <p:spPr/>
+        <p:txBody>
+          <a:bodyPr/>
+          <a:lstStyle/>
+          <a:p>
+            <a:fld id="{132FADFE-3B8F-471C-ABF0-DBC7717ECBBC}" type="slidenum">
+              <a:rPr lang="es-ES" smtClean="0"/>
+              <a:pPr/>
+              <a:t>‹Nº›</a:t>
+            </a:fld>
+            <a:endParaRPr lang="es-ES"/>
+          </a:p>
+        </p:txBody>
+      </p:sp>
+    </p:spTree>
+  </p:cSld>
+  <p:clrMapOvr>
+    <a:masterClrMapping/>
+  </p:clrMapOvr>
+</p:sldLayout>
+</file>
+
+<file path=ppt/slideLayouts/slideLayout12.xml><?xml version="1.0" encoding="utf-8"?>
 <p:sldLayout xmlns:a="http://schemas.openxmlformats.org/drawingml/2006/main" xmlns:r="http://schemas.openxmlformats.org/officeDocument/2006/relationships" xmlns:p="http://schemas.openxmlformats.org/presentationml/2006/main" type="vertTx" preserve="1">
   <p:cSld name="Título y texto vertical">
     <p:spTree>
@@ -459,7 +990,7 @@
             <a:fld id="{7A847CFC-816F-41D0-AAC0-9BF4FEBC753E}" type="datetimeFigureOut">
               <a:rPr lang="es-ES" smtClean="0"/>
               <a:pPr/>
-              <a:t>19/07/2019</a:t>
+              <a:t>25/07/2019</a:t>
             </a:fld>
             <a:endParaRPr lang="es-ES"/>
           </a:p>
@@ -516,7 +1047,7 @@
 </p:sldLayout>
 </file>
 
-<file path=ppt/slideLayouts/slideLayout11.xml><?xml version="1.0" encoding="utf-8"?>
+<file path=ppt/slideLayouts/slideLayout13.xml><?xml version="1.0" encoding="utf-8"?>
 <p:sldLayout xmlns:a="http://schemas.openxmlformats.org/drawingml/2006/main" xmlns:r="http://schemas.openxmlformats.org/officeDocument/2006/relationships" xmlns:p="http://schemas.openxmlformats.org/presentationml/2006/main" type="vertTitleAndTx" preserve="1">
   <p:cSld name="Título vertical y texto">
     <p:spTree>
@@ -636,7 +1167,7 @@
             <a:fld id="{7A847CFC-816F-41D0-AAC0-9BF4FEBC753E}" type="datetimeFigureOut">
               <a:rPr lang="es-ES" smtClean="0"/>
               <a:pPr/>
-              <a:t>19/07/2019</a:t>
+              <a:t>25/07/2019</a:t>
             </a:fld>
             <a:endParaRPr lang="es-ES"/>
           </a:p>
@@ -803,7 +1334,7 @@
             <a:fld id="{7A847CFC-816F-41D0-AAC0-9BF4FEBC753E}" type="datetimeFigureOut">
               <a:rPr lang="es-ES" smtClean="0"/>
               <a:pPr/>
-              <a:t>19/07/2019</a:t>
+              <a:t>25/07/2019</a:t>
             </a:fld>
             <a:endParaRPr lang="es-ES"/>
           </a:p>
@@ -1046,7 +1577,7 @@
             <a:fld id="{7A847CFC-816F-41D0-AAC0-9BF4FEBC753E}" type="datetimeFigureOut">
               <a:rPr lang="es-ES" smtClean="0"/>
               <a:pPr/>
-              <a:t>19/07/2019</a:t>
+              <a:t>25/07/2019</a:t>
             </a:fld>
             <a:endParaRPr lang="es-ES"/>
           </a:p>
@@ -1331,7 +1862,7 @@
             <a:fld id="{7A847CFC-816F-41D0-AAC0-9BF4FEBC753E}" type="datetimeFigureOut">
               <a:rPr lang="es-ES" smtClean="0"/>
               <a:pPr/>
-              <a:t>19/07/2019</a:t>
+              <a:t>25/07/2019</a:t>
             </a:fld>
             <a:endParaRPr lang="es-ES"/>
           </a:p>
@@ -1389,6 +1920,1000 @@
 </file>
 
 <file path=ppt/slideLayouts/slideLayout5.xml><?xml version="1.0" encoding="utf-8"?>
+<p:sldLayout xmlns:a="http://schemas.openxmlformats.org/drawingml/2006/main" xmlns:r="http://schemas.openxmlformats.org/officeDocument/2006/relationships" xmlns:p="http://schemas.openxmlformats.org/presentationml/2006/main" preserve="1" userDrawn="1">
+  <p:cSld name="1_Dos objetos">
+    <p:spTree>
+      <p:nvGrpSpPr>
+        <p:cNvPr id="1" name=""/>
+        <p:cNvGrpSpPr/>
+        <p:nvPr/>
+      </p:nvGrpSpPr>
+      <p:grpSpPr>
+        <a:xfrm>
+          <a:off x="0" y="0"/>
+          <a:ext cx="0" cy="0"/>
+          <a:chOff x="0" y="0"/>
+          <a:chExt cx="0" cy="0"/>
+        </a:xfrm>
+      </p:grpSpPr>
+      <p:sp>
+        <p:nvSpPr>
+          <p:cNvPr id="2" name="1 Título"/>
+          <p:cNvSpPr>
+            <a:spLocks noGrp="1"/>
+          </p:cNvSpPr>
+          <p:nvPr>
+            <p:ph type="title"/>
+          </p:nvPr>
+        </p:nvSpPr>
+        <p:spPr>
+          <a:xfrm>
+            <a:off x="457200" y="274638"/>
+            <a:ext cx="8229600" cy="562074"/>
+          </a:xfrm>
+        </p:spPr>
+        <p:txBody>
+          <a:bodyPr/>
+          <a:lstStyle/>
+          <a:p>
+            <a:r>
+              <a:rPr lang="es-ES" dirty="0" smtClean="0"/>
+              <a:t>Haga clic para modificar el estilo de título del patrón</a:t>
+            </a:r>
+            <a:endParaRPr lang="es-ES" dirty="0"/>
+          </a:p>
+        </p:txBody>
+      </p:sp>
+      <p:sp>
+        <p:nvSpPr>
+          <p:cNvPr id="3" name="2 Marcador de contenido"/>
+          <p:cNvSpPr>
+            <a:spLocks noGrp="1"/>
+          </p:cNvSpPr>
+          <p:nvPr>
+            <p:ph sz="half" idx="1"/>
+          </p:nvPr>
+        </p:nvSpPr>
+        <p:spPr>
+          <a:xfrm>
+            <a:off x="467544" y="1052736"/>
+            <a:ext cx="4038600" cy="2592288"/>
+          </a:xfrm>
+        </p:spPr>
+        <p:txBody>
+          <a:bodyPr/>
+          <a:lstStyle>
+            <a:lvl1pPr>
+              <a:defRPr sz="2800"/>
+            </a:lvl1pPr>
+            <a:lvl2pPr>
+              <a:defRPr sz="2400"/>
+            </a:lvl2pPr>
+            <a:lvl3pPr>
+              <a:defRPr sz="2000"/>
+            </a:lvl3pPr>
+            <a:lvl4pPr>
+              <a:defRPr sz="1800"/>
+            </a:lvl4pPr>
+            <a:lvl5pPr>
+              <a:defRPr sz="1800"/>
+            </a:lvl5pPr>
+            <a:lvl6pPr>
+              <a:defRPr sz="1800"/>
+            </a:lvl6pPr>
+            <a:lvl7pPr>
+              <a:defRPr sz="1800"/>
+            </a:lvl7pPr>
+            <a:lvl8pPr>
+              <a:defRPr sz="1800"/>
+            </a:lvl8pPr>
+            <a:lvl9pPr>
+              <a:defRPr sz="1800"/>
+            </a:lvl9pPr>
+          </a:lstStyle>
+          <a:p>
+            <a:pPr lvl="0"/>
+            <a:r>
+              <a:rPr lang="es-ES" dirty="0" smtClean="0"/>
+              <a:t>Haga clic para modificar el estilo de texto del patrón</a:t>
+            </a:r>
+          </a:p>
+          <a:p>
+            <a:pPr lvl="1"/>
+            <a:r>
+              <a:rPr lang="es-ES" dirty="0" smtClean="0"/>
+              <a:t>Segundo nivel</a:t>
+            </a:r>
+          </a:p>
+          <a:p>
+            <a:pPr lvl="2"/>
+            <a:r>
+              <a:rPr lang="es-ES" dirty="0" smtClean="0"/>
+              <a:t>Tercer nivel</a:t>
+            </a:r>
+          </a:p>
+          <a:p>
+            <a:pPr lvl="3"/>
+            <a:r>
+              <a:rPr lang="es-ES" dirty="0" smtClean="0"/>
+              <a:t>Cuarto nivel</a:t>
+            </a:r>
+          </a:p>
+          <a:p>
+            <a:pPr lvl="4"/>
+            <a:r>
+              <a:rPr lang="es-ES" dirty="0" smtClean="0"/>
+              <a:t>Quinto nivel</a:t>
+            </a:r>
+            <a:endParaRPr lang="es-ES" dirty="0"/>
+          </a:p>
+        </p:txBody>
+      </p:sp>
+      <p:sp>
+        <p:nvSpPr>
+          <p:cNvPr id="4" name="3 Marcador de contenido"/>
+          <p:cNvSpPr>
+            <a:spLocks noGrp="1"/>
+          </p:cNvSpPr>
+          <p:nvPr>
+            <p:ph sz="half" idx="2"/>
+          </p:nvPr>
+        </p:nvSpPr>
+        <p:spPr>
+          <a:xfrm>
+            <a:off x="4644008" y="1052737"/>
+            <a:ext cx="4038600" cy="2592288"/>
+          </a:xfrm>
+        </p:spPr>
+        <p:txBody>
+          <a:bodyPr/>
+          <a:lstStyle>
+            <a:lvl1pPr>
+              <a:defRPr sz="2800"/>
+            </a:lvl1pPr>
+            <a:lvl2pPr>
+              <a:defRPr sz="2400"/>
+            </a:lvl2pPr>
+            <a:lvl3pPr>
+              <a:defRPr sz="2000"/>
+            </a:lvl3pPr>
+            <a:lvl4pPr>
+              <a:defRPr sz="1800"/>
+            </a:lvl4pPr>
+            <a:lvl5pPr>
+              <a:defRPr sz="1800"/>
+            </a:lvl5pPr>
+            <a:lvl6pPr>
+              <a:defRPr sz="1800"/>
+            </a:lvl6pPr>
+            <a:lvl7pPr>
+              <a:defRPr sz="1800"/>
+            </a:lvl7pPr>
+            <a:lvl8pPr>
+              <a:defRPr sz="1800"/>
+            </a:lvl8pPr>
+            <a:lvl9pPr>
+              <a:defRPr sz="1800"/>
+            </a:lvl9pPr>
+          </a:lstStyle>
+          <a:p>
+            <a:pPr lvl="0"/>
+            <a:r>
+              <a:rPr lang="es-ES" dirty="0" smtClean="0"/>
+              <a:t>Haga clic para modificar el estilo de texto del patrón</a:t>
+            </a:r>
+          </a:p>
+          <a:p>
+            <a:pPr lvl="1"/>
+            <a:r>
+              <a:rPr lang="es-ES" dirty="0" smtClean="0"/>
+              <a:t>Segundo nivel</a:t>
+            </a:r>
+          </a:p>
+          <a:p>
+            <a:pPr lvl="2"/>
+            <a:r>
+              <a:rPr lang="es-ES" dirty="0" smtClean="0"/>
+              <a:t>Tercer nivel</a:t>
+            </a:r>
+          </a:p>
+          <a:p>
+            <a:pPr lvl="3"/>
+            <a:r>
+              <a:rPr lang="es-ES" dirty="0" smtClean="0"/>
+              <a:t>Cuarto nivel</a:t>
+            </a:r>
+          </a:p>
+          <a:p>
+            <a:pPr lvl="4"/>
+            <a:r>
+              <a:rPr lang="es-ES" dirty="0" smtClean="0"/>
+              <a:t>Quinto nivel</a:t>
+            </a:r>
+            <a:endParaRPr lang="es-ES" dirty="0"/>
+          </a:p>
+        </p:txBody>
+      </p:sp>
+      <p:sp>
+        <p:nvSpPr>
+          <p:cNvPr id="5" name="4 Marcador de fecha"/>
+          <p:cNvSpPr>
+            <a:spLocks noGrp="1"/>
+          </p:cNvSpPr>
+          <p:nvPr>
+            <p:ph type="dt" sz="half" idx="10"/>
+          </p:nvPr>
+        </p:nvSpPr>
+        <p:spPr/>
+        <p:txBody>
+          <a:bodyPr/>
+          <a:lstStyle/>
+          <a:p>
+            <a:fld id="{7A847CFC-816F-41D0-AAC0-9BF4FEBC753E}" type="datetimeFigureOut">
+              <a:rPr lang="es-ES" smtClean="0"/>
+              <a:pPr/>
+              <a:t>25/07/2019</a:t>
+            </a:fld>
+            <a:endParaRPr lang="es-ES"/>
+          </a:p>
+        </p:txBody>
+      </p:sp>
+      <p:sp>
+        <p:nvSpPr>
+          <p:cNvPr id="6" name="5 Marcador de pie de página"/>
+          <p:cNvSpPr>
+            <a:spLocks noGrp="1"/>
+          </p:cNvSpPr>
+          <p:nvPr>
+            <p:ph type="ftr" sz="quarter" idx="11"/>
+          </p:nvPr>
+        </p:nvSpPr>
+        <p:spPr/>
+        <p:txBody>
+          <a:bodyPr/>
+          <a:lstStyle/>
+          <a:p>
+            <a:endParaRPr lang="es-ES"/>
+          </a:p>
+        </p:txBody>
+      </p:sp>
+      <p:sp>
+        <p:nvSpPr>
+          <p:cNvPr id="7" name="6 Marcador de número de diapositiva"/>
+          <p:cNvSpPr>
+            <a:spLocks noGrp="1"/>
+          </p:cNvSpPr>
+          <p:nvPr>
+            <p:ph type="sldNum" sz="quarter" idx="12"/>
+          </p:nvPr>
+        </p:nvSpPr>
+        <p:spPr/>
+        <p:txBody>
+          <a:bodyPr/>
+          <a:lstStyle/>
+          <a:p>
+            <a:fld id="{132FADFE-3B8F-471C-ABF0-DBC7717ECBBC}" type="slidenum">
+              <a:rPr lang="es-ES" smtClean="0"/>
+              <a:pPr/>
+              <a:t>‹Nº›</a:t>
+            </a:fld>
+            <a:endParaRPr lang="es-ES"/>
+          </a:p>
+        </p:txBody>
+      </p:sp>
+      <p:sp>
+        <p:nvSpPr>
+          <p:cNvPr id="9" name="8 Marcador de contenido"/>
+          <p:cNvSpPr>
+            <a:spLocks noGrp="1"/>
+          </p:cNvSpPr>
+          <p:nvPr>
+            <p:ph sz="quarter" idx="13"/>
+          </p:nvPr>
+        </p:nvSpPr>
+        <p:spPr>
+          <a:xfrm>
+            <a:off x="468313" y="3717032"/>
+            <a:ext cx="4032250" cy="2520256"/>
+          </a:xfrm>
+        </p:spPr>
+        <p:txBody>
+          <a:bodyPr/>
+          <a:lstStyle/>
+          <a:p>
+            <a:pPr lvl="0"/>
+            <a:r>
+              <a:rPr lang="es-ES" dirty="0" smtClean="0"/>
+              <a:t>Haga clic para modificar el estilo de texto del patrón</a:t>
+            </a:r>
+          </a:p>
+          <a:p>
+            <a:pPr lvl="1"/>
+            <a:r>
+              <a:rPr lang="es-ES" dirty="0" smtClean="0"/>
+              <a:t>Segundo nivel</a:t>
+            </a:r>
+          </a:p>
+          <a:p>
+            <a:pPr lvl="2"/>
+            <a:r>
+              <a:rPr lang="es-ES" dirty="0" smtClean="0"/>
+              <a:t>Tercer nivel</a:t>
+            </a:r>
+          </a:p>
+          <a:p>
+            <a:pPr lvl="3"/>
+            <a:r>
+              <a:rPr lang="es-ES" dirty="0" smtClean="0"/>
+              <a:t>Cuarto nivel</a:t>
+            </a:r>
+          </a:p>
+          <a:p>
+            <a:pPr lvl="4"/>
+            <a:r>
+              <a:rPr lang="es-ES" dirty="0" smtClean="0"/>
+              <a:t>Quinto nivel</a:t>
+            </a:r>
+            <a:endParaRPr lang="ca-ES" dirty="0"/>
+          </a:p>
+        </p:txBody>
+      </p:sp>
+      <p:sp>
+        <p:nvSpPr>
+          <p:cNvPr id="11" name="10 Marcador de contenido"/>
+          <p:cNvSpPr>
+            <a:spLocks noGrp="1"/>
+          </p:cNvSpPr>
+          <p:nvPr>
+            <p:ph sz="quarter" idx="14"/>
+          </p:nvPr>
+        </p:nvSpPr>
+        <p:spPr>
+          <a:xfrm>
+            <a:off x="4643439" y="3717032"/>
+            <a:ext cx="4033018" cy="2520256"/>
+          </a:xfrm>
+        </p:spPr>
+        <p:txBody>
+          <a:bodyPr/>
+          <a:lstStyle/>
+          <a:p>
+            <a:pPr lvl="0"/>
+            <a:r>
+              <a:rPr lang="es-ES" dirty="0" smtClean="0"/>
+              <a:t>Haga clic para modificar el estilo de texto del patrón</a:t>
+            </a:r>
+          </a:p>
+          <a:p>
+            <a:pPr lvl="1"/>
+            <a:r>
+              <a:rPr lang="es-ES" dirty="0" smtClean="0"/>
+              <a:t>Segundo nivel</a:t>
+            </a:r>
+          </a:p>
+          <a:p>
+            <a:pPr lvl="2"/>
+            <a:r>
+              <a:rPr lang="es-ES" dirty="0" smtClean="0"/>
+              <a:t>Tercer nivel</a:t>
+            </a:r>
+          </a:p>
+          <a:p>
+            <a:pPr lvl="3"/>
+            <a:r>
+              <a:rPr lang="es-ES" dirty="0" smtClean="0"/>
+              <a:t>Cuarto nivel</a:t>
+            </a:r>
+          </a:p>
+          <a:p>
+            <a:pPr lvl="4"/>
+            <a:r>
+              <a:rPr lang="es-ES" dirty="0" smtClean="0"/>
+              <a:t>Quinto nivel</a:t>
+            </a:r>
+            <a:endParaRPr lang="ca-ES" dirty="0"/>
+          </a:p>
+        </p:txBody>
+      </p:sp>
+    </p:spTree>
+  </p:cSld>
+  <p:clrMapOvr>
+    <a:masterClrMapping/>
+  </p:clrMapOvr>
+</p:sldLayout>
+</file>
+
+<file path=ppt/slideLayouts/slideLayout6.xml><?xml version="1.0" encoding="utf-8"?>
+<p:sldLayout xmlns:a="http://schemas.openxmlformats.org/drawingml/2006/main" xmlns:r="http://schemas.openxmlformats.org/officeDocument/2006/relationships" xmlns:p="http://schemas.openxmlformats.org/presentationml/2006/main" preserve="1" userDrawn="1">
+  <p:cSld name="2_Dos objetos">
+    <p:spTree>
+      <p:nvGrpSpPr>
+        <p:cNvPr id="1" name=""/>
+        <p:cNvGrpSpPr/>
+        <p:nvPr/>
+      </p:nvGrpSpPr>
+      <p:grpSpPr>
+        <a:xfrm>
+          <a:off x="0" y="0"/>
+          <a:ext cx="0" cy="0"/>
+          <a:chOff x="0" y="0"/>
+          <a:chExt cx="0" cy="0"/>
+        </a:xfrm>
+      </p:grpSpPr>
+      <p:sp>
+        <p:nvSpPr>
+          <p:cNvPr id="2" name="1 Título"/>
+          <p:cNvSpPr>
+            <a:spLocks noGrp="1"/>
+          </p:cNvSpPr>
+          <p:nvPr>
+            <p:ph type="title"/>
+          </p:nvPr>
+        </p:nvSpPr>
+        <p:spPr>
+          <a:xfrm>
+            <a:off x="457200" y="274638"/>
+            <a:ext cx="8229600" cy="562074"/>
+          </a:xfrm>
+        </p:spPr>
+        <p:txBody>
+          <a:bodyPr/>
+          <a:lstStyle/>
+          <a:p>
+            <a:r>
+              <a:rPr lang="es-ES" dirty="0" smtClean="0"/>
+              <a:t>Haga clic para modificar el estilo de título del patrón</a:t>
+            </a:r>
+            <a:endParaRPr lang="es-ES" dirty="0"/>
+          </a:p>
+        </p:txBody>
+      </p:sp>
+      <p:sp>
+        <p:nvSpPr>
+          <p:cNvPr id="3" name="2 Marcador de contenido"/>
+          <p:cNvSpPr>
+            <a:spLocks noGrp="1"/>
+          </p:cNvSpPr>
+          <p:nvPr>
+            <p:ph sz="half" idx="1"/>
+          </p:nvPr>
+        </p:nvSpPr>
+        <p:spPr>
+          <a:xfrm>
+            <a:off x="467544" y="1052736"/>
+            <a:ext cx="4038600" cy="1728192"/>
+          </a:xfrm>
+        </p:spPr>
+        <p:txBody>
+          <a:bodyPr/>
+          <a:lstStyle>
+            <a:lvl1pPr>
+              <a:defRPr sz="2800"/>
+            </a:lvl1pPr>
+            <a:lvl2pPr>
+              <a:defRPr sz="2400"/>
+            </a:lvl2pPr>
+            <a:lvl3pPr>
+              <a:defRPr sz="2000"/>
+            </a:lvl3pPr>
+            <a:lvl4pPr>
+              <a:defRPr sz="1800"/>
+            </a:lvl4pPr>
+            <a:lvl5pPr>
+              <a:defRPr sz="1800"/>
+            </a:lvl5pPr>
+            <a:lvl6pPr>
+              <a:defRPr sz="1800"/>
+            </a:lvl6pPr>
+            <a:lvl7pPr>
+              <a:defRPr sz="1800"/>
+            </a:lvl7pPr>
+            <a:lvl8pPr>
+              <a:defRPr sz="1800"/>
+            </a:lvl8pPr>
+            <a:lvl9pPr>
+              <a:defRPr sz="1800"/>
+            </a:lvl9pPr>
+          </a:lstStyle>
+          <a:p>
+            <a:pPr lvl="0"/>
+            <a:r>
+              <a:rPr lang="es-ES" dirty="0" smtClean="0"/>
+              <a:t>Haga clic para modificar el estilo de texto del patrón</a:t>
+            </a:r>
+          </a:p>
+          <a:p>
+            <a:pPr lvl="1"/>
+            <a:r>
+              <a:rPr lang="es-ES" dirty="0" smtClean="0"/>
+              <a:t>Segundo nivel</a:t>
+            </a:r>
+          </a:p>
+          <a:p>
+            <a:pPr lvl="2"/>
+            <a:r>
+              <a:rPr lang="es-ES" dirty="0" smtClean="0"/>
+              <a:t>Tercer nivel</a:t>
+            </a:r>
+          </a:p>
+          <a:p>
+            <a:pPr lvl="3"/>
+            <a:r>
+              <a:rPr lang="es-ES" dirty="0" smtClean="0"/>
+              <a:t>Cuarto nivel</a:t>
+            </a:r>
+          </a:p>
+          <a:p>
+            <a:pPr lvl="4"/>
+            <a:r>
+              <a:rPr lang="es-ES" dirty="0" smtClean="0"/>
+              <a:t>Quinto nivel</a:t>
+            </a:r>
+            <a:endParaRPr lang="es-ES" dirty="0"/>
+          </a:p>
+        </p:txBody>
+      </p:sp>
+      <p:sp>
+        <p:nvSpPr>
+          <p:cNvPr id="4" name="3 Marcador de contenido"/>
+          <p:cNvSpPr>
+            <a:spLocks noGrp="1"/>
+          </p:cNvSpPr>
+          <p:nvPr>
+            <p:ph sz="half" idx="2"/>
+          </p:nvPr>
+        </p:nvSpPr>
+        <p:spPr>
+          <a:xfrm>
+            <a:off x="4644008" y="1052737"/>
+            <a:ext cx="4038600" cy="1728191"/>
+          </a:xfrm>
+        </p:spPr>
+        <p:txBody>
+          <a:bodyPr/>
+          <a:lstStyle>
+            <a:lvl1pPr>
+              <a:defRPr sz="2800"/>
+            </a:lvl1pPr>
+            <a:lvl2pPr>
+              <a:defRPr sz="2400"/>
+            </a:lvl2pPr>
+            <a:lvl3pPr>
+              <a:defRPr sz="2000"/>
+            </a:lvl3pPr>
+            <a:lvl4pPr>
+              <a:defRPr sz="1800"/>
+            </a:lvl4pPr>
+            <a:lvl5pPr>
+              <a:defRPr sz="1800"/>
+            </a:lvl5pPr>
+            <a:lvl6pPr>
+              <a:defRPr sz="1800"/>
+            </a:lvl6pPr>
+            <a:lvl7pPr>
+              <a:defRPr sz="1800"/>
+            </a:lvl7pPr>
+            <a:lvl8pPr>
+              <a:defRPr sz="1800"/>
+            </a:lvl8pPr>
+            <a:lvl9pPr>
+              <a:defRPr sz="1800"/>
+            </a:lvl9pPr>
+          </a:lstStyle>
+          <a:p>
+            <a:pPr lvl="0"/>
+            <a:r>
+              <a:rPr lang="es-ES" dirty="0" smtClean="0"/>
+              <a:t>Haga clic para modificar el estilo de texto del patrón</a:t>
+            </a:r>
+          </a:p>
+          <a:p>
+            <a:pPr lvl="1"/>
+            <a:r>
+              <a:rPr lang="es-ES" dirty="0" smtClean="0"/>
+              <a:t>Segundo nivel</a:t>
+            </a:r>
+          </a:p>
+          <a:p>
+            <a:pPr lvl="2"/>
+            <a:r>
+              <a:rPr lang="es-ES" dirty="0" smtClean="0"/>
+              <a:t>Tercer nivel</a:t>
+            </a:r>
+          </a:p>
+          <a:p>
+            <a:pPr lvl="3"/>
+            <a:r>
+              <a:rPr lang="es-ES" dirty="0" smtClean="0"/>
+              <a:t>Cuarto nivel</a:t>
+            </a:r>
+          </a:p>
+          <a:p>
+            <a:pPr lvl="4"/>
+            <a:r>
+              <a:rPr lang="es-ES" dirty="0" smtClean="0"/>
+              <a:t>Quinto nivel</a:t>
+            </a:r>
+            <a:endParaRPr lang="es-ES" dirty="0"/>
+          </a:p>
+        </p:txBody>
+      </p:sp>
+      <p:sp>
+        <p:nvSpPr>
+          <p:cNvPr id="5" name="4 Marcador de fecha"/>
+          <p:cNvSpPr>
+            <a:spLocks noGrp="1"/>
+          </p:cNvSpPr>
+          <p:nvPr>
+            <p:ph type="dt" sz="half" idx="10"/>
+          </p:nvPr>
+        </p:nvSpPr>
+        <p:spPr/>
+        <p:txBody>
+          <a:bodyPr/>
+          <a:lstStyle/>
+          <a:p>
+            <a:fld id="{7A847CFC-816F-41D0-AAC0-9BF4FEBC753E}" type="datetimeFigureOut">
+              <a:rPr lang="es-ES" smtClean="0"/>
+              <a:pPr/>
+              <a:t>25/07/2019</a:t>
+            </a:fld>
+            <a:endParaRPr lang="es-ES"/>
+          </a:p>
+        </p:txBody>
+      </p:sp>
+      <p:sp>
+        <p:nvSpPr>
+          <p:cNvPr id="6" name="5 Marcador de pie de página"/>
+          <p:cNvSpPr>
+            <a:spLocks noGrp="1"/>
+          </p:cNvSpPr>
+          <p:nvPr>
+            <p:ph type="ftr" sz="quarter" idx="11"/>
+          </p:nvPr>
+        </p:nvSpPr>
+        <p:spPr/>
+        <p:txBody>
+          <a:bodyPr/>
+          <a:lstStyle/>
+          <a:p>
+            <a:endParaRPr lang="es-ES"/>
+          </a:p>
+        </p:txBody>
+      </p:sp>
+      <p:sp>
+        <p:nvSpPr>
+          <p:cNvPr id="7" name="6 Marcador de número de diapositiva"/>
+          <p:cNvSpPr>
+            <a:spLocks noGrp="1"/>
+          </p:cNvSpPr>
+          <p:nvPr>
+            <p:ph type="sldNum" sz="quarter" idx="12"/>
+          </p:nvPr>
+        </p:nvSpPr>
+        <p:spPr/>
+        <p:txBody>
+          <a:bodyPr/>
+          <a:lstStyle/>
+          <a:p>
+            <a:fld id="{132FADFE-3B8F-471C-ABF0-DBC7717ECBBC}" type="slidenum">
+              <a:rPr lang="es-ES" smtClean="0"/>
+              <a:pPr/>
+              <a:t>‹Nº›</a:t>
+            </a:fld>
+            <a:endParaRPr lang="es-ES"/>
+          </a:p>
+        </p:txBody>
+      </p:sp>
+      <p:sp>
+        <p:nvSpPr>
+          <p:cNvPr id="9" name="8 Marcador de contenido"/>
+          <p:cNvSpPr>
+            <a:spLocks noGrp="1"/>
+          </p:cNvSpPr>
+          <p:nvPr>
+            <p:ph sz="quarter" idx="13"/>
+          </p:nvPr>
+        </p:nvSpPr>
+        <p:spPr>
+          <a:xfrm>
+            <a:off x="467544" y="2852936"/>
+            <a:ext cx="4032250" cy="1800200"/>
+          </a:xfrm>
+        </p:spPr>
+        <p:txBody>
+          <a:bodyPr>
+            <a:noAutofit/>
+          </a:bodyPr>
+          <a:lstStyle>
+            <a:lvl1pPr>
+              <a:defRPr sz="2800"/>
+            </a:lvl1pPr>
+            <a:lvl2pPr>
+              <a:defRPr sz="2400"/>
+            </a:lvl2pPr>
+            <a:lvl3pPr>
+              <a:defRPr sz="2000"/>
+            </a:lvl3pPr>
+            <a:lvl4pPr>
+              <a:defRPr sz="1800"/>
+            </a:lvl4pPr>
+            <a:lvl5pPr>
+              <a:defRPr sz="1800"/>
+            </a:lvl5pPr>
+          </a:lstStyle>
+          <a:p>
+            <a:pPr lvl="0"/>
+            <a:r>
+              <a:rPr lang="es-ES" dirty="0" smtClean="0"/>
+              <a:t>Haga clic para modificar el estilo de texto del patrón</a:t>
+            </a:r>
+          </a:p>
+          <a:p>
+            <a:pPr lvl="1"/>
+            <a:r>
+              <a:rPr lang="es-ES" dirty="0" smtClean="0"/>
+              <a:t>Segundo nivel</a:t>
+            </a:r>
+          </a:p>
+          <a:p>
+            <a:pPr lvl="2"/>
+            <a:r>
+              <a:rPr lang="es-ES" dirty="0" smtClean="0"/>
+              <a:t>Tercer nivel</a:t>
+            </a:r>
+          </a:p>
+          <a:p>
+            <a:pPr lvl="3"/>
+            <a:r>
+              <a:rPr lang="es-ES" dirty="0" smtClean="0"/>
+              <a:t>Cuarto nivel</a:t>
+            </a:r>
+          </a:p>
+          <a:p>
+            <a:pPr lvl="4"/>
+            <a:r>
+              <a:rPr lang="es-ES" dirty="0" smtClean="0"/>
+              <a:t>Quinto nivel</a:t>
+            </a:r>
+            <a:endParaRPr lang="ca-ES" dirty="0"/>
+          </a:p>
+        </p:txBody>
+      </p:sp>
+      <p:sp>
+        <p:nvSpPr>
+          <p:cNvPr id="11" name="10 Marcador de contenido"/>
+          <p:cNvSpPr>
+            <a:spLocks noGrp="1"/>
+          </p:cNvSpPr>
+          <p:nvPr>
+            <p:ph sz="quarter" idx="14"/>
+          </p:nvPr>
+        </p:nvSpPr>
+        <p:spPr>
+          <a:xfrm>
+            <a:off x="4644008" y="2852936"/>
+            <a:ext cx="4033018" cy="1800200"/>
+          </a:xfrm>
+        </p:spPr>
+        <p:txBody>
+          <a:bodyPr>
+            <a:noAutofit/>
+          </a:bodyPr>
+          <a:lstStyle>
+            <a:lvl1pPr>
+              <a:defRPr sz="2800"/>
+            </a:lvl1pPr>
+            <a:lvl2pPr>
+              <a:defRPr sz="2400"/>
+            </a:lvl2pPr>
+            <a:lvl3pPr>
+              <a:defRPr sz="2000"/>
+            </a:lvl3pPr>
+            <a:lvl4pPr>
+              <a:defRPr sz="1800"/>
+            </a:lvl4pPr>
+            <a:lvl5pPr>
+              <a:defRPr sz="1800"/>
+            </a:lvl5pPr>
+          </a:lstStyle>
+          <a:p>
+            <a:pPr lvl="0"/>
+            <a:r>
+              <a:rPr lang="es-ES" dirty="0" smtClean="0"/>
+              <a:t>Haga clic para modificar el estilo de texto del patrón</a:t>
+            </a:r>
+          </a:p>
+          <a:p>
+            <a:pPr lvl="1"/>
+            <a:r>
+              <a:rPr lang="es-ES" dirty="0" smtClean="0"/>
+              <a:t>Segundo nivel</a:t>
+            </a:r>
+          </a:p>
+          <a:p>
+            <a:pPr lvl="2"/>
+            <a:r>
+              <a:rPr lang="es-ES" dirty="0" smtClean="0"/>
+              <a:t>Tercer nivel</a:t>
+            </a:r>
+          </a:p>
+          <a:p>
+            <a:pPr lvl="3"/>
+            <a:r>
+              <a:rPr lang="es-ES" dirty="0" smtClean="0"/>
+              <a:t>Cuarto nivel</a:t>
+            </a:r>
+          </a:p>
+          <a:p>
+            <a:pPr lvl="4"/>
+            <a:r>
+              <a:rPr lang="es-ES" dirty="0" smtClean="0"/>
+              <a:t>Quinto nivel</a:t>
+            </a:r>
+            <a:endParaRPr lang="ca-ES" dirty="0"/>
+          </a:p>
+        </p:txBody>
+      </p:sp>
+      <p:sp>
+        <p:nvSpPr>
+          <p:cNvPr id="12" name="11 Marcador de contenido"/>
+          <p:cNvSpPr>
+            <a:spLocks noGrp="1"/>
+          </p:cNvSpPr>
+          <p:nvPr>
+            <p:ph sz="quarter" idx="15"/>
+          </p:nvPr>
+        </p:nvSpPr>
+        <p:spPr>
+          <a:xfrm>
+            <a:off x="468313" y="4724400"/>
+            <a:ext cx="4032250" cy="1584325"/>
+          </a:xfrm>
+        </p:spPr>
+        <p:txBody>
+          <a:bodyPr>
+            <a:noAutofit/>
+          </a:bodyPr>
+          <a:lstStyle>
+            <a:lvl1pPr>
+              <a:defRPr sz="2800"/>
+            </a:lvl1pPr>
+            <a:lvl2pPr>
+              <a:defRPr sz="2400"/>
+            </a:lvl2pPr>
+            <a:lvl3pPr>
+              <a:defRPr sz="2000"/>
+            </a:lvl3pPr>
+            <a:lvl4pPr>
+              <a:defRPr sz="1800"/>
+            </a:lvl4pPr>
+            <a:lvl5pPr>
+              <a:defRPr sz="1800"/>
+            </a:lvl5pPr>
+          </a:lstStyle>
+          <a:p>
+            <a:pPr lvl="0"/>
+            <a:r>
+              <a:rPr lang="es-ES" smtClean="0"/>
+              <a:t>Haga clic para modificar el estilo de texto del patrón</a:t>
+            </a:r>
+          </a:p>
+          <a:p>
+            <a:pPr lvl="1"/>
+            <a:r>
+              <a:rPr lang="es-ES" smtClean="0"/>
+              <a:t>Segundo nivel</a:t>
+            </a:r>
+          </a:p>
+          <a:p>
+            <a:pPr lvl="2"/>
+            <a:r>
+              <a:rPr lang="es-ES" smtClean="0"/>
+              <a:t>Tercer nivel</a:t>
+            </a:r>
+          </a:p>
+          <a:p>
+            <a:pPr lvl="3"/>
+            <a:r>
+              <a:rPr lang="es-ES" smtClean="0"/>
+              <a:t>Cuarto nivel</a:t>
+            </a:r>
+          </a:p>
+          <a:p>
+            <a:pPr lvl="4"/>
+            <a:r>
+              <a:rPr lang="es-ES" smtClean="0"/>
+              <a:t>Quinto nivel</a:t>
+            </a:r>
+            <a:endParaRPr lang="ca-ES"/>
+          </a:p>
+        </p:txBody>
+      </p:sp>
+      <p:sp>
+        <p:nvSpPr>
+          <p:cNvPr id="14" name="13 Marcador de contenido"/>
+          <p:cNvSpPr>
+            <a:spLocks noGrp="1"/>
+          </p:cNvSpPr>
+          <p:nvPr>
+            <p:ph sz="quarter" idx="16"/>
+          </p:nvPr>
+        </p:nvSpPr>
+        <p:spPr>
+          <a:xfrm>
+            <a:off x="4643438" y="4724400"/>
+            <a:ext cx="4032250" cy="1584325"/>
+          </a:xfrm>
+        </p:spPr>
+        <p:txBody>
+          <a:bodyPr>
+            <a:noAutofit/>
+          </a:bodyPr>
+          <a:lstStyle>
+            <a:lvl1pPr>
+              <a:defRPr sz="2800"/>
+            </a:lvl1pPr>
+            <a:lvl2pPr>
+              <a:defRPr sz="2400"/>
+            </a:lvl2pPr>
+            <a:lvl3pPr>
+              <a:defRPr sz="2000"/>
+            </a:lvl3pPr>
+            <a:lvl4pPr>
+              <a:defRPr sz="1800"/>
+            </a:lvl4pPr>
+            <a:lvl5pPr>
+              <a:defRPr sz="1800"/>
+            </a:lvl5pPr>
+          </a:lstStyle>
+          <a:p>
+            <a:pPr lvl="0"/>
+            <a:r>
+              <a:rPr lang="es-ES" smtClean="0"/>
+              <a:t>Haga clic para modificar el estilo de texto del patrón</a:t>
+            </a:r>
+          </a:p>
+          <a:p>
+            <a:pPr lvl="1"/>
+            <a:r>
+              <a:rPr lang="es-ES" smtClean="0"/>
+              <a:t>Segundo nivel</a:t>
+            </a:r>
+          </a:p>
+          <a:p>
+            <a:pPr lvl="2"/>
+            <a:r>
+              <a:rPr lang="es-ES" smtClean="0"/>
+              <a:t>Tercer nivel</a:t>
+            </a:r>
+          </a:p>
+          <a:p>
+            <a:pPr lvl="3"/>
+            <a:r>
+              <a:rPr lang="es-ES" smtClean="0"/>
+              <a:t>Cuarto nivel</a:t>
+            </a:r>
+          </a:p>
+          <a:p>
+            <a:pPr lvl="4"/>
+            <a:r>
+              <a:rPr lang="es-ES" smtClean="0"/>
+              <a:t>Quinto nivel</a:t>
+            </a:r>
+            <a:endParaRPr lang="ca-ES"/>
+          </a:p>
+        </p:txBody>
+      </p:sp>
+    </p:spTree>
+  </p:cSld>
+  <p:clrMapOvr>
+    <a:masterClrMapping/>
+  </p:clrMapOvr>
+</p:sldLayout>
+</file>
+
+<file path=ppt/slideLayouts/slideLayout7.xml><?xml version="1.0" encoding="utf-8"?>
 <p:sldLayout xmlns:a="http://schemas.openxmlformats.org/drawingml/2006/main" xmlns:r="http://schemas.openxmlformats.org/officeDocument/2006/relationships" xmlns:p="http://schemas.openxmlformats.org/presentationml/2006/main" type="twoTxTwoObj" preserve="1">
   <p:cSld name="Comparación">
     <p:spTree>
@@ -1750,7 +3275,7 @@
             <a:fld id="{7A847CFC-816F-41D0-AAC0-9BF4FEBC753E}" type="datetimeFigureOut">
               <a:rPr lang="es-ES" smtClean="0"/>
               <a:pPr/>
-              <a:t>19/07/2019</a:t>
+              <a:t>25/07/2019</a:t>
             </a:fld>
             <a:endParaRPr lang="es-ES"/>
           </a:p>
@@ -1807,7 +3332,7 @@
 </p:sldLayout>
 </file>
 
-<file path=ppt/slideLayouts/slideLayout6.xml><?xml version="1.0" encoding="utf-8"?>
+<file path=ppt/slideLayouts/slideLayout8.xml><?xml version="1.0" encoding="utf-8"?>
 <p:sldLayout xmlns:a="http://schemas.openxmlformats.org/drawingml/2006/main" xmlns:r="http://schemas.openxmlformats.org/officeDocument/2006/relationships" xmlns:p="http://schemas.openxmlformats.org/presentationml/2006/main" type="titleOnly" preserve="1">
   <p:cSld name="Sólo el título">
     <p:spTree>
@@ -1865,7 +3390,7 @@
             <a:fld id="{7A847CFC-816F-41D0-AAC0-9BF4FEBC753E}" type="datetimeFigureOut">
               <a:rPr lang="es-ES" smtClean="0"/>
               <a:pPr/>
-              <a:t>19/07/2019</a:t>
+              <a:t>25/07/2019</a:t>
             </a:fld>
             <a:endParaRPr lang="es-ES"/>
           </a:p>
@@ -1922,7 +3447,7 @@
 </p:sldLayout>
 </file>
 
-<file path=ppt/slideLayouts/slideLayout7.xml><?xml version="1.0" encoding="utf-8"?>
+<file path=ppt/slideLayouts/slideLayout9.xml><?xml version="1.0" encoding="utf-8"?>
 <p:sldLayout xmlns:a="http://schemas.openxmlformats.org/drawingml/2006/main" xmlns:r="http://schemas.openxmlformats.org/officeDocument/2006/relationships" xmlns:p="http://schemas.openxmlformats.org/presentationml/2006/main" type="blank" preserve="1">
   <p:cSld name="En blanco">
     <p:spTree>
@@ -1957,7 +3482,7 @@
             <a:fld id="{7A847CFC-816F-41D0-AAC0-9BF4FEBC753E}" type="datetimeFigureOut">
               <a:rPr lang="es-ES" smtClean="0"/>
               <a:pPr/>
-              <a:t>19/07/2019</a:t>
+              <a:t>25/07/2019</a:t>
             </a:fld>
             <a:endParaRPr lang="es-ES"/>
           </a:p>
@@ -1985,530 +3510,6 @@
       <p:sp>
         <p:nvSpPr>
           <p:cNvPr id="4" name="3 Marcador de número de diapositiva"/>
-          <p:cNvSpPr>
-            <a:spLocks noGrp="1"/>
-          </p:cNvSpPr>
-          <p:nvPr>
-            <p:ph type="sldNum" sz="quarter" idx="12"/>
-          </p:nvPr>
-        </p:nvSpPr>
-        <p:spPr/>
-        <p:txBody>
-          <a:bodyPr/>
-          <a:lstStyle/>
-          <a:p>
-            <a:fld id="{132FADFE-3B8F-471C-ABF0-DBC7717ECBBC}" type="slidenum">
-              <a:rPr lang="es-ES" smtClean="0"/>
-              <a:pPr/>
-              <a:t>‹Nº›</a:t>
-            </a:fld>
-            <a:endParaRPr lang="es-ES"/>
-          </a:p>
-        </p:txBody>
-      </p:sp>
-    </p:spTree>
-  </p:cSld>
-  <p:clrMapOvr>
-    <a:masterClrMapping/>
-  </p:clrMapOvr>
-</p:sldLayout>
-</file>
-
-<file path=ppt/slideLayouts/slideLayout8.xml><?xml version="1.0" encoding="utf-8"?>
-<p:sldLayout xmlns:a="http://schemas.openxmlformats.org/drawingml/2006/main" xmlns:r="http://schemas.openxmlformats.org/officeDocument/2006/relationships" xmlns:p="http://schemas.openxmlformats.org/presentationml/2006/main" type="objTx" preserve="1">
-  <p:cSld name="Contenido con título">
-    <p:spTree>
-      <p:nvGrpSpPr>
-        <p:cNvPr id="1" name=""/>
-        <p:cNvGrpSpPr/>
-        <p:nvPr/>
-      </p:nvGrpSpPr>
-      <p:grpSpPr>
-        <a:xfrm>
-          <a:off x="0" y="0"/>
-          <a:ext cx="0" cy="0"/>
-          <a:chOff x="0" y="0"/>
-          <a:chExt cx="0" cy="0"/>
-        </a:xfrm>
-      </p:grpSpPr>
-      <p:sp>
-        <p:nvSpPr>
-          <p:cNvPr id="2" name="1 Título"/>
-          <p:cNvSpPr>
-            <a:spLocks noGrp="1"/>
-          </p:cNvSpPr>
-          <p:nvPr>
-            <p:ph type="title"/>
-          </p:nvPr>
-        </p:nvSpPr>
-        <p:spPr>
-          <a:xfrm>
-            <a:off x="457200" y="273050"/>
-            <a:ext cx="3008313" cy="1162050"/>
-          </a:xfrm>
-        </p:spPr>
-        <p:txBody>
-          <a:bodyPr anchor="b"/>
-          <a:lstStyle>
-            <a:lvl1pPr algn="l">
-              <a:defRPr sz="2000" b="1"/>
-            </a:lvl1pPr>
-          </a:lstStyle>
-          <a:p>
-            <a:r>
-              <a:rPr lang="es-ES" smtClean="0"/>
-              <a:t>Haga clic para modificar el estilo de título del patrón</a:t>
-            </a:r>
-            <a:endParaRPr lang="es-ES"/>
-          </a:p>
-        </p:txBody>
-      </p:sp>
-      <p:sp>
-        <p:nvSpPr>
-          <p:cNvPr id="3" name="2 Marcador de contenido"/>
-          <p:cNvSpPr>
-            <a:spLocks noGrp="1"/>
-          </p:cNvSpPr>
-          <p:nvPr>
-            <p:ph idx="1"/>
-          </p:nvPr>
-        </p:nvSpPr>
-        <p:spPr>
-          <a:xfrm>
-            <a:off x="3575050" y="273050"/>
-            <a:ext cx="5111750" cy="5853113"/>
-          </a:xfrm>
-        </p:spPr>
-        <p:txBody>
-          <a:bodyPr/>
-          <a:lstStyle>
-            <a:lvl1pPr>
-              <a:defRPr sz="3200"/>
-            </a:lvl1pPr>
-            <a:lvl2pPr>
-              <a:defRPr sz="2800"/>
-            </a:lvl2pPr>
-            <a:lvl3pPr>
-              <a:defRPr sz="2400"/>
-            </a:lvl3pPr>
-            <a:lvl4pPr>
-              <a:defRPr sz="2000"/>
-            </a:lvl4pPr>
-            <a:lvl5pPr>
-              <a:defRPr sz="2000"/>
-            </a:lvl5pPr>
-            <a:lvl6pPr>
-              <a:defRPr sz="2000"/>
-            </a:lvl6pPr>
-            <a:lvl7pPr>
-              <a:defRPr sz="2000"/>
-            </a:lvl7pPr>
-            <a:lvl8pPr>
-              <a:defRPr sz="2000"/>
-            </a:lvl8pPr>
-            <a:lvl9pPr>
-              <a:defRPr sz="2000"/>
-            </a:lvl9pPr>
-          </a:lstStyle>
-          <a:p>
-            <a:pPr lvl="0"/>
-            <a:r>
-              <a:rPr lang="es-ES" smtClean="0"/>
-              <a:t>Haga clic para modificar el estilo de texto del patrón</a:t>
-            </a:r>
-          </a:p>
-          <a:p>
-            <a:pPr lvl="1"/>
-            <a:r>
-              <a:rPr lang="es-ES" smtClean="0"/>
-              <a:t>Segundo nivel</a:t>
-            </a:r>
-          </a:p>
-          <a:p>
-            <a:pPr lvl="2"/>
-            <a:r>
-              <a:rPr lang="es-ES" smtClean="0"/>
-              <a:t>Tercer nivel</a:t>
-            </a:r>
-          </a:p>
-          <a:p>
-            <a:pPr lvl="3"/>
-            <a:r>
-              <a:rPr lang="es-ES" smtClean="0"/>
-              <a:t>Cuarto nivel</a:t>
-            </a:r>
-          </a:p>
-          <a:p>
-            <a:pPr lvl="4"/>
-            <a:r>
-              <a:rPr lang="es-ES" smtClean="0"/>
-              <a:t>Quinto nivel</a:t>
-            </a:r>
-            <a:endParaRPr lang="es-ES"/>
-          </a:p>
-        </p:txBody>
-      </p:sp>
-      <p:sp>
-        <p:nvSpPr>
-          <p:cNvPr id="4" name="3 Marcador de texto"/>
-          <p:cNvSpPr>
-            <a:spLocks noGrp="1"/>
-          </p:cNvSpPr>
-          <p:nvPr>
-            <p:ph type="body" sz="half" idx="2"/>
-          </p:nvPr>
-        </p:nvSpPr>
-        <p:spPr>
-          <a:xfrm>
-            <a:off x="457200" y="1435100"/>
-            <a:ext cx="3008313" cy="4691063"/>
-          </a:xfrm>
-        </p:spPr>
-        <p:txBody>
-          <a:bodyPr/>
-          <a:lstStyle>
-            <a:lvl1pPr marL="0" indent="0">
-              <a:buNone/>
-              <a:defRPr sz="1400"/>
-            </a:lvl1pPr>
-            <a:lvl2pPr marL="457200" indent="0">
-              <a:buNone/>
-              <a:defRPr sz="1200"/>
-            </a:lvl2pPr>
-            <a:lvl3pPr marL="914400" indent="0">
-              <a:buNone/>
-              <a:defRPr sz="1000"/>
-            </a:lvl3pPr>
-            <a:lvl4pPr marL="1371600" indent="0">
-              <a:buNone/>
-              <a:defRPr sz="900"/>
-            </a:lvl4pPr>
-            <a:lvl5pPr marL="1828800" indent="0">
-              <a:buNone/>
-              <a:defRPr sz="900"/>
-            </a:lvl5pPr>
-            <a:lvl6pPr marL="2286000" indent="0">
-              <a:buNone/>
-              <a:defRPr sz="900"/>
-            </a:lvl6pPr>
-            <a:lvl7pPr marL="2743200" indent="0">
-              <a:buNone/>
-              <a:defRPr sz="900"/>
-            </a:lvl7pPr>
-            <a:lvl8pPr marL="3200400" indent="0">
-              <a:buNone/>
-              <a:defRPr sz="900"/>
-            </a:lvl8pPr>
-            <a:lvl9pPr marL="3657600" indent="0">
-              <a:buNone/>
-              <a:defRPr sz="900"/>
-            </a:lvl9pPr>
-          </a:lstStyle>
-          <a:p>
-            <a:pPr lvl="0"/>
-            <a:r>
-              <a:rPr lang="es-ES" smtClean="0"/>
-              <a:t>Haga clic para modificar el estilo de texto del patrón</a:t>
-            </a:r>
-          </a:p>
-        </p:txBody>
-      </p:sp>
-      <p:sp>
-        <p:nvSpPr>
-          <p:cNvPr id="5" name="4 Marcador de fecha"/>
-          <p:cNvSpPr>
-            <a:spLocks noGrp="1"/>
-          </p:cNvSpPr>
-          <p:nvPr>
-            <p:ph type="dt" sz="half" idx="10"/>
-          </p:nvPr>
-        </p:nvSpPr>
-        <p:spPr/>
-        <p:txBody>
-          <a:bodyPr/>
-          <a:lstStyle/>
-          <a:p>
-            <a:fld id="{7A847CFC-816F-41D0-AAC0-9BF4FEBC753E}" type="datetimeFigureOut">
-              <a:rPr lang="es-ES" smtClean="0"/>
-              <a:pPr/>
-              <a:t>19/07/2019</a:t>
-            </a:fld>
-            <a:endParaRPr lang="es-ES"/>
-          </a:p>
-        </p:txBody>
-      </p:sp>
-      <p:sp>
-        <p:nvSpPr>
-          <p:cNvPr id="6" name="5 Marcador de pie de página"/>
-          <p:cNvSpPr>
-            <a:spLocks noGrp="1"/>
-          </p:cNvSpPr>
-          <p:nvPr>
-            <p:ph type="ftr" sz="quarter" idx="11"/>
-          </p:nvPr>
-        </p:nvSpPr>
-        <p:spPr/>
-        <p:txBody>
-          <a:bodyPr/>
-          <a:lstStyle/>
-          <a:p>
-            <a:endParaRPr lang="es-ES"/>
-          </a:p>
-        </p:txBody>
-      </p:sp>
-      <p:sp>
-        <p:nvSpPr>
-          <p:cNvPr id="7" name="6 Marcador de número de diapositiva"/>
-          <p:cNvSpPr>
-            <a:spLocks noGrp="1"/>
-          </p:cNvSpPr>
-          <p:nvPr>
-            <p:ph type="sldNum" sz="quarter" idx="12"/>
-          </p:nvPr>
-        </p:nvSpPr>
-        <p:spPr/>
-        <p:txBody>
-          <a:bodyPr/>
-          <a:lstStyle/>
-          <a:p>
-            <a:fld id="{132FADFE-3B8F-471C-ABF0-DBC7717ECBBC}" type="slidenum">
-              <a:rPr lang="es-ES" smtClean="0"/>
-              <a:pPr/>
-              <a:t>‹Nº›</a:t>
-            </a:fld>
-            <a:endParaRPr lang="es-ES"/>
-          </a:p>
-        </p:txBody>
-      </p:sp>
-    </p:spTree>
-  </p:cSld>
-  <p:clrMapOvr>
-    <a:masterClrMapping/>
-  </p:clrMapOvr>
-</p:sldLayout>
-</file>
-
-<file path=ppt/slideLayouts/slideLayout9.xml><?xml version="1.0" encoding="utf-8"?>
-<p:sldLayout xmlns:a="http://schemas.openxmlformats.org/drawingml/2006/main" xmlns:r="http://schemas.openxmlformats.org/officeDocument/2006/relationships" xmlns:p="http://schemas.openxmlformats.org/presentationml/2006/main" type="picTx" preserve="1">
-  <p:cSld name="Imagen con título">
-    <p:spTree>
-      <p:nvGrpSpPr>
-        <p:cNvPr id="1" name=""/>
-        <p:cNvGrpSpPr/>
-        <p:nvPr/>
-      </p:nvGrpSpPr>
-      <p:grpSpPr>
-        <a:xfrm>
-          <a:off x="0" y="0"/>
-          <a:ext cx="0" cy="0"/>
-          <a:chOff x="0" y="0"/>
-          <a:chExt cx="0" cy="0"/>
-        </a:xfrm>
-      </p:grpSpPr>
-      <p:sp>
-        <p:nvSpPr>
-          <p:cNvPr id="2" name="1 Título"/>
-          <p:cNvSpPr>
-            <a:spLocks noGrp="1"/>
-          </p:cNvSpPr>
-          <p:nvPr>
-            <p:ph type="title"/>
-          </p:nvPr>
-        </p:nvSpPr>
-        <p:spPr>
-          <a:xfrm>
-            <a:off x="1792288" y="4800600"/>
-            <a:ext cx="5486400" cy="566738"/>
-          </a:xfrm>
-        </p:spPr>
-        <p:txBody>
-          <a:bodyPr anchor="b"/>
-          <a:lstStyle>
-            <a:lvl1pPr algn="l">
-              <a:defRPr sz="2000" b="1"/>
-            </a:lvl1pPr>
-          </a:lstStyle>
-          <a:p>
-            <a:r>
-              <a:rPr lang="es-ES" smtClean="0"/>
-              <a:t>Haga clic para modificar el estilo de título del patrón</a:t>
-            </a:r>
-            <a:endParaRPr lang="es-ES"/>
-          </a:p>
-        </p:txBody>
-      </p:sp>
-      <p:sp>
-        <p:nvSpPr>
-          <p:cNvPr id="3" name="2 Marcador de posición de imagen"/>
-          <p:cNvSpPr>
-            <a:spLocks noGrp="1"/>
-          </p:cNvSpPr>
-          <p:nvPr>
-            <p:ph type="pic" idx="1"/>
-          </p:nvPr>
-        </p:nvSpPr>
-        <p:spPr>
-          <a:xfrm>
-            <a:off x="1792288" y="612775"/>
-            <a:ext cx="5486400" cy="4114800"/>
-          </a:xfrm>
-        </p:spPr>
-        <p:txBody>
-          <a:bodyPr/>
-          <a:lstStyle>
-            <a:lvl1pPr marL="0" indent="0">
-              <a:buNone/>
-              <a:defRPr sz="3200"/>
-            </a:lvl1pPr>
-            <a:lvl2pPr marL="457200" indent="0">
-              <a:buNone/>
-              <a:defRPr sz="2800"/>
-            </a:lvl2pPr>
-            <a:lvl3pPr marL="914400" indent="0">
-              <a:buNone/>
-              <a:defRPr sz="2400"/>
-            </a:lvl3pPr>
-            <a:lvl4pPr marL="1371600" indent="0">
-              <a:buNone/>
-              <a:defRPr sz="2000"/>
-            </a:lvl4pPr>
-            <a:lvl5pPr marL="1828800" indent="0">
-              <a:buNone/>
-              <a:defRPr sz="2000"/>
-            </a:lvl5pPr>
-            <a:lvl6pPr marL="2286000" indent="0">
-              <a:buNone/>
-              <a:defRPr sz="2000"/>
-            </a:lvl6pPr>
-            <a:lvl7pPr marL="2743200" indent="0">
-              <a:buNone/>
-              <a:defRPr sz="2000"/>
-            </a:lvl7pPr>
-            <a:lvl8pPr marL="3200400" indent="0">
-              <a:buNone/>
-              <a:defRPr sz="2000"/>
-            </a:lvl8pPr>
-            <a:lvl9pPr marL="3657600" indent="0">
-              <a:buNone/>
-              <a:defRPr sz="2000"/>
-            </a:lvl9pPr>
-          </a:lstStyle>
-          <a:p>
-            <a:endParaRPr lang="es-ES"/>
-          </a:p>
-        </p:txBody>
-      </p:sp>
-      <p:sp>
-        <p:nvSpPr>
-          <p:cNvPr id="4" name="3 Marcador de texto"/>
-          <p:cNvSpPr>
-            <a:spLocks noGrp="1"/>
-          </p:cNvSpPr>
-          <p:nvPr>
-            <p:ph type="body" sz="half" idx="2"/>
-          </p:nvPr>
-        </p:nvSpPr>
-        <p:spPr>
-          <a:xfrm>
-            <a:off x="1792288" y="5367338"/>
-            <a:ext cx="5486400" cy="804862"/>
-          </a:xfrm>
-        </p:spPr>
-        <p:txBody>
-          <a:bodyPr/>
-          <a:lstStyle>
-            <a:lvl1pPr marL="0" indent="0">
-              <a:buNone/>
-              <a:defRPr sz="1400"/>
-            </a:lvl1pPr>
-            <a:lvl2pPr marL="457200" indent="0">
-              <a:buNone/>
-              <a:defRPr sz="1200"/>
-            </a:lvl2pPr>
-            <a:lvl3pPr marL="914400" indent="0">
-              <a:buNone/>
-              <a:defRPr sz="1000"/>
-            </a:lvl3pPr>
-            <a:lvl4pPr marL="1371600" indent="0">
-              <a:buNone/>
-              <a:defRPr sz="900"/>
-            </a:lvl4pPr>
-            <a:lvl5pPr marL="1828800" indent="0">
-              <a:buNone/>
-              <a:defRPr sz="900"/>
-            </a:lvl5pPr>
-            <a:lvl6pPr marL="2286000" indent="0">
-              <a:buNone/>
-              <a:defRPr sz="900"/>
-            </a:lvl6pPr>
-            <a:lvl7pPr marL="2743200" indent="0">
-              <a:buNone/>
-              <a:defRPr sz="900"/>
-            </a:lvl7pPr>
-            <a:lvl8pPr marL="3200400" indent="0">
-              <a:buNone/>
-              <a:defRPr sz="900"/>
-            </a:lvl8pPr>
-            <a:lvl9pPr marL="3657600" indent="0">
-              <a:buNone/>
-              <a:defRPr sz="900"/>
-            </a:lvl9pPr>
-          </a:lstStyle>
-          <a:p>
-            <a:pPr lvl="0"/>
-            <a:r>
-              <a:rPr lang="es-ES" smtClean="0"/>
-              <a:t>Haga clic para modificar el estilo de texto del patrón</a:t>
-            </a:r>
-          </a:p>
-        </p:txBody>
-      </p:sp>
-      <p:sp>
-        <p:nvSpPr>
-          <p:cNvPr id="5" name="4 Marcador de fecha"/>
-          <p:cNvSpPr>
-            <a:spLocks noGrp="1"/>
-          </p:cNvSpPr>
-          <p:nvPr>
-            <p:ph type="dt" sz="half" idx="10"/>
-          </p:nvPr>
-        </p:nvSpPr>
-        <p:spPr/>
-        <p:txBody>
-          <a:bodyPr/>
-          <a:lstStyle/>
-          <a:p>
-            <a:fld id="{7A847CFC-816F-41D0-AAC0-9BF4FEBC753E}" type="datetimeFigureOut">
-              <a:rPr lang="es-ES" smtClean="0"/>
-              <a:pPr/>
-              <a:t>19/07/2019</a:t>
-            </a:fld>
-            <a:endParaRPr lang="es-ES"/>
-          </a:p>
-        </p:txBody>
-      </p:sp>
-      <p:sp>
-        <p:nvSpPr>
-          <p:cNvPr id="6" name="5 Marcador de pie de página"/>
-          <p:cNvSpPr>
-            <a:spLocks noGrp="1"/>
-          </p:cNvSpPr>
-          <p:nvPr>
-            <p:ph type="ftr" sz="quarter" idx="11"/>
-          </p:nvPr>
-        </p:nvSpPr>
-        <p:spPr/>
-        <p:txBody>
-          <a:bodyPr/>
-          <a:lstStyle/>
-          <a:p>
-            <a:endParaRPr lang="es-ES"/>
-          </a:p>
-        </p:txBody>
-      </p:sp>
-      <p:sp>
-        <p:nvSpPr>
-          <p:cNvPr id="7" name="6 Marcador de número de diapositiva"/>
           <p:cNvSpPr>
             <a:spLocks noGrp="1"/>
           </p:cNvSpPr>
@@ -2691,7 +3692,7 @@
             <a:fld id="{7A847CFC-816F-41D0-AAC0-9BF4FEBC753E}" type="datetimeFigureOut">
               <a:rPr lang="es-ES" smtClean="0"/>
               <a:pPr/>
-              <a:t>19/07/2019</a:t>
+              <a:t>25/07/2019</a:t>
             </a:fld>
             <a:endParaRPr lang="es-ES"/>
           </a:p>
@@ -2784,13 +3785,15 @@
     <p:sldLayoutId id="2147483650" r:id="rId2"/>
     <p:sldLayoutId id="2147483651" r:id="rId3"/>
     <p:sldLayoutId id="2147483652" r:id="rId4"/>
-    <p:sldLayoutId id="2147483653" r:id="rId5"/>
-    <p:sldLayoutId id="2147483654" r:id="rId6"/>
-    <p:sldLayoutId id="2147483655" r:id="rId7"/>
-    <p:sldLayoutId id="2147483656" r:id="rId8"/>
-    <p:sldLayoutId id="2147483657" r:id="rId9"/>
-    <p:sldLayoutId id="2147483658" r:id="rId10"/>
-    <p:sldLayoutId id="2147483659" r:id="rId11"/>
+    <p:sldLayoutId id="2147483660" r:id="rId5"/>
+    <p:sldLayoutId id="2147483661" r:id="rId6"/>
+    <p:sldLayoutId id="2147483653" r:id="rId7"/>
+    <p:sldLayoutId id="2147483654" r:id="rId8"/>
+    <p:sldLayoutId id="2147483655" r:id="rId9"/>
+    <p:sldLayoutId id="2147483656" r:id="rId10"/>
+    <p:sldLayoutId id="2147483657" r:id="rId11"/>
+    <p:sldLayoutId id="2147483658" r:id="rId12"/>
+    <p:sldLayoutId id="2147483659" r:id="rId13"/>
   </p:sldLayoutIdLst>
   <p:txStyles>
     <p:titleStyle>
@@ -4217,7 +5220,1571 @@
 </p:sld>
 </file>
 
+<file path=ppt/slides/slide10.xml><?xml version="1.0" encoding="utf-8"?>
+<p:sld xmlns:a="http://schemas.openxmlformats.org/drawingml/2006/main" xmlns:r="http://schemas.openxmlformats.org/officeDocument/2006/relationships" xmlns:p="http://schemas.openxmlformats.org/presentationml/2006/main">
+  <p:cSld>
+    <p:spTree>
+      <p:nvGrpSpPr>
+        <p:cNvPr id="1" name=""/>
+        <p:cNvGrpSpPr/>
+        <p:nvPr/>
+      </p:nvGrpSpPr>
+      <p:grpSpPr>
+        <a:xfrm>
+          <a:off x="0" y="0"/>
+          <a:ext cx="0" cy="0"/>
+          <a:chOff x="0" y="0"/>
+          <a:chExt cx="0" cy="0"/>
+        </a:xfrm>
+      </p:grpSpPr>
+      <p:sp>
+        <p:nvSpPr>
+          <p:cNvPr id="2" name="1 Título"/>
+          <p:cNvSpPr>
+            <a:spLocks noGrp="1"/>
+          </p:cNvSpPr>
+          <p:nvPr>
+            <p:ph type="title"/>
+          </p:nvPr>
+        </p:nvSpPr>
+        <p:spPr/>
+        <p:txBody>
+          <a:bodyPr>
+            <a:noAutofit/>
+          </a:bodyPr>
+          <a:lstStyle/>
+          <a:p>
+            <a:r>
+              <a:rPr lang="ca-ES" sz="3200" dirty="0" smtClean="0"/>
+              <a:t>ogc-api-map-tiles-opf-xmp-</a:t>
+            </a:r>
+            <a:r>
+              <a:rPr lang="ca-ES" sz="3200" b="1" dirty="0" smtClean="0"/>
+              <a:t>mt</a:t>
+            </a:r>
+            <a:r>
+              <a:rPr lang="ca-ES" sz="3200" dirty="0" smtClean="0"/>
+              <a:t>-more-1-collection</a:t>
+            </a:r>
+            <a:endParaRPr lang="ca-ES" sz="3200" dirty="0"/>
+          </a:p>
+        </p:txBody>
+      </p:sp>
+      <p:pic>
+        <p:nvPicPr>
+          <p:cNvPr id="2050" name="Picture 2"/>
+          <p:cNvPicPr>
+            <a:picLocks noGrp="1" noChangeAspect="1" noChangeArrowheads="1"/>
+          </p:cNvPicPr>
+          <p:nvPr>
+            <p:ph idx="1"/>
+          </p:nvPr>
+        </p:nvPicPr>
+        <p:blipFill>
+          <a:blip r:embed="rId2" cstate="print"/>
+          <a:srcRect/>
+          <a:stretch>
+            <a:fillRect/>
+          </a:stretch>
+        </p:blipFill>
+        <p:spPr bwMode="auto">
+          <a:xfrm>
+            <a:off x="0" y="1412776"/>
+            <a:ext cx="9144000" cy="4940170"/>
+          </a:xfrm>
+          <a:prstGeom prst="rect">
+            <a:avLst/>
+          </a:prstGeom>
+          <a:noFill/>
+          <a:ln w="9525">
+            <a:noFill/>
+            <a:miter lim="800000"/>
+            <a:headEnd/>
+            <a:tailEnd/>
+          </a:ln>
+        </p:spPr>
+      </p:pic>
+    </p:spTree>
+  </p:cSld>
+  <p:clrMapOvr>
+    <a:masterClrMapping/>
+  </p:clrMapOvr>
+  <p:timing>
+    <p:tnLst>
+      <p:par>
+        <p:cTn id="1" dur="indefinite" restart="never" nodeType="tmRoot"/>
+      </p:par>
+    </p:tnLst>
+  </p:timing>
+</p:sld>
+</file>
+
+<file path=ppt/slides/slide11.xml><?xml version="1.0" encoding="utf-8"?>
+<p:sld xmlns:a="http://schemas.openxmlformats.org/drawingml/2006/main" xmlns:r="http://schemas.openxmlformats.org/officeDocument/2006/relationships" xmlns:p="http://schemas.openxmlformats.org/presentationml/2006/main">
+  <p:cSld>
+    <p:spTree>
+      <p:nvGrpSpPr>
+        <p:cNvPr id="1" name=""/>
+        <p:cNvGrpSpPr/>
+        <p:nvPr/>
+      </p:nvGrpSpPr>
+      <p:grpSpPr>
+        <a:xfrm>
+          <a:off x="0" y="0"/>
+          <a:ext cx="0" cy="0"/>
+          <a:chOff x="0" y="0"/>
+          <a:chExt cx="0" cy="0"/>
+        </a:xfrm>
+      </p:grpSpPr>
+      <p:sp>
+        <p:nvSpPr>
+          <p:cNvPr id="2" name="1 Título"/>
+          <p:cNvSpPr>
+            <a:spLocks noGrp="1"/>
+          </p:cNvSpPr>
+          <p:nvPr>
+            <p:ph type="title"/>
+          </p:nvPr>
+        </p:nvSpPr>
+        <p:spPr/>
+        <p:txBody>
+          <a:bodyPr>
+            <a:normAutofit/>
+          </a:bodyPr>
+          <a:lstStyle/>
+          <a:p>
+            <a:r>
+              <a:rPr lang="ca-ES" sz="3600" dirty="0" smtClean="0"/>
+              <a:t>ogc-api-maps-opf-xmp-more-1-collection</a:t>
+            </a:r>
+            <a:endParaRPr lang="ca-ES" sz="3600" dirty="0"/>
+          </a:p>
+        </p:txBody>
+      </p:sp>
+      <p:sp>
+        <p:nvSpPr>
+          <p:cNvPr id="3" name="2 Marcador de contenido"/>
+          <p:cNvSpPr>
+            <a:spLocks noGrp="1"/>
+          </p:cNvSpPr>
+          <p:nvPr>
+            <p:ph idx="1"/>
+          </p:nvPr>
+        </p:nvSpPr>
+        <p:spPr/>
+        <p:txBody>
+          <a:bodyPr/>
+          <a:lstStyle/>
+          <a:p>
+            <a:endParaRPr lang="ca-ES"/>
+          </a:p>
+        </p:txBody>
+      </p:sp>
+      <p:pic>
+        <p:nvPicPr>
+          <p:cNvPr id="3074" name="Picture 2"/>
+          <p:cNvPicPr>
+            <a:picLocks noChangeAspect="1" noChangeArrowheads="1"/>
+          </p:cNvPicPr>
+          <p:nvPr/>
+        </p:nvPicPr>
+        <p:blipFill>
+          <a:blip r:embed="rId2" cstate="print"/>
+          <a:srcRect/>
+          <a:stretch>
+            <a:fillRect/>
+          </a:stretch>
+        </p:blipFill>
+        <p:spPr bwMode="auto">
+          <a:xfrm>
+            <a:off x="0" y="1484784"/>
+            <a:ext cx="9144000" cy="4940170"/>
+          </a:xfrm>
+          <a:prstGeom prst="rect">
+            <a:avLst/>
+          </a:prstGeom>
+          <a:noFill/>
+          <a:ln w="9525">
+            <a:noFill/>
+            <a:miter lim="800000"/>
+            <a:headEnd/>
+            <a:tailEnd/>
+          </a:ln>
+        </p:spPr>
+      </p:pic>
+    </p:spTree>
+  </p:cSld>
+  <p:clrMapOvr>
+    <a:masterClrMapping/>
+  </p:clrMapOvr>
+</p:sld>
+</file>
+
 <file path=ppt/slides/slide2.xml><?xml version="1.0" encoding="utf-8"?>
+<p:sld xmlns:a="http://schemas.openxmlformats.org/drawingml/2006/main" xmlns:r="http://schemas.openxmlformats.org/officeDocument/2006/relationships" xmlns:p="http://schemas.openxmlformats.org/presentationml/2006/main">
+  <p:cSld>
+    <p:spTree>
+      <p:nvGrpSpPr>
+        <p:cNvPr id="1" name=""/>
+        <p:cNvGrpSpPr/>
+        <p:nvPr/>
+      </p:nvGrpSpPr>
+      <p:grpSpPr>
+        <a:xfrm>
+          <a:off x="0" y="0"/>
+          <a:ext cx="0" cy="0"/>
+          <a:chOff x="0" y="0"/>
+          <a:chExt cx="0" cy="0"/>
+        </a:xfrm>
+      </p:grpSpPr>
+      <p:sp>
+        <p:nvSpPr>
+          <p:cNvPr id="2" name="1 Título"/>
+          <p:cNvSpPr>
+            <a:spLocks noGrp="1"/>
+          </p:cNvSpPr>
+          <p:nvPr>
+            <p:ph type="title"/>
+          </p:nvPr>
+        </p:nvSpPr>
+        <p:spPr/>
+        <p:txBody>
+          <a:bodyPr/>
+          <a:lstStyle/>
+          <a:p>
+            <a:r>
+              <a:rPr lang="en-US" dirty="0" smtClean="0"/>
+              <a:t>Tiles core</a:t>
+            </a:r>
+            <a:endParaRPr lang="en-US" dirty="0"/>
+          </a:p>
+        </p:txBody>
+      </p:sp>
+      <p:sp>
+        <p:nvSpPr>
+          <p:cNvPr id="3" name="2 Marcador de contenido"/>
+          <p:cNvSpPr>
+            <a:spLocks noGrp="1"/>
+          </p:cNvSpPr>
+          <p:nvPr>
+            <p:ph idx="1"/>
+          </p:nvPr>
+        </p:nvSpPr>
+        <p:spPr/>
+        <p:txBody>
+          <a:bodyPr/>
+          <a:lstStyle/>
+          <a:p>
+            <a:r>
+              <a:rPr lang="en-US" dirty="0" smtClean="0"/>
+              <a:t>Only one collection</a:t>
+            </a:r>
+          </a:p>
+          <a:p>
+            <a:r>
+              <a:rPr lang="en-US" dirty="0" smtClean="0"/>
+              <a:t>Only support for </a:t>
+            </a:r>
+            <a:r>
+              <a:rPr lang="en-US" dirty="0" err="1" smtClean="0"/>
+              <a:t>WebMercatorQuad</a:t>
+            </a:r>
+            <a:endParaRPr lang="en-US" dirty="0" smtClean="0"/>
+          </a:p>
+          <a:p>
+            <a:pPr lvl="1"/>
+            <a:r>
+              <a:rPr lang="en-US" dirty="0" smtClean="0"/>
+              <a:t>No </a:t>
+            </a:r>
+            <a:r>
+              <a:rPr lang="en-US" dirty="0" err="1" smtClean="0"/>
+              <a:t>TileMatrixSet</a:t>
+            </a:r>
+            <a:r>
+              <a:rPr lang="en-US" dirty="0" smtClean="0"/>
+              <a:t> definition</a:t>
+            </a:r>
+          </a:p>
+          <a:p>
+            <a:pPr lvl="1"/>
+            <a:r>
+              <a:rPr lang="en-US" dirty="0" smtClean="0"/>
+              <a:t>No </a:t>
+            </a:r>
+            <a:r>
+              <a:rPr lang="en-US" dirty="0" err="1" smtClean="0"/>
+              <a:t>TileMatrixSet</a:t>
+            </a:r>
+            <a:r>
+              <a:rPr lang="en-US" dirty="0" smtClean="0"/>
+              <a:t> Link</a:t>
+            </a:r>
+          </a:p>
+          <a:p>
+            <a:r>
+              <a:rPr lang="en-US" dirty="0" smtClean="0"/>
+              <a:t>No </a:t>
+            </a:r>
+            <a:r>
+              <a:rPr lang="en-US" dirty="0" err="1" smtClean="0"/>
+              <a:t>featureInfo</a:t>
+            </a:r>
+            <a:endParaRPr lang="en-US" dirty="0" smtClean="0"/>
+          </a:p>
+          <a:p>
+            <a:r>
+              <a:rPr lang="en-US" dirty="0" smtClean="0"/>
+              <a:t>Only one tile at a time</a:t>
+            </a:r>
+          </a:p>
+          <a:p>
+            <a:r>
+              <a:rPr lang="en-US" dirty="0" smtClean="0"/>
+              <a:t>No information updates</a:t>
+            </a:r>
+          </a:p>
+          <a:p>
+            <a:endParaRPr lang="en-US" dirty="0"/>
+          </a:p>
+        </p:txBody>
+      </p:sp>
+    </p:spTree>
+  </p:cSld>
+  <p:clrMapOvr>
+    <a:masterClrMapping/>
+  </p:clrMapOvr>
+</p:sld>
+</file>
+
+<file path=ppt/slides/slide3.xml><?xml version="1.0" encoding="utf-8"?>
+<p:sld xmlns:a="http://schemas.openxmlformats.org/drawingml/2006/main" xmlns:r="http://schemas.openxmlformats.org/officeDocument/2006/relationships" xmlns:p="http://schemas.openxmlformats.org/presentationml/2006/main">
+  <p:cSld>
+    <p:spTree>
+      <p:nvGrpSpPr>
+        <p:cNvPr id="1" name=""/>
+        <p:cNvGrpSpPr/>
+        <p:nvPr/>
+      </p:nvGrpSpPr>
+      <p:grpSpPr>
+        <a:xfrm>
+          <a:off x="0" y="0"/>
+          <a:ext cx="0" cy="0"/>
+          <a:chOff x="0" y="0"/>
+          <a:chExt cx="0" cy="0"/>
+        </a:xfrm>
+      </p:grpSpPr>
+      <p:sp>
+        <p:nvSpPr>
+          <p:cNvPr id="4" name="3 Título"/>
+          <p:cNvSpPr>
+            <a:spLocks noGrp="1"/>
+          </p:cNvSpPr>
+          <p:nvPr>
+            <p:ph type="title"/>
+          </p:nvPr>
+        </p:nvSpPr>
+        <p:spPr/>
+        <p:txBody>
+          <a:bodyPr>
+            <a:normAutofit fontScale="90000"/>
+          </a:bodyPr>
+          <a:lstStyle/>
+          <a:p>
+            <a:r>
+              <a:rPr lang="ca-ES" dirty="0" err="1" smtClean="0"/>
+              <a:t>Tiles</a:t>
+            </a:r>
+            <a:r>
+              <a:rPr lang="ca-ES" dirty="0" smtClean="0"/>
+              <a:t> extensions</a:t>
+            </a:r>
+            <a:endParaRPr lang="ca-ES" dirty="0"/>
+          </a:p>
+        </p:txBody>
+      </p:sp>
+      <p:sp>
+        <p:nvSpPr>
+          <p:cNvPr id="5" name="4 Marcador de contenido"/>
+          <p:cNvSpPr>
+            <a:spLocks noGrp="1"/>
+          </p:cNvSpPr>
+          <p:nvPr>
+            <p:ph sz="half" idx="1"/>
+          </p:nvPr>
+        </p:nvSpPr>
+        <p:spPr/>
+        <p:txBody>
+          <a:bodyPr/>
+          <a:lstStyle/>
+          <a:p>
+            <a:r>
+              <a:rPr lang="ca-ES" dirty="0" err="1" smtClean="0"/>
+              <a:t>TileMatrixSet</a:t>
+            </a:r>
+            <a:endParaRPr lang="ca-ES" dirty="0"/>
+          </a:p>
+        </p:txBody>
+      </p:sp>
+      <p:sp>
+        <p:nvSpPr>
+          <p:cNvPr id="6" name="5 Marcador de contenido"/>
+          <p:cNvSpPr>
+            <a:spLocks noGrp="1"/>
+          </p:cNvSpPr>
+          <p:nvPr>
+            <p:ph sz="half" idx="2"/>
+          </p:nvPr>
+        </p:nvSpPr>
+        <p:spPr/>
+        <p:txBody>
+          <a:bodyPr/>
+          <a:lstStyle/>
+          <a:p>
+            <a:r>
+              <a:rPr lang="ca-ES" dirty="0" err="1" smtClean="0"/>
+              <a:t>Info</a:t>
+            </a:r>
+            <a:r>
+              <a:rPr lang="ca-ES" dirty="0" smtClean="0"/>
+              <a:t> (</a:t>
+            </a:r>
+            <a:r>
+              <a:rPr lang="ca-ES" dirty="0" err="1" smtClean="0"/>
+              <a:t>featureInfo</a:t>
+            </a:r>
+            <a:r>
+              <a:rPr lang="ca-ES" dirty="0" smtClean="0"/>
+              <a:t>)</a:t>
+            </a:r>
+            <a:endParaRPr lang="ca-ES" dirty="0"/>
+          </a:p>
+        </p:txBody>
+      </p:sp>
+      <p:sp>
+        <p:nvSpPr>
+          <p:cNvPr id="7" name="6 Marcador de contenido"/>
+          <p:cNvSpPr>
+            <a:spLocks noGrp="1"/>
+          </p:cNvSpPr>
+          <p:nvPr>
+            <p:ph sz="quarter" idx="13"/>
+          </p:nvPr>
+        </p:nvSpPr>
+        <p:spPr/>
+        <p:txBody>
+          <a:bodyPr/>
+          <a:lstStyle/>
+          <a:p>
+            <a:r>
+              <a:rPr lang="ca-ES" dirty="0" err="1" smtClean="0"/>
+              <a:t>Collections</a:t>
+            </a:r>
+            <a:r>
+              <a:rPr lang="ca-ES" dirty="0" smtClean="0"/>
+              <a:t> (</a:t>
+            </a:r>
+            <a:r>
+              <a:rPr lang="ca-ES" dirty="0" err="1" smtClean="0"/>
+              <a:t>more</a:t>
+            </a:r>
+            <a:r>
+              <a:rPr lang="ca-ES" dirty="0" smtClean="0"/>
+              <a:t> </a:t>
+            </a:r>
+            <a:r>
+              <a:rPr lang="ca-ES" dirty="0" err="1" smtClean="0"/>
+              <a:t>than</a:t>
+            </a:r>
+            <a:r>
+              <a:rPr lang="ca-ES" dirty="0" smtClean="0"/>
+              <a:t> </a:t>
+            </a:r>
+            <a:r>
+              <a:rPr lang="ca-ES" dirty="0" err="1" smtClean="0"/>
+              <a:t>one</a:t>
+            </a:r>
+            <a:r>
+              <a:rPr lang="ca-ES" dirty="0" smtClean="0"/>
+              <a:t>)</a:t>
+            </a:r>
+            <a:endParaRPr lang="ca-ES" dirty="0"/>
+          </a:p>
+        </p:txBody>
+      </p:sp>
+      <p:sp>
+        <p:nvSpPr>
+          <p:cNvPr id="8" name="7 Marcador de contenido"/>
+          <p:cNvSpPr>
+            <a:spLocks noGrp="1"/>
+          </p:cNvSpPr>
+          <p:nvPr>
+            <p:ph sz="quarter" idx="14"/>
+          </p:nvPr>
+        </p:nvSpPr>
+        <p:spPr/>
+        <p:txBody>
+          <a:bodyPr/>
+          <a:lstStyle/>
+          <a:p>
+            <a:r>
+              <a:rPr lang="ca-ES" dirty="0" err="1" smtClean="0"/>
+              <a:t>C</a:t>
+            </a:r>
+            <a:r>
+              <a:rPr lang="ca-ES" dirty="0" err="1" smtClean="0"/>
+              <a:t>ollections-info</a:t>
+            </a:r>
+            <a:endParaRPr lang="ca-ES" dirty="0"/>
+          </a:p>
+        </p:txBody>
+      </p:sp>
+      <p:sp>
+        <p:nvSpPr>
+          <p:cNvPr id="9" name="8 Marcador de contenido"/>
+          <p:cNvSpPr>
+            <a:spLocks noGrp="1"/>
+          </p:cNvSpPr>
+          <p:nvPr>
+            <p:ph sz="quarter" idx="15"/>
+          </p:nvPr>
+        </p:nvSpPr>
+        <p:spPr/>
+        <p:txBody>
+          <a:bodyPr/>
+          <a:lstStyle/>
+          <a:p>
+            <a:r>
+              <a:rPr lang="ca-ES" dirty="0" err="1" smtClean="0"/>
+              <a:t>Multi-tile</a:t>
+            </a:r>
+            <a:endParaRPr lang="ca-ES" dirty="0"/>
+          </a:p>
+        </p:txBody>
+      </p:sp>
+      <p:sp>
+        <p:nvSpPr>
+          <p:cNvPr id="10" name="9 Marcador de contenido"/>
+          <p:cNvSpPr>
+            <a:spLocks noGrp="1"/>
+          </p:cNvSpPr>
+          <p:nvPr>
+            <p:ph sz="quarter" idx="16"/>
+          </p:nvPr>
+        </p:nvSpPr>
+        <p:spPr/>
+        <p:txBody>
+          <a:bodyPr/>
+          <a:lstStyle/>
+          <a:p>
+            <a:r>
+              <a:rPr lang="ca-ES" dirty="0" err="1" smtClean="0"/>
+              <a:t>Delta-updates</a:t>
+            </a:r>
+            <a:endParaRPr lang="ca-ES" dirty="0"/>
+          </a:p>
+        </p:txBody>
+      </p:sp>
+    </p:spTree>
+  </p:cSld>
+  <p:clrMapOvr>
+    <a:masterClrMapping/>
+  </p:clrMapOvr>
+</p:sld>
+</file>
+
+<file path=ppt/slides/slide4.xml><?xml version="1.0" encoding="utf-8"?>
+<p:sld xmlns:a="http://schemas.openxmlformats.org/drawingml/2006/main" xmlns:r="http://schemas.openxmlformats.org/officeDocument/2006/relationships" xmlns:p="http://schemas.openxmlformats.org/presentationml/2006/main">
+  <p:cSld>
+    <p:spTree>
+      <p:nvGrpSpPr>
+        <p:cNvPr id="1" name=""/>
+        <p:cNvGrpSpPr/>
+        <p:nvPr/>
+      </p:nvGrpSpPr>
+      <p:grpSpPr>
+        <a:xfrm>
+          <a:off x="0" y="0"/>
+          <a:ext cx="0" cy="0"/>
+          <a:chOff x="0" y="0"/>
+          <a:chExt cx="0" cy="0"/>
+        </a:xfrm>
+      </p:grpSpPr>
+      <p:sp>
+        <p:nvSpPr>
+          <p:cNvPr id="2" name="1 Título"/>
+          <p:cNvSpPr>
+            <a:spLocks noGrp="1"/>
+          </p:cNvSpPr>
+          <p:nvPr>
+            <p:ph type="title"/>
+          </p:nvPr>
+        </p:nvSpPr>
+        <p:spPr/>
+        <p:txBody>
+          <a:bodyPr/>
+          <a:lstStyle/>
+          <a:p>
+            <a:r>
+              <a:rPr lang="en-US" dirty="0" smtClean="0"/>
+              <a:t>Maps core</a:t>
+            </a:r>
+            <a:endParaRPr lang="en-US" dirty="0"/>
+          </a:p>
+        </p:txBody>
+      </p:sp>
+      <p:sp>
+        <p:nvSpPr>
+          <p:cNvPr id="3" name="2 Marcador de contenido"/>
+          <p:cNvSpPr>
+            <a:spLocks noGrp="1"/>
+          </p:cNvSpPr>
+          <p:nvPr>
+            <p:ph idx="1"/>
+          </p:nvPr>
+        </p:nvSpPr>
+        <p:spPr/>
+        <p:txBody>
+          <a:bodyPr>
+            <a:normAutofit fontScale="77500" lnSpcReduction="20000"/>
+          </a:bodyPr>
+          <a:lstStyle/>
+          <a:p>
+            <a:r>
+              <a:rPr lang="en-US" dirty="0" smtClean="0"/>
+              <a:t>This would be something that allows to create a map that cannot be necessarily retrievable (yet)</a:t>
+            </a:r>
+          </a:p>
+          <a:p>
+            <a:r>
+              <a:rPr lang="en-US" dirty="0" smtClean="0"/>
+              <a:t>The reason:</a:t>
+            </a:r>
+          </a:p>
+          <a:p>
+            <a:pPr lvl="1"/>
+            <a:r>
+              <a:rPr lang="en-US" dirty="0" smtClean="0"/>
+              <a:t>We need to support /maps/{</a:t>
+            </a:r>
+            <a:r>
+              <a:rPr lang="en-US" dirty="0" err="1" smtClean="0"/>
+              <a:t>styleID</a:t>
+            </a:r>
+            <a:r>
+              <a:rPr lang="en-US" dirty="0" smtClean="0"/>
+              <a:t>}/tiles/…</a:t>
+            </a:r>
+          </a:p>
+          <a:p>
+            <a:r>
+              <a:rPr lang="en-US" dirty="0" smtClean="0"/>
+              <a:t>It has no resolution </a:t>
+            </a:r>
+          </a:p>
+          <a:p>
+            <a:pPr lvl="1"/>
+            <a:r>
+              <a:rPr lang="en-US" dirty="0" smtClean="0"/>
+              <a:t>No parameters related with width, height, </a:t>
+            </a:r>
+            <a:r>
+              <a:rPr lang="en-US" dirty="0" err="1" smtClean="0"/>
+              <a:t>bbox</a:t>
+            </a:r>
+            <a:r>
+              <a:rPr lang="en-US" dirty="0" smtClean="0"/>
+              <a:t>, </a:t>
+            </a:r>
+            <a:r>
+              <a:rPr lang="en-US" smtClean="0"/>
+              <a:t>crs… </a:t>
+            </a:r>
+            <a:r>
+              <a:rPr lang="en-US" dirty="0" smtClean="0"/>
+              <a:t>etc.</a:t>
+            </a:r>
+          </a:p>
+          <a:p>
+            <a:r>
+              <a:rPr lang="en-US" dirty="0" smtClean="0"/>
+              <a:t>Actually, it is map that can only be retrieved by extending it to (one of):</a:t>
+            </a:r>
+          </a:p>
+          <a:p>
+            <a:pPr lvl="1"/>
+            <a:r>
+              <a:rPr lang="en-US" dirty="0" smtClean="0"/>
+              <a:t>a tile </a:t>
+            </a:r>
+          </a:p>
+          <a:p>
+            <a:pPr lvl="1"/>
+            <a:r>
+              <a:rPr lang="en-US" dirty="0" smtClean="0"/>
+              <a:t>a </a:t>
+            </a:r>
+            <a:r>
+              <a:rPr lang="en-US" dirty="0" err="1" smtClean="0"/>
+              <a:t>map+resolution</a:t>
+            </a:r>
+            <a:endParaRPr lang="en-US" dirty="0" smtClean="0"/>
+          </a:p>
+          <a:p>
+            <a:r>
+              <a:rPr lang="en-US" dirty="0" smtClean="0"/>
+              <a:t>It will not have styles (because this forces a dependency to the styles API that I would like to avoid): </a:t>
+            </a:r>
+            <a:r>
+              <a:rPr lang="en-US" dirty="0" smtClean="0"/>
+              <a:t>{</a:t>
+            </a:r>
+            <a:r>
+              <a:rPr lang="en-US" dirty="0" err="1" smtClean="0"/>
+              <a:t>styleID</a:t>
+            </a:r>
+            <a:r>
+              <a:rPr lang="en-US" dirty="0" smtClean="0"/>
+              <a:t>}=“default”.</a:t>
+            </a:r>
+          </a:p>
+        </p:txBody>
+      </p:sp>
+    </p:spTree>
+  </p:cSld>
+  <p:clrMapOvr>
+    <a:masterClrMapping/>
+  </p:clrMapOvr>
+</p:sld>
+</file>
+
+<file path=ppt/slides/slide5.xml><?xml version="1.0" encoding="utf-8"?>
+<p:sld xmlns:a="http://schemas.openxmlformats.org/drawingml/2006/main" xmlns:r="http://schemas.openxmlformats.org/officeDocument/2006/relationships" xmlns:p="http://schemas.openxmlformats.org/presentationml/2006/main">
+  <p:cSld>
+    <p:spTree>
+      <p:nvGrpSpPr>
+        <p:cNvPr id="1" name=""/>
+        <p:cNvGrpSpPr/>
+        <p:nvPr/>
+      </p:nvGrpSpPr>
+      <p:grpSpPr>
+        <a:xfrm>
+          <a:off x="0" y="0"/>
+          <a:ext cx="0" cy="0"/>
+          <a:chOff x="0" y="0"/>
+          <a:chExt cx="0" cy="0"/>
+        </a:xfrm>
+      </p:grpSpPr>
+      <p:sp>
+        <p:nvSpPr>
+          <p:cNvPr id="4" name="3 Título"/>
+          <p:cNvSpPr>
+            <a:spLocks noGrp="1"/>
+          </p:cNvSpPr>
+          <p:nvPr>
+            <p:ph type="title"/>
+          </p:nvPr>
+        </p:nvSpPr>
+        <p:spPr/>
+        <p:txBody>
+          <a:bodyPr>
+            <a:normAutofit fontScale="90000"/>
+          </a:bodyPr>
+          <a:lstStyle/>
+          <a:p>
+            <a:r>
+              <a:rPr lang="ca-ES" dirty="0" err="1" smtClean="0"/>
+              <a:t>Map</a:t>
+            </a:r>
+            <a:r>
+              <a:rPr lang="ca-ES" dirty="0" smtClean="0"/>
+              <a:t> extensions</a:t>
+            </a:r>
+            <a:endParaRPr lang="ca-ES" dirty="0"/>
+          </a:p>
+        </p:txBody>
+      </p:sp>
+      <p:sp>
+        <p:nvSpPr>
+          <p:cNvPr id="5" name="4 Marcador de contenido"/>
+          <p:cNvSpPr>
+            <a:spLocks noGrp="1"/>
+          </p:cNvSpPr>
+          <p:nvPr>
+            <p:ph sz="half" idx="1"/>
+          </p:nvPr>
+        </p:nvSpPr>
+        <p:spPr/>
+        <p:txBody>
+          <a:bodyPr/>
+          <a:lstStyle/>
+          <a:p>
+            <a:r>
+              <a:rPr lang="ca-ES" dirty="0" err="1" smtClean="0"/>
+              <a:t>StyleIds</a:t>
+            </a:r>
+            <a:endParaRPr lang="ca-ES" dirty="0"/>
+          </a:p>
+        </p:txBody>
+      </p:sp>
+      <p:sp>
+        <p:nvSpPr>
+          <p:cNvPr id="6" name="5 Marcador de contenido"/>
+          <p:cNvSpPr>
+            <a:spLocks noGrp="1"/>
+          </p:cNvSpPr>
+          <p:nvPr>
+            <p:ph sz="half" idx="2"/>
+          </p:nvPr>
+        </p:nvSpPr>
+        <p:spPr/>
+        <p:txBody>
+          <a:bodyPr/>
+          <a:lstStyle/>
+          <a:p>
+            <a:r>
+              <a:rPr lang="ca-ES" dirty="0" err="1" smtClean="0"/>
+              <a:t>Map</a:t>
+            </a:r>
+            <a:r>
+              <a:rPr lang="ca-ES" dirty="0" smtClean="0"/>
+              <a:t>+</a:t>
+            </a:r>
+            <a:r>
+              <a:rPr lang="ca-ES" dirty="0" err="1" smtClean="0"/>
+              <a:t>resolution</a:t>
+            </a:r>
+            <a:endParaRPr lang="ca-ES" dirty="0" smtClean="0"/>
+          </a:p>
+        </p:txBody>
+      </p:sp>
+      <p:sp>
+        <p:nvSpPr>
+          <p:cNvPr id="7" name="6 Marcador de contenido"/>
+          <p:cNvSpPr>
+            <a:spLocks noGrp="1"/>
+          </p:cNvSpPr>
+          <p:nvPr>
+            <p:ph sz="quarter" idx="13"/>
+          </p:nvPr>
+        </p:nvSpPr>
+        <p:spPr/>
+        <p:txBody>
+          <a:bodyPr/>
+          <a:lstStyle/>
+          <a:p>
+            <a:pPr marL="342900" marR="0" indent="-342900" algn="l" defTabSz="914400" rtl="0" eaLnBrk="1" fontAlgn="auto" latinLnBrk="0" hangingPunct="1">
+              <a:lnSpc>
+                <a:spcPct val="100000"/>
+              </a:lnSpc>
+              <a:spcBef>
+                <a:spcPct val="20000"/>
+              </a:spcBef>
+              <a:spcAft>
+                <a:spcPts val="0"/>
+              </a:spcAft>
+              <a:buClrTx/>
+              <a:buSzTx/>
+              <a:buFont typeface="Arial" pitchFamily="34" charset="0"/>
+              <a:buChar char="•"/>
+              <a:tabLst/>
+              <a:defRPr/>
+            </a:pPr>
+            <a:r>
+              <a:rPr lang="ca-ES" dirty="0" err="1" smtClean="0"/>
+              <a:t>I</a:t>
+            </a:r>
+            <a:r>
+              <a:rPr lang="ca-ES" sz="2800" kern="1200" dirty="0" err="1" smtClean="0">
+                <a:solidFill>
+                  <a:schemeClr val="tx1"/>
+                </a:solidFill>
+                <a:latin typeface="+mn-lt"/>
+                <a:ea typeface="+mn-ea"/>
+                <a:cs typeface="+mn-cs"/>
+              </a:rPr>
+              <a:t>nfo</a:t>
+            </a:r>
+            <a:endParaRPr lang="ca-ES" sz="2800" kern="1200" dirty="0" smtClean="0">
+              <a:solidFill>
+                <a:schemeClr val="tx1"/>
+              </a:solidFill>
+              <a:latin typeface="+mn-lt"/>
+              <a:ea typeface="+mn-ea"/>
+              <a:cs typeface="+mn-cs"/>
+            </a:endParaRPr>
+          </a:p>
+        </p:txBody>
+      </p:sp>
+      <p:sp>
+        <p:nvSpPr>
+          <p:cNvPr id="8" name="7 Marcador de contenido"/>
+          <p:cNvSpPr>
+            <a:spLocks noGrp="1"/>
+          </p:cNvSpPr>
+          <p:nvPr>
+            <p:ph sz="quarter" idx="14"/>
+          </p:nvPr>
+        </p:nvSpPr>
+        <p:spPr/>
+        <p:txBody>
+          <a:bodyPr/>
+          <a:lstStyle/>
+          <a:p>
+            <a:r>
+              <a:rPr lang="ca-ES" sz="2800" kern="1200" dirty="0" err="1" smtClean="0">
+                <a:solidFill>
+                  <a:schemeClr val="tx1"/>
+                </a:solidFill>
+                <a:latin typeface="+mn-lt"/>
+                <a:ea typeface="+mn-ea"/>
+                <a:cs typeface="+mn-cs"/>
+              </a:rPr>
+              <a:t>Collections</a:t>
+            </a:r>
+            <a:r>
+              <a:rPr lang="ca-ES" sz="2800" kern="1200" dirty="0" smtClean="0">
+                <a:solidFill>
+                  <a:schemeClr val="tx1"/>
+                </a:solidFill>
+                <a:latin typeface="+mn-lt"/>
+                <a:ea typeface="+mn-ea"/>
+                <a:cs typeface="+mn-cs"/>
+              </a:rPr>
+              <a:t> (</a:t>
+            </a:r>
+            <a:r>
+              <a:rPr lang="ca-ES" sz="2800" kern="1200" dirty="0" err="1" smtClean="0">
+                <a:solidFill>
+                  <a:schemeClr val="tx1"/>
+                </a:solidFill>
+                <a:latin typeface="+mn-lt"/>
+                <a:ea typeface="+mn-ea"/>
+                <a:cs typeface="+mn-cs"/>
+              </a:rPr>
+              <a:t>more</a:t>
+            </a:r>
+            <a:r>
+              <a:rPr lang="ca-ES" sz="2800" kern="1200" dirty="0" smtClean="0">
+                <a:solidFill>
+                  <a:schemeClr val="tx1"/>
+                </a:solidFill>
+                <a:latin typeface="+mn-lt"/>
+                <a:ea typeface="+mn-ea"/>
+                <a:cs typeface="+mn-cs"/>
+              </a:rPr>
+              <a:t> </a:t>
+            </a:r>
+            <a:r>
+              <a:rPr lang="ca-ES" sz="2800" kern="1200" dirty="0" err="1" smtClean="0">
+                <a:solidFill>
+                  <a:schemeClr val="tx1"/>
+                </a:solidFill>
+                <a:latin typeface="+mn-lt"/>
+                <a:ea typeface="+mn-ea"/>
+                <a:cs typeface="+mn-cs"/>
+              </a:rPr>
+              <a:t>than</a:t>
+            </a:r>
+            <a:r>
+              <a:rPr lang="ca-ES" sz="2800" kern="1200" dirty="0" smtClean="0">
+                <a:solidFill>
+                  <a:schemeClr val="tx1"/>
+                </a:solidFill>
+                <a:latin typeface="+mn-lt"/>
+                <a:ea typeface="+mn-ea"/>
+                <a:cs typeface="+mn-cs"/>
+              </a:rPr>
+              <a:t> </a:t>
+            </a:r>
+            <a:r>
+              <a:rPr lang="ca-ES" sz="2800" kern="1200" dirty="0" err="1" smtClean="0">
+                <a:solidFill>
+                  <a:schemeClr val="tx1"/>
+                </a:solidFill>
+                <a:latin typeface="+mn-lt"/>
+                <a:ea typeface="+mn-ea"/>
+                <a:cs typeface="+mn-cs"/>
+              </a:rPr>
+              <a:t>one</a:t>
+            </a:r>
+            <a:r>
+              <a:rPr lang="ca-ES" sz="2800" kern="1200" dirty="0" smtClean="0">
+                <a:solidFill>
+                  <a:schemeClr val="tx1"/>
+                </a:solidFill>
+                <a:latin typeface="+mn-lt"/>
+                <a:ea typeface="+mn-ea"/>
+                <a:cs typeface="+mn-cs"/>
+              </a:rPr>
+              <a:t>)</a:t>
+            </a:r>
+            <a:endParaRPr lang="ca-ES" dirty="0" smtClean="0"/>
+          </a:p>
+        </p:txBody>
+      </p:sp>
+      <p:sp>
+        <p:nvSpPr>
+          <p:cNvPr id="9" name="8 Marcador de contenido"/>
+          <p:cNvSpPr>
+            <a:spLocks noGrp="1"/>
+          </p:cNvSpPr>
+          <p:nvPr>
+            <p:ph sz="quarter" idx="15"/>
+          </p:nvPr>
+        </p:nvSpPr>
+        <p:spPr/>
+        <p:txBody>
+          <a:bodyPr/>
+          <a:lstStyle/>
+          <a:p>
+            <a:pPr marL="342900" marR="0" indent="-342900" algn="l" defTabSz="914400" rtl="0" eaLnBrk="1" fontAlgn="auto" latinLnBrk="0" hangingPunct="1">
+              <a:lnSpc>
+                <a:spcPct val="100000"/>
+              </a:lnSpc>
+              <a:spcBef>
+                <a:spcPct val="20000"/>
+              </a:spcBef>
+              <a:spcAft>
+                <a:spcPts val="0"/>
+              </a:spcAft>
+              <a:buClrTx/>
+              <a:buSzTx/>
+              <a:buFont typeface="Arial" pitchFamily="34" charset="0"/>
+              <a:buChar char="•"/>
+              <a:tabLst/>
+              <a:defRPr/>
+            </a:pPr>
+            <a:r>
+              <a:rPr lang="ca-ES" sz="2800" kern="1200" dirty="0" err="1" smtClean="0">
+                <a:solidFill>
+                  <a:schemeClr val="tx1"/>
+                </a:solidFill>
+                <a:latin typeface="+mn-lt"/>
+                <a:ea typeface="+mn-ea"/>
+                <a:cs typeface="+mn-cs"/>
+              </a:rPr>
+              <a:t>Collections-info</a:t>
+            </a:r>
+            <a:endParaRPr lang="ca-ES" sz="2800" kern="1200" dirty="0" smtClean="0">
+              <a:solidFill>
+                <a:schemeClr val="tx1"/>
+              </a:solidFill>
+              <a:latin typeface="+mn-lt"/>
+              <a:ea typeface="+mn-ea"/>
+              <a:cs typeface="+mn-cs"/>
+            </a:endParaRPr>
+          </a:p>
+        </p:txBody>
+      </p:sp>
+      <p:sp>
+        <p:nvSpPr>
+          <p:cNvPr id="10" name="9 Marcador de contenido"/>
+          <p:cNvSpPr>
+            <a:spLocks noGrp="1"/>
+          </p:cNvSpPr>
+          <p:nvPr>
+            <p:ph sz="quarter" idx="16"/>
+          </p:nvPr>
+        </p:nvSpPr>
+        <p:spPr/>
+        <p:txBody>
+          <a:bodyPr/>
+          <a:lstStyle/>
+          <a:p>
+            <a:r>
+              <a:rPr lang="ca-ES" dirty="0" err="1" smtClean="0"/>
+              <a:t>Maps</a:t>
+            </a:r>
+            <a:r>
+              <a:rPr lang="ca-ES" dirty="0" smtClean="0"/>
+              <a:t> </a:t>
+            </a:r>
+            <a:r>
+              <a:rPr lang="ca-ES" dirty="0" err="1" smtClean="0"/>
+              <a:t>with</a:t>
+            </a:r>
+            <a:r>
+              <a:rPr lang="ca-ES" dirty="0" smtClean="0"/>
+              <a:t> </a:t>
+            </a:r>
+            <a:r>
+              <a:rPr lang="ca-ES" dirty="0" err="1" smtClean="0"/>
+              <a:t>styles</a:t>
+            </a:r>
+            <a:r>
+              <a:rPr lang="ca-ES" dirty="0" smtClean="0"/>
+              <a:t> on </a:t>
+            </a:r>
+            <a:r>
+              <a:rPr lang="ca-ES" dirty="0" err="1" smtClean="0"/>
+              <a:t>the</a:t>
+            </a:r>
+            <a:r>
+              <a:rPr lang="ca-ES" dirty="0" smtClean="0"/>
+              <a:t> </a:t>
+            </a:r>
+            <a:r>
+              <a:rPr lang="ca-ES" dirty="0" err="1" smtClean="0"/>
+              <a:t>fly</a:t>
+            </a:r>
+            <a:r>
+              <a:rPr lang="ca-ES" dirty="0" smtClean="0"/>
+              <a:t> (</a:t>
+            </a:r>
+            <a:r>
+              <a:rPr lang="ca-ES" dirty="0" err="1" smtClean="0"/>
+              <a:t>involving</a:t>
+            </a:r>
+            <a:r>
+              <a:rPr lang="ca-ES" dirty="0" smtClean="0"/>
+              <a:t> </a:t>
+            </a:r>
+            <a:r>
+              <a:rPr lang="ca-ES" dirty="0" err="1" smtClean="0"/>
+              <a:t>collections</a:t>
+            </a:r>
+            <a:r>
+              <a:rPr lang="ca-ES" dirty="0" smtClean="0"/>
+              <a:t>)</a:t>
+            </a:r>
+            <a:endParaRPr lang="ca-ES" dirty="0"/>
+          </a:p>
+        </p:txBody>
+      </p:sp>
+    </p:spTree>
+  </p:cSld>
+  <p:clrMapOvr>
+    <a:masterClrMapping/>
+  </p:clrMapOvr>
+</p:sld>
+</file>
+
+<file path=ppt/slides/slide6.xml><?xml version="1.0" encoding="utf-8"?>
+<p:sld xmlns:a="http://schemas.openxmlformats.org/drawingml/2006/main" xmlns:r="http://schemas.openxmlformats.org/officeDocument/2006/relationships" xmlns:p="http://schemas.openxmlformats.org/presentationml/2006/main">
+  <p:cSld>
+    <p:spTree>
+      <p:nvGrpSpPr>
+        <p:cNvPr id="1" name=""/>
+        <p:cNvGrpSpPr/>
+        <p:nvPr/>
+      </p:nvGrpSpPr>
+      <p:grpSpPr>
+        <a:xfrm>
+          <a:off x="0" y="0"/>
+          <a:ext cx="0" cy="0"/>
+          <a:chOff x="0" y="0"/>
+          <a:chExt cx="0" cy="0"/>
+        </a:xfrm>
+      </p:grpSpPr>
+      <p:sp>
+        <p:nvSpPr>
+          <p:cNvPr id="9" name="8 Título"/>
+          <p:cNvSpPr>
+            <a:spLocks noGrp="1"/>
+          </p:cNvSpPr>
+          <p:nvPr>
+            <p:ph type="title"/>
+          </p:nvPr>
+        </p:nvSpPr>
+        <p:spPr/>
+        <p:txBody>
+          <a:bodyPr>
+            <a:normAutofit fontScale="90000"/>
+          </a:bodyPr>
+          <a:lstStyle/>
+          <a:p>
+            <a:r>
+              <a:rPr lang="en-US" dirty="0" smtClean="0"/>
+              <a:t>Architecture/Scenario: </a:t>
+            </a:r>
+            <a:br>
+              <a:rPr lang="en-US" dirty="0" smtClean="0"/>
+            </a:br>
+            <a:r>
+              <a:rPr lang="en-US" dirty="0" smtClean="0"/>
+              <a:t>Adding an image</a:t>
+            </a:r>
+            <a:endParaRPr lang="en-US" dirty="0"/>
+          </a:p>
+        </p:txBody>
+      </p:sp>
+      <p:sp>
+        <p:nvSpPr>
+          <p:cNvPr id="10" name="9 Marcador de contenido"/>
+          <p:cNvSpPr>
+            <a:spLocks noGrp="1"/>
+          </p:cNvSpPr>
+          <p:nvPr>
+            <p:ph idx="1"/>
+          </p:nvPr>
+        </p:nvSpPr>
+        <p:spPr/>
+        <p:txBody>
+          <a:bodyPr>
+            <a:normAutofit fontScale="77500" lnSpcReduction="20000"/>
+          </a:bodyPr>
+          <a:lstStyle/>
+          <a:p>
+            <a:r>
+              <a:rPr lang="en-US" dirty="0" smtClean="0"/>
+              <a:t>An image is loaded in an OGC API image server</a:t>
+            </a:r>
+          </a:p>
+          <a:p>
+            <a:r>
+              <a:rPr lang="en-US" dirty="0" smtClean="0"/>
+              <a:t>The image server and the tiles server are internally connected </a:t>
+            </a:r>
+          </a:p>
+          <a:p>
+            <a:pPr lvl="1"/>
+            <a:r>
+              <a:rPr lang="en-US" dirty="0" smtClean="0"/>
+              <a:t>new tiles are created.</a:t>
+            </a:r>
+          </a:p>
+          <a:p>
+            <a:r>
+              <a:rPr lang="en-US" dirty="0" smtClean="0"/>
+              <a:t>The new tiles are exposed as:</a:t>
+            </a:r>
+          </a:p>
+          <a:p>
+            <a:pPr lvl="1"/>
+            <a:r>
+              <a:rPr lang="en-US" strike="sngStrike" dirty="0" smtClean="0"/>
+              <a:t>Vector tiles</a:t>
+            </a:r>
+          </a:p>
+          <a:p>
+            <a:pPr lvl="1"/>
+            <a:r>
+              <a:rPr lang="en-US" dirty="0" smtClean="0"/>
+              <a:t>Coverage tiles ? (small </a:t>
+            </a:r>
+            <a:r>
+              <a:rPr lang="en-US" dirty="0" err="1" smtClean="0"/>
+              <a:t>geotiff’s</a:t>
+            </a:r>
+            <a:r>
+              <a:rPr lang="en-US" dirty="0" smtClean="0"/>
+              <a:t>?)</a:t>
+            </a:r>
+          </a:p>
+          <a:p>
+            <a:pPr lvl="1"/>
+            <a:r>
+              <a:rPr lang="en-US" dirty="0" smtClean="0"/>
+              <a:t>Map tiles? (small jpeg’s in grayscale?) Minimum style is needed to re-scale values to 256 gray colors.</a:t>
+            </a:r>
+          </a:p>
+          <a:p>
+            <a:r>
+              <a:rPr lang="en-US" dirty="0" smtClean="0"/>
+              <a:t>A client requests a multi-tile (with a checkpoint and </a:t>
+            </a:r>
+            <a:r>
+              <a:rPr lang="en-US" dirty="0" err="1" smtClean="0"/>
+              <a:t>collectionId</a:t>
+            </a:r>
+            <a:r>
+              <a:rPr lang="en-US" dirty="0" smtClean="0"/>
+              <a:t> as parameters)</a:t>
+            </a:r>
+          </a:p>
+          <a:p>
+            <a:r>
+              <a:rPr lang="en-US" dirty="0" smtClean="0"/>
+              <a:t>The client receives the package and updates the changes.</a:t>
+            </a:r>
+          </a:p>
+        </p:txBody>
+      </p:sp>
+    </p:spTree>
+  </p:cSld>
+  <p:clrMapOvr>
+    <a:masterClrMapping/>
+  </p:clrMapOvr>
+</p:sld>
+</file>
+
+<file path=ppt/slides/slide7.xml><?xml version="1.0" encoding="utf-8"?>
+<p:sld xmlns:a="http://schemas.openxmlformats.org/drawingml/2006/main" xmlns:r="http://schemas.openxmlformats.org/officeDocument/2006/relationships" xmlns:p="http://schemas.openxmlformats.org/presentationml/2006/main">
+  <p:cSld>
+    <p:spTree>
+      <p:nvGrpSpPr>
+        <p:cNvPr id="1" name=""/>
+        <p:cNvGrpSpPr/>
+        <p:nvPr/>
+      </p:nvGrpSpPr>
+      <p:grpSpPr>
+        <a:xfrm>
+          <a:off x="0" y="0"/>
+          <a:ext cx="0" cy="0"/>
+          <a:chOff x="0" y="0"/>
+          <a:chExt cx="0" cy="0"/>
+        </a:xfrm>
+      </p:grpSpPr>
+      <p:sp>
+        <p:nvSpPr>
+          <p:cNvPr id="9" name="8 Título"/>
+          <p:cNvSpPr>
+            <a:spLocks noGrp="1"/>
+          </p:cNvSpPr>
+          <p:nvPr>
+            <p:ph type="title"/>
+          </p:nvPr>
+        </p:nvSpPr>
+        <p:spPr/>
+        <p:txBody>
+          <a:bodyPr>
+            <a:normAutofit fontScale="90000"/>
+          </a:bodyPr>
+          <a:lstStyle/>
+          <a:p>
+            <a:r>
+              <a:rPr lang="en-US" dirty="0" smtClean="0"/>
+              <a:t>Architecture/Scenario: </a:t>
+            </a:r>
+            <a:br>
+              <a:rPr lang="en-US" dirty="0" smtClean="0"/>
+            </a:br>
+            <a:r>
+              <a:rPr lang="en-US" dirty="0" smtClean="0"/>
+              <a:t>Deleting an image</a:t>
+            </a:r>
+            <a:endParaRPr lang="en-US" dirty="0"/>
+          </a:p>
+        </p:txBody>
+      </p:sp>
+      <p:sp>
+        <p:nvSpPr>
+          <p:cNvPr id="10" name="9 Marcador de contenido"/>
+          <p:cNvSpPr>
+            <a:spLocks noGrp="1"/>
+          </p:cNvSpPr>
+          <p:nvPr>
+            <p:ph idx="1"/>
+          </p:nvPr>
+        </p:nvSpPr>
+        <p:spPr/>
+        <p:txBody>
+          <a:bodyPr>
+            <a:normAutofit fontScale="77500" lnSpcReduction="20000"/>
+          </a:bodyPr>
+          <a:lstStyle/>
+          <a:p>
+            <a:r>
+              <a:rPr lang="en-US" dirty="0" smtClean="0"/>
+              <a:t>An image is removed in an OGC API image server</a:t>
+            </a:r>
+          </a:p>
+          <a:p>
+            <a:r>
+              <a:rPr lang="en-US" dirty="0" smtClean="0"/>
+              <a:t>The image server and the tiles server are internally connected. </a:t>
+            </a:r>
+          </a:p>
+          <a:p>
+            <a:pPr lvl="1"/>
+            <a:r>
+              <a:rPr lang="en-US" dirty="0" smtClean="0"/>
+              <a:t>Some tiles disappear (or are “down-dated”)</a:t>
+            </a:r>
+          </a:p>
+          <a:p>
+            <a:r>
+              <a:rPr lang="en-US" dirty="0" smtClean="0"/>
+              <a:t>The new tiles are exposed as:</a:t>
+            </a:r>
+          </a:p>
+          <a:p>
+            <a:pPr lvl="1"/>
+            <a:r>
+              <a:rPr lang="en-US" dirty="0" smtClean="0"/>
+              <a:t>Coverage tiles ?</a:t>
+            </a:r>
+          </a:p>
+          <a:p>
+            <a:pPr lvl="1"/>
+            <a:r>
+              <a:rPr lang="en-US" dirty="0" smtClean="0"/>
+              <a:t>Map tiles?</a:t>
+            </a:r>
+          </a:p>
+          <a:p>
+            <a:r>
+              <a:rPr lang="en-US" dirty="0" smtClean="0">
+                <a:solidFill>
+                  <a:srgbClr val="FF0000"/>
+                </a:solidFill>
+              </a:rPr>
+              <a:t>A client requests what?</a:t>
+            </a:r>
+            <a:r>
+              <a:rPr lang="en-US" dirty="0" smtClean="0"/>
+              <a:t> (with a checkpoint and </a:t>
+            </a:r>
+            <a:r>
+              <a:rPr lang="en-US" dirty="0" err="1" smtClean="0"/>
+              <a:t>collectionId</a:t>
+            </a:r>
+            <a:r>
+              <a:rPr lang="en-US" dirty="0" smtClean="0"/>
+              <a:t> as parameters)</a:t>
+            </a:r>
+          </a:p>
+          <a:p>
+            <a:pPr lvl="1"/>
+            <a:r>
+              <a:rPr lang="en-US" dirty="0" smtClean="0"/>
+              <a:t>The server should be able to tell the client that some tiles has been deleted. </a:t>
+            </a:r>
+            <a:r>
+              <a:rPr lang="en-US" dirty="0" smtClean="0">
+                <a:solidFill>
+                  <a:srgbClr val="FF0000"/>
+                </a:solidFill>
+              </a:rPr>
+              <a:t>The </a:t>
+            </a:r>
+            <a:r>
+              <a:rPr lang="en-US" dirty="0" err="1" smtClean="0">
+                <a:solidFill>
+                  <a:srgbClr val="FF0000"/>
+                </a:solidFill>
+              </a:rPr>
+              <a:t>multitile</a:t>
+            </a:r>
+            <a:r>
+              <a:rPr lang="en-US" dirty="0" smtClean="0">
+                <a:solidFill>
+                  <a:srgbClr val="FF0000"/>
+                </a:solidFill>
+              </a:rPr>
+              <a:t> format can no longer be a ZIP with some tiles. We need something more.</a:t>
+            </a:r>
+          </a:p>
+          <a:p>
+            <a:r>
+              <a:rPr lang="en-US" dirty="0" smtClean="0"/>
+              <a:t>The client receives the package and updates the changes.</a:t>
+            </a:r>
+          </a:p>
+          <a:p>
+            <a:endParaRPr lang="en-US" dirty="0"/>
+          </a:p>
+        </p:txBody>
+      </p:sp>
+    </p:spTree>
+  </p:cSld>
+  <p:clrMapOvr>
+    <a:masterClrMapping/>
+  </p:clrMapOvr>
+</p:sld>
+</file>
+
+<file path=ppt/slides/slide8.xml><?xml version="1.0" encoding="utf-8"?>
+<p:sld xmlns:a="http://schemas.openxmlformats.org/drawingml/2006/main" xmlns:r="http://schemas.openxmlformats.org/officeDocument/2006/relationships" xmlns:p="http://schemas.openxmlformats.org/presentationml/2006/main">
+  <p:cSld>
+    <p:spTree>
+      <p:nvGrpSpPr>
+        <p:cNvPr id="1" name=""/>
+        <p:cNvGrpSpPr/>
+        <p:nvPr/>
+      </p:nvGrpSpPr>
+      <p:grpSpPr>
+        <a:xfrm>
+          <a:off x="0" y="0"/>
+          <a:ext cx="0" cy="0"/>
+          <a:chOff x="0" y="0"/>
+          <a:chExt cx="0" cy="0"/>
+        </a:xfrm>
+      </p:grpSpPr>
+      <p:sp>
+        <p:nvSpPr>
+          <p:cNvPr id="2" name="1 Título"/>
+          <p:cNvSpPr>
+            <a:spLocks noGrp="1"/>
+          </p:cNvSpPr>
+          <p:nvPr>
+            <p:ph type="title"/>
+          </p:nvPr>
+        </p:nvSpPr>
+        <p:spPr/>
+        <p:txBody>
+          <a:bodyPr/>
+          <a:lstStyle/>
+          <a:p>
+            <a:endParaRPr lang="ca-ES" dirty="0"/>
+          </a:p>
+        </p:txBody>
+      </p:sp>
+      <p:sp>
+        <p:nvSpPr>
+          <p:cNvPr id="3" name="2 Marcador de contenido"/>
+          <p:cNvSpPr>
+            <a:spLocks noGrp="1"/>
+          </p:cNvSpPr>
+          <p:nvPr>
+            <p:ph idx="1"/>
+          </p:nvPr>
+        </p:nvSpPr>
+        <p:spPr/>
+        <p:txBody>
+          <a:bodyPr/>
+          <a:lstStyle/>
+          <a:p>
+            <a:r>
+              <a:rPr lang="ca-ES" dirty="0" err="1" smtClean="0"/>
+              <a:t>An</a:t>
+            </a:r>
+            <a:r>
+              <a:rPr lang="ca-ES" dirty="0" smtClean="0"/>
+              <a:t> </a:t>
+            </a:r>
+            <a:r>
+              <a:rPr lang="ca-ES" dirty="0" err="1" smtClean="0"/>
+              <a:t>image</a:t>
+            </a:r>
+            <a:r>
+              <a:rPr lang="ca-ES" dirty="0" smtClean="0"/>
+              <a:t> is </a:t>
+            </a:r>
+            <a:r>
+              <a:rPr lang="ca-ES" dirty="0" err="1" smtClean="0"/>
+              <a:t>deleted</a:t>
+            </a:r>
+            <a:r>
+              <a:rPr lang="ca-ES" dirty="0" smtClean="0"/>
+              <a:t> in </a:t>
+            </a:r>
+            <a:r>
+              <a:rPr lang="ca-ES" dirty="0" err="1" smtClean="0"/>
+              <a:t>the</a:t>
+            </a:r>
+            <a:r>
+              <a:rPr lang="ca-ES" dirty="0" smtClean="0"/>
+              <a:t> OGC API </a:t>
+            </a:r>
+            <a:r>
+              <a:rPr lang="ca-ES" dirty="0" err="1" smtClean="0"/>
+              <a:t>images</a:t>
+            </a:r>
+            <a:endParaRPr lang="ca-ES" dirty="0"/>
+          </a:p>
+        </p:txBody>
+      </p:sp>
+    </p:spTree>
+  </p:cSld>
+  <p:clrMapOvr>
+    <a:masterClrMapping/>
+  </p:clrMapOvr>
+</p:sld>
+</file>
+
+<file path=ppt/slides/slide9.xml><?xml version="1.0" encoding="utf-8"?>
 <p:sld xmlns:a="http://schemas.openxmlformats.org/drawingml/2006/main" xmlns:r="http://schemas.openxmlformats.org/officeDocument/2006/relationships" xmlns:p="http://schemas.openxmlformats.org/presentationml/2006/main">
   <p:cSld>
     <p:spTree>
@@ -4311,206 +6878,6 @@
       </p:par>
     </p:tnLst>
   </p:timing>
-</p:sld>
-</file>
-
-<file path=ppt/slides/slide3.xml><?xml version="1.0" encoding="utf-8"?>
-<p:sld xmlns:a="http://schemas.openxmlformats.org/drawingml/2006/main" xmlns:r="http://schemas.openxmlformats.org/officeDocument/2006/relationships" xmlns:p="http://schemas.openxmlformats.org/presentationml/2006/main">
-  <p:cSld>
-    <p:spTree>
-      <p:nvGrpSpPr>
-        <p:cNvPr id="1" name=""/>
-        <p:cNvGrpSpPr/>
-        <p:nvPr/>
-      </p:nvGrpSpPr>
-      <p:grpSpPr>
-        <a:xfrm>
-          <a:off x="0" y="0"/>
-          <a:ext cx="0" cy="0"/>
-          <a:chOff x="0" y="0"/>
-          <a:chExt cx="0" cy="0"/>
-        </a:xfrm>
-      </p:grpSpPr>
-      <p:sp>
-        <p:nvSpPr>
-          <p:cNvPr id="2" name="1 Título"/>
-          <p:cNvSpPr>
-            <a:spLocks noGrp="1"/>
-          </p:cNvSpPr>
-          <p:nvPr>
-            <p:ph type="title"/>
-          </p:nvPr>
-        </p:nvSpPr>
-        <p:spPr/>
-        <p:txBody>
-          <a:bodyPr>
-            <a:noAutofit/>
-          </a:bodyPr>
-          <a:lstStyle/>
-          <a:p>
-            <a:r>
-              <a:rPr lang="ca-ES" sz="3200" dirty="0" smtClean="0"/>
-              <a:t>ogc-api-map-tiles-opf-xmp-</a:t>
-            </a:r>
-            <a:r>
-              <a:rPr lang="ca-ES" sz="3200" b="1" dirty="0" smtClean="0"/>
-              <a:t>mt</a:t>
-            </a:r>
-            <a:r>
-              <a:rPr lang="ca-ES" sz="3200" dirty="0" smtClean="0"/>
-              <a:t>-more-1-collection</a:t>
-            </a:r>
-            <a:endParaRPr lang="ca-ES" sz="3200" dirty="0"/>
-          </a:p>
-        </p:txBody>
-      </p:sp>
-      <p:pic>
-        <p:nvPicPr>
-          <p:cNvPr id="2050" name="Picture 2"/>
-          <p:cNvPicPr>
-            <a:picLocks noGrp="1" noChangeAspect="1" noChangeArrowheads="1"/>
-          </p:cNvPicPr>
-          <p:nvPr>
-            <p:ph idx="1"/>
-          </p:nvPr>
-        </p:nvPicPr>
-        <p:blipFill>
-          <a:blip r:embed="rId2" cstate="print"/>
-          <a:srcRect/>
-          <a:stretch>
-            <a:fillRect/>
-          </a:stretch>
-        </p:blipFill>
-        <p:spPr bwMode="auto">
-          <a:xfrm>
-            <a:off x="0" y="1412776"/>
-            <a:ext cx="9144000" cy="4940170"/>
-          </a:xfrm>
-          <a:prstGeom prst="rect">
-            <a:avLst/>
-          </a:prstGeom>
-          <a:noFill/>
-          <a:ln w="9525">
-            <a:noFill/>
-            <a:miter lim="800000"/>
-            <a:headEnd/>
-            <a:tailEnd/>
-          </a:ln>
-        </p:spPr>
-      </p:pic>
-    </p:spTree>
-  </p:cSld>
-  <p:clrMapOvr>
-    <a:masterClrMapping/>
-  </p:clrMapOvr>
-  <p:timing>
-    <p:tnLst>
-      <p:par>
-        <p:cTn id="1" dur="indefinite" restart="never" nodeType="tmRoot"/>
-      </p:par>
-    </p:tnLst>
-  </p:timing>
-</p:sld>
-</file>
-
-<file path=ppt/slides/slide4.xml><?xml version="1.0" encoding="utf-8"?>
-<p:sld xmlns:a="http://schemas.openxmlformats.org/drawingml/2006/main" xmlns:r="http://schemas.openxmlformats.org/officeDocument/2006/relationships" xmlns:p="http://schemas.openxmlformats.org/presentationml/2006/main">
-  <p:cSld>
-    <p:spTree>
-      <p:nvGrpSpPr>
-        <p:cNvPr id="1" name=""/>
-        <p:cNvGrpSpPr/>
-        <p:nvPr/>
-      </p:nvGrpSpPr>
-      <p:grpSpPr>
-        <a:xfrm>
-          <a:off x="0" y="0"/>
-          <a:ext cx="0" cy="0"/>
-          <a:chOff x="0" y="0"/>
-          <a:chExt cx="0" cy="0"/>
-        </a:xfrm>
-      </p:grpSpPr>
-      <p:sp>
-        <p:nvSpPr>
-          <p:cNvPr id="2" name="1 Título"/>
-          <p:cNvSpPr>
-            <a:spLocks noGrp="1"/>
-          </p:cNvSpPr>
-          <p:nvPr>
-            <p:ph type="title"/>
-          </p:nvPr>
-        </p:nvSpPr>
-        <p:spPr/>
-        <p:txBody>
-          <a:bodyPr>
-            <a:normAutofit/>
-          </a:bodyPr>
-          <a:lstStyle/>
-          <a:p>
-            <a:r>
-              <a:rPr lang="ca-ES" sz="3600" dirty="0" smtClean="0"/>
-              <a:t>ogc-api-maps-opf-xmp-more-1-collection</a:t>
-            </a:r>
-            <a:endParaRPr lang="ca-ES" sz="3600" dirty="0"/>
-          </a:p>
-        </p:txBody>
-      </p:sp>
-      <p:sp>
-        <p:nvSpPr>
-          <p:cNvPr id="3" name="2 Marcador de contenido"/>
-          <p:cNvSpPr>
-            <a:spLocks noGrp="1"/>
-          </p:cNvSpPr>
-          <p:nvPr>
-            <p:ph idx="1"/>
-          </p:nvPr>
-        </p:nvSpPr>
-        <p:spPr/>
-        <p:txBody>
-          <a:bodyPr/>
-          <a:lstStyle/>
-          <a:p>
-            <a:endParaRPr lang="ca-ES"/>
-          </a:p>
-        </p:txBody>
-      </p:sp>
-      <p:pic>
-        <p:nvPicPr>
-          <p:cNvPr id="3074" name="Picture 2"/>
-          <p:cNvPicPr>
-            <a:picLocks noChangeAspect="1" noChangeArrowheads="1"/>
-          </p:cNvPicPr>
-          <p:nvPr/>
-        </p:nvPicPr>
-        <p:blipFill>
-          <a:blip r:embed="rId2" cstate="print"/>
-          <a:srcRect/>
-          <a:stretch>
-            <a:fillRect/>
-          </a:stretch>
-        </p:blipFill>
-        <p:spPr bwMode="auto">
-          <a:xfrm>
-            <a:off x="0" y="1484784"/>
-            <a:ext cx="9144000" cy="4940170"/>
-          </a:xfrm>
-          <a:prstGeom prst="rect">
-            <a:avLst/>
-          </a:prstGeom>
-          <a:noFill/>
-          <a:ln w="9525">
-            <a:noFill/>
-            <a:miter lim="800000"/>
-            <a:headEnd/>
-            <a:tailEnd/>
-          </a:ln>
-        </p:spPr>
-      </p:pic>
-    </p:spTree>
-  </p:cSld>
-  <p:clrMapOvr>
-    <a:masterClrMapping/>
-  </p:clrMapOvr>
 </p:sld>
 </file>
 

</xml_diff>

<commit_message>
Progress in tile core definition
</commit_message>
<xml_diff>
--- a/standard/images/diagrams.pptx
+++ b/standard/images/diagrams.pptx
@@ -299,7 +299,7 @@
             <a:fld id="{7A847CFC-816F-41D0-AAC0-9BF4FEBC753E}" type="datetimeFigureOut">
               <a:rPr lang="es-ES" smtClean="0"/>
               <a:pPr/>
-              <a:t>25/07/2019</a:t>
+              <a:t>26/07/2019</a:t>
             </a:fld>
             <a:endParaRPr lang="es-ES"/>
           </a:p>
@@ -573,7 +573,7 @@
             <a:fld id="{7A847CFC-816F-41D0-AAC0-9BF4FEBC753E}" type="datetimeFigureOut">
               <a:rPr lang="es-ES" smtClean="0"/>
               <a:pPr/>
-              <a:t>25/07/2019</a:t>
+              <a:t>26/07/2019</a:t>
             </a:fld>
             <a:endParaRPr lang="es-ES"/>
           </a:p>
@@ -823,7 +823,7 @@
             <a:fld id="{7A847CFC-816F-41D0-AAC0-9BF4FEBC753E}" type="datetimeFigureOut">
               <a:rPr lang="es-ES" smtClean="0"/>
               <a:pPr/>
-              <a:t>25/07/2019</a:t>
+              <a:t>26/07/2019</a:t>
             </a:fld>
             <a:endParaRPr lang="es-ES"/>
           </a:p>
@@ -990,7 +990,7 @@
             <a:fld id="{7A847CFC-816F-41D0-AAC0-9BF4FEBC753E}" type="datetimeFigureOut">
               <a:rPr lang="es-ES" smtClean="0"/>
               <a:pPr/>
-              <a:t>25/07/2019</a:t>
+              <a:t>26/07/2019</a:t>
             </a:fld>
             <a:endParaRPr lang="es-ES"/>
           </a:p>
@@ -1167,7 +1167,7 @@
             <a:fld id="{7A847CFC-816F-41D0-AAC0-9BF4FEBC753E}" type="datetimeFigureOut">
               <a:rPr lang="es-ES" smtClean="0"/>
               <a:pPr/>
-              <a:t>25/07/2019</a:t>
+              <a:t>26/07/2019</a:t>
             </a:fld>
             <a:endParaRPr lang="es-ES"/>
           </a:p>
@@ -1334,7 +1334,7 @@
             <a:fld id="{7A847CFC-816F-41D0-AAC0-9BF4FEBC753E}" type="datetimeFigureOut">
               <a:rPr lang="es-ES" smtClean="0"/>
               <a:pPr/>
-              <a:t>25/07/2019</a:t>
+              <a:t>26/07/2019</a:t>
             </a:fld>
             <a:endParaRPr lang="es-ES"/>
           </a:p>
@@ -1577,7 +1577,7 @@
             <a:fld id="{7A847CFC-816F-41D0-AAC0-9BF4FEBC753E}" type="datetimeFigureOut">
               <a:rPr lang="es-ES" smtClean="0"/>
               <a:pPr/>
-              <a:t>25/07/2019</a:t>
+              <a:t>26/07/2019</a:t>
             </a:fld>
             <a:endParaRPr lang="es-ES"/>
           </a:p>
@@ -1862,7 +1862,7 @@
             <a:fld id="{7A847CFC-816F-41D0-AAC0-9BF4FEBC753E}" type="datetimeFigureOut">
               <a:rPr lang="es-ES" smtClean="0"/>
               <a:pPr/>
-              <a:t>25/07/2019</a:t>
+              <a:t>26/07/2019</a:t>
             </a:fld>
             <a:endParaRPr lang="es-ES"/>
           </a:p>
@@ -2152,7 +2152,7 @@
             <a:fld id="{7A847CFC-816F-41D0-AAC0-9BF4FEBC753E}" type="datetimeFigureOut">
               <a:rPr lang="es-ES" smtClean="0"/>
               <a:pPr/>
-              <a:t>25/07/2019</a:t>
+              <a:t>26/07/2019</a:t>
             </a:fld>
             <a:endParaRPr lang="es-ES"/>
           </a:p>
@@ -2556,7 +2556,7 @@
             <a:fld id="{7A847CFC-816F-41D0-AAC0-9BF4FEBC753E}" type="datetimeFigureOut">
               <a:rPr lang="es-ES" smtClean="0"/>
               <a:pPr/>
-              <a:t>25/07/2019</a:t>
+              <a:t>26/07/2019</a:t>
             </a:fld>
             <a:endParaRPr lang="es-ES"/>
           </a:p>
@@ -3275,7 +3275,7 @@
             <a:fld id="{7A847CFC-816F-41D0-AAC0-9BF4FEBC753E}" type="datetimeFigureOut">
               <a:rPr lang="es-ES" smtClean="0"/>
               <a:pPr/>
-              <a:t>25/07/2019</a:t>
+              <a:t>26/07/2019</a:t>
             </a:fld>
             <a:endParaRPr lang="es-ES"/>
           </a:p>
@@ -3390,7 +3390,7 @@
             <a:fld id="{7A847CFC-816F-41D0-AAC0-9BF4FEBC753E}" type="datetimeFigureOut">
               <a:rPr lang="es-ES" smtClean="0"/>
               <a:pPr/>
-              <a:t>25/07/2019</a:t>
+              <a:t>26/07/2019</a:t>
             </a:fld>
             <a:endParaRPr lang="es-ES"/>
           </a:p>
@@ -3482,7 +3482,7 @@
             <a:fld id="{7A847CFC-816F-41D0-AAC0-9BF4FEBC753E}" type="datetimeFigureOut">
               <a:rPr lang="es-ES" smtClean="0"/>
               <a:pPr/>
-              <a:t>25/07/2019</a:t>
+              <a:t>26/07/2019</a:t>
             </a:fld>
             <a:endParaRPr lang="es-ES"/>
           </a:p>
@@ -3692,7 +3692,7 @@
             <a:fld id="{7A847CFC-816F-41D0-AAC0-9BF4FEBC753E}" type="datetimeFigureOut">
               <a:rPr lang="es-ES" smtClean="0"/>
               <a:pPr/>
-              <a:t>25/07/2019</a:t>
+              <a:t>26/07/2019</a:t>
             </a:fld>
             <a:endParaRPr lang="es-ES"/>
           </a:p>
@@ -5217,6 +5217,13 @@
   <p:clrMapOvr>
     <a:masterClrMapping/>
   </p:clrMapOvr>
+  <p:timing>
+    <p:tnLst>
+      <p:par>
+        <p:cTn id="1" dur="indefinite" restart="never" nodeType="tmRoot"/>
+      </p:par>
+    </p:tnLst>
+  </p:timing>
 </p:sld>
 </file>
 
@@ -5470,7 +5477,12 @@
             <p:ph idx="1"/>
           </p:nvPr>
         </p:nvSpPr>
-        <p:spPr/>
+        <p:spPr>
+          <a:xfrm>
+            <a:off x="457200" y="1600200"/>
+            <a:ext cx="8507288" cy="4525963"/>
+          </a:xfrm>
+        </p:spPr>
         <p:txBody>
           <a:bodyPr/>
           <a:lstStyle/>
@@ -5483,11 +5495,11 @@
           <a:p>
             <a:r>
               <a:rPr lang="en-US" dirty="0" smtClean="0"/>
-              <a:t>Only support for </a:t>
-            </a:r>
-            <a:r>
-              <a:rPr lang="en-US" dirty="0" err="1" smtClean="0"/>
-              <a:t>WebMercatorQuad</a:t>
+              <a:t>Only support </a:t>
+            </a:r>
+            <a:r>
+              <a:rPr lang="en-US" dirty="0" smtClean="0"/>
+              <a:t>the 8 options in 2D-TMS Annex D</a:t>
             </a:r>
             <a:endParaRPr lang="en-US" dirty="0" smtClean="0"/>
           </a:p>
@@ -5509,25 +5521,34 @@
           <a:p>
             <a:pPr lvl="1"/>
             <a:r>
+              <a:rPr lang="en-US" dirty="0" err="1" smtClean="0"/>
+              <a:t>TileMatrixSet</a:t>
+            </a:r>
+            <a:r>
+              <a:rPr lang="en-US" dirty="0" smtClean="0"/>
+              <a:t> Link (but </a:t>
+            </a:r>
+            <a:r>
+              <a:rPr lang="en-US" dirty="0" smtClean="0"/>
+              <a:t>not </a:t>
+            </a:r>
+            <a:r>
+              <a:rPr lang="en-US" dirty="0" err="1" smtClean="0"/>
+              <a:t>TileMatrixSetLimits</a:t>
+            </a:r>
+            <a:r>
+              <a:rPr lang="en-US" dirty="0" smtClean="0"/>
+              <a:t>)</a:t>
+            </a:r>
+            <a:endParaRPr lang="en-US" dirty="0" smtClean="0"/>
+          </a:p>
+          <a:p>
+            <a:r>
               <a:rPr lang="en-US" dirty="0" smtClean="0"/>
               <a:t>No </a:t>
             </a:r>
             <a:r>
               <a:rPr lang="en-US" dirty="0" err="1" smtClean="0"/>
-              <a:t>TileMatrixSet</a:t>
-            </a:r>
-            <a:r>
-              <a:rPr lang="en-US" dirty="0" smtClean="0"/>
-              <a:t> Link</a:t>
-            </a:r>
-          </a:p>
-          <a:p>
-            <a:r>
-              <a:rPr lang="en-US" dirty="0" smtClean="0"/>
-              <a:t>No </a:t>
-            </a:r>
-            <a:r>
-              <a:rPr lang="en-US" dirty="0" err="1" smtClean="0"/>
               <a:t>featureInfo</a:t>
             </a:r>
             <a:endParaRPr lang="en-US" dirty="0" smtClean="0"/>
@@ -5546,6 +5567,57 @@
           </a:p>
           <a:p>
             <a:endParaRPr lang="en-US" dirty="0"/>
+          </a:p>
+        </p:txBody>
+      </p:sp>
+      <p:sp>
+        <p:nvSpPr>
+          <p:cNvPr id="4" name="3 CuadroTexto"/>
+          <p:cNvSpPr txBox="1"/>
+          <p:nvPr/>
+        </p:nvSpPr>
+        <p:spPr>
+          <a:xfrm rot="19840231">
+            <a:off x="6185170" y="727819"/>
+            <a:ext cx="998564" cy="510778"/>
+          </a:xfrm>
+          <a:prstGeom prst="roundRect">
+            <a:avLst/>
+          </a:prstGeom>
+          <a:noFill/>
+          <a:ln>
+            <a:solidFill>
+              <a:srgbClr val="FF0000"/>
+            </a:solidFill>
+          </a:ln>
+        </p:spPr>
+        <p:txBody>
+          <a:bodyPr wrap="none" rtlCol="0">
+            <a:spAutoFit/>
+          </a:bodyPr>
+          <a:lstStyle/>
+          <a:p>
+            <a:r>
+              <a:rPr lang="ca-ES" sz="2400" dirty="0" err="1" smtClean="0">
+                <a:solidFill>
+                  <a:srgbClr val="FF0000"/>
+                </a:solidFill>
+              </a:rPr>
+              <a:t>Done</a:t>
+            </a:r>
+            <a:r>
+              <a:rPr lang="ca-ES" sz="2400" dirty="0" smtClean="0">
+                <a:solidFill>
+                  <a:srgbClr val="FF0000"/>
+                </a:solidFill>
+              </a:rPr>
+              <a:t>!</a:t>
+            </a:r>
+            <a:endParaRPr lang="ca-ES" sz="2400" dirty="0">
+              <a:solidFill>
+                <a:srgbClr val="FF0000"/>
+              </a:solidFill>
+            </a:endParaRPr>
           </a:p>
         </p:txBody>
       </p:sp>
@@ -5554,6 +5626,13 @@
   <p:clrMapOvr>
     <a:masterClrMapping/>
   </p:clrMapOvr>
+  <p:timing>
+    <p:tnLst>
+      <p:par>
+        <p:cTn id="1" dur="indefinite" restart="never" nodeType="tmRoot"/>
+      </p:par>
+    </p:tnLst>
+  </p:timing>
 </p:sld>
 </file>
 
@@ -5622,6 +5701,25 @@
               <a:rPr lang="ca-ES" dirty="0" err="1" smtClean="0"/>
               <a:t>TileMatrixSet</a:t>
             </a:r>
+            <a:r>
+              <a:rPr lang="ca-ES" dirty="0" smtClean="0"/>
+              <a:t>   </a:t>
+            </a:r>
+            <a:br>
+              <a:rPr lang="ca-ES" dirty="0" smtClean="0"/>
+            </a:br>
+            <a:r>
+              <a:rPr lang="ca-ES" dirty="0" smtClean="0"/>
+              <a:t>(5th </a:t>
+            </a:r>
+            <a:r>
+              <a:rPr lang="ca-ES" dirty="0" err="1" smtClean="0"/>
+              <a:t>SWG</a:t>
+            </a:r>
+            <a:r>
+              <a:rPr lang="ca-ES" dirty="0" smtClean="0"/>
+              <a:t>)</a:t>
+            </a:r>
             <a:endParaRPr lang="ca-ES" dirty="0"/>
           </a:p>
         </p:txBody>
@@ -5655,6 +5753,21 @@
             </a:r>
             <a:r>
               <a:rPr lang="ca-ES" dirty="0" smtClean="0"/>
+              <a:t>) </a:t>
+            </a:r>
+            <a:br>
+              <a:rPr lang="ca-ES" dirty="0" smtClean="0"/>
+            </a:br>
+            <a:r>
+              <a:rPr lang="ca-ES" dirty="0" smtClean="0"/>
+              <a:t>(8th </a:t>
+            </a:r>
+            <a:r>
+              <a:rPr lang="ca-ES" dirty="0" err="1" smtClean="0"/>
+              <a:t>SWG</a:t>
+            </a:r>
+            <a:r>
+              <a:rPr lang="ca-ES" dirty="0" smtClean="0"/>
               <a:t>)</a:t>
             </a:r>
             <a:endParaRPr lang="ca-ES" dirty="0"/>
@@ -5706,34 +5819,60 @@
             </a:r>
             <a:r>
               <a:rPr lang="ca-ES" dirty="0" smtClean="0"/>
+              <a:t>)   </a:t>
+            </a:r>
+            <a:br>
+              <a:rPr lang="ca-ES" dirty="0" smtClean="0"/>
+            </a:br>
+            <a:r>
+              <a:rPr lang="ca-ES" dirty="0" smtClean="0"/>
+              <a:t>(1st TB15)</a:t>
+            </a:r>
+            <a:endParaRPr lang="ca-ES" dirty="0"/>
+          </a:p>
+        </p:txBody>
+      </p:sp>
+      <p:sp>
+        <p:nvSpPr>
+          <p:cNvPr id="8" name="7 Marcador de contenido"/>
+          <p:cNvSpPr>
+            <a:spLocks noGrp="1"/>
+          </p:cNvSpPr>
+          <p:nvPr>
+            <p:ph sz="quarter" idx="14"/>
+          </p:nvPr>
+        </p:nvSpPr>
+        <p:spPr/>
+        <p:txBody>
+          <a:bodyPr/>
+          <a:lstStyle/>
+          <a:p>
+            <a:r>
+              <a:rPr lang="ca-ES" dirty="0" err="1" smtClean="0"/>
+              <a:t>Collections-info</a:t>
+            </a:r>
+            <a:r>
+              <a:rPr lang="ca-ES" dirty="0" smtClean="0"/>
+              <a:t> </a:t>
+            </a:r>
+            <a:r>
+              <a:rPr lang="ca-ES" dirty="0" smtClean="0"/>
+              <a:t/>
+            </a:r>
+            <a:br>
+              <a:rPr lang="ca-ES" dirty="0" smtClean="0"/>
+            </a:br>
+            <a:r>
+              <a:rPr lang="ca-ES" dirty="0" smtClean="0"/>
+              <a:t>(9th </a:t>
+            </a:r>
+            <a:r>
+              <a:rPr lang="ca-ES" dirty="0" err="1" smtClean="0"/>
+              <a:t>SWG</a:t>
+            </a:r>
+            <a:r>
+              <a:rPr lang="ca-ES" dirty="0" smtClean="0"/>
               <a:t>)</a:t>
-            </a:r>
-            <a:endParaRPr lang="ca-ES" dirty="0"/>
-          </a:p>
-        </p:txBody>
-      </p:sp>
-      <p:sp>
-        <p:nvSpPr>
-          <p:cNvPr id="8" name="7 Marcador de contenido"/>
-          <p:cNvSpPr>
-            <a:spLocks noGrp="1"/>
-          </p:cNvSpPr>
-          <p:nvPr>
-            <p:ph sz="quarter" idx="14"/>
-          </p:nvPr>
-        </p:nvSpPr>
-        <p:spPr/>
-        <p:txBody>
-          <a:bodyPr/>
-          <a:lstStyle/>
-          <a:p>
-            <a:r>
-              <a:rPr lang="ca-ES" dirty="0" err="1" smtClean="0"/>
-              <a:t>C</a:t>
-            </a:r>
-            <a:r>
-              <a:rPr lang="ca-ES" dirty="0" err="1" smtClean="0"/>
-              <a:t>ollections-info</a:t>
             </a:r>
             <a:endParaRPr lang="ca-ES" dirty="0"/>
           </a:p>
@@ -5758,6 +5897,21 @@
               <a:rPr lang="ca-ES" dirty="0" err="1" smtClean="0"/>
               <a:t>Multi-tile</a:t>
             </a:r>
+            <a:r>
+              <a:rPr lang="ca-ES" dirty="0" smtClean="0"/>
+              <a:t>   </a:t>
+            </a:r>
+            <a:br>
+              <a:rPr lang="ca-ES" dirty="0" smtClean="0"/>
+            </a:br>
+            <a:r>
+              <a:rPr lang="ca-ES" dirty="0" smtClean="0"/>
+              <a:t>(3rt TB15</a:t>
+            </a:r>
+            <a:r>
+              <a:rPr lang="ca-ES" dirty="0" smtClean="0"/>
+              <a:t>) </a:t>
+            </a:r>
             <a:endParaRPr lang="ca-ES" dirty="0"/>
           </a:p>
         </p:txBody>
@@ -5780,6 +5934,21 @@
             <a:r>
               <a:rPr lang="ca-ES" dirty="0" err="1" smtClean="0"/>
               <a:t>Delta-updates</a:t>
+            </a:r>
+            <a:r>
+              <a:rPr lang="ca-ES" dirty="0" smtClean="0"/>
+              <a:t>  </a:t>
+            </a:r>
+            <a:br>
+              <a:rPr lang="ca-ES" dirty="0" smtClean="0"/>
+            </a:br>
+            <a:r>
+              <a:rPr lang="ca-ES" dirty="0" smtClean="0"/>
+              <a:t>(2nd TB15</a:t>
+            </a:r>
+            <a:r>
+              <a:rPr lang="ca-ES" dirty="0" smtClean="0"/>
+              <a:t>)</a:t>
             </a:r>
             <a:endParaRPr lang="ca-ES" dirty="0"/>
           </a:p>
@@ -5790,6 +5959,13 @@
   <p:clrMapOvr>
     <a:masterClrMapping/>
   </p:clrMapOvr>
+  <p:timing>
+    <p:tnLst>
+      <p:par>
+        <p:cTn id="1" dur="indefinite" restart="never" nodeType="tmRoot"/>
+      </p:par>
+    </p:tnLst>
+  </p:timing>
 </p:sld>
 </file>
 
@@ -5897,12 +6073,12 @@
               <a:t>, </a:t>
             </a:r>
             <a:r>
-              <a:rPr lang="en-US" smtClean="0"/>
-              <a:t>crs… </a:t>
+              <a:rPr lang="en-US" dirty="0" err="1" smtClean="0"/>
+              <a:t>crs</a:t>
             </a:r>
             <a:r>
               <a:rPr lang="en-US" dirty="0" smtClean="0"/>
-              <a:t>etc.</a:t>
+              <a:t>… etc.</a:t>
             </a:r>
           </a:p>
           <a:p>
@@ -5933,11 +6109,7 @@
           <a:p>
             <a:r>
               <a:rPr lang="en-US" dirty="0" smtClean="0"/>
-              <a:t>It will not have styles (because this forces a dependency to the styles API that I would like to avoid): </a:t>
-            </a:r>
-            <a:r>
-              <a:rPr lang="en-US" dirty="0" smtClean="0"/>
-              <a:t>{</a:t>
+              <a:t>It will not have styles (because this forces a dependency to the styles API that I would like to avoid): {</a:t>
             </a:r>
             <a:r>
               <a:rPr lang="en-US" dirty="0" err="1" smtClean="0"/>
@@ -5955,6 +6127,13 @@
   <p:clrMapOvr>
     <a:masterClrMapping/>
   </p:clrMapOvr>
+  <p:timing>
+    <p:tnLst>
+      <p:par>
+        <p:cTn id="1" dur="indefinite" restart="never" nodeType="tmRoot"/>
+      </p:par>
+    </p:tnLst>
+  </p:timing>
 </p:sld>
 </file>
 
@@ -5998,7 +6177,27 @@
             </a:r>
             <a:r>
               <a:rPr lang="ca-ES" dirty="0" smtClean="0"/>
-              <a:t> extensions</a:t>
+              <a:t> </a:t>
+            </a:r>
+            <a:r>
+              <a:rPr lang="ca-ES" dirty="0" smtClean="0"/>
+              <a:t>extensions (</a:t>
+            </a:r>
+            <a:r>
+              <a:rPr lang="ca-ES" dirty="0" err="1" smtClean="0"/>
+              <a:t>building</a:t>
+            </a:r>
+            <a:r>
+              <a:rPr lang="ca-ES" dirty="0" smtClean="0"/>
+              <a:t> </a:t>
+            </a:r>
+            <a:r>
+              <a:rPr lang="ca-ES" dirty="0" err="1" smtClean="0"/>
+              <a:t>block</a:t>
+            </a:r>
+            <a:r>
+              <a:rPr lang="ca-ES" dirty="0" smtClean="0"/>
+              <a:t>)</a:t>
             </a:r>
             <a:endParaRPr lang="ca-ES" dirty="0"/>
           </a:p>
@@ -6023,7 +6222,22 @@
               <a:rPr lang="ca-ES" dirty="0" err="1" smtClean="0"/>
               <a:t>StyleIds</a:t>
             </a:r>
-            <a:endParaRPr lang="ca-ES" dirty="0"/>
+            <a:r>
+              <a:rPr lang="ca-ES" dirty="0"/>
+              <a:t> </a:t>
+            </a:r>
+            <a:r>
+              <a:rPr lang="ca-ES" dirty="0" smtClean="0"/>
+              <a:t/>
+            </a:r>
+            <a:br>
+              <a:rPr lang="ca-ES" dirty="0" smtClean="0"/>
+            </a:br>
+            <a:r>
+              <a:rPr lang="ca-ES" dirty="0" smtClean="0"/>
+              <a:t>(1st TB15)</a:t>
+            </a:r>
+            <a:endParaRPr lang="ca-ES" dirty="0" smtClean="0"/>
           </a:p>
         </p:txBody>
       </p:sp>
@@ -6039,7 +6253,9 @@
         </p:nvSpPr>
         <p:spPr/>
         <p:txBody>
-          <a:bodyPr/>
+          <a:bodyPr>
+            <a:normAutofit lnSpcReduction="10000"/>
+          </a:bodyPr>
           <a:lstStyle/>
           <a:p>
             <a:r>
@@ -6053,6 +6269,52 @@
             <a:r>
               <a:rPr lang="ca-ES" dirty="0" err="1" smtClean="0"/>
               <a:t>resolution</a:t>
+            </a:r>
+            <a:r>
+              <a:rPr lang="ca-ES" dirty="0" smtClean="0"/>
+              <a:t> </a:t>
+            </a:r>
+            <a:br>
+              <a:rPr lang="ca-ES" dirty="0" smtClean="0"/>
+            </a:br>
+            <a:r>
+              <a:rPr lang="ca-ES" dirty="0" smtClean="0"/>
+              <a:t>(3rt </a:t>
+            </a:r>
+            <a:r>
+              <a:rPr lang="ca-ES" dirty="0" err="1" smtClean="0"/>
+              <a:t>SWG</a:t>
+            </a:r>
+            <a:r>
+              <a:rPr lang="ca-ES" dirty="0" smtClean="0"/>
+              <a:t>)</a:t>
+            </a:r>
+          </a:p>
+          <a:p>
+            <a:pPr lvl="1"/>
+            <a:r>
+              <a:rPr lang="ca-ES" dirty="0" err="1" smtClean="0"/>
+              <a:t>Adds</a:t>
+            </a:r>
+            <a:r>
+              <a:rPr lang="ca-ES" dirty="0" smtClean="0"/>
+              <a:t>: </a:t>
+            </a:r>
+            <a:r>
+              <a:rPr lang="en-US" dirty="0" smtClean="0"/>
+              <a:t>width, height, </a:t>
+            </a:r>
+            <a:r>
+              <a:rPr lang="en-US" dirty="0" err="1" smtClean="0"/>
+              <a:t>bbox</a:t>
+            </a:r>
+            <a:r>
+              <a:rPr lang="en-US" dirty="0" smtClean="0"/>
+              <a:t>, </a:t>
+            </a:r>
+            <a:r>
+              <a:rPr lang="en-US" dirty="0" err="1" smtClean="0"/>
+              <a:t>crs</a:t>
             </a:r>
             <a:endParaRPr lang="ca-ES" dirty="0" smtClean="0"/>
           </a:p>
@@ -6105,6 +6367,60 @@
               </a:rPr>
               <a:t>nfo</a:t>
             </a:r>
+            <a:r>
+              <a:rPr lang="ca-ES" sz="2800" kern="1200" dirty="0" smtClean="0">
+                <a:solidFill>
+                  <a:schemeClr val="tx1"/>
+                </a:solidFill>
+                <a:latin typeface="+mn-lt"/>
+                <a:ea typeface="+mn-ea"/>
+                <a:cs typeface="+mn-cs"/>
+              </a:rPr>
+              <a:t> </a:t>
+            </a:r>
+            <a:br>
+              <a:rPr lang="ca-ES" sz="2800" kern="1200" dirty="0" smtClean="0">
+                <a:solidFill>
+                  <a:schemeClr val="tx1"/>
+                </a:solidFill>
+                <a:latin typeface="+mn-lt"/>
+                <a:ea typeface="+mn-ea"/>
+                <a:cs typeface="+mn-cs"/>
+              </a:rPr>
+            </a:br>
+            <a:r>
+              <a:rPr lang="ca-ES" sz="2800" kern="1200" dirty="0" smtClean="0">
+                <a:solidFill>
+                  <a:schemeClr val="tx1"/>
+                </a:solidFill>
+                <a:latin typeface="+mn-lt"/>
+                <a:ea typeface="+mn-ea"/>
+                <a:cs typeface="+mn-cs"/>
+              </a:rPr>
+              <a:t>(</a:t>
+            </a:r>
+            <a:r>
+              <a:rPr lang="ca-ES" sz="2800" kern="1200" dirty="0" err="1" smtClean="0">
+                <a:solidFill>
+                  <a:schemeClr val="tx1"/>
+                </a:solidFill>
+                <a:latin typeface="+mn-lt"/>
+                <a:ea typeface="+mn-ea"/>
+                <a:cs typeface="+mn-cs"/>
+              </a:rPr>
+              <a:t>SWG</a:t>
+            </a:r>
+            <a:r>
+              <a:rPr lang="ca-ES" sz="2800" kern="1200" dirty="0" smtClean="0">
+                <a:solidFill>
+                  <a:schemeClr val="tx1"/>
+                </a:solidFill>
+                <a:latin typeface="+mn-lt"/>
+                <a:ea typeface="+mn-ea"/>
+                <a:cs typeface="+mn-cs"/>
+              </a:rPr>
+              <a:t>)</a:t>
+            </a:r>
             <a:endParaRPr lang="ca-ES" sz="2800" kern="1200" dirty="0" smtClean="0">
               <a:solidFill>
                 <a:schemeClr val="tx1"/>
@@ -6217,7 +6533,28 @@
                 <a:ea typeface="+mn-ea"/>
                 <a:cs typeface="+mn-cs"/>
               </a:rPr>
-              <a:t>)</a:t>
+              <a:t>) </a:t>
+            </a:r>
+            <a:br>
+              <a:rPr lang="ca-ES" sz="2800" kern="1200" dirty="0" smtClean="0">
+                <a:solidFill>
+                  <a:schemeClr val="tx1"/>
+                </a:solidFill>
+                <a:latin typeface="+mn-lt"/>
+                <a:ea typeface="+mn-ea"/>
+                <a:cs typeface="+mn-cs"/>
+              </a:rPr>
+            </a:br>
+            <a:r>
+              <a:rPr lang="ca-ES" sz="2800" kern="1200" dirty="0" smtClean="0">
+                <a:solidFill>
+                  <a:schemeClr val="tx1"/>
+                </a:solidFill>
+                <a:latin typeface="+mn-lt"/>
+                <a:ea typeface="+mn-ea"/>
+                <a:cs typeface="+mn-cs"/>
+              </a:rPr>
+              <a:t>(2on TB15)</a:t>
             </a:r>
             <a:endParaRPr lang="ca-ES" dirty="0" smtClean="0"/>
           </a:p>
@@ -6266,6 +6603,60 @@
               </a:rPr>
               <a:t>Collections-info</a:t>
             </a:r>
+            <a:r>
+              <a:rPr lang="ca-ES" sz="2800" kern="1200" dirty="0" smtClean="0">
+                <a:solidFill>
+                  <a:schemeClr val="tx1"/>
+                </a:solidFill>
+                <a:latin typeface="+mn-lt"/>
+                <a:ea typeface="+mn-ea"/>
+                <a:cs typeface="+mn-cs"/>
+              </a:rPr>
+              <a:t> </a:t>
+            </a:r>
+            <a:br>
+              <a:rPr lang="ca-ES" sz="2800" kern="1200" dirty="0" smtClean="0">
+                <a:solidFill>
+                  <a:schemeClr val="tx1"/>
+                </a:solidFill>
+                <a:latin typeface="+mn-lt"/>
+                <a:ea typeface="+mn-ea"/>
+                <a:cs typeface="+mn-cs"/>
+              </a:rPr>
+            </a:br>
+            <a:r>
+              <a:rPr lang="ca-ES" sz="2800" kern="1200" dirty="0" smtClean="0">
+                <a:solidFill>
+                  <a:schemeClr val="tx1"/>
+                </a:solidFill>
+                <a:latin typeface="+mn-lt"/>
+                <a:ea typeface="+mn-ea"/>
+                <a:cs typeface="+mn-cs"/>
+              </a:rPr>
+              <a:t>(</a:t>
+            </a:r>
+            <a:r>
+              <a:rPr lang="ca-ES" sz="2800" kern="1200" dirty="0" err="1" smtClean="0">
+                <a:solidFill>
+                  <a:schemeClr val="tx1"/>
+                </a:solidFill>
+                <a:latin typeface="+mn-lt"/>
+                <a:ea typeface="+mn-ea"/>
+                <a:cs typeface="+mn-cs"/>
+              </a:rPr>
+              <a:t>SWG</a:t>
+            </a:r>
+            <a:r>
+              <a:rPr lang="ca-ES" sz="2800" kern="1200" dirty="0" smtClean="0">
+                <a:solidFill>
+                  <a:schemeClr val="tx1"/>
+                </a:solidFill>
+                <a:latin typeface="+mn-lt"/>
+                <a:ea typeface="+mn-ea"/>
+                <a:cs typeface="+mn-cs"/>
+              </a:rPr>
+              <a:t>)</a:t>
+            </a:r>
             <a:endParaRPr lang="ca-ES" sz="2800" kern="1200" dirty="0" smtClean="0">
               <a:solidFill>
                 <a:schemeClr val="tx1"/>
@@ -6346,6 +6737,21 @@
             </a:r>
             <a:r>
               <a:rPr lang="ca-ES" dirty="0" smtClean="0"/>
+              <a:t>) </a:t>
+            </a:r>
+            <a:br>
+              <a:rPr lang="ca-ES" dirty="0" smtClean="0"/>
+            </a:br>
+            <a:r>
+              <a:rPr lang="ca-ES" dirty="0" smtClean="0"/>
+              <a:t>(</a:t>
+            </a:r>
+            <a:r>
+              <a:rPr lang="ca-ES" dirty="0" err="1" smtClean="0"/>
+              <a:t>SWG</a:t>
+            </a:r>
+            <a:r>
+              <a:rPr lang="ca-ES" dirty="0" smtClean="0"/>
               <a:t>)</a:t>
             </a:r>
             <a:endParaRPr lang="ca-ES" dirty="0"/>
@@ -6357,6 +6763,13 @@
   <p:clrMapOvr>
     <a:masterClrMapping/>
   </p:clrMapOvr>
+  <p:timing>
+    <p:tnLst>
+      <p:par>
+        <p:cTn id="1" dur="indefinite" restart="never" nodeType="tmRoot"/>
+      </p:par>
+    </p:tnLst>
+  </p:timing>
 </p:sld>
 </file>
 
@@ -6506,6 +6919,13 @@
   <p:clrMapOvr>
     <a:masterClrMapping/>
   </p:clrMapOvr>
+  <p:timing>
+    <p:tnLst>
+      <p:par>
+        <p:cTn id="1" dur="indefinite" restart="never" nodeType="tmRoot"/>
+      </p:par>
+    </p:tnLst>
+  </p:timing>
 </p:sld>
 </file>
 
@@ -6682,6 +7102,13 @@
   <p:clrMapOvr>
     <a:masterClrMapping/>
   </p:clrMapOvr>
+  <p:timing>
+    <p:tnLst>
+      <p:par>
+        <p:cTn id="1" dur="indefinite" restart="never" nodeType="tmRoot"/>
+      </p:par>
+    </p:tnLst>
+  </p:timing>
 </p:sld>
 </file>
 
@@ -6781,6 +7208,13 @@
   <p:clrMapOvr>
     <a:masterClrMapping/>
   </p:clrMapOvr>
+  <p:timing>
+    <p:tnLst>
+      <p:par>
+        <p:cTn id="1" dur="indefinite" restart="never" nodeType="tmRoot"/>
+      </p:par>
+    </p:tnLst>
+  </p:timing>
 </p:sld>
 </file>
 

</xml_diff>

<commit_message>
TileMatrixSet and Collections extensions for tiles completed
</commit_message>
<xml_diff>
--- a/standard/images/diagrams.pptx
+++ b/standard/images/diagrams.pptx
@@ -299,7 +299,7 @@
             <a:fld id="{7A847CFC-816F-41D0-AAC0-9BF4FEBC753E}" type="datetimeFigureOut">
               <a:rPr lang="es-ES" smtClean="0"/>
               <a:pPr/>
-              <a:t>26/07/2019</a:t>
+              <a:t>30/07/2019</a:t>
             </a:fld>
             <a:endParaRPr lang="es-ES"/>
           </a:p>
@@ -357,6 +357,98 @@
 </file>
 
 <file path=ppt/slideLayouts/slideLayout10.xml><?xml version="1.0" encoding="utf-8"?>
+<p:sldLayout xmlns:a="http://schemas.openxmlformats.org/drawingml/2006/main" xmlns:r="http://schemas.openxmlformats.org/officeDocument/2006/relationships" xmlns:p="http://schemas.openxmlformats.org/presentationml/2006/main" type="blank" preserve="1">
+  <p:cSld name="En blanco">
+    <p:spTree>
+      <p:nvGrpSpPr>
+        <p:cNvPr id="1" name=""/>
+        <p:cNvGrpSpPr/>
+        <p:nvPr/>
+      </p:nvGrpSpPr>
+      <p:grpSpPr>
+        <a:xfrm>
+          <a:off x="0" y="0"/>
+          <a:ext cx="0" cy="0"/>
+          <a:chOff x="0" y="0"/>
+          <a:chExt cx="0" cy="0"/>
+        </a:xfrm>
+      </p:grpSpPr>
+      <p:sp>
+        <p:nvSpPr>
+          <p:cNvPr id="2" name="1 Marcador de fecha"/>
+          <p:cNvSpPr>
+            <a:spLocks noGrp="1"/>
+          </p:cNvSpPr>
+          <p:nvPr>
+            <p:ph type="dt" sz="half" idx="10"/>
+          </p:nvPr>
+        </p:nvSpPr>
+        <p:spPr/>
+        <p:txBody>
+          <a:bodyPr/>
+          <a:lstStyle/>
+          <a:p>
+            <a:fld id="{7A847CFC-816F-41D0-AAC0-9BF4FEBC753E}" type="datetimeFigureOut">
+              <a:rPr lang="es-ES" smtClean="0"/>
+              <a:pPr/>
+              <a:t>30/07/2019</a:t>
+            </a:fld>
+            <a:endParaRPr lang="es-ES"/>
+          </a:p>
+        </p:txBody>
+      </p:sp>
+      <p:sp>
+        <p:nvSpPr>
+          <p:cNvPr id="3" name="2 Marcador de pie de página"/>
+          <p:cNvSpPr>
+            <a:spLocks noGrp="1"/>
+          </p:cNvSpPr>
+          <p:nvPr>
+            <p:ph type="ftr" sz="quarter" idx="11"/>
+          </p:nvPr>
+        </p:nvSpPr>
+        <p:spPr/>
+        <p:txBody>
+          <a:bodyPr/>
+          <a:lstStyle/>
+          <a:p>
+            <a:endParaRPr lang="es-ES"/>
+          </a:p>
+        </p:txBody>
+      </p:sp>
+      <p:sp>
+        <p:nvSpPr>
+          <p:cNvPr id="4" name="3 Marcador de número de diapositiva"/>
+          <p:cNvSpPr>
+            <a:spLocks noGrp="1"/>
+          </p:cNvSpPr>
+          <p:nvPr>
+            <p:ph type="sldNum" sz="quarter" idx="12"/>
+          </p:nvPr>
+        </p:nvSpPr>
+        <p:spPr/>
+        <p:txBody>
+          <a:bodyPr/>
+          <a:lstStyle/>
+          <a:p>
+            <a:fld id="{132FADFE-3B8F-471C-ABF0-DBC7717ECBBC}" type="slidenum">
+              <a:rPr lang="es-ES" smtClean="0"/>
+              <a:pPr/>
+              <a:t>‹Nº›</a:t>
+            </a:fld>
+            <a:endParaRPr lang="es-ES"/>
+          </a:p>
+        </p:txBody>
+      </p:sp>
+    </p:spTree>
+  </p:cSld>
+  <p:clrMapOvr>
+    <a:masterClrMapping/>
+  </p:clrMapOvr>
+</p:sldLayout>
+</file>
+
+<file path=ppt/slideLayouts/slideLayout11.xml><?xml version="1.0" encoding="utf-8"?>
 <p:sldLayout xmlns:a="http://schemas.openxmlformats.org/drawingml/2006/main" xmlns:r="http://schemas.openxmlformats.org/officeDocument/2006/relationships" xmlns:p="http://schemas.openxmlformats.org/presentationml/2006/main" type="objTx" preserve="1">
   <p:cSld name="Contenido con título">
     <p:spTree>
@@ -573,7 +665,7 @@
             <a:fld id="{7A847CFC-816F-41D0-AAC0-9BF4FEBC753E}" type="datetimeFigureOut">
               <a:rPr lang="es-ES" smtClean="0"/>
               <a:pPr/>
-              <a:t>26/07/2019</a:t>
+              <a:t>30/07/2019</a:t>
             </a:fld>
             <a:endParaRPr lang="es-ES"/>
           </a:p>
@@ -630,7 +722,7 @@
 </p:sldLayout>
 </file>
 
-<file path=ppt/slideLayouts/slideLayout11.xml><?xml version="1.0" encoding="utf-8"?>
+<file path=ppt/slideLayouts/slideLayout12.xml><?xml version="1.0" encoding="utf-8"?>
 <p:sldLayout xmlns:a="http://schemas.openxmlformats.org/drawingml/2006/main" xmlns:r="http://schemas.openxmlformats.org/officeDocument/2006/relationships" xmlns:p="http://schemas.openxmlformats.org/presentationml/2006/main" type="picTx" preserve="1">
   <p:cSld name="Imagen con título">
     <p:spTree>
@@ -823,7 +915,7 @@
             <a:fld id="{7A847CFC-816F-41D0-AAC0-9BF4FEBC753E}" type="datetimeFigureOut">
               <a:rPr lang="es-ES" smtClean="0"/>
               <a:pPr/>
-              <a:t>26/07/2019</a:t>
+              <a:t>30/07/2019</a:t>
             </a:fld>
             <a:endParaRPr lang="es-ES"/>
           </a:p>
@@ -880,7 +972,7 @@
 </p:sldLayout>
 </file>
 
-<file path=ppt/slideLayouts/slideLayout12.xml><?xml version="1.0" encoding="utf-8"?>
+<file path=ppt/slideLayouts/slideLayout13.xml><?xml version="1.0" encoding="utf-8"?>
 <p:sldLayout xmlns:a="http://schemas.openxmlformats.org/drawingml/2006/main" xmlns:r="http://schemas.openxmlformats.org/officeDocument/2006/relationships" xmlns:p="http://schemas.openxmlformats.org/presentationml/2006/main" type="vertTx" preserve="1">
   <p:cSld name="Título y texto vertical">
     <p:spTree>
@@ -990,7 +1082,7 @@
             <a:fld id="{7A847CFC-816F-41D0-AAC0-9BF4FEBC753E}" type="datetimeFigureOut">
               <a:rPr lang="es-ES" smtClean="0"/>
               <a:pPr/>
-              <a:t>26/07/2019</a:t>
+              <a:t>30/07/2019</a:t>
             </a:fld>
             <a:endParaRPr lang="es-ES"/>
           </a:p>
@@ -1047,7 +1139,7 @@
 </p:sldLayout>
 </file>
 
-<file path=ppt/slideLayouts/slideLayout13.xml><?xml version="1.0" encoding="utf-8"?>
+<file path=ppt/slideLayouts/slideLayout14.xml><?xml version="1.0" encoding="utf-8"?>
 <p:sldLayout xmlns:a="http://schemas.openxmlformats.org/drawingml/2006/main" xmlns:r="http://schemas.openxmlformats.org/officeDocument/2006/relationships" xmlns:p="http://schemas.openxmlformats.org/presentationml/2006/main" type="vertTitleAndTx" preserve="1">
   <p:cSld name="Título vertical y texto">
     <p:spTree>
@@ -1167,7 +1259,7 @@
             <a:fld id="{7A847CFC-816F-41D0-AAC0-9BF4FEBC753E}" type="datetimeFigureOut">
               <a:rPr lang="es-ES" smtClean="0"/>
               <a:pPr/>
-              <a:t>26/07/2019</a:t>
+              <a:t>30/07/2019</a:t>
             </a:fld>
             <a:endParaRPr lang="es-ES"/>
           </a:p>
@@ -1334,7 +1426,7 @@
             <a:fld id="{7A847CFC-816F-41D0-AAC0-9BF4FEBC753E}" type="datetimeFigureOut">
               <a:rPr lang="es-ES" smtClean="0"/>
               <a:pPr/>
-              <a:t>26/07/2019</a:t>
+              <a:t>30/07/2019</a:t>
             </a:fld>
             <a:endParaRPr lang="es-ES"/>
           </a:p>
@@ -1577,7 +1669,7 @@
             <a:fld id="{7A847CFC-816F-41D0-AAC0-9BF4FEBC753E}" type="datetimeFigureOut">
               <a:rPr lang="es-ES" smtClean="0"/>
               <a:pPr/>
-              <a:t>26/07/2019</a:t>
+              <a:t>30/07/2019</a:t>
             </a:fld>
             <a:endParaRPr lang="es-ES"/>
           </a:p>
@@ -1862,7 +1954,7 @@
             <a:fld id="{7A847CFC-816F-41D0-AAC0-9BF4FEBC753E}" type="datetimeFigureOut">
               <a:rPr lang="es-ES" smtClean="0"/>
               <a:pPr/>
-              <a:t>26/07/2019</a:t>
+              <a:t>30/07/2019</a:t>
             </a:fld>
             <a:endParaRPr lang="es-ES"/>
           </a:p>
@@ -2152,7 +2244,7 @@
             <a:fld id="{7A847CFC-816F-41D0-AAC0-9BF4FEBC753E}" type="datetimeFigureOut">
               <a:rPr lang="es-ES" smtClean="0"/>
               <a:pPr/>
-              <a:t>26/07/2019</a:t>
+              <a:t>30/07/2019</a:t>
             </a:fld>
             <a:endParaRPr lang="es-ES"/>
           </a:p>
@@ -2556,7 +2648,7 @@
             <a:fld id="{7A847CFC-816F-41D0-AAC0-9BF4FEBC753E}" type="datetimeFigureOut">
               <a:rPr lang="es-ES" smtClean="0"/>
               <a:pPr/>
-              <a:t>26/07/2019</a:t>
+              <a:t>30/07/2019</a:t>
             </a:fld>
             <a:endParaRPr lang="es-ES"/>
           </a:p>
@@ -2914,6 +3006,746 @@
 </file>
 
 <file path=ppt/slideLayouts/slideLayout7.xml><?xml version="1.0" encoding="utf-8"?>
+<p:sldLayout xmlns:a="http://schemas.openxmlformats.org/drawingml/2006/main" xmlns:r="http://schemas.openxmlformats.org/officeDocument/2006/relationships" xmlns:p="http://schemas.openxmlformats.org/presentationml/2006/main" preserve="1" userDrawn="1">
+  <p:cSld name="3_Dos objetos">
+    <p:spTree>
+      <p:nvGrpSpPr>
+        <p:cNvPr id="1" name=""/>
+        <p:cNvGrpSpPr/>
+        <p:nvPr/>
+      </p:nvGrpSpPr>
+      <p:grpSpPr>
+        <a:xfrm>
+          <a:off x="0" y="0"/>
+          <a:ext cx="0" cy="0"/>
+          <a:chOff x="0" y="0"/>
+          <a:chExt cx="0" cy="0"/>
+        </a:xfrm>
+      </p:grpSpPr>
+      <p:sp>
+        <p:nvSpPr>
+          <p:cNvPr id="2" name="1 Título"/>
+          <p:cNvSpPr>
+            <a:spLocks noGrp="1"/>
+          </p:cNvSpPr>
+          <p:nvPr>
+            <p:ph type="title"/>
+          </p:nvPr>
+        </p:nvSpPr>
+        <p:spPr>
+          <a:xfrm>
+            <a:off x="457200" y="274638"/>
+            <a:ext cx="8229600" cy="562074"/>
+          </a:xfrm>
+        </p:spPr>
+        <p:txBody>
+          <a:bodyPr/>
+          <a:lstStyle/>
+          <a:p>
+            <a:r>
+              <a:rPr lang="es-ES" dirty="0" smtClean="0"/>
+              <a:t>Haga clic para modificar el estilo de título del patrón</a:t>
+            </a:r>
+            <a:endParaRPr lang="es-ES" dirty="0"/>
+          </a:p>
+        </p:txBody>
+      </p:sp>
+      <p:sp>
+        <p:nvSpPr>
+          <p:cNvPr id="3" name="2 Marcador de contenido"/>
+          <p:cNvSpPr>
+            <a:spLocks noGrp="1"/>
+          </p:cNvSpPr>
+          <p:nvPr>
+            <p:ph sz="half" idx="1"/>
+          </p:nvPr>
+        </p:nvSpPr>
+        <p:spPr>
+          <a:xfrm>
+            <a:off x="467544" y="1052736"/>
+            <a:ext cx="4038600" cy="1224136"/>
+          </a:xfrm>
+        </p:spPr>
+        <p:txBody>
+          <a:bodyPr/>
+          <a:lstStyle>
+            <a:lvl1pPr>
+              <a:defRPr sz="2800"/>
+            </a:lvl1pPr>
+            <a:lvl2pPr>
+              <a:defRPr sz="2400"/>
+            </a:lvl2pPr>
+            <a:lvl3pPr>
+              <a:defRPr sz="2000"/>
+            </a:lvl3pPr>
+            <a:lvl4pPr>
+              <a:defRPr sz="1800"/>
+            </a:lvl4pPr>
+            <a:lvl5pPr>
+              <a:defRPr sz="1800"/>
+            </a:lvl5pPr>
+            <a:lvl6pPr>
+              <a:defRPr sz="1800"/>
+            </a:lvl6pPr>
+            <a:lvl7pPr>
+              <a:defRPr sz="1800"/>
+            </a:lvl7pPr>
+            <a:lvl8pPr>
+              <a:defRPr sz="1800"/>
+            </a:lvl8pPr>
+            <a:lvl9pPr>
+              <a:defRPr sz="1800"/>
+            </a:lvl9pPr>
+          </a:lstStyle>
+          <a:p>
+            <a:pPr lvl="0"/>
+            <a:r>
+              <a:rPr lang="es-ES" dirty="0" smtClean="0"/>
+              <a:t>Haga clic para modificar el estilo de texto del patrón</a:t>
+            </a:r>
+          </a:p>
+          <a:p>
+            <a:pPr lvl="1"/>
+            <a:r>
+              <a:rPr lang="es-ES" dirty="0" smtClean="0"/>
+              <a:t>Segundo nivel</a:t>
+            </a:r>
+          </a:p>
+          <a:p>
+            <a:pPr lvl="2"/>
+            <a:r>
+              <a:rPr lang="es-ES" dirty="0" smtClean="0"/>
+              <a:t>Tercer nivel</a:t>
+            </a:r>
+          </a:p>
+          <a:p>
+            <a:pPr lvl="3"/>
+            <a:r>
+              <a:rPr lang="es-ES" dirty="0" smtClean="0"/>
+              <a:t>Cuarto nivel</a:t>
+            </a:r>
+          </a:p>
+          <a:p>
+            <a:pPr lvl="4"/>
+            <a:r>
+              <a:rPr lang="es-ES" dirty="0" smtClean="0"/>
+              <a:t>Quinto nivel</a:t>
+            </a:r>
+            <a:endParaRPr lang="es-ES" dirty="0"/>
+          </a:p>
+        </p:txBody>
+      </p:sp>
+      <p:sp>
+        <p:nvSpPr>
+          <p:cNvPr id="4" name="3 Marcador de contenido"/>
+          <p:cNvSpPr>
+            <a:spLocks noGrp="1"/>
+          </p:cNvSpPr>
+          <p:nvPr>
+            <p:ph sz="half" idx="2"/>
+          </p:nvPr>
+        </p:nvSpPr>
+        <p:spPr>
+          <a:xfrm>
+            <a:off x="4644008" y="1052737"/>
+            <a:ext cx="4038600" cy="1224135"/>
+          </a:xfrm>
+        </p:spPr>
+        <p:txBody>
+          <a:bodyPr/>
+          <a:lstStyle>
+            <a:lvl1pPr>
+              <a:defRPr sz="2800"/>
+            </a:lvl1pPr>
+            <a:lvl2pPr>
+              <a:defRPr sz="2400"/>
+            </a:lvl2pPr>
+            <a:lvl3pPr>
+              <a:defRPr sz="2000"/>
+            </a:lvl3pPr>
+            <a:lvl4pPr>
+              <a:defRPr sz="1800"/>
+            </a:lvl4pPr>
+            <a:lvl5pPr>
+              <a:defRPr sz="1800"/>
+            </a:lvl5pPr>
+            <a:lvl6pPr>
+              <a:defRPr sz="1800"/>
+            </a:lvl6pPr>
+            <a:lvl7pPr>
+              <a:defRPr sz="1800"/>
+            </a:lvl7pPr>
+            <a:lvl8pPr>
+              <a:defRPr sz="1800"/>
+            </a:lvl8pPr>
+            <a:lvl9pPr>
+              <a:defRPr sz="1800"/>
+            </a:lvl9pPr>
+          </a:lstStyle>
+          <a:p>
+            <a:pPr lvl="0"/>
+            <a:r>
+              <a:rPr lang="es-ES" dirty="0" smtClean="0"/>
+              <a:t>Haga clic para modificar el estilo de texto del patrón</a:t>
+            </a:r>
+          </a:p>
+          <a:p>
+            <a:pPr lvl="1"/>
+            <a:r>
+              <a:rPr lang="es-ES" dirty="0" smtClean="0"/>
+              <a:t>Segundo nivel</a:t>
+            </a:r>
+          </a:p>
+          <a:p>
+            <a:pPr lvl="2"/>
+            <a:r>
+              <a:rPr lang="es-ES" dirty="0" smtClean="0"/>
+              <a:t>Tercer nivel</a:t>
+            </a:r>
+          </a:p>
+          <a:p>
+            <a:pPr lvl="3"/>
+            <a:r>
+              <a:rPr lang="es-ES" dirty="0" smtClean="0"/>
+              <a:t>Cuarto nivel</a:t>
+            </a:r>
+          </a:p>
+          <a:p>
+            <a:pPr lvl="4"/>
+            <a:r>
+              <a:rPr lang="es-ES" dirty="0" smtClean="0"/>
+              <a:t>Quinto nivel</a:t>
+            </a:r>
+            <a:endParaRPr lang="es-ES" dirty="0"/>
+          </a:p>
+        </p:txBody>
+      </p:sp>
+      <p:sp>
+        <p:nvSpPr>
+          <p:cNvPr id="5" name="4 Marcador de fecha"/>
+          <p:cNvSpPr>
+            <a:spLocks noGrp="1"/>
+          </p:cNvSpPr>
+          <p:nvPr>
+            <p:ph type="dt" sz="half" idx="10"/>
+          </p:nvPr>
+        </p:nvSpPr>
+        <p:spPr/>
+        <p:txBody>
+          <a:bodyPr/>
+          <a:lstStyle/>
+          <a:p>
+            <a:fld id="{7A847CFC-816F-41D0-AAC0-9BF4FEBC753E}" type="datetimeFigureOut">
+              <a:rPr lang="es-ES" smtClean="0"/>
+              <a:pPr/>
+              <a:t>30/07/2019</a:t>
+            </a:fld>
+            <a:endParaRPr lang="es-ES"/>
+          </a:p>
+        </p:txBody>
+      </p:sp>
+      <p:sp>
+        <p:nvSpPr>
+          <p:cNvPr id="6" name="5 Marcador de pie de página"/>
+          <p:cNvSpPr>
+            <a:spLocks noGrp="1"/>
+          </p:cNvSpPr>
+          <p:nvPr>
+            <p:ph type="ftr" sz="quarter" idx="11"/>
+          </p:nvPr>
+        </p:nvSpPr>
+        <p:spPr/>
+        <p:txBody>
+          <a:bodyPr/>
+          <a:lstStyle/>
+          <a:p>
+            <a:endParaRPr lang="es-ES"/>
+          </a:p>
+        </p:txBody>
+      </p:sp>
+      <p:sp>
+        <p:nvSpPr>
+          <p:cNvPr id="7" name="6 Marcador de número de diapositiva"/>
+          <p:cNvSpPr>
+            <a:spLocks noGrp="1"/>
+          </p:cNvSpPr>
+          <p:nvPr>
+            <p:ph type="sldNum" sz="quarter" idx="12"/>
+          </p:nvPr>
+        </p:nvSpPr>
+        <p:spPr/>
+        <p:txBody>
+          <a:bodyPr/>
+          <a:lstStyle/>
+          <a:p>
+            <a:fld id="{132FADFE-3B8F-471C-ABF0-DBC7717ECBBC}" type="slidenum">
+              <a:rPr lang="es-ES" smtClean="0"/>
+              <a:pPr/>
+              <a:t>‹Nº›</a:t>
+            </a:fld>
+            <a:endParaRPr lang="es-ES"/>
+          </a:p>
+        </p:txBody>
+      </p:sp>
+      <p:sp>
+        <p:nvSpPr>
+          <p:cNvPr id="9" name="8 Marcador de contenido"/>
+          <p:cNvSpPr>
+            <a:spLocks noGrp="1"/>
+          </p:cNvSpPr>
+          <p:nvPr>
+            <p:ph sz="quarter" idx="13"/>
+          </p:nvPr>
+        </p:nvSpPr>
+        <p:spPr>
+          <a:xfrm>
+            <a:off x="467544" y="2348880"/>
+            <a:ext cx="4032250" cy="1224136"/>
+          </a:xfrm>
+        </p:spPr>
+        <p:txBody>
+          <a:bodyPr>
+            <a:noAutofit/>
+          </a:bodyPr>
+          <a:lstStyle>
+            <a:lvl1pPr>
+              <a:defRPr sz="2800"/>
+            </a:lvl1pPr>
+            <a:lvl2pPr>
+              <a:defRPr sz="2400"/>
+            </a:lvl2pPr>
+            <a:lvl3pPr>
+              <a:defRPr sz="2000"/>
+            </a:lvl3pPr>
+            <a:lvl4pPr>
+              <a:defRPr sz="1800"/>
+            </a:lvl4pPr>
+            <a:lvl5pPr>
+              <a:defRPr sz="1800"/>
+            </a:lvl5pPr>
+          </a:lstStyle>
+          <a:p>
+            <a:pPr lvl="0"/>
+            <a:r>
+              <a:rPr lang="es-ES" dirty="0" smtClean="0"/>
+              <a:t>Haga clic para modificar el estilo de texto del patrón</a:t>
+            </a:r>
+          </a:p>
+          <a:p>
+            <a:pPr lvl="1"/>
+            <a:r>
+              <a:rPr lang="es-ES" dirty="0" smtClean="0"/>
+              <a:t>Segundo nivel</a:t>
+            </a:r>
+          </a:p>
+          <a:p>
+            <a:pPr lvl="2"/>
+            <a:r>
+              <a:rPr lang="es-ES" dirty="0" smtClean="0"/>
+              <a:t>Tercer nivel</a:t>
+            </a:r>
+          </a:p>
+          <a:p>
+            <a:pPr lvl="3"/>
+            <a:r>
+              <a:rPr lang="es-ES" dirty="0" smtClean="0"/>
+              <a:t>Cuarto nivel</a:t>
+            </a:r>
+          </a:p>
+          <a:p>
+            <a:pPr lvl="4"/>
+            <a:r>
+              <a:rPr lang="es-ES" dirty="0" smtClean="0"/>
+              <a:t>Quinto nivel</a:t>
+            </a:r>
+            <a:endParaRPr lang="ca-ES" dirty="0"/>
+          </a:p>
+        </p:txBody>
+      </p:sp>
+      <p:sp>
+        <p:nvSpPr>
+          <p:cNvPr id="11" name="10 Marcador de contenido"/>
+          <p:cNvSpPr>
+            <a:spLocks noGrp="1"/>
+          </p:cNvSpPr>
+          <p:nvPr>
+            <p:ph sz="quarter" idx="14"/>
+          </p:nvPr>
+        </p:nvSpPr>
+        <p:spPr>
+          <a:xfrm>
+            <a:off x="4644008" y="2348880"/>
+            <a:ext cx="4033018" cy="1224136"/>
+          </a:xfrm>
+        </p:spPr>
+        <p:txBody>
+          <a:bodyPr>
+            <a:noAutofit/>
+          </a:bodyPr>
+          <a:lstStyle>
+            <a:lvl1pPr>
+              <a:defRPr sz="2800"/>
+            </a:lvl1pPr>
+            <a:lvl2pPr>
+              <a:defRPr sz="2400"/>
+            </a:lvl2pPr>
+            <a:lvl3pPr>
+              <a:defRPr sz="2000"/>
+            </a:lvl3pPr>
+            <a:lvl4pPr>
+              <a:defRPr sz="1800"/>
+            </a:lvl4pPr>
+            <a:lvl5pPr>
+              <a:defRPr sz="1800"/>
+            </a:lvl5pPr>
+          </a:lstStyle>
+          <a:p>
+            <a:pPr lvl="0"/>
+            <a:r>
+              <a:rPr lang="es-ES" dirty="0" smtClean="0"/>
+              <a:t>Haga clic para modificar el estilo de texto del patrón</a:t>
+            </a:r>
+          </a:p>
+          <a:p>
+            <a:pPr lvl="1"/>
+            <a:r>
+              <a:rPr lang="es-ES" dirty="0" smtClean="0"/>
+              <a:t>Segundo nivel</a:t>
+            </a:r>
+          </a:p>
+          <a:p>
+            <a:pPr lvl="2"/>
+            <a:r>
+              <a:rPr lang="es-ES" dirty="0" smtClean="0"/>
+              <a:t>Tercer nivel</a:t>
+            </a:r>
+          </a:p>
+          <a:p>
+            <a:pPr lvl="3"/>
+            <a:r>
+              <a:rPr lang="es-ES" dirty="0" smtClean="0"/>
+              <a:t>Cuarto nivel</a:t>
+            </a:r>
+          </a:p>
+          <a:p>
+            <a:pPr lvl="4"/>
+            <a:r>
+              <a:rPr lang="es-ES" dirty="0" smtClean="0"/>
+              <a:t>Quinto nivel</a:t>
+            </a:r>
+            <a:endParaRPr lang="ca-ES" dirty="0"/>
+          </a:p>
+        </p:txBody>
+      </p:sp>
+      <p:sp>
+        <p:nvSpPr>
+          <p:cNvPr id="12" name="11 Marcador de contenido"/>
+          <p:cNvSpPr>
+            <a:spLocks noGrp="1"/>
+          </p:cNvSpPr>
+          <p:nvPr>
+            <p:ph sz="quarter" idx="15"/>
+          </p:nvPr>
+        </p:nvSpPr>
+        <p:spPr>
+          <a:xfrm>
+            <a:off x="468313" y="3645024"/>
+            <a:ext cx="4032250" cy="1224136"/>
+          </a:xfrm>
+        </p:spPr>
+        <p:txBody>
+          <a:bodyPr>
+            <a:noAutofit/>
+          </a:bodyPr>
+          <a:lstStyle>
+            <a:lvl1pPr>
+              <a:defRPr sz="2800"/>
+            </a:lvl1pPr>
+            <a:lvl2pPr>
+              <a:defRPr sz="2400"/>
+            </a:lvl2pPr>
+            <a:lvl3pPr>
+              <a:defRPr sz="2000"/>
+            </a:lvl3pPr>
+            <a:lvl4pPr>
+              <a:defRPr sz="1800"/>
+            </a:lvl4pPr>
+            <a:lvl5pPr>
+              <a:defRPr sz="1800"/>
+            </a:lvl5pPr>
+          </a:lstStyle>
+          <a:p>
+            <a:pPr lvl="0"/>
+            <a:r>
+              <a:rPr lang="es-ES" dirty="0" smtClean="0"/>
+              <a:t>Haga clic para modificar el estilo de texto del patrón</a:t>
+            </a:r>
+          </a:p>
+          <a:p>
+            <a:pPr lvl="1"/>
+            <a:r>
+              <a:rPr lang="es-ES" dirty="0" smtClean="0"/>
+              <a:t>Segundo nivel</a:t>
+            </a:r>
+          </a:p>
+          <a:p>
+            <a:pPr lvl="2"/>
+            <a:r>
+              <a:rPr lang="es-ES" dirty="0" smtClean="0"/>
+              <a:t>Tercer nivel</a:t>
+            </a:r>
+          </a:p>
+          <a:p>
+            <a:pPr lvl="3"/>
+            <a:r>
+              <a:rPr lang="es-ES" dirty="0" smtClean="0"/>
+              <a:t>Cuarto nivel</a:t>
+            </a:r>
+          </a:p>
+          <a:p>
+            <a:pPr lvl="4"/>
+            <a:r>
+              <a:rPr lang="es-ES" dirty="0" smtClean="0"/>
+              <a:t>Quinto nivel</a:t>
+            </a:r>
+            <a:endParaRPr lang="ca-ES" dirty="0"/>
+          </a:p>
+        </p:txBody>
+      </p:sp>
+      <p:sp>
+        <p:nvSpPr>
+          <p:cNvPr id="14" name="13 Marcador de contenido"/>
+          <p:cNvSpPr>
+            <a:spLocks noGrp="1"/>
+          </p:cNvSpPr>
+          <p:nvPr>
+            <p:ph sz="quarter" idx="16"/>
+          </p:nvPr>
+        </p:nvSpPr>
+        <p:spPr>
+          <a:xfrm>
+            <a:off x="4643438" y="3645024"/>
+            <a:ext cx="4032250" cy="1224136"/>
+          </a:xfrm>
+        </p:spPr>
+        <p:txBody>
+          <a:bodyPr>
+            <a:noAutofit/>
+          </a:bodyPr>
+          <a:lstStyle>
+            <a:lvl1pPr>
+              <a:defRPr sz="2800"/>
+            </a:lvl1pPr>
+            <a:lvl2pPr>
+              <a:defRPr sz="2400"/>
+            </a:lvl2pPr>
+            <a:lvl3pPr>
+              <a:defRPr sz="2000"/>
+            </a:lvl3pPr>
+            <a:lvl4pPr>
+              <a:defRPr sz="1800"/>
+            </a:lvl4pPr>
+            <a:lvl5pPr>
+              <a:defRPr sz="1800"/>
+            </a:lvl5pPr>
+          </a:lstStyle>
+          <a:p>
+            <a:pPr lvl="0"/>
+            <a:r>
+              <a:rPr lang="es-ES" dirty="0" smtClean="0"/>
+              <a:t>Haga clic para modificar el estilo de texto del patrón</a:t>
+            </a:r>
+          </a:p>
+          <a:p>
+            <a:pPr lvl="1"/>
+            <a:r>
+              <a:rPr lang="es-ES" dirty="0" smtClean="0"/>
+              <a:t>Segundo nivel</a:t>
+            </a:r>
+          </a:p>
+          <a:p>
+            <a:pPr lvl="2"/>
+            <a:r>
+              <a:rPr lang="es-ES" dirty="0" smtClean="0"/>
+              <a:t>Tercer nivel</a:t>
+            </a:r>
+          </a:p>
+          <a:p>
+            <a:pPr lvl="3"/>
+            <a:r>
+              <a:rPr lang="es-ES" dirty="0" smtClean="0"/>
+              <a:t>Cuarto nivel</a:t>
+            </a:r>
+          </a:p>
+          <a:p>
+            <a:pPr lvl="4"/>
+            <a:r>
+              <a:rPr lang="es-ES" dirty="0" smtClean="0"/>
+              <a:t>Quinto nivel</a:t>
+            </a:r>
+            <a:endParaRPr lang="ca-ES" dirty="0"/>
+          </a:p>
+        </p:txBody>
+      </p:sp>
+      <p:sp>
+        <p:nvSpPr>
+          <p:cNvPr id="15" name="14 Marcador de contenido"/>
+          <p:cNvSpPr>
+            <a:spLocks noGrp="1"/>
+          </p:cNvSpPr>
+          <p:nvPr>
+            <p:ph sz="quarter" idx="17"/>
+          </p:nvPr>
+        </p:nvSpPr>
+        <p:spPr>
+          <a:xfrm>
+            <a:off x="468313" y="4941888"/>
+            <a:ext cx="4032250" cy="1295400"/>
+          </a:xfrm>
+        </p:spPr>
+        <p:txBody>
+          <a:bodyPr>
+            <a:noAutofit/>
+          </a:bodyPr>
+          <a:lstStyle>
+            <a:lvl1pPr>
+              <a:defRPr sz="2800"/>
+            </a:lvl1pPr>
+            <a:lvl2pPr>
+              <a:defRPr sz="2400"/>
+            </a:lvl2pPr>
+            <a:lvl3pPr>
+              <a:defRPr sz="2000"/>
+            </a:lvl3pPr>
+            <a:lvl4pPr>
+              <a:defRPr sz="1800"/>
+            </a:lvl4pPr>
+            <a:lvl5pPr>
+              <a:defRPr sz="1800"/>
+            </a:lvl5pPr>
+          </a:lstStyle>
+          <a:p>
+            <a:pPr lvl="0"/>
+            <a:r>
+              <a:rPr lang="es-ES" smtClean="0"/>
+              <a:t>Haga clic para modificar el estilo de texto del patrón</a:t>
+            </a:r>
+          </a:p>
+          <a:p>
+            <a:pPr lvl="1"/>
+            <a:r>
+              <a:rPr lang="es-ES" smtClean="0"/>
+              <a:t>Segundo nivel</a:t>
+            </a:r>
+          </a:p>
+          <a:p>
+            <a:pPr lvl="2"/>
+            <a:r>
+              <a:rPr lang="es-ES" smtClean="0"/>
+              <a:t>Tercer nivel</a:t>
+            </a:r>
+          </a:p>
+          <a:p>
+            <a:pPr lvl="3"/>
+            <a:r>
+              <a:rPr lang="es-ES" smtClean="0"/>
+              <a:t>Cuarto nivel</a:t>
+            </a:r>
+          </a:p>
+          <a:p>
+            <a:pPr lvl="4"/>
+            <a:r>
+              <a:rPr lang="es-ES" smtClean="0"/>
+              <a:t>Quinto nivel</a:t>
+            </a:r>
+            <a:endParaRPr lang="ca-ES"/>
+          </a:p>
+        </p:txBody>
+      </p:sp>
+      <p:sp>
+        <p:nvSpPr>
+          <p:cNvPr id="17" name="16 Marcador de contenido"/>
+          <p:cNvSpPr>
+            <a:spLocks noGrp="1"/>
+          </p:cNvSpPr>
+          <p:nvPr>
+            <p:ph sz="quarter" idx="18"/>
+          </p:nvPr>
+        </p:nvSpPr>
+        <p:spPr>
+          <a:xfrm>
+            <a:off x="4643438" y="4941888"/>
+            <a:ext cx="4032250" cy="1295400"/>
+          </a:xfrm>
+        </p:spPr>
+        <p:txBody>
+          <a:bodyPr>
+            <a:noAutofit/>
+          </a:bodyPr>
+          <a:lstStyle>
+            <a:lvl1pPr>
+              <a:defRPr sz="2800"/>
+            </a:lvl1pPr>
+            <a:lvl2pPr>
+              <a:defRPr sz="2400"/>
+            </a:lvl2pPr>
+            <a:lvl3pPr>
+              <a:defRPr sz="2000"/>
+            </a:lvl3pPr>
+            <a:lvl4pPr>
+              <a:defRPr sz="1800"/>
+            </a:lvl4pPr>
+            <a:lvl5pPr>
+              <a:defRPr sz="1800"/>
+            </a:lvl5pPr>
+          </a:lstStyle>
+          <a:p>
+            <a:pPr lvl="0"/>
+            <a:r>
+              <a:rPr lang="es-ES" smtClean="0"/>
+              <a:t>Haga clic para modificar el estilo de texto del patrón</a:t>
+            </a:r>
+          </a:p>
+          <a:p>
+            <a:pPr lvl="1"/>
+            <a:r>
+              <a:rPr lang="es-ES" smtClean="0"/>
+              <a:t>Segundo nivel</a:t>
+            </a:r>
+          </a:p>
+          <a:p>
+            <a:pPr lvl="2"/>
+            <a:r>
+              <a:rPr lang="es-ES" smtClean="0"/>
+              <a:t>Tercer nivel</a:t>
+            </a:r>
+          </a:p>
+          <a:p>
+            <a:pPr lvl="3"/>
+            <a:r>
+              <a:rPr lang="es-ES" smtClean="0"/>
+              <a:t>Cuarto nivel</a:t>
+            </a:r>
+          </a:p>
+          <a:p>
+            <a:pPr lvl="4"/>
+            <a:r>
+              <a:rPr lang="es-ES" smtClean="0"/>
+              <a:t>Quinto nivel</a:t>
+            </a:r>
+            <a:endParaRPr lang="ca-ES"/>
+          </a:p>
+        </p:txBody>
+      </p:sp>
+    </p:spTree>
+  </p:cSld>
+  <p:clrMapOvr>
+    <a:masterClrMapping/>
+  </p:clrMapOvr>
+</p:sldLayout>
+</file>
+
+<file path=ppt/slideLayouts/slideLayout8.xml><?xml version="1.0" encoding="utf-8"?>
 <p:sldLayout xmlns:a="http://schemas.openxmlformats.org/drawingml/2006/main" xmlns:r="http://schemas.openxmlformats.org/officeDocument/2006/relationships" xmlns:p="http://schemas.openxmlformats.org/presentationml/2006/main" type="twoTxTwoObj" preserve="1">
   <p:cSld name="Comparación">
     <p:spTree>
@@ -3275,7 +4107,7 @@
             <a:fld id="{7A847CFC-816F-41D0-AAC0-9BF4FEBC753E}" type="datetimeFigureOut">
               <a:rPr lang="es-ES" smtClean="0"/>
               <a:pPr/>
-              <a:t>26/07/2019</a:t>
+              <a:t>30/07/2019</a:t>
             </a:fld>
             <a:endParaRPr lang="es-ES"/>
           </a:p>
@@ -3332,7 +4164,7 @@
 </p:sldLayout>
 </file>
 
-<file path=ppt/slideLayouts/slideLayout8.xml><?xml version="1.0" encoding="utf-8"?>
+<file path=ppt/slideLayouts/slideLayout9.xml><?xml version="1.0" encoding="utf-8"?>
 <p:sldLayout xmlns:a="http://schemas.openxmlformats.org/drawingml/2006/main" xmlns:r="http://schemas.openxmlformats.org/officeDocument/2006/relationships" xmlns:p="http://schemas.openxmlformats.org/presentationml/2006/main" type="titleOnly" preserve="1">
   <p:cSld name="Sólo el título">
     <p:spTree>
@@ -3390,7 +4222,7 @@
             <a:fld id="{7A847CFC-816F-41D0-AAC0-9BF4FEBC753E}" type="datetimeFigureOut">
               <a:rPr lang="es-ES" smtClean="0"/>
               <a:pPr/>
-              <a:t>26/07/2019</a:t>
+              <a:t>30/07/2019</a:t>
             </a:fld>
             <a:endParaRPr lang="es-ES"/>
           </a:p>
@@ -3418,98 +4250,6 @@
       <p:sp>
         <p:nvSpPr>
           <p:cNvPr id="5" name="4 Marcador de número de diapositiva"/>
-          <p:cNvSpPr>
-            <a:spLocks noGrp="1"/>
-          </p:cNvSpPr>
-          <p:nvPr>
-            <p:ph type="sldNum" sz="quarter" idx="12"/>
-          </p:nvPr>
-        </p:nvSpPr>
-        <p:spPr/>
-        <p:txBody>
-          <a:bodyPr/>
-          <a:lstStyle/>
-          <a:p>
-            <a:fld id="{132FADFE-3B8F-471C-ABF0-DBC7717ECBBC}" type="slidenum">
-              <a:rPr lang="es-ES" smtClean="0"/>
-              <a:pPr/>
-              <a:t>‹Nº›</a:t>
-            </a:fld>
-            <a:endParaRPr lang="es-ES"/>
-          </a:p>
-        </p:txBody>
-      </p:sp>
-    </p:spTree>
-  </p:cSld>
-  <p:clrMapOvr>
-    <a:masterClrMapping/>
-  </p:clrMapOvr>
-</p:sldLayout>
-</file>
-
-<file path=ppt/slideLayouts/slideLayout9.xml><?xml version="1.0" encoding="utf-8"?>
-<p:sldLayout xmlns:a="http://schemas.openxmlformats.org/drawingml/2006/main" xmlns:r="http://schemas.openxmlformats.org/officeDocument/2006/relationships" xmlns:p="http://schemas.openxmlformats.org/presentationml/2006/main" type="blank" preserve="1">
-  <p:cSld name="En blanco">
-    <p:spTree>
-      <p:nvGrpSpPr>
-        <p:cNvPr id="1" name=""/>
-        <p:cNvGrpSpPr/>
-        <p:nvPr/>
-      </p:nvGrpSpPr>
-      <p:grpSpPr>
-        <a:xfrm>
-          <a:off x="0" y="0"/>
-          <a:ext cx="0" cy="0"/>
-          <a:chOff x="0" y="0"/>
-          <a:chExt cx="0" cy="0"/>
-        </a:xfrm>
-      </p:grpSpPr>
-      <p:sp>
-        <p:nvSpPr>
-          <p:cNvPr id="2" name="1 Marcador de fecha"/>
-          <p:cNvSpPr>
-            <a:spLocks noGrp="1"/>
-          </p:cNvSpPr>
-          <p:nvPr>
-            <p:ph type="dt" sz="half" idx="10"/>
-          </p:nvPr>
-        </p:nvSpPr>
-        <p:spPr/>
-        <p:txBody>
-          <a:bodyPr/>
-          <a:lstStyle/>
-          <a:p>
-            <a:fld id="{7A847CFC-816F-41D0-AAC0-9BF4FEBC753E}" type="datetimeFigureOut">
-              <a:rPr lang="es-ES" smtClean="0"/>
-              <a:pPr/>
-              <a:t>26/07/2019</a:t>
-            </a:fld>
-            <a:endParaRPr lang="es-ES"/>
-          </a:p>
-        </p:txBody>
-      </p:sp>
-      <p:sp>
-        <p:nvSpPr>
-          <p:cNvPr id="3" name="2 Marcador de pie de página"/>
-          <p:cNvSpPr>
-            <a:spLocks noGrp="1"/>
-          </p:cNvSpPr>
-          <p:nvPr>
-            <p:ph type="ftr" sz="quarter" idx="11"/>
-          </p:nvPr>
-        </p:nvSpPr>
-        <p:spPr/>
-        <p:txBody>
-          <a:bodyPr/>
-          <a:lstStyle/>
-          <a:p>
-            <a:endParaRPr lang="es-ES"/>
-          </a:p>
-        </p:txBody>
-      </p:sp>
-      <p:sp>
-        <p:nvSpPr>
-          <p:cNvPr id="4" name="3 Marcador de número de diapositiva"/>
           <p:cNvSpPr>
             <a:spLocks noGrp="1"/>
           </p:cNvSpPr>
@@ -3692,7 +4432,7 @@
             <a:fld id="{7A847CFC-816F-41D0-AAC0-9BF4FEBC753E}" type="datetimeFigureOut">
               <a:rPr lang="es-ES" smtClean="0"/>
               <a:pPr/>
-              <a:t>26/07/2019</a:t>
+              <a:t>30/07/2019</a:t>
             </a:fld>
             <a:endParaRPr lang="es-ES"/>
           </a:p>
@@ -3787,13 +4527,14 @@
     <p:sldLayoutId id="2147483652" r:id="rId4"/>
     <p:sldLayoutId id="2147483660" r:id="rId5"/>
     <p:sldLayoutId id="2147483661" r:id="rId6"/>
-    <p:sldLayoutId id="2147483653" r:id="rId7"/>
-    <p:sldLayoutId id="2147483654" r:id="rId8"/>
-    <p:sldLayoutId id="2147483655" r:id="rId9"/>
-    <p:sldLayoutId id="2147483656" r:id="rId10"/>
-    <p:sldLayoutId id="2147483657" r:id="rId11"/>
-    <p:sldLayoutId id="2147483658" r:id="rId12"/>
-    <p:sldLayoutId id="2147483659" r:id="rId13"/>
+    <p:sldLayoutId id="2147483662" r:id="rId7"/>
+    <p:sldLayoutId id="2147483653" r:id="rId8"/>
+    <p:sldLayoutId id="2147483654" r:id="rId9"/>
+    <p:sldLayoutId id="2147483655" r:id="rId10"/>
+    <p:sldLayoutId id="2147483656" r:id="rId11"/>
+    <p:sldLayoutId id="2147483657" r:id="rId12"/>
+    <p:sldLayoutId id="2147483658" r:id="rId13"/>
+    <p:sldLayoutId id="2147483659" r:id="rId14"/>
   </p:sldLayoutIdLst>
   <p:txStyles>
     <p:titleStyle>
@@ -5495,13 +6236,8 @@
           <a:p>
             <a:r>
               <a:rPr lang="en-US" dirty="0" smtClean="0"/>
-              <a:t>Only support </a:t>
-            </a:r>
-            <a:r>
-              <a:rPr lang="en-US" dirty="0" smtClean="0"/>
-              <a:t>the 8 options in 2D-TMS Annex D</a:t>
-            </a:r>
-            <a:endParaRPr lang="en-US" dirty="0" smtClean="0"/>
+              <a:t>Only support the 8 options in 2D-TMS Annex D</a:t>
+            </a:r>
           </a:p>
           <a:p>
             <a:pPr lvl="1"/>
@@ -5526,11 +6262,7 @@
             </a:r>
             <a:r>
               <a:rPr lang="en-US" dirty="0" smtClean="0"/>
-              <a:t> Link (but </a:t>
-            </a:r>
-            <a:r>
-              <a:rPr lang="en-US" dirty="0" smtClean="0"/>
-              <a:t>not </a:t>
+              <a:t> Link (but not </a:t>
             </a:r>
             <a:r>
               <a:rPr lang="en-US" dirty="0" err="1" smtClean="0"/>
@@ -5540,7 +6272,6 @@
               <a:rPr lang="en-US" dirty="0" smtClean="0"/>
               <a:t>)</a:t>
             </a:r>
-            <a:endParaRPr lang="en-US" dirty="0" smtClean="0"/>
           </a:p>
           <a:p>
             <a:r>
@@ -5710,7 +6441,7 @@
             </a:br>
             <a:r>
               <a:rPr lang="ca-ES" dirty="0" smtClean="0"/>
-              <a:t>(5th </a:t>
+              <a:t>(4th </a:t>
             </a:r>
             <a:r>
               <a:rPr lang="ca-ES" dirty="0" err="1" smtClean="0"/>
@@ -5760,7 +6491,7 @@
             </a:br>
             <a:r>
               <a:rPr lang="ca-ES" dirty="0" smtClean="0"/>
-              <a:t>(8th </a:t>
+              <a:t>(5th </a:t>
             </a:r>
             <a:r>
               <a:rPr lang="ca-ES" dirty="0" err="1" smtClean="0"/>
@@ -5855,16 +6586,12 @@
               <a:rPr lang="ca-ES" dirty="0" smtClean="0"/>
               <a:t> </a:t>
             </a:r>
-            <a:r>
-              <a:rPr lang="ca-ES" dirty="0" smtClean="0"/>
-              <a:t/>
-            </a:r>
             <a:br>
               <a:rPr lang="ca-ES" dirty="0" smtClean="0"/>
             </a:br>
             <a:r>
               <a:rPr lang="ca-ES" dirty="0" smtClean="0"/>
-              <a:t>(9th </a:t>
+              <a:t>(6th </a:t>
             </a:r>
             <a:r>
               <a:rPr lang="ca-ES" dirty="0" err="1" smtClean="0"/>
@@ -5906,11 +6633,7 @@
             </a:br>
             <a:r>
               <a:rPr lang="ca-ES" dirty="0" smtClean="0"/>
-              <a:t>(3rt TB15</a:t>
-            </a:r>
-            <a:r>
-              <a:rPr lang="ca-ES" dirty="0" smtClean="0"/>
-              <a:t>) </a:t>
+              <a:t>(3rt TB15) </a:t>
             </a:r>
             <a:endParaRPr lang="ca-ES" dirty="0"/>
           </a:p>
@@ -5944,13 +6667,203 @@
             </a:br>
             <a:r>
               <a:rPr lang="ca-ES" dirty="0" smtClean="0"/>
-              <a:t>(2nd TB15</a:t>
+              <a:t>(2nd TB15)</a:t>
+            </a:r>
+            <a:endParaRPr lang="ca-ES" dirty="0"/>
+          </a:p>
+        </p:txBody>
+      </p:sp>
+      <p:sp>
+        <p:nvSpPr>
+          <p:cNvPr id="12" name="11 Marcador de contenido"/>
+          <p:cNvSpPr>
+            <a:spLocks noGrp="1"/>
+          </p:cNvSpPr>
+          <p:nvPr>
+            <p:ph sz="quarter" idx="17"/>
+          </p:nvPr>
+        </p:nvSpPr>
+        <p:spPr/>
+        <p:txBody>
+          <a:bodyPr/>
+          <a:lstStyle/>
+          <a:p>
+            <a:r>
+              <a:rPr lang="ca-ES" dirty="0" smtClean="0"/>
+              <a:t>Time/</a:t>
+            </a:r>
+            <a:r>
+              <a:rPr lang="ca-ES" dirty="0" err="1" smtClean="0"/>
+              <a:t>elevation</a:t>
+            </a:r>
+            <a:r>
+              <a:rPr lang="ca-ES" dirty="0" smtClean="0"/>
+              <a:t/>
+            </a:r>
+            <a:br>
+              <a:rPr lang="ca-ES" dirty="0" smtClean="0"/>
+            </a:br>
+            <a:r>
+              <a:rPr lang="ca-ES" dirty="0" smtClean="0"/>
+              <a:t> </a:t>
+            </a:r>
+            <a:r>
+              <a:rPr lang="ca-ES" dirty="0" smtClean="0"/>
+              <a:t>(7th </a:t>
+            </a:r>
+            <a:r>
+              <a:rPr lang="ca-ES" dirty="0" err="1" smtClean="0"/>
+              <a:t>SWG</a:t>
             </a:r>
             <a:r>
               <a:rPr lang="ca-ES" dirty="0" smtClean="0"/>
               <a:t>)</a:t>
             </a:r>
             <a:endParaRPr lang="ca-ES" dirty="0"/>
+          </a:p>
+        </p:txBody>
+      </p:sp>
+      <p:sp>
+        <p:nvSpPr>
+          <p:cNvPr id="13" name="12 Marcador de contenido"/>
+          <p:cNvSpPr>
+            <a:spLocks noGrp="1"/>
+          </p:cNvSpPr>
+          <p:nvPr>
+            <p:ph sz="quarter" idx="18"/>
+          </p:nvPr>
+        </p:nvSpPr>
+        <p:spPr/>
+        <p:txBody>
+          <a:bodyPr/>
+          <a:lstStyle/>
+          <a:p>
+            <a:r>
+              <a:rPr lang="ca-ES" dirty="0" smtClean="0"/>
+              <a:t>Extra dimensions</a:t>
+            </a:r>
+            <a:br>
+              <a:rPr lang="ca-ES" dirty="0" smtClean="0"/>
+            </a:br>
+            <a:r>
+              <a:rPr lang="ca-ES" dirty="0" smtClean="0"/>
+              <a:t> </a:t>
+            </a:r>
+            <a:r>
+              <a:rPr lang="ca-ES" dirty="0" smtClean="0"/>
+              <a:t>(8th </a:t>
+            </a:r>
+            <a:r>
+              <a:rPr lang="ca-ES" dirty="0" err="1" smtClean="0"/>
+              <a:t>SWG</a:t>
+            </a:r>
+            <a:r>
+              <a:rPr lang="ca-ES" dirty="0" smtClean="0"/>
+              <a:t>)</a:t>
+            </a:r>
+            <a:endParaRPr lang="ca-ES" dirty="0"/>
+          </a:p>
+        </p:txBody>
+      </p:sp>
+      <p:sp>
+        <p:nvSpPr>
+          <p:cNvPr id="11" name="10 CuadroTexto"/>
+          <p:cNvSpPr txBox="1"/>
+          <p:nvPr/>
+        </p:nvSpPr>
+        <p:spPr>
+          <a:xfrm rot="19840231">
+            <a:off x="2904906" y="1408579"/>
+            <a:ext cx="998564" cy="510778"/>
+          </a:xfrm>
+          <a:prstGeom prst="roundRect">
+            <a:avLst/>
+          </a:prstGeom>
+          <a:noFill/>
+          <a:ln>
+            <a:solidFill>
+              <a:srgbClr val="FF0000"/>
+            </a:solidFill>
+          </a:ln>
+        </p:spPr>
+        <p:txBody>
+          <a:bodyPr wrap="none" rtlCol="0">
+            <a:spAutoFit/>
+          </a:bodyPr>
+          <a:lstStyle/>
+          <a:p>
+            <a:r>
+              <a:rPr lang="ca-ES" sz="2400" dirty="0" err="1" smtClean="0">
+                <a:solidFill>
+                  <a:srgbClr val="FF0000"/>
+                </a:solidFill>
+              </a:rPr>
+              <a:t>Done</a:t>
+            </a:r>
+            <a:r>
+              <a:rPr lang="ca-ES" sz="2400" dirty="0" smtClean="0">
+                <a:solidFill>
+                  <a:srgbClr val="FF0000"/>
+                </a:solidFill>
+              </a:rPr>
+              <a:t>!</a:t>
+            </a:r>
+            <a:endParaRPr lang="ca-ES" sz="2400" dirty="0">
+              <a:solidFill>
+                <a:srgbClr val="FF0000"/>
+              </a:solidFill>
+            </a:endParaRPr>
+          </a:p>
+        </p:txBody>
+      </p:sp>
+      <p:sp>
+        <p:nvSpPr>
+          <p:cNvPr id="14" name="13 CuadroTexto"/>
+          <p:cNvSpPr txBox="1"/>
+          <p:nvPr/>
+        </p:nvSpPr>
+        <p:spPr>
+          <a:xfrm rot="19840231">
+            <a:off x="2904905" y="3064764"/>
+            <a:ext cx="998564" cy="510778"/>
+          </a:xfrm>
+          <a:prstGeom prst="roundRect">
+            <a:avLst/>
+          </a:prstGeom>
+          <a:noFill/>
+          <a:ln>
+            <a:solidFill>
+              <a:srgbClr val="FF0000"/>
+            </a:solidFill>
+          </a:ln>
+        </p:spPr>
+        <p:txBody>
+          <a:bodyPr wrap="none" rtlCol="0">
+            <a:spAutoFit/>
+          </a:bodyPr>
+          <a:lstStyle/>
+          <a:p>
+            <a:r>
+              <a:rPr lang="ca-ES" sz="2400" dirty="0" err="1" smtClean="0">
+                <a:solidFill>
+                  <a:srgbClr val="FF0000"/>
+                </a:solidFill>
+              </a:rPr>
+              <a:t>Done</a:t>
+            </a:r>
+            <a:r>
+              <a:rPr lang="ca-ES" sz="2400" dirty="0" smtClean="0">
+                <a:solidFill>
+                  <a:srgbClr val="FF0000"/>
+                </a:solidFill>
+              </a:rPr>
+              <a:t>!</a:t>
+            </a:r>
+            <a:endParaRPr lang="ca-ES" sz="2400" dirty="0">
+              <a:solidFill>
+                <a:srgbClr val="FF0000"/>
+              </a:solidFill>
+            </a:endParaRPr>
           </a:p>
         </p:txBody>
       </p:sp>
@@ -6177,11 +7090,7 @@
             </a:r>
             <a:r>
               <a:rPr lang="ca-ES" dirty="0" smtClean="0"/>
-              <a:t> </a:t>
-            </a:r>
-            <a:r>
-              <a:rPr lang="ca-ES" dirty="0" smtClean="0"/>
-              <a:t>extensions (</a:t>
+              <a:t> extensions (</a:t>
             </a:r>
             <a:r>
               <a:rPr lang="ca-ES" dirty="0" err="1" smtClean="0"/>
@@ -6237,7 +7146,6 @@
               <a:rPr lang="ca-ES" dirty="0" smtClean="0"/>
               <a:t>(1st TB15)</a:t>
             </a:r>
-            <a:endParaRPr lang="ca-ES" dirty="0" smtClean="0"/>
           </a:p>
         </p:txBody>
       </p:sp>
@@ -6254,7 +7162,7 @@
         <p:spPr/>
         <p:txBody>
           <a:bodyPr>
-            <a:normAutofit lnSpcReduction="10000"/>
+            <a:normAutofit fontScale="85000" lnSpcReduction="10000"/>
           </a:bodyPr>
           <a:lstStyle/>
           <a:p>
@@ -6421,14 +7329,6 @@
               </a:rPr>
               <a:t>)</a:t>
             </a:r>
-            <a:endParaRPr lang="ca-ES" sz="2800" kern="1200" dirty="0" smtClean="0">
-              <a:solidFill>
-                <a:schemeClr val="tx1"/>
-              </a:solidFill>
-              <a:latin typeface="+mn-lt"/>
-              <a:ea typeface="+mn-ea"/>
-              <a:cs typeface="+mn-cs"/>
-            </a:endParaRPr>
           </a:p>
         </p:txBody>
       </p:sp>
@@ -6657,14 +7557,6 @@
               </a:rPr>
               <a:t>)</a:t>
             </a:r>
-            <a:endParaRPr lang="ca-ES" sz="2800" kern="1200" dirty="0" smtClean="0">
-              <a:solidFill>
-                <a:schemeClr val="tx1"/>
-              </a:solidFill>
-              <a:latin typeface="+mn-lt"/>
-              <a:ea typeface="+mn-ea"/>
-              <a:cs typeface="+mn-cs"/>
-            </a:endParaRPr>
           </a:p>
         </p:txBody>
       </p:sp>
@@ -6721,23 +7613,99 @@
             </a:r>
             <a:r>
               <a:rPr lang="ca-ES" dirty="0" smtClean="0"/>
-              <a:t> (</a:t>
+              <a:t> </a:t>
+            </a:r>
+            <a:r>
+              <a:rPr lang="ca-ES" dirty="0" smtClean="0"/>
+              <a:t/>
+            </a:r>
+            <a:br>
+              <a:rPr lang="ca-ES" dirty="0" smtClean="0"/>
+            </a:br>
+            <a:r>
+              <a:rPr lang="ca-ES" dirty="0" smtClean="0"/>
+              <a:t>(</a:t>
             </a:r>
             <a:r>
               <a:rPr lang="ca-ES" dirty="0" err="1" smtClean="0"/>
-              <a:t>involving</a:t>
+              <a:t>SWG</a:t>
             </a:r>
             <a:r>
               <a:rPr lang="ca-ES" dirty="0" smtClean="0"/>
-              <a:t> </a:t>
+              <a:t>)</a:t>
+            </a:r>
+            <a:endParaRPr lang="ca-ES" dirty="0"/>
+          </a:p>
+        </p:txBody>
+      </p:sp>
+      <p:sp>
+        <p:nvSpPr>
+          <p:cNvPr id="11" name="10 Marcador de contenido"/>
+          <p:cNvSpPr>
+            <a:spLocks noGrp="1"/>
+          </p:cNvSpPr>
+          <p:nvPr>
+            <p:ph sz="quarter" idx="17"/>
+          </p:nvPr>
+        </p:nvSpPr>
+        <p:spPr/>
+        <p:txBody>
+          <a:bodyPr/>
+          <a:lstStyle/>
+          <a:p>
+            <a:r>
+              <a:rPr lang="ca-ES" dirty="0" smtClean="0"/>
+              <a:t>Time/</a:t>
             </a:r>
             <a:r>
               <a:rPr lang="ca-ES" dirty="0" err="1" smtClean="0"/>
-              <a:t>collections</a:t>
+              <a:t>elevation</a:t>
             </a:r>
             <a:r>
               <a:rPr lang="ca-ES" dirty="0" smtClean="0"/>
-              <a:t>) </a:t>
+              <a:t/>
+            </a:r>
+            <a:br>
+              <a:rPr lang="ca-ES" dirty="0" smtClean="0"/>
+            </a:br>
+            <a:r>
+              <a:rPr lang="ca-ES" dirty="0" smtClean="0"/>
+              <a:t>(</a:t>
+            </a:r>
+            <a:r>
+              <a:rPr lang="ca-ES" dirty="0" err="1" smtClean="0"/>
+              <a:t>SWG</a:t>
+            </a:r>
+            <a:r>
+              <a:rPr lang="ca-ES" dirty="0" smtClean="0"/>
+              <a:t>)</a:t>
+            </a:r>
+            <a:endParaRPr lang="ca-ES" dirty="0"/>
+          </a:p>
+        </p:txBody>
+      </p:sp>
+      <p:sp>
+        <p:nvSpPr>
+          <p:cNvPr id="12" name="11 Marcador de contenido"/>
+          <p:cNvSpPr>
+            <a:spLocks noGrp="1"/>
+          </p:cNvSpPr>
+          <p:nvPr>
+            <p:ph sz="quarter" idx="18"/>
+          </p:nvPr>
+        </p:nvSpPr>
+        <p:spPr/>
+        <p:txBody>
+          <a:bodyPr/>
+          <a:lstStyle/>
+          <a:p>
+            <a:r>
+              <a:rPr lang="ca-ES" dirty="0" err="1" smtClean="0"/>
+              <a:t>Other</a:t>
+            </a:r>
+            <a:r>
+              <a:rPr lang="ca-ES" dirty="0" smtClean="0"/>
+              <a:t> dimensions</a:t>
             </a:r>
             <a:br>
               <a:rPr lang="ca-ES" dirty="0" smtClean="0"/>

</xml_diff>

<commit_message>
Maps of more than one collection added
</commit_message>
<xml_diff>
--- a/standard/images/diagrams.pptx
+++ b/standard/images/diagrams.pptx
@@ -299,7 +299,7 @@
             <a:fld id="{7A847CFC-816F-41D0-AAC0-9BF4FEBC753E}" type="datetimeFigureOut">
               <a:rPr lang="es-ES" smtClean="0"/>
               <a:pPr/>
-              <a:t>31/07/2019</a:t>
+              <a:t>01/08/2019</a:t>
             </a:fld>
             <a:endParaRPr lang="es-ES"/>
           </a:p>
@@ -391,7 +391,7 @@
             <a:fld id="{7A847CFC-816F-41D0-AAC0-9BF4FEBC753E}" type="datetimeFigureOut">
               <a:rPr lang="es-ES" smtClean="0"/>
               <a:pPr/>
-              <a:t>31/07/2019</a:t>
+              <a:t>01/08/2019</a:t>
             </a:fld>
             <a:endParaRPr lang="es-ES"/>
           </a:p>
@@ -665,7 +665,7 @@
             <a:fld id="{7A847CFC-816F-41D0-AAC0-9BF4FEBC753E}" type="datetimeFigureOut">
               <a:rPr lang="es-ES" smtClean="0"/>
               <a:pPr/>
-              <a:t>31/07/2019</a:t>
+              <a:t>01/08/2019</a:t>
             </a:fld>
             <a:endParaRPr lang="es-ES"/>
           </a:p>
@@ -915,7 +915,7 @@
             <a:fld id="{7A847CFC-816F-41D0-AAC0-9BF4FEBC753E}" type="datetimeFigureOut">
               <a:rPr lang="es-ES" smtClean="0"/>
               <a:pPr/>
-              <a:t>31/07/2019</a:t>
+              <a:t>01/08/2019</a:t>
             </a:fld>
             <a:endParaRPr lang="es-ES"/>
           </a:p>
@@ -1082,7 +1082,7 @@
             <a:fld id="{7A847CFC-816F-41D0-AAC0-9BF4FEBC753E}" type="datetimeFigureOut">
               <a:rPr lang="es-ES" smtClean="0"/>
               <a:pPr/>
-              <a:t>31/07/2019</a:t>
+              <a:t>01/08/2019</a:t>
             </a:fld>
             <a:endParaRPr lang="es-ES"/>
           </a:p>
@@ -1259,7 +1259,7 @@
             <a:fld id="{7A847CFC-816F-41D0-AAC0-9BF4FEBC753E}" type="datetimeFigureOut">
               <a:rPr lang="es-ES" smtClean="0"/>
               <a:pPr/>
-              <a:t>31/07/2019</a:t>
+              <a:t>01/08/2019</a:t>
             </a:fld>
             <a:endParaRPr lang="es-ES"/>
           </a:p>
@@ -1426,7 +1426,7 @@
             <a:fld id="{7A847CFC-816F-41D0-AAC0-9BF4FEBC753E}" type="datetimeFigureOut">
               <a:rPr lang="es-ES" smtClean="0"/>
               <a:pPr/>
-              <a:t>31/07/2019</a:t>
+              <a:t>01/08/2019</a:t>
             </a:fld>
             <a:endParaRPr lang="es-ES"/>
           </a:p>
@@ -1669,7 +1669,7 @@
             <a:fld id="{7A847CFC-816F-41D0-AAC0-9BF4FEBC753E}" type="datetimeFigureOut">
               <a:rPr lang="es-ES" smtClean="0"/>
               <a:pPr/>
-              <a:t>31/07/2019</a:t>
+              <a:t>01/08/2019</a:t>
             </a:fld>
             <a:endParaRPr lang="es-ES"/>
           </a:p>
@@ -1954,7 +1954,7 @@
             <a:fld id="{7A847CFC-816F-41D0-AAC0-9BF4FEBC753E}" type="datetimeFigureOut">
               <a:rPr lang="es-ES" smtClean="0"/>
               <a:pPr/>
-              <a:t>31/07/2019</a:t>
+              <a:t>01/08/2019</a:t>
             </a:fld>
             <a:endParaRPr lang="es-ES"/>
           </a:p>
@@ -2244,7 +2244,7 @@
             <a:fld id="{7A847CFC-816F-41D0-AAC0-9BF4FEBC753E}" type="datetimeFigureOut">
               <a:rPr lang="es-ES" smtClean="0"/>
               <a:pPr/>
-              <a:t>31/07/2019</a:t>
+              <a:t>01/08/2019</a:t>
             </a:fld>
             <a:endParaRPr lang="es-ES"/>
           </a:p>
@@ -2648,7 +2648,7 @@
             <a:fld id="{7A847CFC-816F-41D0-AAC0-9BF4FEBC753E}" type="datetimeFigureOut">
               <a:rPr lang="es-ES" smtClean="0"/>
               <a:pPr/>
-              <a:t>31/07/2019</a:t>
+              <a:t>01/08/2019</a:t>
             </a:fld>
             <a:endParaRPr lang="es-ES"/>
           </a:p>
@@ -3238,7 +3238,7 @@
             <a:fld id="{7A847CFC-816F-41D0-AAC0-9BF4FEBC753E}" type="datetimeFigureOut">
               <a:rPr lang="es-ES" smtClean="0"/>
               <a:pPr/>
-              <a:t>31/07/2019</a:t>
+              <a:t>01/08/2019</a:t>
             </a:fld>
             <a:endParaRPr lang="es-ES"/>
           </a:p>
@@ -4107,7 +4107,7 @@
             <a:fld id="{7A847CFC-816F-41D0-AAC0-9BF4FEBC753E}" type="datetimeFigureOut">
               <a:rPr lang="es-ES" smtClean="0"/>
               <a:pPr/>
-              <a:t>31/07/2019</a:t>
+              <a:t>01/08/2019</a:t>
             </a:fld>
             <a:endParaRPr lang="es-ES"/>
           </a:p>
@@ -4222,7 +4222,7 @@
             <a:fld id="{7A847CFC-816F-41D0-AAC0-9BF4FEBC753E}" type="datetimeFigureOut">
               <a:rPr lang="es-ES" smtClean="0"/>
               <a:pPr/>
-              <a:t>31/07/2019</a:t>
+              <a:t>01/08/2019</a:t>
             </a:fld>
             <a:endParaRPr lang="es-ES"/>
           </a:p>
@@ -4432,7 +4432,7 @@
             <a:fld id="{7A847CFC-816F-41D0-AAC0-9BF4FEBC753E}" type="datetimeFigureOut">
               <a:rPr lang="es-ES" smtClean="0"/>
               <a:pPr/>
-              <a:t>31/07/2019</a:t>
+              <a:t>01/08/2019</a:t>
             </a:fld>
             <a:endParaRPr lang="es-ES"/>
           </a:p>
@@ -7202,10 +7202,15 @@
             <p:ph sz="half" idx="2"/>
           </p:nvPr>
         </p:nvSpPr>
-        <p:spPr/>
+        <p:spPr>
+          <a:xfrm>
+            <a:off x="4644008" y="1052737"/>
+            <a:ext cx="4499992" cy="1224135"/>
+          </a:xfrm>
+        </p:spPr>
         <p:txBody>
           <a:bodyPr>
-            <a:normAutofit fontScale="85000" lnSpcReduction="10000"/>
+            <a:noAutofit/>
           </a:bodyPr>
           <a:lstStyle/>
           <a:p>
@@ -7244,30 +7249,30 @@
           <a:p>
             <a:pPr lvl="1"/>
             <a:r>
-              <a:rPr lang="ca-ES" dirty="0" err="1" smtClean="0"/>
+              <a:rPr lang="ca-ES" sz="2000" dirty="0" err="1" smtClean="0"/>
               <a:t>Adds</a:t>
             </a:r>
             <a:r>
-              <a:rPr lang="ca-ES" dirty="0" smtClean="0"/>
+              <a:rPr lang="ca-ES" sz="2000" dirty="0" smtClean="0"/>
               <a:t>: </a:t>
             </a:r>
             <a:r>
-              <a:rPr lang="en-US" dirty="0" smtClean="0"/>
+              <a:rPr lang="en-US" sz="2000" dirty="0" smtClean="0"/>
               <a:t>width, height, </a:t>
             </a:r>
             <a:r>
-              <a:rPr lang="en-US" dirty="0" err="1" smtClean="0"/>
+              <a:rPr lang="en-US" sz="2000" dirty="0" err="1" smtClean="0"/>
               <a:t>bbox</a:t>
             </a:r>
             <a:r>
-              <a:rPr lang="en-US" dirty="0" smtClean="0"/>
+              <a:rPr lang="en-US" sz="2000" dirty="0" smtClean="0"/>
               <a:t>, </a:t>
             </a:r>
             <a:r>
-              <a:rPr lang="en-US" dirty="0" err="1" smtClean="0"/>
+              <a:rPr lang="en-US" sz="2000" dirty="0" err="1" smtClean="0"/>
               <a:t>crs</a:t>
             </a:r>
-            <a:endParaRPr lang="ca-ES" dirty="0" smtClean="0"/>
+            <a:endParaRPr lang="ca-ES" sz="2000" dirty="0" smtClean="0"/>
           </a:p>
         </p:txBody>
       </p:sp>
@@ -7762,6 +7767,57 @@
               <a:t>)</a:t>
             </a:r>
             <a:endParaRPr lang="ca-ES" dirty="0"/>
+          </a:p>
+        </p:txBody>
+      </p:sp>
+      <p:sp>
+        <p:nvSpPr>
+          <p:cNvPr id="13" name="12 CuadroTexto"/>
+          <p:cNvSpPr txBox="1"/>
+          <p:nvPr/>
+        </p:nvSpPr>
+        <p:spPr>
+          <a:xfrm rot="19840231">
+            <a:off x="7081370" y="2992756"/>
+            <a:ext cx="998564" cy="510778"/>
+          </a:xfrm>
+          <a:prstGeom prst="roundRect">
+            <a:avLst/>
+          </a:prstGeom>
+          <a:noFill/>
+          <a:ln>
+            <a:solidFill>
+              <a:srgbClr val="FF0000"/>
+            </a:solidFill>
+          </a:ln>
+        </p:spPr>
+        <p:txBody>
+          <a:bodyPr wrap="none" rtlCol="0">
+            <a:spAutoFit/>
+          </a:bodyPr>
+          <a:lstStyle/>
+          <a:p>
+            <a:r>
+              <a:rPr lang="ca-ES" sz="2400" dirty="0" err="1" smtClean="0">
+                <a:solidFill>
+                  <a:srgbClr val="FF0000"/>
+                </a:solidFill>
+              </a:rPr>
+              <a:t>Done</a:t>
+            </a:r>
+            <a:r>
+              <a:rPr lang="ca-ES" sz="2400" dirty="0" smtClean="0">
+                <a:solidFill>
+                  <a:srgbClr val="FF0000"/>
+                </a:solidFill>
+              </a:rPr>
+              <a:t>!</a:t>
+            </a:r>
+            <a:endParaRPr lang="ca-ES" sz="2400" dirty="0">
+              <a:solidFill>
+                <a:srgbClr val="FF0000"/>
+              </a:solidFill>
+            </a:endParaRPr>
           </a:p>
         </p:txBody>
       </p:sp>

</xml_diff>

<commit_message>
Map styles extension started
</commit_message>
<xml_diff>
--- a/standard/images/diagrams.pptx
+++ b/standard/images/diagrams.pptx
@@ -4814,7 +4814,7 @@
         </p:nvSpPr>
         <p:spPr>
           <a:xfrm>
-            <a:off x="4283968" y="332656"/>
+            <a:off x="6012160" y="665312"/>
             <a:ext cx="1440160" cy="646331"/>
           </a:xfrm>
           <a:prstGeom prst="rect">
@@ -4850,7 +4850,7 @@
         </p:nvSpPr>
         <p:spPr>
           <a:xfrm>
-            <a:off x="1115616" y="1484784"/>
+            <a:off x="7452320" y="1745432"/>
             <a:ext cx="1512168" cy="646331"/>
           </a:xfrm>
           <a:prstGeom prst="rect">
@@ -4895,8 +4895,8 @@
         </p:nvSpPr>
         <p:spPr>
           <a:xfrm>
-            <a:off x="1835696" y="5013176"/>
-            <a:ext cx="1800200" cy="646331"/>
+            <a:off x="6516216" y="5157192"/>
+            <a:ext cx="1800200" cy="369332"/>
           </a:xfrm>
           <a:prstGeom prst="rect">
             <a:avLst/>
@@ -4917,14 +4917,11 @@
             <a:pPr algn="ctr"/>
             <a:r>
               <a:rPr lang="en-US" dirty="0" smtClean="0"/>
-              <a:t>Domains</a:t>
-            </a:r>
-          </a:p>
-          <a:p>
-            <a:pPr algn="ctr"/>
+              <a:t>Map </a:t>
+            </a:r>
             <a:r>
               <a:rPr lang="en-US" dirty="0" smtClean="0"/>
-              <a:t>Maps and Tiles</a:t>
+              <a:t>and Tiles</a:t>
             </a:r>
           </a:p>
         </p:txBody>
@@ -4937,8 +4934,8 @@
         </p:nvSpPr>
         <p:spPr>
           <a:xfrm>
-            <a:off x="4572000" y="5517232"/>
-            <a:ext cx="1440160" cy="646331"/>
+            <a:off x="4211960" y="6165304"/>
+            <a:ext cx="1440160" cy="369332"/>
           </a:xfrm>
           <a:prstGeom prst="rect">
             <a:avLst/>
@@ -4958,17 +4955,10 @@
           <a:p>
             <a:pPr algn="ctr"/>
             <a:r>
-              <a:rPr lang="en-US" smtClean="0"/>
-              <a:t>Domains</a:t>
-            </a:r>
-          </a:p>
-          <a:p>
-            <a:pPr algn="ctr"/>
-            <a:r>
-              <a:rPr lang="en-US" smtClean="0"/>
+              <a:rPr lang="en-US" dirty="0" smtClean="0"/>
               <a:t>Common</a:t>
             </a:r>
-            <a:endParaRPr lang="en-US"/>
+            <a:endParaRPr lang="en-US" dirty="0"/>
           </a:p>
         </p:txBody>
       </p:sp>
@@ -4980,8 +4970,8 @@
         </p:nvSpPr>
         <p:spPr>
           <a:xfrm>
-            <a:off x="3779912" y="3356992"/>
-            <a:ext cx="1440160" cy="646331"/>
+            <a:off x="5508104" y="3617640"/>
+            <a:ext cx="1440160" cy="369332"/>
           </a:xfrm>
           <a:prstGeom prst="rect">
             <a:avLst/>
@@ -5001,16 +4991,10 @@
           <a:p>
             <a:pPr algn="ctr"/>
             <a:r>
-              <a:rPr lang="en-US" smtClean="0"/>
-              <a:t>Domains</a:t>
-            </a:r>
-          </a:p>
-          <a:p>
-            <a:pPr algn="ctr"/>
-            <a:r>
-              <a:rPr lang="en-US" smtClean="0"/>
+              <a:rPr lang="en-US" dirty="0" smtClean="0"/>
               <a:t>Tiles</a:t>
             </a:r>
+            <a:endParaRPr lang="en-US" dirty="0" smtClean="0"/>
           </a:p>
         </p:txBody>
       </p:sp>
@@ -5022,8 +5006,8 @@
         </p:nvSpPr>
         <p:spPr>
           <a:xfrm>
-            <a:off x="2051720" y="3356992"/>
-            <a:ext cx="1440160" cy="646331"/>
+            <a:off x="7524328" y="3545632"/>
+            <a:ext cx="1440160" cy="369332"/>
           </a:xfrm>
           <a:prstGeom prst="rect">
             <a:avLst/>
@@ -5043,16 +5027,10 @@
           <a:p>
             <a:pPr algn="ctr"/>
             <a:r>
-              <a:rPr lang="en-US" smtClean="0"/>
-              <a:t>Domains</a:t>
-            </a:r>
-          </a:p>
-          <a:p>
-            <a:pPr algn="ctr"/>
-            <a:r>
-              <a:rPr lang="en-US" smtClean="0"/>
-              <a:t>Maps</a:t>
-            </a:r>
+              <a:rPr lang="en-US" dirty="0" smtClean="0"/>
+              <a:t>Map</a:t>
+            </a:r>
+            <a:endParaRPr lang="en-US" dirty="0" smtClean="0"/>
           </a:p>
         </p:txBody>
       </p:sp>
@@ -5066,15 +5044,15 @@
           <p:nvPr/>
         </p:nvCxnSpPr>
         <p:spPr>
-          <a:xfrm flipH="1">
-            <a:off x="2735796" y="4003323"/>
-            <a:ext cx="1764196" cy="1009853"/>
+          <a:xfrm>
+            <a:off x="6228184" y="3986972"/>
+            <a:ext cx="1188132" cy="1170220"/>
           </a:xfrm>
           <a:prstGeom prst="straightConnector1">
             <a:avLst/>
           </a:prstGeom>
           <a:ln w="28575">
-            <a:prstDash val="lgDash"/>
+            <a:prstDash val="solid"/>
             <a:tailEnd type="arrow"/>
           </a:ln>
         </p:spPr>
@@ -5104,14 +5082,14 @@
         </p:nvCxnSpPr>
         <p:spPr>
           <a:xfrm flipH="1">
-            <a:off x="2735796" y="4003323"/>
-            <a:ext cx="36004" cy="1009853"/>
+            <a:off x="7416316" y="3914964"/>
+            <a:ext cx="828092" cy="1242228"/>
           </a:xfrm>
           <a:prstGeom prst="straightConnector1">
             <a:avLst/>
           </a:prstGeom>
           <a:ln w="28575">
-            <a:prstDash val="lgDash"/>
+            <a:prstDash val="solid"/>
             <a:tailEnd type="arrow"/>
           </a:ln>
         </p:spPr>
@@ -5140,14 +5118,15 @@
           <p:nvPr/>
         </p:nvCxnSpPr>
         <p:spPr>
-          <a:xfrm>
-            <a:off x="4499992" y="4003323"/>
-            <a:ext cx="792088" cy="1513909"/>
+          <a:xfrm flipH="1">
+            <a:off x="4932040" y="3986972"/>
+            <a:ext cx="1296144" cy="2178332"/>
           </a:xfrm>
           <a:prstGeom prst="straightConnector1">
             <a:avLst/>
           </a:prstGeom>
-          <a:ln w="28575">
+          <a:ln w="12700">
+            <a:prstDash val="dash"/>
             <a:tailEnd type="arrow"/>
           </a:ln>
         </p:spPr>
@@ -5176,14 +5155,15 @@
           <p:nvPr/>
         </p:nvCxnSpPr>
         <p:spPr>
-          <a:xfrm>
-            <a:off x="2771800" y="4003323"/>
-            <a:ext cx="2520280" cy="1513909"/>
+          <a:xfrm flipH="1">
+            <a:off x="4932040" y="3914964"/>
+            <a:ext cx="3312368" cy="2250340"/>
           </a:xfrm>
           <a:prstGeom prst="straightConnector1">
             <a:avLst/>
           </a:prstGeom>
-          <a:ln w="28575">
+          <a:ln w="12700">
+            <a:prstDash val="dash"/>
             <a:tailEnd type="arrow"/>
           </a:ln>
         </p:spPr>
@@ -5213,8 +5193,8 @@
         </p:nvCxnSpPr>
         <p:spPr>
           <a:xfrm>
-            <a:off x="1871700" y="2131115"/>
-            <a:ext cx="900100" cy="1225877"/>
+            <a:off x="8208404" y="2391763"/>
+            <a:ext cx="36004" cy="1153869"/>
           </a:xfrm>
           <a:prstGeom prst="straightConnector1">
             <a:avLst/>
@@ -5248,9 +5228,9 @@
           <p:nvPr/>
         </p:nvCxnSpPr>
         <p:spPr>
-          <a:xfrm flipH="1">
-            <a:off x="2771800" y="2131115"/>
-            <a:ext cx="1008112" cy="1225877"/>
+          <a:xfrm>
+            <a:off x="6228184" y="2391763"/>
+            <a:ext cx="2016224" cy="1153869"/>
           </a:xfrm>
           <a:prstGeom prst="straightConnector1">
             <a:avLst/>
@@ -5285,8 +5265,8 @@
         </p:nvCxnSpPr>
         <p:spPr>
           <a:xfrm>
-            <a:off x="3779912" y="2131115"/>
-            <a:ext cx="720080" cy="1225877"/>
+            <a:off x="6228184" y="2391763"/>
+            <a:ext cx="0" cy="1225877"/>
           </a:xfrm>
           <a:prstGeom prst="straightConnector1">
             <a:avLst/>
@@ -5320,9 +5300,9 @@
           <p:nvPr/>
         </p:nvCxnSpPr>
         <p:spPr>
-          <a:xfrm flipH="1">
-            <a:off x="4499992" y="2131115"/>
-            <a:ext cx="1224136" cy="1225877"/>
+          <a:xfrm>
+            <a:off x="3491880" y="2391763"/>
+            <a:ext cx="2736304" cy="1225877"/>
           </a:xfrm>
           <a:prstGeom prst="straightConnector1">
             <a:avLst/>
@@ -5356,9 +5336,9 @@
           <p:nvPr/>
         </p:nvCxnSpPr>
         <p:spPr>
-          <a:xfrm flipH="1">
-            <a:off x="2771800" y="978987"/>
-            <a:ext cx="2232248" cy="2378005"/>
+          <a:xfrm>
+            <a:off x="6732240" y="1311643"/>
+            <a:ext cx="1512168" cy="2233989"/>
           </a:xfrm>
           <a:prstGeom prst="straightConnector1">
             <a:avLst/>
@@ -5394,8 +5374,8 @@
         </p:nvCxnSpPr>
         <p:spPr>
           <a:xfrm flipH="1">
-            <a:off x="4499992" y="978987"/>
-            <a:ext cx="504056" cy="2378005"/>
+            <a:off x="6228184" y="1311643"/>
+            <a:ext cx="504056" cy="2305997"/>
           </a:xfrm>
           <a:prstGeom prst="straightConnector1">
             <a:avLst/>
@@ -5428,8 +5408,8 @@
         </p:nvSpPr>
         <p:spPr>
           <a:xfrm rot="16200000">
-            <a:off x="46723" y="1257533"/>
-            <a:ext cx="1066959" cy="369332"/>
+            <a:off x="-350439" y="1590189"/>
+            <a:ext cx="1429237" cy="369332"/>
           </a:xfrm>
           <a:prstGeom prst="rect">
             <a:avLst/>
@@ -5443,10 +5423,10 @@
           <a:lstStyle/>
           <a:p>
             <a:r>
-              <a:rPr lang="en-US" smtClean="0"/>
-              <a:t>Examples</a:t>
-            </a:r>
-            <a:endParaRPr lang="en-US"/>
+              <a:rPr lang="en-US" dirty="0" smtClean="0"/>
+              <a:t>API Examples</a:t>
+            </a:r>
+            <a:endParaRPr lang="en-US" dirty="0"/>
           </a:p>
         </p:txBody>
       </p:sp>
@@ -5458,8 +5438,8 @@
         </p:nvSpPr>
         <p:spPr>
           <a:xfrm rot="16200000">
-            <a:off x="75898" y="3561790"/>
-            <a:ext cx="1008609" cy="369332"/>
+            <a:off x="-321264" y="3793262"/>
+            <a:ext cx="1370888" cy="369332"/>
           </a:xfrm>
           <a:prstGeom prst="rect">
             <a:avLst/>
@@ -5473,10 +5453,10 @@
           <a:lstStyle/>
           <a:p>
             <a:r>
-              <a:rPr lang="en-US" smtClean="0"/>
-              <a:t>Domains</a:t>
-            </a:r>
-            <a:endParaRPr lang="en-US"/>
+              <a:rPr lang="en-US" dirty="0" smtClean="0"/>
+              <a:t>API Domains</a:t>
+            </a:r>
+            <a:endParaRPr lang="en-US" dirty="0"/>
           </a:p>
         </p:txBody>
       </p:sp>
@@ -5488,8 +5468,8 @@
         </p:nvSpPr>
         <p:spPr>
           <a:xfrm>
-            <a:off x="7236296" y="3356992"/>
-            <a:ext cx="1440160" cy="646331"/>
+            <a:off x="755576" y="3645024"/>
+            <a:ext cx="1440160" cy="369332"/>
           </a:xfrm>
           <a:prstGeom prst="rect">
             <a:avLst/>
@@ -5510,15 +5490,9 @@
             <a:pPr algn="ctr"/>
             <a:r>
               <a:rPr lang="en-US" dirty="0" smtClean="0"/>
-              <a:t>Domains</a:t>
-            </a:r>
-          </a:p>
-          <a:p>
-            <a:pPr algn="ctr"/>
-            <a:r>
-              <a:rPr lang="en-US" dirty="0" smtClean="0"/>
               <a:t>Coverages</a:t>
             </a:r>
+            <a:endParaRPr lang="en-US" dirty="0" smtClean="0"/>
           </a:p>
         </p:txBody>
       </p:sp>
@@ -5530,8 +5504,8 @@
         </p:nvSpPr>
         <p:spPr>
           <a:xfrm>
-            <a:off x="5508104" y="3356992"/>
-            <a:ext cx="1440160" cy="646331"/>
+            <a:off x="2771800" y="3617640"/>
+            <a:ext cx="1440160" cy="369332"/>
           </a:xfrm>
           <a:prstGeom prst="rect">
             <a:avLst/>
@@ -5552,15 +5526,9 @@
             <a:pPr algn="ctr"/>
             <a:r>
               <a:rPr lang="en-US" dirty="0" smtClean="0"/>
-              <a:t>Domains</a:t>
-            </a:r>
-          </a:p>
-          <a:p>
-            <a:pPr algn="ctr"/>
-            <a:r>
-              <a:rPr lang="en-US" dirty="0" smtClean="0"/>
               <a:t>Features</a:t>
             </a:r>
+            <a:endParaRPr lang="en-US" dirty="0" smtClean="0"/>
           </a:p>
         </p:txBody>
       </p:sp>
@@ -5574,14 +5542,15 @@
           <p:nvPr/>
         </p:nvCxnSpPr>
         <p:spPr>
-          <a:xfrm flipH="1">
-            <a:off x="5292080" y="4003323"/>
-            <a:ext cx="2664296" cy="1513909"/>
+          <a:xfrm>
+            <a:off x="1475656" y="4014356"/>
+            <a:ext cx="3456384" cy="2150948"/>
           </a:xfrm>
           <a:prstGeom prst="straightConnector1">
             <a:avLst/>
           </a:prstGeom>
-          <a:ln w="28575">
+          <a:ln w="12700">
+            <a:prstDash val="dash"/>
             <a:tailEnd type="arrow"/>
           </a:ln>
         </p:spPr>
@@ -5610,14 +5579,15 @@
           <p:nvPr/>
         </p:nvCxnSpPr>
         <p:spPr>
-          <a:xfrm flipH="1">
-            <a:off x="5292080" y="4003323"/>
-            <a:ext cx="936104" cy="1513909"/>
+          <a:xfrm>
+            <a:off x="3491880" y="3986972"/>
+            <a:ext cx="1440160" cy="2178332"/>
           </a:xfrm>
           <a:prstGeom prst="straightConnector1">
             <a:avLst/>
           </a:prstGeom>
-          <a:ln w="28575">
+          <a:ln w="12700">
+            <a:prstDash val="dash"/>
             <a:tailEnd type="arrow"/>
           </a:ln>
         </p:spPr>
@@ -5646,9 +5616,9 @@
           <p:nvPr/>
         </p:nvCxnSpPr>
         <p:spPr>
-          <a:xfrm>
-            <a:off x="5004048" y="978987"/>
-            <a:ext cx="2952328" cy="2378005"/>
+          <a:xfrm flipH="1">
+            <a:off x="1475656" y="1311643"/>
+            <a:ext cx="5256584" cy="2333381"/>
           </a:xfrm>
           <a:prstGeom prst="straightConnector1">
             <a:avLst/>
@@ -5683,9 +5653,9 @@
           <p:nvPr/>
         </p:nvCxnSpPr>
         <p:spPr>
-          <a:xfrm>
-            <a:off x="5004048" y="978987"/>
-            <a:ext cx="1224136" cy="2378005"/>
+          <a:xfrm flipH="1">
+            <a:off x="3491880" y="1311643"/>
+            <a:ext cx="3240360" cy="2305997"/>
           </a:xfrm>
           <a:prstGeom prst="straightConnector1">
             <a:avLst/>
@@ -5718,7 +5688,7 @@
         </p:nvSpPr>
         <p:spPr>
           <a:xfrm>
-            <a:off x="4932040" y="1484784"/>
+            <a:off x="2699792" y="1745432"/>
             <a:ext cx="1584176" cy="646331"/>
           </a:xfrm>
           <a:prstGeom prst="rect">
@@ -5763,7 +5733,7 @@
         </p:nvSpPr>
         <p:spPr>
           <a:xfrm>
-            <a:off x="2987824" y="1484784"/>
+            <a:off x="5436096" y="1745432"/>
             <a:ext cx="1584176" cy="646331"/>
           </a:xfrm>
           <a:prstGeom prst="rect">
@@ -5808,7 +5778,7 @@
         </p:nvSpPr>
         <p:spPr>
           <a:xfrm>
-            <a:off x="6876256" y="1484784"/>
+            <a:off x="611560" y="1745432"/>
             <a:ext cx="1728192" cy="646331"/>
           </a:xfrm>
           <a:prstGeom prst="rect">
@@ -5856,8 +5826,8 @@
         </p:nvCxnSpPr>
         <p:spPr>
           <a:xfrm>
-            <a:off x="5724128" y="2131115"/>
-            <a:ext cx="504056" cy="1225877"/>
+            <a:off x="3491880" y="2391763"/>
+            <a:ext cx="0" cy="1225877"/>
           </a:xfrm>
           <a:prstGeom prst="straightConnector1">
             <a:avLst/>
@@ -5892,8 +5862,8 @@
         </p:nvCxnSpPr>
         <p:spPr>
           <a:xfrm>
-            <a:off x="7740352" y="2131115"/>
-            <a:ext cx="216024" cy="1225877"/>
+            <a:off x="1475656" y="2391763"/>
+            <a:ext cx="0" cy="1253261"/>
           </a:xfrm>
           <a:prstGeom prst="straightConnector1">
             <a:avLst/>
@@ -5927,15 +5897,399 @@
           <p:nvPr/>
         </p:nvCxnSpPr>
         <p:spPr>
-          <a:xfrm flipH="1">
-            <a:off x="4499992" y="2131115"/>
-            <a:ext cx="3240360" cy="1225877"/>
+          <a:xfrm>
+            <a:off x="1475656" y="2391763"/>
+            <a:ext cx="4752528" cy="1225877"/>
           </a:xfrm>
           <a:prstGeom prst="straightConnector1">
             <a:avLst/>
           </a:prstGeom>
           <a:ln w="28575">
             <a:tailEnd type="arrow"/>
+          </a:ln>
+        </p:spPr>
+        <p:style>
+          <a:lnRef idx="1">
+            <a:schemeClr val="accent1"/>
+          </a:lnRef>
+          <a:fillRef idx="0">
+            <a:schemeClr val="accent1"/>
+          </a:fillRef>
+          <a:effectRef idx="0">
+            <a:schemeClr val="accent1"/>
+          </a:effectRef>
+          <a:fontRef idx="minor">
+            <a:schemeClr val="tx1"/>
+          </a:fontRef>
+        </p:style>
+      </p:cxnSp>
+      <p:sp>
+        <p:nvSpPr>
+          <p:cNvPr id="92" name="91 CuadroTexto"/>
+          <p:cNvSpPr txBox="1"/>
+          <p:nvPr/>
+        </p:nvSpPr>
+        <p:spPr>
+          <a:xfrm>
+            <a:off x="4283968" y="5157192"/>
+            <a:ext cx="1224136" cy="369332"/>
+          </a:xfrm>
+          <a:prstGeom prst="rect">
+            <a:avLst/>
+          </a:prstGeom>
+          <a:noFill/>
+          <a:ln>
+            <a:solidFill>
+              <a:schemeClr val="tx1"/>
+            </a:solidFill>
+          </a:ln>
+        </p:spPr>
+        <p:txBody>
+          <a:bodyPr wrap="square" rtlCol="0">
+            <a:spAutoFit/>
+          </a:bodyPr>
+          <a:lstStyle/>
+          <a:p>
+            <a:pPr algn="ctr"/>
+            <a:r>
+              <a:rPr lang="en-US" dirty="0" smtClean="0"/>
+              <a:t>Map Styles</a:t>
+            </a:r>
+            <a:endParaRPr lang="en-US" dirty="0" smtClean="0"/>
+          </a:p>
+        </p:txBody>
+      </p:sp>
+      <p:cxnSp>
+        <p:nvCxnSpPr>
+          <p:cNvPr id="93" name="92 Conector recto de flecha"/>
+          <p:cNvCxnSpPr>
+            <a:stCxn id="9" idx="2"/>
+            <a:endCxn id="92" idx="0"/>
+          </p:cNvCxnSpPr>
+          <p:nvPr/>
+        </p:nvCxnSpPr>
+        <p:spPr>
+          <a:xfrm flipH="1">
+            <a:off x="4896036" y="3914964"/>
+            <a:ext cx="3348372" cy="1242228"/>
+          </a:xfrm>
+          <a:prstGeom prst="straightConnector1">
+            <a:avLst/>
+          </a:prstGeom>
+          <a:ln w="28575">
+            <a:prstDash val="solid"/>
+            <a:tailEnd type="arrow"/>
+          </a:ln>
+        </p:spPr>
+        <p:style>
+          <a:lnRef idx="1">
+            <a:schemeClr val="accent1"/>
+          </a:lnRef>
+          <a:fillRef idx="0">
+            <a:schemeClr val="accent1"/>
+          </a:fillRef>
+          <a:effectRef idx="0">
+            <a:schemeClr val="accent1"/>
+          </a:effectRef>
+          <a:fontRef idx="minor">
+            <a:schemeClr val="tx1"/>
+          </a:fontRef>
+        </p:style>
+      </p:cxnSp>
+      <p:cxnSp>
+        <p:nvCxnSpPr>
+          <p:cNvPr id="97" name="96 Conector recto de flecha"/>
+          <p:cNvCxnSpPr>
+            <a:stCxn id="24" idx="2"/>
+            <a:endCxn id="92" idx="0"/>
+          </p:cNvCxnSpPr>
+          <p:nvPr/>
+        </p:nvCxnSpPr>
+        <p:spPr>
+          <a:xfrm>
+            <a:off x="3491880" y="3986972"/>
+            <a:ext cx="1404156" cy="1170220"/>
+          </a:xfrm>
+          <a:prstGeom prst="straightConnector1">
+            <a:avLst/>
+          </a:prstGeom>
+          <a:ln w="28575">
+            <a:prstDash val="solid"/>
+            <a:tailEnd type="arrow"/>
+          </a:ln>
+        </p:spPr>
+        <p:style>
+          <a:lnRef idx="1">
+            <a:schemeClr val="accent1"/>
+          </a:lnRef>
+          <a:fillRef idx="0">
+            <a:schemeClr val="accent1"/>
+          </a:fillRef>
+          <a:effectRef idx="0">
+            <a:schemeClr val="accent1"/>
+          </a:effectRef>
+          <a:fontRef idx="minor">
+            <a:schemeClr val="tx1"/>
+          </a:fontRef>
+        </p:style>
+      </p:cxnSp>
+      <p:cxnSp>
+        <p:nvCxnSpPr>
+          <p:cNvPr id="119" name="118 Conector recto de flecha"/>
+          <p:cNvCxnSpPr>
+            <a:stCxn id="92" idx="2"/>
+            <a:endCxn id="7" idx="0"/>
+          </p:cNvCxnSpPr>
+          <p:nvPr/>
+        </p:nvCxnSpPr>
+        <p:spPr>
+          <a:xfrm>
+            <a:off x="4896036" y="5526524"/>
+            <a:ext cx="36004" cy="638780"/>
+          </a:xfrm>
+          <a:prstGeom prst="straightConnector1">
+            <a:avLst/>
+          </a:prstGeom>
+          <a:ln w="12700">
+            <a:prstDash val="dash"/>
+            <a:tailEnd type="arrow"/>
+          </a:ln>
+        </p:spPr>
+        <p:style>
+          <a:lnRef idx="1">
+            <a:schemeClr val="accent1"/>
+          </a:lnRef>
+          <a:fillRef idx="0">
+            <a:schemeClr val="accent1"/>
+          </a:fillRef>
+          <a:effectRef idx="0">
+            <a:schemeClr val="accent1"/>
+          </a:effectRef>
+          <a:fontRef idx="minor">
+            <a:schemeClr val="tx1"/>
+          </a:fontRef>
+        </p:style>
+      </p:cxnSp>
+      <p:sp>
+        <p:nvSpPr>
+          <p:cNvPr id="151" name="150 CuadroTexto"/>
+          <p:cNvSpPr txBox="1"/>
+          <p:nvPr/>
+        </p:nvSpPr>
+        <p:spPr>
+          <a:xfrm>
+            <a:off x="3851920" y="179348"/>
+            <a:ext cx="2403991" cy="369332"/>
+          </a:xfrm>
+          <a:prstGeom prst="rect">
+            <a:avLst/>
+          </a:prstGeom>
+          <a:noFill/>
+        </p:spPr>
+        <p:txBody>
+          <a:bodyPr wrap="none" rtlCol="0">
+            <a:spAutoFit/>
+          </a:bodyPr>
+          <a:lstStyle/>
+          <a:p>
+            <a:r>
+              <a:rPr lang="ca-ES" dirty="0" err="1" smtClean="0"/>
+              <a:t>Scope</a:t>
+            </a:r>
+            <a:r>
+              <a:rPr lang="ca-ES" dirty="0" smtClean="0"/>
+              <a:t> of </a:t>
+            </a:r>
+            <a:r>
+              <a:rPr lang="ca-ES" dirty="0" err="1" smtClean="0"/>
+              <a:t>the</a:t>
+            </a:r>
+            <a:r>
+              <a:rPr lang="ca-ES" dirty="0" smtClean="0"/>
+              <a:t> TB15 </a:t>
+            </a:r>
+            <a:r>
+              <a:rPr lang="ca-ES" dirty="0" err="1" smtClean="0"/>
+              <a:t>work</a:t>
+            </a:r>
+            <a:endParaRPr lang="ca-ES" dirty="0"/>
+          </a:p>
+        </p:txBody>
+      </p:sp>
+      <p:sp>
+        <p:nvSpPr>
+          <p:cNvPr id="155" name="154 CuadroTexto"/>
+          <p:cNvSpPr txBox="1"/>
+          <p:nvPr/>
+        </p:nvSpPr>
+        <p:spPr>
+          <a:xfrm>
+            <a:off x="1473764" y="188640"/>
+            <a:ext cx="2090124" cy="369332"/>
+          </a:xfrm>
+          <a:prstGeom prst="rect">
+            <a:avLst/>
+          </a:prstGeom>
+          <a:noFill/>
+        </p:spPr>
+        <p:txBody>
+          <a:bodyPr wrap="none" rtlCol="0">
+            <a:spAutoFit/>
+          </a:bodyPr>
+          <a:lstStyle/>
+          <a:p>
+            <a:r>
+              <a:rPr lang="ca-ES" dirty="0" err="1" smtClean="0"/>
+              <a:t>Other</a:t>
+            </a:r>
+            <a:r>
+              <a:rPr lang="ca-ES" dirty="0" smtClean="0"/>
+              <a:t> OGC API </a:t>
+            </a:r>
+            <a:r>
+              <a:rPr lang="ca-ES" dirty="0" err="1" smtClean="0"/>
+              <a:t>work</a:t>
+            </a:r>
+            <a:endParaRPr lang="ca-ES" dirty="0"/>
+          </a:p>
+        </p:txBody>
+      </p:sp>
+      <p:sp>
+        <p:nvSpPr>
+          <p:cNvPr id="158" name="157 CuadroTexto"/>
+          <p:cNvSpPr txBox="1"/>
+          <p:nvPr/>
+        </p:nvSpPr>
+        <p:spPr>
+          <a:xfrm>
+            <a:off x="4427984" y="1745432"/>
+            <a:ext cx="864096" cy="646331"/>
+          </a:xfrm>
+          <a:prstGeom prst="rect">
+            <a:avLst/>
+          </a:prstGeom>
+          <a:solidFill>
+            <a:schemeClr val="bg1"/>
+          </a:solidFill>
+          <a:ln>
+            <a:solidFill>
+              <a:schemeClr val="tx1"/>
+            </a:solidFill>
+          </a:ln>
+        </p:spPr>
+        <p:txBody>
+          <a:bodyPr wrap="square" rtlCol="0">
+            <a:spAutoFit/>
+          </a:bodyPr>
+          <a:lstStyle/>
+          <a:p>
+            <a:pPr algn="ctr"/>
+            <a:r>
+              <a:rPr lang="en-US" dirty="0" smtClean="0"/>
+              <a:t>Styles API</a:t>
+            </a:r>
+            <a:endParaRPr lang="en-US" dirty="0"/>
+          </a:p>
+        </p:txBody>
+      </p:sp>
+      <p:cxnSp>
+        <p:nvCxnSpPr>
+          <p:cNvPr id="159" name="158 Conector recto de flecha"/>
+          <p:cNvCxnSpPr>
+            <a:stCxn id="158" idx="2"/>
+            <a:endCxn id="92" idx="0"/>
+          </p:cNvCxnSpPr>
+          <p:nvPr/>
+        </p:nvCxnSpPr>
+        <p:spPr>
+          <a:xfrm>
+            <a:off x="4860032" y="2391763"/>
+            <a:ext cx="36004" cy="2765429"/>
+          </a:xfrm>
+          <a:prstGeom prst="straightConnector1">
+            <a:avLst/>
+          </a:prstGeom>
+          <a:ln w="28575">
+            <a:tailEnd type="arrow"/>
+          </a:ln>
+        </p:spPr>
+        <p:style>
+          <a:lnRef idx="1">
+            <a:schemeClr val="accent1"/>
+          </a:lnRef>
+          <a:fillRef idx="0">
+            <a:schemeClr val="accent1"/>
+          </a:fillRef>
+          <a:effectRef idx="0">
+            <a:schemeClr val="accent1"/>
+          </a:effectRef>
+          <a:fontRef idx="minor">
+            <a:schemeClr val="tx1"/>
+          </a:fontRef>
+        </p:style>
+      </p:cxnSp>
+      <p:sp>
+        <p:nvSpPr>
+          <p:cNvPr id="167" name="166 CuadroTexto"/>
+          <p:cNvSpPr txBox="1"/>
+          <p:nvPr/>
+        </p:nvSpPr>
+        <p:spPr>
+          <a:xfrm rot="19840231">
+            <a:off x="5262765" y="5128333"/>
+            <a:ext cx="897867" cy="510778"/>
+          </a:xfrm>
+          <a:prstGeom prst="roundRect">
+            <a:avLst/>
+          </a:prstGeom>
+          <a:noFill/>
+          <a:ln>
+            <a:solidFill>
+              <a:srgbClr val="FF0000"/>
+            </a:solidFill>
+          </a:ln>
+        </p:spPr>
+        <p:txBody>
+          <a:bodyPr wrap="none" rtlCol="0">
+            <a:spAutoFit/>
+          </a:bodyPr>
+          <a:lstStyle/>
+          <a:p>
+            <a:r>
+              <a:rPr lang="ca-ES" sz="2400" dirty="0" smtClean="0">
+                <a:solidFill>
+                  <a:srgbClr val="FF0000"/>
+                </a:solidFill>
+              </a:rPr>
+              <a:t>New!</a:t>
+            </a:r>
+            <a:endParaRPr lang="ca-ES" sz="2400" dirty="0">
+              <a:solidFill>
+                <a:srgbClr val="FF0000"/>
+              </a:solidFill>
+            </a:endParaRPr>
+          </a:p>
+        </p:txBody>
+      </p:sp>
+      <p:cxnSp>
+        <p:nvCxnSpPr>
+          <p:cNvPr id="174" name="173 Conector recto"/>
+          <p:cNvCxnSpPr/>
+          <p:nvPr/>
+        </p:nvCxnSpPr>
+        <p:spPr>
+          <a:xfrm>
+            <a:off x="3707904" y="260648"/>
+            <a:ext cx="0" cy="6336704"/>
+          </a:xfrm>
+          <a:prstGeom prst="line">
+            <a:avLst/>
+          </a:prstGeom>
+          <a:ln>
+            <a:solidFill>
+              <a:srgbClr val="FF0000"/>
+            </a:solidFill>
+            <a:prstDash val="lgDashDotDot"/>
           </a:ln>
         </p:spPr>
         <p:style>
@@ -6526,38 +6880,53 @@
             </a:r>
             <a:r>
               <a:rPr lang="ca-ES" dirty="0" smtClean="0"/>
-              <a:t> (</a:t>
-            </a:r>
-            <a:r>
-              <a:rPr lang="ca-ES" dirty="0" err="1" smtClean="0"/>
-              <a:t>more</a:t>
+              <a:t> </a:t>
             </a:r>
             <a:r>
               <a:rPr lang="ca-ES" dirty="0" smtClean="0"/>
-              <a:t> </a:t>
-            </a:r>
-            <a:r>
-              <a:rPr lang="ca-ES" dirty="0" err="1" smtClean="0"/>
-              <a:t>than</a:t>
-            </a:r>
-            <a:r>
-              <a:rPr lang="ca-ES" dirty="0" smtClean="0"/>
-              <a:t> </a:t>
-            </a:r>
-            <a:r>
-              <a:rPr lang="ca-ES" dirty="0" err="1" smtClean="0"/>
-              <a:t>one</a:t>
-            </a:r>
-            <a:r>
-              <a:rPr lang="ca-ES" dirty="0" smtClean="0"/>
-              <a:t>)   </a:t>
+              <a:t/>
             </a:r>
             <a:br>
               <a:rPr lang="ca-ES" dirty="0" smtClean="0"/>
             </a:br>
             <a:r>
+              <a:rPr lang="ca-ES" sz="2400" dirty="0" smtClean="0"/>
+              <a:t>(</a:t>
+            </a:r>
+            <a:r>
+              <a:rPr lang="ca-ES" sz="2400" dirty="0" err="1" smtClean="0"/>
+              <a:t>more</a:t>
+            </a:r>
+            <a:r>
+              <a:rPr lang="ca-ES" sz="2400" dirty="0" smtClean="0"/>
+              <a:t> </a:t>
+            </a:r>
+            <a:r>
+              <a:rPr lang="ca-ES" sz="2400" dirty="0" err="1" smtClean="0"/>
+              <a:t>than</a:t>
+            </a:r>
+            <a:r>
+              <a:rPr lang="ca-ES" sz="2400" dirty="0" smtClean="0"/>
+              <a:t> </a:t>
+            </a:r>
+            <a:r>
+              <a:rPr lang="ca-ES" sz="2400" dirty="0" err="1" smtClean="0"/>
+              <a:t>one</a:t>
+            </a:r>
+            <a:r>
+              <a:rPr lang="ca-ES" sz="2400" dirty="0" smtClean="0"/>
+              <a:t>)</a:t>
+            </a:r>
+            <a:br>
+              <a:rPr lang="ca-ES" sz="2400" dirty="0" smtClean="0"/>
+            </a:br>
+            <a:r>
               <a:rPr lang="ca-ES" dirty="0" smtClean="0"/>
-              <a:t>(1st TB15)</a:t>
+              <a:t>(</a:t>
+            </a:r>
+            <a:r>
+              <a:rPr lang="ca-ES" dirty="0" smtClean="0"/>
+              <a:t>1st TB15)</a:t>
             </a:r>
             <a:endParaRPr lang="ca-ES" dirty="0"/>
           </a:p>
@@ -6615,7 +6984,12 @@
             <p:ph sz="quarter" idx="15"/>
           </p:nvPr>
         </p:nvSpPr>
-        <p:spPr/>
+        <p:spPr>
+          <a:xfrm>
+            <a:off x="468313" y="3789040"/>
+            <a:ext cx="4032250" cy="1224136"/>
+          </a:xfrm>
+        </p:spPr>
         <p:txBody>
           <a:bodyPr/>
           <a:lstStyle/>
@@ -6649,7 +7023,12 @@
             <p:ph sz="quarter" idx="16"/>
           </p:nvPr>
         </p:nvSpPr>
-        <p:spPr/>
+        <p:spPr>
+          <a:xfrm>
+            <a:off x="4643438" y="3789040"/>
+            <a:ext cx="4032250" cy="1224136"/>
+          </a:xfrm>
+        </p:spPr>
         <p:txBody>
           <a:bodyPr/>
           <a:lstStyle/>
@@ -6816,7 +7195,7 @@
         </p:nvSpPr>
         <p:spPr>
           <a:xfrm rot="19840231">
-            <a:off x="2904905" y="3064764"/>
+            <a:off x="2904905" y="2848740"/>
             <a:ext cx="998564" cy="510778"/>
           </a:xfrm>
           <a:prstGeom prst="roundRect">
@@ -7415,10 +7794,42 @@
                 <a:ea typeface="+mn-ea"/>
                 <a:cs typeface="+mn-cs"/>
               </a:rPr>
-              <a:t> (</a:t>
-            </a:r>
-            <a:r>
-              <a:rPr lang="ca-ES" sz="2800" kern="1200" dirty="0" err="1" smtClean="0">
+              <a:t> </a:t>
+            </a:r>
+            <a:r>
+              <a:rPr lang="ca-ES" sz="2800" kern="1200" dirty="0" smtClean="0">
+                <a:solidFill>
+                  <a:schemeClr val="tx1"/>
+                </a:solidFill>
+                <a:latin typeface="+mn-lt"/>
+                <a:ea typeface="+mn-ea"/>
+                <a:cs typeface="+mn-cs"/>
+              </a:rPr>
+              <a:t/>
+            </a:r>
+            <a:br>
+              <a:rPr lang="ca-ES" sz="2800" kern="1200" dirty="0" smtClean="0">
+                <a:solidFill>
+                  <a:schemeClr val="tx1"/>
+                </a:solidFill>
+                <a:latin typeface="+mn-lt"/>
+                <a:ea typeface="+mn-ea"/>
+                <a:cs typeface="+mn-cs"/>
+              </a:rPr>
+            </a:br>
+            <a:r>
+              <a:rPr lang="ca-ES" sz="2400" kern="1200" dirty="0" smtClean="0">
+                <a:solidFill>
+                  <a:schemeClr val="tx1"/>
+                </a:solidFill>
+                <a:latin typeface="+mn-lt"/>
+                <a:ea typeface="+mn-ea"/>
+                <a:cs typeface="+mn-cs"/>
+              </a:rPr>
+              <a:t>(</a:t>
+            </a:r>
+            <a:r>
+              <a:rPr lang="ca-ES" sz="2400" kern="1200" dirty="0" err="1" smtClean="0">
                 <a:solidFill>
                   <a:schemeClr val="tx1"/>
                 </a:solidFill>
@@ -7427,6 +7838,61 @@
                 <a:cs typeface="+mn-cs"/>
               </a:rPr>
               <a:t>more</a:t>
+            </a:r>
+            <a:r>
+              <a:rPr lang="ca-ES" sz="2400" kern="1200" dirty="0" smtClean="0">
+                <a:solidFill>
+                  <a:schemeClr val="tx1"/>
+                </a:solidFill>
+                <a:latin typeface="+mn-lt"/>
+                <a:ea typeface="+mn-ea"/>
+                <a:cs typeface="+mn-cs"/>
+              </a:rPr>
+              <a:t> </a:t>
+            </a:r>
+            <a:r>
+              <a:rPr lang="ca-ES" sz="2400" kern="1200" dirty="0" err="1" smtClean="0">
+                <a:solidFill>
+                  <a:schemeClr val="tx1"/>
+                </a:solidFill>
+                <a:latin typeface="+mn-lt"/>
+                <a:ea typeface="+mn-ea"/>
+                <a:cs typeface="+mn-cs"/>
+              </a:rPr>
+              <a:t>than</a:t>
+            </a:r>
+            <a:r>
+              <a:rPr lang="ca-ES" sz="2400" kern="1200" dirty="0" smtClean="0">
+                <a:solidFill>
+                  <a:schemeClr val="tx1"/>
+                </a:solidFill>
+                <a:latin typeface="+mn-lt"/>
+                <a:ea typeface="+mn-ea"/>
+                <a:cs typeface="+mn-cs"/>
+              </a:rPr>
+              <a:t> </a:t>
+            </a:r>
+            <a:r>
+              <a:rPr lang="ca-ES" sz="2400" kern="1200" dirty="0" err="1" smtClean="0">
+                <a:solidFill>
+                  <a:schemeClr val="tx1"/>
+                </a:solidFill>
+                <a:latin typeface="+mn-lt"/>
+                <a:ea typeface="+mn-ea"/>
+                <a:cs typeface="+mn-cs"/>
+              </a:rPr>
+              <a:t>one</a:t>
+            </a:r>
+            <a:r>
+              <a:rPr lang="ca-ES" sz="2400" kern="1200" dirty="0" smtClean="0">
+                <a:solidFill>
+                  <a:schemeClr val="tx1"/>
+                </a:solidFill>
+                <a:latin typeface="+mn-lt"/>
+                <a:ea typeface="+mn-ea"/>
+                <a:cs typeface="+mn-cs"/>
+              </a:rPr>
+              <a:t>)</a:t>
             </a:r>
             <a:r>
               <a:rPr lang="ca-ES" sz="2800" kern="1200" dirty="0" smtClean="0">
@@ -7438,50 +7904,6 @@
                 <a:cs typeface="+mn-cs"/>
               </a:rPr>
               <a:t> </a:t>
-            </a:r>
-            <a:r>
-              <a:rPr lang="ca-ES" sz="2800" kern="1200" dirty="0" err="1" smtClean="0">
-                <a:solidFill>
-                  <a:schemeClr val="tx1"/>
-                </a:solidFill>
-                <a:latin typeface="+mn-lt"/>
-                <a:ea typeface="+mn-ea"/>
-                <a:cs typeface="+mn-cs"/>
-              </a:rPr>
-              <a:t>than</a:t>
-            </a:r>
-            <a:r>
-              <a:rPr lang="ca-ES" sz="2800" kern="1200" dirty="0" smtClean="0">
-                <a:solidFill>
-                  <a:schemeClr val="tx1"/>
-                </a:solidFill>
-                <a:latin typeface="+mn-lt"/>
-                <a:ea typeface="+mn-ea"/>
-                <a:cs typeface="+mn-cs"/>
-              </a:rPr>
-              <a:t> </a:t>
-            </a:r>
-            <a:r>
-              <a:rPr lang="ca-ES" sz="2800" kern="1200" dirty="0" err="1" smtClean="0">
-                <a:solidFill>
-                  <a:schemeClr val="tx1"/>
-                </a:solidFill>
-                <a:latin typeface="+mn-lt"/>
-                <a:ea typeface="+mn-ea"/>
-                <a:cs typeface="+mn-cs"/>
-              </a:rPr>
-              <a:t>one</a:t>
-            </a:r>
-            <a:r>
-              <a:rPr lang="ca-ES" sz="2800" kern="1200" dirty="0" smtClean="0">
-                <a:solidFill>
-                  <a:schemeClr val="tx1"/>
-                </a:solidFill>
-                <a:latin typeface="+mn-lt"/>
-                <a:ea typeface="+mn-ea"/>
-                <a:cs typeface="+mn-cs"/>
-              </a:rPr>
-              <a:t>) </a:t>
             </a:r>
             <a:br>
               <a:rPr lang="ca-ES" sz="2800" kern="1200" dirty="0" smtClean="0">
@@ -7645,69 +8067,34 @@
             </a:r>
             <a:r>
               <a:rPr lang="ca-ES" dirty="0" smtClean="0"/>
-              <a:t> on </a:t>
-            </a:r>
-            <a:r>
-              <a:rPr lang="ca-ES" dirty="0" err="1" smtClean="0"/>
-              <a:t>the</a:t>
+              <a:t> </a:t>
             </a:r>
             <a:r>
               <a:rPr lang="ca-ES" dirty="0" smtClean="0"/>
-              <a:t> </a:t>
-            </a:r>
-            <a:r>
-              <a:rPr lang="ca-ES" dirty="0" err="1" smtClean="0"/>
-              <a:t>fly</a:t>
-            </a:r>
-            <a:r>
-              <a:rPr lang="ca-ES" dirty="0" smtClean="0"/>
-              <a:t> </a:t>
+              <a:t/>
             </a:r>
             <a:br>
               <a:rPr lang="ca-ES" dirty="0" smtClean="0"/>
             </a:br>
             <a:r>
               <a:rPr lang="ca-ES" dirty="0" smtClean="0"/>
-              <a:t>(</a:t>
+              <a:t>on </a:t>
             </a:r>
             <a:r>
               <a:rPr lang="ca-ES" dirty="0" err="1" smtClean="0"/>
-              <a:t>SWG</a:t>
+              <a:t>the</a:t>
             </a:r>
             <a:r>
               <a:rPr lang="ca-ES" dirty="0" smtClean="0"/>
-              <a:t>)</a:t>
-            </a:r>
-            <a:endParaRPr lang="ca-ES" dirty="0"/>
-          </a:p>
-        </p:txBody>
-      </p:sp>
-      <p:sp>
-        <p:nvSpPr>
-          <p:cNvPr id="11" name="10 Marcador de contenido"/>
-          <p:cNvSpPr>
-            <a:spLocks noGrp="1"/>
-          </p:cNvSpPr>
-          <p:nvPr>
-            <p:ph sz="quarter" idx="17"/>
-          </p:nvPr>
-        </p:nvSpPr>
-        <p:spPr/>
-        <p:txBody>
-          <a:bodyPr/>
-          <a:lstStyle/>
-          <a:p>
+              <a:t> </a:t>
+            </a:r>
+            <a:r>
+              <a:rPr lang="ca-ES" dirty="0" err="1" smtClean="0"/>
+              <a:t>fly</a:t>
+            </a:r>
             <a:r>
               <a:rPr lang="ca-ES" dirty="0" smtClean="0"/>
-              <a:t>Time/</a:t>
-            </a:r>
-            <a:r>
-              <a:rPr lang="ca-ES" dirty="0" err="1" smtClean="0"/>
-              <a:t>elevation</a:t>
-            </a:r>
-            <a:r>
-              <a:rPr lang="ca-ES" dirty="0" smtClean="0"/>
-              <a:t/>
+              <a:t> </a:t>
             </a:r>
             <a:br>
               <a:rPr lang="ca-ES" dirty="0" smtClean="0"/>
@@ -7730,12 +8117,12 @@
       </p:sp>
       <p:sp>
         <p:nvSpPr>
-          <p:cNvPr id="12" name="11 Marcador de contenido"/>
-          <p:cNvSpPr>
-            <a:spLocks noGrp="1"/>
-          </p:cNvSpPr>
-          <p:nvPr>
-            <p:ph sz="quarter" idx="18"/>
+          <p:cNvPr id="11" name="10 Marcador de contenido"/>
+          <p:cNvSpPr>
+            <a:spLocks noGrp="1"/>
+          </p:cNvSpPr>
+          <p:nvPr>
+            <p:ph sz="quarter" idx="17"/>
           </p:nvPr>
         </p:nvSpPr>
         <p:spPr/>
@@ -7744,12 +8131,16 @@
           <a:lstStyle/>
           <a:p>
             <a:r>
+              <a:rPr lang="ca-ES" dirty="0" smtClean="0"/>
+              <a:t>Time/</a:t>
+            </a:r>
+            <a:r>
               <a:rPr lang="ca-ES" dirty="0" err="1" smtClean="0"/>
-              <a:t>Other</a:t>
+              <a:t>elevation</a:t>
             </a:r>
             <a:r>
               <a:rPr lang="ca-ES" dirty="0" smtClean="0"/>
-              <a:t> dimensions</a:t>
+              <a:t/>
             </a:r>
             <a:br>
               <a:rPr lang="ca-ES" dirty="0" smtClean="0"/>
@@ -7772,13 +8163,55 @@
       </p:sp>
       <p:sp>
         <p:nvSpPr>
+          <p:cNvPr id="12" name="11 Marcador de contenido"/>
+          <p:cNvSpPr>
+            <a:spLocks noGrp="1"/>
+          </p:cNvSpPr>
+          <p:nvPr>
+            <p:ph sz="quarter" idx="18"/>
+          </p:nvPr>
+        </p:nvSpPr>
+        <p:spPr/>
+        <p:txBody>
+          <a:bodyPr/>
+          <a:lstStyle/>
+          <a:p>
+            <a:r>
+              <a:rPr lang="ca-ES" dirty="0" err="1" smtClean="0"/>
+              <a:t>Other</a:t>
+            </a:r>
+            <a:r>
+              <a:rPr lang="ca-ES" dirty="0" smtClean="0"/>
+              <a:t> dimensions</a:t>
+            </a:r>
+            <a:br>
+              <a:rPr lang="ca-ES" dirty="0" smtClean="0"/>
+            </a:br>
+            <a:r>
+              <a:rPr lang="ca-ES" dirty="0" smtClean="0"/>
+              <a:t>(</a:t>
+            </a:r>
+            <a:r>
+              <a:rPr lang="ca-ES" dirty="0" err="1" smtClean="0"/>
+              <a:t>SWG</a:t>
+            </a:r>
+            <a:r>
+              <a:rPr lang="ca-ES" dirty="0" smtClean="0"/>
+              <a:t>)</a:t>
+            </a:r>
+            <a:endParaRPr lang="ca-ES" dirty="0"/>
+          </a:p>
+        </p:txBody>
+      </p:sp>
+      <p:sp>
+        <p:nvSpPr>
           <p:cNvPr id="13" name="12 CuadroTexto"/>
           <p:cNvSpPr txBox="1"/>
           <p:nvPr/>
         </p:nvSpPr>
         <p:spPr>
           <a:xfrm rot="19840231">
-            <a:off x="7081370" y="2992756"/>
+            <a:off x="7081370" y="2920748"/>
             <a:ext cx="998564" cy="510778"/>
           </a:xfrm>
           <a:prstGeom prst="roundRect">

</xml_diff>

<commit_message>
Changes in response to Clemens comments
</commit_message>
<xml_diff>
--- a/standard/images/diagrams.pptx
+++ b/standard/images/diagrams.pptx
@@ -15,10 +15,12 @@
     <p:sldId id="264" r:id="rId9"/>
     <p:sldId id="263" r:id="rId10"/>
     <p:sldId id="268" r:id="rId11"/>
-    <p:sldId id="269" r:id="rId12"/>
-    <p:sldId id="257" r:id="rId13"/>
-    <p:sldId id="258" r:id="rId14"/>
-    <p:sldId id="259" r:id="rId15"/>
+    <p:sldId id="270" r:id="rId12"/>
+    <p:sldId id="271" r:id="rId13"/>
+    <p:sldId id="269" r:id="rId14"/>
+    <p:sldId id="257" r:id="rId15"/>
+    <p:sldId id="258" r:id="rId16"/>
+    <p:sldId id="259" r:id="rId17"/>
   </p:sldIdLst>
   <p:sldSz cx="9144000" cy="6858000" type="screen4x3"/>
   <p:notesSz cx="6858000" cy="9144000"/>
@@ -302,7 +304,7 @@
             <a:fld id="{7A847CFC-816F-41D0-AAC0-9BF4FEBC753E}" type="datetimeFigureOut">
               <a:rPr lang="es-ES" smtClean="0"/>
               <a:pPr/>
-              <a:t>09/08/2019</a:t>
+              <a:t>16/08/2019</a:t>
             </a:fld>
             <a:endParaRPr lang="es-ES"/>
           </a:p>
@@ -394,7 +396,7 @@
             <a:fld id="{7A847CFC-816F-41D0-AAC0-9BF4FEBC753E}" type="datetimeFigureOut">
               <a:rPr lang="es-ES" smtClean="0"/>
               <a:pPr/>
-              <a:t>09/08/2019</a:t>
+              <a:t>16/08/2019</a:t>
             </a:fld>
             <a:endParaRPr lang="es-ES"/>
           </a:p>
@@ -668,7 +670,7 @@
             <a:fld id="{7A847CFC-816F-41D0-AAC0-9BF4FEBC753E}" type="datetimeFigureOut">
               <a:rPr lang="es-ES" smtClean="0"/>
               <a:pPr/>
-              <a:t>09/08/2019</a:t>
+              <a:t>16/08/2019</a:t>
             </a:fld>
             <a:endParaRPr lang="es-ES"/>
           </a:p>
@@ -918,7 +920,7 @@
             <a:fld id="{7A847CFC-816F-41D0-AAC0-9BF4FEBC753E}" type="datetimeFigureOut">
               <a:rPr lang="es-ES" smtClean="0"/>
               <a:pPr/>
-              <a:t>09/08/2019</a:t>
+              <a:t>16/08/2019</a:t>
             </a:fld>
             <a:endParaRPr lang="es-ES"/>
           </a:p>
@@ -1085,7 +1087,7 @@
             <a:fld id="{7A847CFC-816F-41D0-AAC0-9BF4FEBC753E}" type="datetimeFigureOut">
               <a:rPr lang="es-ES" smtClean="0"/>
               <a:pPr/>
-              <a:t>09/08/2019</a:t>
+              <a:t>16/08/2019</a:t>
             </a:fld>
             <a:endParaRPr lang="es-ES"/>
           </a:p>
@@ -1262,7 +1264,7 @@
             <a:fld id="{7A847CFC-816F-41D0-AAC0-9BF4FEBC753E}" type="datetimeFigureOut">
               <a:rPr lang="es-ES" smtClean="0"/>
               <a:pPr/>
-              <a:t>09/08/2019</a:t>
+              <a:t>16/08/2019</a:t>
             </a:fld>
             <a:endParaRPr lang="es-ES"/>
           </a:p>
@@ -1429,7 +1431,7 @@
             <a:fld id="{7A847CFC-816F-41D0-AAC0-9BF4FEBC753E}" type="datetimeFigureOut">
               <a:rPr lang="es-ES" smtClean="0"/>
               <a:pPr/>
-              <a:t>09/08/2019</a:t>
+              <a:t>16/08/2019</a:t>
             </a:fld>
             <a:endParaRPr lang="es-ES"/>
           </a:p>
@@ -1672,7 +1674,7 @@
             <a:fld id="{7A847CFC-816F-41D0-AAC0-9BF4FEBC753E}" type="datetimeFigureOut">
               <a:rPr lang="es-ES" smtClean="0"/>
               <a:pPr/>
-              <a:t>09/08/2019</a:t>
+              <a:t>16/08/2019</a:t>
             </a:fld>
             <a:endParaRPr lang="es-ES"/>
           </a:p>
@@ -1957,7 +1959,7 @@
             <a:fld id="{7A847CFC-816F-41D0-AAC0-9BF4FEBC753E}" type="datetimeFigureOut">
               <a:rPr lang="es-ES" smtClean="0"/>
               <a:pPr/>
-              <a:t>09/08/2019</a:t>
+              <a:t>16/08/2019</a:t>
             </a:fld>
             <a:endParaRPr lang="es-ES"/>
           </a:p>
@@ -2247,7 +2249,7 @@
             <a:fld id="{7A847CFC-816F-41D0-AAC0-9BF4FEBC753E}" type="datetimeFigureOut">
               <a:rPr lang="es-ES" smtClean="0"/>
               <a:pPr/>
-              <a:t>09/08/2019</a:t>
+              <a:t>16/08/2019</a:t>
             </a:fld>
             <a:endParaRPr lang="es-ES"/>
           </a:p>
@@ -2651,7 +2653,7 @@
             <a:fld id="{7A847CFC-816F-41D0-AAC0-9BF4FEBC753E}" type="datetimeFigureOut">
               <a:rPr lang="es-ES" smtClean="0"/>
               <a:pPr/>
-              <a:t>09/08/2019</a:t>
+              <a:t>16/08/2019</a:t>
             </a:fld>
             <a:endParaRPr lang="es-ES"/>
           </a:p>
@@ -3241,7 +3243,7 @@
             <a:fld id="{7A847CFC-816F-41D0-AAC0-9BF4FEBC753E}" type="datetimeFigureOut">
               <a:rPr lang="es-ES" smtClean="0"/>
               <a:pPr/>
-              <a:t>09/08/2019</a:t>
+              <a:t>16/08/2019</a:t>
             </a:fld>
             <a:endParaRPr lang="es-ES"/>
           </a:p>
@@ -4110,7 +4112,7 @@
             <a:fld id="{7A847CFC-816F-41D0-AAC0-9BF4FEBC753E}" type="datetimeFigureOut">
               <a:rPr lang="es-ES" smtClean="0"/>
               <a:pPr/>
-              <a:t>09/08/2019</a:t>
+              <a:t>16/08/2019</a:t>
             </a:fld>
             <a:endParaRPr lang="es-ES"/>
           </a:p>
@@ -4225,7 +4227,7 @@
             <a:fld id="{7A847CFC-816F-41D0-AAC0-9BF4FEBC753E}" type="datetimeFigureOut">
               <a:rPr lang="es-ES" smtClean="0"/>
               <a:pPr/>
-              <a:t>09/08/2019</a:t>
+              <a:t>16/08/2019</a:t>
             </a:fld>
             <a:endParaRPr lang="es-ES"/>
           </a:p>
@@ -4435,7 +4437,7 @@
             <a:fld id="{7A847CFC-816F-41D0-AAC0-9BF4FEBC753E}" type="datetimeFigureOut">
               <a:rPr lang="es-ES" smtClean="0"/>
               <a:pPr/>
-              <a:t>09/08/2019</a:t>
+              <a:t>16/08/2019</a:t>
             </a:fld>
             <a:endParaRPr lang="es-ES"/>
           </a:p>
@@ -6549,13 +6551,8 @@
             <a:pPr algn="ctr"/>
             <a:r>
               <a:rPr lang="en-US" dirty="0" smtClean="0"/>
-              <a:t>Tiles </a:t>
-            </a:r>
-            <a:r>
-              <a:rPr lang="en-US" dirty="0" smtClean="0"/>
-              <a:t>Checkpoint</a:t>
-            </a:r>
-            <a:endParaRPr lang="en-US" dirty="0" smtClean="0"/>
+              <a:t>Tiles Checkpoint</a:t>
+            </a:r>
           </a:p>
         </p:txBody>
       </p:sp>
@@ -6639,14 +6636,76 @@
         </p:nvSpPr>
         <p:spPr/>
         <p:txBody>
+          <a:bodyPr>
+            <a:normAutofit fontScale="90000"/>
+          </a:bodyPr>
+          <a:lstStyle/>
+          <a:p>
+            <a:r>
+              <a:rPr lang="en-US" noProof="0" dirty="0" smtClean="0"/>
+              <a:t>Checkpoint</a:t>
+            </a:r>
+            <a:endParaRPr lang="en-US" noProof="0" dirty="0"/>
+          </a:p>
+        </p:txBody>
+      </p:sp>
+      <p:sp>
+        <p:nvSpPr>
+          <p:cNvPr id="7" name="6 Marcador de contenido"/>
+          <p:cNvSpPr>
+            <a:spLocks noGrp="1"/>
+          </p:cNvSpPr>
+          <p:nvPr>
+            <p:ph sz="half" idx="1"/>
+          </p:nvPr>
+        </p:nvSpPr>
+        <p:spPr/>
+        <p:txBody>
           <a:bodyPr/>
           <a:lstStyle/>
           <a:p>
             <a:r>
-              <a:rPr lang="ca-ES" dirty="0" err="1" smtClean="0"/>
-              <a:t>Checkpoint</a:t>
-            </a:r>
-            <a:endParaRPr lang="ca-ES" dirty="0"/>
+              <a:rPr lang="en-US" noProof="0" smtClean="0"/>
+              <a:t>Any request for resources can communicate a checkpoint to the client.</a:t>
+            </a:r>
+            <a:endParaRPr lang="en-US" noProof="0" smtClean="0"/>
+          </a:p>
+        </p:txBody>
+      </p:sp>
+      <p:sp>
+        <p:nvSpPr>
+          <p:cNvPr id="9" name="8 Marcador de contenido"/>
+          <p:cNvSpPr>
+            <a:spLocks noGrp="1"/>
+          </p:cNvSpPr>
+          <p:nvPr>
+            <p:ph sz="half" idx="2"/>
+          </p:nvPr>
+        </p:nvSpPr>
+        <p:spPr/>
+        <p:txBody>
+          <a:bodyPr/>
+          <a:lstStyle/>
+          <a:p>
+            <a:r>
+              <a:rPr lang="en-US" noProof="0" dirty="0" smtClean="0"/>
+              <a:t>Response to a checkpoint is:</a:t>
+            </a:r>
+          </a:p>
+          <a:p>
+            <a:pPr lvl="1"/>
+            <a:r>
+              <a:rPr lang="en-US" noProof="0" dirty="0" smtClean="0"/>
+              <a:t>A checkpoint report</a:t>
+            </a:r>
+          </a:p>
+          <a:p>
+            <a:pPr lvl="1"/>
+            <a:r>
+              <a:rPr lang="en-US" noProof="0" dirty="0" smtClean="0"/>
+              <a:t>A package with resources</a:t>
+            </a:r>
+            <a:endParaRPr lang="en-US" noProof="0" dirty="0"/>
           </a:p>
         </p:txBody>
       </p:sp>
@@ -6657,276 +6716,107 @@
             <a:spLocks noGrp="1"/>
           </p:cNvSpPr>
           <p:nvPr>
-            <p:ph type="body" idx="1"/>
+            <p:ph sz="quarter" idx="13"/>
+          </p:nvPr>
+        </p:nvSpPr>
+        <p:spPr>
+          <a:xfrm>
+            <a:off x="468313" y="3140968"/>
+            <a:ext cx="4032250" cy="3717032"/>
+          </a:xfrm>
+        </p:spPr>
+        <p:txBody>
+          <a:bodyPr>
+            <a:normAutofit fontScale="85000" lnSpcReduction="10000"/>
+          </a:bodyPr>
+          <a:lstStyle/>
+          <a:p>
+            <a:r>
+              <a:rPr lang="en-US" noProof="0" dirty="0" smtClean="0"/>
+              <a:t>A request for resources can have a checkpoint parameters will return only changes</a:t>
+            </a:r>
+          </a:p>
+          <a:p>
+            <a:pPr lvl="1"/>
+            <a:r>
+              <a:rPr lang="en-US" dirty="0" smtClean="0"/>
+              <a:t>Checkpoints are not resources but queries (changed to </a:t>
+            </a:r>
+            <a:r>
+              <a:rPr lang="en-US" dirty="0" err="1" smtClean="0"/>
+              <a:t>pvretanos</a:t>
+            </a:r>
+            <a:r>
+              <a:rPr lang="en-US" dirty="0" smtClean="0"/>
+              <a:t>)</a:t>
+            </a:r>
+          </a:p>
+          <a:p>
+            <a:pPr lvl="1"/>
+            <a:r>
+              <a:rPr lang="en-US" dirty="0" smtClean="0"/>
+              <a:t>Applicable to</a:t>
+            </a:r>
+          </a:p>
+          <a:p>
+            <a:pPr lvl="2"/>
+            <a:r>
+              <a:rPr lang="en-US" dirty="0" smtClean="0"/>
+              <a:t>Items</a:t>
+            </a:r>
+          </a:p>
+          <a:p>
+            <a:pPr lvl="2"/>
+            <a:r>
+              <a:rPr lang="en-US" dirty="0" err="1" smtClean="0"/>
+              <a:t>multitiles</a:t>
+            </a:r>
+            <a:endParaRPr lang="en-US" dirty="0" smtClean="0"/>
+          </a:p>
+        </p:txBody>
+      </p:sp>
+      <p:sp>
+        <p:nvSpPr>
+          <p:cNvPr id="8" name="7 Marcador de texto"/>
+          <p:cNvSpPr>
+            <a:spLocks noGrp="1"/>
+          </p:cNvSpPr>
+          <p:nvPr>
+            <p:ph sz="quarter" idx="14"/>
           </p:nvPr>
         </p:nvSpPr>
         <p:spPr/>
         <p:txBody>
-          <a:bodyPr/>
-          <a:lstStyle/>
-          <a:p>
-            <a:r>
-              <a:rPr lang="ca-ES" dirty="0" err="1" smtClean="0"/>
-              <a:t>Request</a:t>
-            </a:r>
-            <a:endParaRPr lang="ca-ES" dirty="0"/>
-          </a:p>
-        </p:txBody>
-      </p:sp>
-      <p:sp>
-        <p:nvSpPr>
-          <p:cNvPr id="7" name="6 Marcador de contenido"/>
-          <p:cNvSpPr>
-            <a:spLocks noGrp="1"/>
-          </p:cNvSpPr>
-          <p:nvPr>
-            <p:ph sz="half" idx="2"/>
-          </p:nvPr>
-        </p:nvSpPr>
-        <p:spPr/>
-        <p:txBody>
-          <a:bodyPr/>
-          <a:lstStyle/>
-          <a:p>
-            <a:r>
-              <a:rPr lang="ca-ES" dirty="0" smtClean="0"/>
-              <a:t>The </a:t>
-            </a:r>
-            <a:r>
-              <a:rPr lang="ca-ES" dirty="0" err="1" smtClean="0"/>
-              <a:t>checkpoint</a:t>
-            </a:r>
-            <a:r>
-              <a:rPr lang="ca-ES" dirty="0" smtClean="0"/>
-              <a:t> </a:t>
-            </a:r>
-            <a:r>
-              <a:rPr lang="ca-ES" dirty="0" err="1" smtClean="0"/>
-              <a:t>request</a:t>
-            </a:r>
-            <a:r>
-              <a:rPr lang="ca-ES" dirty="0" smtClean="0"/>
-              <a:t> </a:t>
-            </a:r>
-            <a:r>
-              <a:rPr lang="ca-ES" dirty="0" err="1" smtClean="0"/>
-              <a:t>assumes</a:t>
-            </a:r>
-            <a:r>
-              <a:rPr lang="ca-ES" dirty="0" smtClean="0"/>
-              <a:t> </a:t>
-            </a:r>
-            <a:r>
-              <a:rPr lang="ca-ES" dirty="0" err="1" smtClean="0"/>
-              <a:t>items</a:t>
-            </a:r>
-            <a:endParaRPr lang="ca-ES" dirty="0" smtClean="0"/>
+          <a:bodyPr>
+            <a:normAutofit fontScale="85000" lnSpcReduction="10000"/>
+          </a:bodyPr>
+          <a:lstStyle/>
+          <a:p>
+            <a:r>
+              <a:rPr lang="en-US" noProof="0" dirty="0" smtClean="0"/>
+              <a:t>Response has been extended with a extent.</a:t>
+            </a:r>
+          </a:p>
+          <a:p>
+            <a:r>
+              <a:rPr lang="en-US" noProof="0" dirty="0" smtClean="0"/>
+              <a:t>Specify response to tiles includes </a:t>
+            </a:r>
           </a:p>
           <a:p>
             <a:pPr lvl="1"/>
             <a:r>
-              <a:rPr lang="ca-ES" dirty="0" smtClean="0"/>
-              <a:t>How to “</a:t>
-            </a:r>
-            <a:r>
-              <a:rPr lang="ca-ES" dirty="0" err="1" smtClean="0"/>
-              <a:t>tiles</a:t>
-            </a:r>
-            <a:r>
-              <a:rPr lang="ca-ES" dirty="0" smtClean="0"/>
-              <a:t>”</a:t>
+              <a:rPr lang="en-US" noProof="0" dirty="0" smtClean="0"/>
+              <a:t>scale range</a:t>
             </a:r>
           </a:p>
           <a:p>
             <a:pPr lvl="1"/>
             <a:r>
-              <a:rPr lang="ca-ES" dirty="0" err="1" smtClean="0"/>
-              <a:t>Integrate</a:t>
-            </a:r>
-            <a:r>
-              <a:rPr lang="ca-ES" dirty="0" smtClean="0"/>
-              <a:t> </a:t>
-            </a:r>
-            <a:r>
-              <a:rPr lang="ca-ES" dirty="0" err="1" smtClean="0"/>
-              <a:t>checkpoint</a:t>
-            </a:r>
-            <a:r>
-              <a:rPr lang="ca-ES" dirty="0" smtClean="0"/>
-              <a:t> </a:t>
-            </a:r>
-            <a:r>
-              <a:rPr lang="ca-ES" dirty="0" err="1" smtClean="0"/>
-              <a:t>request</a:t>
-            </a:r>
-            <a:r>
-              <a:rPr lang="ca-ES" dirty="0" smtClean="0"/>
-              <a:t> </a:t>
-            </a:r>
-            <a:r>
-              <a:rPr lang="ca-ES" dirty="0" err="1" smtClean="0"/>
-              <a:t>with</a:t>
-            </a:r>
-            <a:r>
-              <a:rPr lang="ca-ES" dirty="0" smtClean="0"/>
-              <a:t> </a:t>
-            </a:r>
-            <a:r>
-              <a:rPr lang="ca-ES" dirty="0" err="1" smtClean="0"/>
-              <a:t>multitile</a:t>
-            </a:r>
-            <a:r>
-              <a:rPr lang="ca-ES" dirty="0" smtClean="0"/>
-              <a:t> </a:t>
-            </a:r>
-            <a:r>
-              <a:rPr lang="ca-ES" dirty="0" err="1" smtClean="0"/>
-              <a:t>request</a:t>
-            </a:r>
-            <a:r>
-              <a:rPr lang="ca-ES" dirty="0" smtClean="0"/>
-              <a:t>?.</a:t>
-            </a:r>
-          </a:p>
-        </p:txBody>
-      </p:sp>
-      <p:sp>
-        <p:nvSpPr>
-          <p:cNvPr id="8" name="7 Marcador de texto"/>
-          <p:cNvSpPr>
-            <a:spLocks noGrp="1"/>
-          </p:cNvSpPr>
-          <p:nvPr>
-            <p:ph type="body" sz="quarter" idx="3"/>
-          </p:nvPr>
-        </p:nvSpPr>
-        <p:spPr/>
-        <p:txBody>
-          <a:bodyPr/>
-          <a:lstStyle/>
-          <a:p>
-            <a:r>
-              <a:rPr lang="ca-ES" dirty="0" err="1" smtClean="0"/>
-              <a:t>Response</a:t>
-            </a:r>
-            <a:endParaRPr lang="ca-ES" dirty="0"/>
-          </a:p>
-        </p:txBody>
-      </p:sp>
-      <p:sp>
-        <p:nvSpPr>
-          <p:cNvPr id="9" name="8 Marcador de contenido"/>
-          <p:cNvSpPr>
-            <a:spLocks noGrp="1"/>
-          </p:cNvSpPr>
-          <p:nvPr>
-            <p:ph sz="quarter" idx="4"/>
-          </p:nvPr>
-        </p:nvSpPr>
-        <p:spPr/>
-        <p:txBody>
-          <a:bodyPr/>
-          <a:lstStyle/>
-          <a:p>
-            <a:r>
-              <a:rPr lang="ca-ES" dirty="0" smtClean="0">
-                <a:solidFill>
-                  <a:srgbClr val="FF0000"/>
-                </a:solidFill>
-              </a:rPr>
-              <a:t>How to get </a:t>
-            </a:r>
-            <a:r>
-              <a:rPr lang="ca-ES" dirty="0" err="1" smtClean="0">
-                <a:solidFill>
-                  <a:srgbClr val="FF0000"/>
-                </a:solidFill>
-              </a:rPr>
-              <a:t>the</a:t>
-            </a:r>
-            <a:r>
-              <a:rPr lang="ca-ES" dirty="0" smtClean="0">
-                <a:solidFill>
-                  <a:srgbClr val="FF0000"/>
-                </a:solidFill>
-              </a:rPr>
-              <a:t> </a:t>
-            </a:r>
-            <a:r>
-              <a:rPr lang="ca-ES" dirty="0" err="1" smtClean="0">
-                <a:solidFill>
-                  <a:srgbClr val="FF0000"/>
-                </a:solidFill>
-              </a:rPr>
-              <a:t>next</a:t>
-            </a:r>
-            <a:r>
-              <a:rPr lang="ca-ES" dirty="0" smtClean="0">
-                <a:solidFill>
-                  <a:srgbClr val="FF0000"/>
-                </a:solidFill>
-              </a:rPr>
-              <a:t> </a:t>
-            </a:r>
-            <a:r>
-              <a:rPr lang="ca-ES" dirty="0" err="1" smtClean="0">
-                <a:solidFill>
-                  <a:srgbClr val="FF0000"/>
-                </a:solidFill>
-              </a:rPr>
-              <a:t>checkpoint</a:t>
-            </a:r>
-            <a:r>
-              <a:rPr lang="ca-ES" dirty="0" smtClean="0">
-                <a:solidFill>
-                  <a:srgbClr val="FF0000"/>
-                </a:solidFill>
-              </a:rPr>
-              <a:t>?</a:t>
-            </a:r>
-          </a:p>
-          <a:p>
-            <a:r>
-              <a:rPr lang="ca-ES" dirty="0" err="1" smtClean="0"/>
-              <a:t>PVretanos</a:t>
-            </a:r>
-            <a:r>
-              <a:rPr lang="ca-ES" dirty="0" smtClean="0"/>
-              <a:t> </a:t>
-            </a:r>
-            <a:r>
-              <a:rPr lang="ca-ES" dirty="0" err="1" smtClean="0"/>
-              <a:t>defined</a:t>
-            </a:r>
-            <a:r>
-              <a:rPr lang="ca-ES" dirty="0" smtClean="0"/>
-              <a:t> a </a:t>
-            </a:r>
-            <a:r>
-              <a:rPr lang="ca-ES" dirty="0" err="1" smtClean="0"/>
-              <a:t>response</a:t>
-            </a:r>
-            <a:endParaRPr lang="ca-ES" dirty="0" smtClean="0"/>
-          </a:p>
-          <a:p>
-            <a:pPr lvl="1"/>
-            <a:r>
-              <a:rPr lang="ca-ES" dirty="0" smtClean="0"/>
-              <a:t>How to get a </a:t>
-            </a:r>
-            <a:r>
-              <a:rPr lang="ca-ES" dirty="0" err="1" smtClean="0"/>
-              <a:t>multitile</a:t>
-            </a:r>
-            <a:r>
-              <a:rPr lang="ca-ES" dirty="0" smtClean="0"/>
-              <a:t> </a:t>
-            </a:r>
-            <a:r>
-              <a:rPr lang="ca-ES" dirty="0" err="1" smtClean="0"/>
-              <a:t>zip</a:t>
-            </a:r>
-            <a:endParaRPr lang="ca-ES" dirty="0"/>
+              <a:rPr lang="en-US" noProof="0" dirty="0" smtClean="0"/>
+              <a:t>Path structure.</a:t>
+            </a:r>
+            <a:endParaRPr lang="ca-ES" noProof="0" dirty="0" smtClean="0"/>
           </a:p>
         </p:txBody>
       </p:sp>
@@ -6967,12 +6857,154 @@
         </p:nvSpPr>
         <p:spPr/>
         <p:txBody>
+          <a:bodyPr>
+            <a:normAutofit fontScale="90000"/>
+          </a:bodyPr>
+          <a:lstStyle/>
+          <a:p>
+            <a:r>
+              <a:rPr lang="en-US" noProof="0" dirty="0" err="1" smtClean="0"/>
+              <a:t>Multitiles</a:t>
+            </a:r>
+            <a:endParaRPr lang="en-US" noProof="0" dirty="0"/>
+          </a:p>
+        </p:txBody>
+      </p:sp>
+      <p:sp>
+        <p:nvSpPr>
+          <p:cNvPr id="3" name="2 Marcador de contenido"/>
+          <p:cNvSpPr>
+            <a:spLocks noGrp="1"/>
+          </p:cNvSpPr>
+          <p:nvPr>
+            <p:ph sz="half" idx="1"/>
+          </p:nvPr>
+        </p:nvSpPr>
+        <p:spPr/>
+        <p:txBody>
           <a:bodyPr/>
           <a:lstStyle/>
           <a:p>
             <a:r>
+              <a:rPr lang="en-US" noProof="0" dirty="0" smtClean="0"/>
+              <a:t>Request based on</a:t>
+            </a:r>
+          </a:p>
+          <a:p>
+            <a:pPr lvl="1"/>
+            <a:r>
+              <a:rPr lang="en-US" dirty="0" err="1" smtClean="0"/>
+              <a:t>b</a:t>
+            </a:r>
+            <a:r>
+              <a:rPr lang="en-US" noProof="0" dirty="0" smtClean="0"/>
+              <a:t>box</a:t>
+            </a:r>
+          </a:p>
+          <a:p>
+            <a:pPr lvl="1"/>
+            <a:r>
+              <a:rPr lang="en-US" noProof="0" dirty="0" err="1" smtClean="0"/>
+              <a:t>scaleDenominator</a:t>
+            </a:r>
+            <a:r>
+              <a:rPr lang="en-US" noProof="0" dirty="0" smtClean="0"/>
+              <a:t> (range)</a:t>
+            </a:r>
+          </a:p>
+          <a:p>
+            <a:pPr lvl="1"/>
+            <a:endParaRPr lang="ca-ES" dirty="0"/>
+          </a:p>
+        </p:txBody>
+      </p:sp>
+      <p:sp>
+        <p:nvSpPr>
+          <p:cNvPr id="4" name="3 Marcador de contenido"/>
+          <p:cNvSpPr>
+            <a:spLocks noGrp="1"/>
+          </p:cNvSpPr>
+          <p:nvPr>
+            <p:ph sz="half" idx="2"/>
+          </p:nvPr>
+        </p:nvSpPr>
+        <p:spPr/>
+        <p:txBody>
+          <a:bodyPr/>
+          <a:lstStyle/>
+          <a:p>
+            <a:r>
+              <a:rPr lang="en-US" dirty="0" smtClean="0"/>
+              <a:t>Response can be </a:t>
+            </a:r>
+          </a:p>
+          <a:p>
+            <a:pPr lvl="1"/>
+            <a:r>
+              <a:rPr lang="en-US" dirty="0" smtClean="0"/>
+              <a:t>tiles in a package (ZIP)</a:t>
+            </a:r>
+          </a:p>
+          <a:p>
+            <a:pPr lvl="1"/>
+            <a:r>
+              <a:rPr lang="en-US" dirty="0" smtClean="0"/>
+              <a:t>list of URIs of individual tiles for later retrieve</a:t>
+            </a:r>
+            <a:endParaRPr lang="en-US" dirty="0"/>
+          </a:p>
+        </p:txBody>
+      </p:sp>
+      <p:sp>
+        <p:nvSpPr>
+          <p:cNvPr id="5" name="4 Marcador de contenido"/>
+          <p:cNvSpPr>
+            <a:spLocks noGrp="1"/>
+          </p:cNvSpPr>
+          <p:nvPr>
+            <p:ph sz="quarter" idx="13"/>
+          </p:nvPr>
+        </p:nvSpPr>
+        <p:spPr/>
+        <p:txBody>
+          <a:bodyPr/>
+          <a:lstStyle/>
+          <a:p>
+            <a:r>
               <a:rPr lang="ca-ES" dirty="0" err="1" smtClean="0"/>
-              <a:t>Checkpoint</a:t>
+              <a:t>Request</a:t>
+            </a:r>
+            <a:r>
+              <a:rPr lang="ca-ES" dirty="0" smtClean="0"/>
+              <a:t> </a:t>
+            </a:r>
+            <a:r>
+              <a:rPr lang="ca-ES" dirty="0" err="1" smtClean="0"/>
+              <a:t>can</a:t>
+            </a:r>
+            <a:r>
+              <a:rPr lang="ca-ES" dirty="0" smtClean="0"/>
+              <a:t> be </a:t>
+            </a:r>
+            <a:r>
+              <a:rPr lang="ca-ES" dirty="0" err="1" smtClean="0"/>
+              <a:t>overloaded</a:t>
+            </a:r>
+            <a:r>
+              <a:rPr lang="ca-ES" dirty="0" smtClean="0"/>
+              <a:t> </a:t>
+            </a:r>
+            <a:r>
+              <a:rPr lang="ca-ES" dirty="0" err="1" smtClean="0"/>
+              <a:t>with</a:t>
+            </a:r>
+            <a:r>
+              <a:rPr lang="ca-ES" dirty="0" smtClean="0"/>
+              <a:t> </a:t>
+            </a:r>
+            <a:r>
+              <a:rPr lang="ca-ES" dirty="0" err="1" smtClean="0"/>
+              <a:t>checkpoint</a:t>
             </a:r>
             <a:endParaRPr lang="ca-ES" dirty="0"/>
           </a:p>
@@ -6980,458 +7012,52 @@
       </p:sp>
       <p:sp>
         <p:nvSpPr>
-          <p:cNvPr id="3" name="2 Marcador de texto"/>
-          <p:cNvSpPr>
-            <a:spLocks noGrp="1"/>
-          </p:cNvSpPr>
-          <p:nvPr>
-            <p:ph type="body" idx="1"/>
+          <p:cNvPr id="6" name="5 Marcador de contenido"/>
+          <p:cNvSpPr>
+            <a:spLocks noGrp="1"/>
+          </p:cNvSpPr>
+          <p:nvPr>
+            <p:ph sz="quarter" idx="14"/>
           </p:nvPr>
         </p:nvSpPr>
         <p:spPr/>
         <p:txBody>
-          <a:bodyPr/>
+          <a:bodyPr>
+            <a:normAutofit/>
+          </a:bodyPr>
           <a:lstStyle/>
           <a:p>
             <a:r>
               <a:rPr lang="ca-ES" dirty="0" err="1" smtClean="0"/>
-              <a:t>Features</a:t>
-            </a:r>
-            <a:endParaRPr lang="ca-ES" dirty="0"/>
-          </a:p>
-        </p:txBody>
-      </p:sp>
-      <p:sp>
-        <p:nvSpPr>
-          <p:cNvPr id="4" name="3 Marcador de contenido"/>
-          <p:cNvSpPr>
-            <a:spLocks noGrp="1"/>
-          </p:cNvSpPr>
-          <p:nvPr>
-            <p:ph sz="half" idx="2"/>
-          </p:nvPr>
-        </p:nvSpPr>
-        <p:spPr>
-          <a:xfrm>
-            <a:off x="457200" y="2174875"/>
-            <a:ext cx="8291264" cy="3951288"/>
-          </a:xfrm>
-        </p:spPr>
-        <p:txBody>
-          <a:bodyPr/>
-          <a:lstStyle/>
-          <a:p>
+              <a:t>Response</a:t>
+            </a:r>
             <a:r>
               <a:rPr lang="ca-ES" dirty="0" smtClean="0"/>
-              <a:t>/</a:t>
-            </a:r>
-            <a:r>
-              <a:rPr lang="ca-ES" dirty="0" err="1" smtClean="0"/>
-              <a:t>collections</a:t>
-            </a:r>
-            <a:r>
-              <a:rPr lang="ca-ES" dirty="0" smtClean="0"/>
-              <a:t>/{</a:t>
-            </a:r>
-            <a:r>
-              <a:rPr lang="ca-ES" dirty="0" err="1" smtClean="0"/>
-              <a:t>collectionId</a:t>
-            </a:r>
-            <a:r>
-              <a:rPr lang="ca-ES" dirty="0" smtClean="0"/>
-              <a:t>}/</a:t>
-            </a:r>
-            <a:r>
-              <a:rPr lang="ca-ES" dirty="0" err="1" smtClean="0"/>
-              <a:t>changesets</a:t>
-            </a:r>
-            <a:r>
-              <a:rPr lang="ca-ES" dirty="0" smtClean="0"/>
-              <a:t>/{</a:t>
-            </a:r>
-            <a:r>
-              <a:rPr lang="ca-ES" dirty="0" err="1" smtClean="0"/>
-              <a:t>checkpointId</a:t>
-            </a:r>
-            <a:r>
-              <a:rPr lang="ca-ES" dirty="0" smtClean="0"/>
-              <a:t>}</a:t>
-            </a:r>
-          </a:p>
-          <a:p>
-            <a:r>
-              <a:rPr lang="ca-ES" dirty="0" smtClean="0"/>
-              <a:t>/</a:t>
-            </a:r>
-            <a:r>
-              <a:rPr lang="ca-ES" dirty="0" err="1" smtClean="0"/>
-              <a:t>collections</a:t>
-            </a:r>
-            <a:r>
-              <a:rPr lang="ca-ES" dirty="0" smtClean="0"/>
-              <a:t>/{</a:t>
-            </a:r>
-            <a:r>
-              <a:rPr lang="ca-ES" dirty="0" err="1" smtClean="0"/>
-              <a:t>collectionId</a:t>
-            </a:r>
-            <a:r>
-              <a:rPr lang="ca-ES" dirty="0" smtClean="0"/>
-              <a:t>}/</a:t>
-            </a:r>
-            <a:r>
-              <a:rPr lang="ca-ES" dirty="0" err="1" smtClean="0"/>
-              <a:t>changesets</a:t>
-            </a:r>
-            <a:r>
-              <a:rPr lang="ca-ES" dirty="0" smtClean="0"/>
-              <a:t>/{</a:t>
-            </a:r>
-            <a:r>
-              <a:rPr lang="ca-ES" dirty="0" err="1" smtClean="0"/>
-              <a:t>checkpointId</a:t>
-            </a:r>
-            <a:r>
-              <a:rPr lang="ca-ES" dirty="0" smtClean="0"/>
-              <a:t>}/</a:t>
-            </a:r>
-            <a:r>
-              <a:rPr lang="ca-ES" dirty="0" err="1" smtClean="0"/>
-              <a:t>features</a:t>
+              <a:t> is </a:t>
+            </a:r>
+          </a:p>
+          <a:p>
+            <a:pPr lvl="1"/>
+            <a:r>
+              <a:rPr lang="en-US" dirty="0" smtClean="0"/>
+              <a:t>tiles in a package (ZIP)</a:t>
+            </a:r>
+          </a:p>
+          <a:p>
+            <a:pPr lvl="1"/>
+            <a:r>
+              <a:rPr lang="en-US" dirty="0" smtClean="0"/>
+              <a:t>Checkpoint summary with </a:t>
+            </a:r>
+            <a:r>
+              <a:rPr lang="en-US" dirty="0" err="1" smtClean="0"/>
+              <a:t>bbox</a:t>
+            </a:r>
+            <a:r>
+              <a:rPr lang="en-US" dirty="0" smtClean="0"/>
+              <a:t> and scales.</a:t>
             </a:r>
             <a:endParaRPr lang="ca-ES" dirty="0" smtClean="0"/>
-          </a:p>
-          <a:p>
-            <a:r>
-              <a:rPr lang="ca-ES" dirty="0" smtClean="0"/>
-              <a:t>/</a:t>
-            </a:r>
-            <a:r>
-              <a:rPr lang="ca-ES" dirty="0" err="1" smtClean="0"/>
-              <a:t>collections</a:t>
-            </a:r>
-            <a:r>
-              <a:rPr lang="ca-ES" dirty="0" smtClean="0"/>
-              <a:t>/{</a:t>
-            </a:r>
-            <a:r>
-              <a:rPr lang="ca-ES" dirty="0" err="1" smtClean="0"/>
-              <a:t>collectionId</a:t>
-            </a:r>
-            <a:r>
-              <a:rPr lang="ca-ES" dirty="0" smtClean="0"/>
-              <a:t>}/</a:t>
-            </a:r>
-            <a:r>
-              <a:rPr lang="ca-ES" dirty="0" err="1" smtClean="0"/>
-              <a:t>items</a:t>
-            </a:r>
-            <a:r>
-              <a:rPr lang="ca-ES" dirty="0" smtClean="0"/>
-              <a:t>?</a:t>
-            </a:r>
-            <a:r>
-              <a:rPr lang="ca-ES" dirty="0" err="1" smtClean="0"/>
-              <a:t>checkPoint</a:t>
-            </a:r>
-            <a:r>
-              <a:rPr lang="ca-ES" dirty="0" smtClean="0"/>
-              <a:t>={</a:t>
-            </a:r>
-            <a:r>
-              <a:rPr lang="ca-ES" dirty="0" err="1" smtClean="0"/>
-              <a:t>checkPointId</a:t>
-            </a:r>
-            <a:r>
-              <a:rPr lang="ca-ES" dirty="0" smtClean="0"/>
-              <a:t>}</a:t>
-            </a:r>
-          </a:p>
-          <a:p>
-            <a:r>
-              <a:rPr lang="ca-ES" strike="sngStrike" dirty="0" smtClean="0">
-                <a:solidFill>
-                  <a:schemeClr val="bg1">
-                    <a:lumMod val="50000"/>
-                  </a:schemeClr>
-                </a:solidFill>
-              </a:rPr>
-              <a:t>/</a:t>
-            </a:r>
-            <a:r>
-              <a:rPr lang="ca-ES" strike="sngStrike" dirty="0" err="1" smtClean="0">
-                <a:solidFill>
-                  <a:schemeClr val="bg1">
-                    <a:lumMod val="50000"/>
-                  </a:schemeClr>
-                </a:solidFill>
-              </a:rPr>
-              <a:t>collections</a:t>
-            </a:r>
-            <a:r>
-              <a:rPr lang="ca-ES" strike="sngStrike" dirty="0" smtClean="0">
-                <a:solidFill>
-                  <a:schemeClr val="bg1">
-                    <a:lumMod val="50000"/>
-                  </a:schemeClr>
-                </a:solidFill>
-              </a:rPr>
-              <a:t>/{</a:t>
-            </a:r>
-            <a:r>
-              <a:rPr lang="ca-ES" strike="sngStrike" dirty="0" err="1" smtClean="0">
-                <a:solidFill>
-                  <a:schemeClr val="bg1">
-                    <a:lumMod val="50000"/>
-                  </a:schemeClr>
-                </a:solidFill>
-              </a:rPr>
-              <a:t>collectionId</a:t>
-            </a:r>
-            <a:r>
-              <a:rPr lang="ca-ES" strike="sngStrike" dirty="0" smtClean="0">
-                <a:solidFill>
-                  <a:schemeClr val="bg1">
-                    <a:lumMod val="50000"/>
-                  </a:schemeClr>
-                </a:solidFill>
-              </a:rPr>
-              <a:t>}/</a:t>
-            </a:r>
-            <a:r>
-              <a:rPr lang="ca-ES" strike="sngStrike" dirty="0" err="1" smtClean="0">
-                <a:solidFill>
-                  <a:schemeClr val="bg1">
-                    <a:lumMod val="50000"/>
-                  </a:schemeClr>
-                </a:solidFill>
-              </a:rPr>
-              <a:t>items</a:t>
-            </a:r>
-            <a:r>
-              <a:rPr lang="ca-ES" strike="sngStrike" dirty="0" smtClean="0">
-                <a:solidFill>
-                  <a:schemeClr val="bg1">
-                    <a:lumMod val="50000"/>
-                  </a:schemeClr>
-                </a:solidFill>
-              </a:rPr>
-              <a:t>/</a:t>
-            </a:r>
-            <a:r>
-              <a:rPr lang="ca-ES" strike="sngStrike" dirty="0" err="1" smtClean="0">
-                <a:solidFill>
-                  <a:schemeClr val="bg1">
-                    <a:lumMod val="50000"/>
-                  </a:schemeClr>
-                </a:solidFill>
-              </a:rPr>
-              <a:t>checkPoint</a:t>
-            </a:r>
-            <a:r>
-              <a:rPr lang="ca-ES" strike="sngStrike" dirty="0" smtClean="0">
-                <a:solidFill>
-                  <a:schemeClr val="bg1">
-                    <a:lumMod val="50000"/>
-                  </a:schemeClr>
-                </a:solidFill>
-              </a:rPr>
-              <a:t>/{</a:t>
-            </a:r>
-            <a:r>
-              <a:rPr lang="ca-ES" strike="sngStrike" dirty="0" err="1" smtClean="0">
-                <a:solidFill>
-                  <a:schemeClr val="bg1">
-                    <a:lumMod val="50000"/>
-                  </a:schemeClr>
-                </a:solidFill>
-              </a:rPr>
-              <a:t>checkPointId</a:t>
-            </a:r>
-            <a:r>
-              <a:rPr lang="ca-ES" strike="sngStrike" dirty="0" smtClean="0">
-                <a:solidFill>
-                  <a:schemeClr val="bg1">
-                    <a:lumMod val="50000"/>
-                  </a:schemeClr>
-                </a:solidFill>
-              </a:rPr>
-              <a:t>}</a:t>
-            </a:r>
-          </a:p>
-          <a:p>
-            <a:endParaRPr lang="ca-ES" dirty="0"/>
-          </a:p>
-        </p:txBody>
-      </p:sp>
-      <p:sp>
-        <p:nvSpPr>
-          <p:cNvPr id="5" name="4 Marcador de texto"/>
-          <p:cNvSpPr>
-            <a:spLocks noGrp="1"/>
-          </p:cNvSpPr>
-          <p:nvPr>
-            <p:ph type="body" sz="quarter" idx="3"/>
-          </p:nvPr>
-        </p:nvSpPr>
-        <p:spPr>
-          <a:xfrm>
-            <a:off x="395536" y="3717032"/>
-            <a:ext cx="4041775" cy="639762"/>
-          </a:xfrm>
-        </p:spPr>
-        <p:txBody>
-          <a:bodyPr/>
-          <a:lstStyle/>
-          <a:p>
-            <a:r>
-              <a:rPr lang="ca-ES" dirty="0" err="1" smtClean="0"/>
-              <a:t>Tiles</a:t>
-            </a:r>
-            <a:endParaRPr lang="ca-ES" dirty="0"/>
-          </a:p>
-        </p:txBody>
-      </p:sp>
-      <p:sp>
-        <p:nvSpPr>
-          <p:cNvPr id="6" name="5 Marcador de contenido"/>
-          <p:cNvSpPr>
-            <a:spLocks noGrp="1"/>
-          </p:cNvSpPr>
-          <p:nvPr>
-            <p:ph sz="quarter" idx="4"/>
-          </p:nvPr>
-        </p:nvSpPr>
-        <p:spPr>
-          <a:xfrm>
-            <a:off x="467543" y="4437111"/>
-            <a:ext cx="8219257" cy="1689051"/>
-          </a:xfrm>
-        </p:spPr>
-        <p:txBody>
-          <a:bodyPr>
-            <a:normAutofit lnSpcReduction="10000"/>
-          </a:bodyPr>
-          <a:lstStyle/>
-          <a:p>
-            <a:r>
-              <a:rPr lang="ca-ES" dirty="0" smtClean="0"/>
-              <a:t>??</a:t>
-            </a:r>
-          </a:p>
-          <a:p>
-            <a:r>
-              <a:rPr lang="ca-ES" dirty="0" smtClean="0"/>
-              <a:t>/</a:t>
-            </a:r>
-            <a:r>
-              <a:rPr lang="ca-ES" dirty="0" err="1" smtClean="0"/>
-              <a:t>collections</a:t>
-            </a:r>
-            <a:r>
-              <a:rPr lang="ca-ES" dirty="0" smtClean="0"/>
-              <a:t>/{</a:t>
-            </a:r>
-            <a:r>
-              <a:rPr lang="ca-ES" dirty="0" err="1" smtClean="0"/>
-              <a:t>collectionId</a:t>
-            </a:r>
-            <a:r>
-              <a:rPr lang="ca-ES" dirty="0" smtClean="0"/>
-              <a:t>}/</a:t>
-            </a:r>
-            <a:r>
-              <a:rPr lang="ca-ES" dirty="0" err="1" smtClean="0"/>
-              <a:t>changesets</a:t>
-            </a:r>
-            <a:r>
-              <a:rPr lang="ca-ES" dirty="0" smtClean="0"/>
-              <a:t>/{</a:t>
-            </a:r>
-            <a:r>
-              <a:rPr lang="ca-ES" dirty="0" err="1" smtClean="0"/>
-              <a:t>checkpointId</a:t>
-            </a:r>
-            <a:r>
-              <a:rPr lang="ca-ES" dirty="0" smtClean="0"/>
-              <a:t>}/</a:t>
-            </a:r>
-            <a:r>
-              <a:rPr lang="ca-ES" dirty="0" err="1" smtClean="0"/>
-              <a:t>tiles</a:t>
-            </a:r>
-            <a:endParaRPr lang="ca-ES" dirty="0" smtClean="0"/>
-          </a:p>
-          <a:p>
-            <a:r>
-              <a:rPr lang="ca-ES" dirty="0" smtClean="0"/>
-              <a:t>/</a:t>
-            </a:r>
-            <a:r>
-              <a:rPr lang="ca-ES" dirty="0" err="1" smtClean="0"/>
-              <a:t>collections</a:t>
-            </a:r>
-            <a:r>
-              <a:rPr lang="ca-ES" dirty="0" smtClean="0"/>
-              <a:t>/{</a:t>
-            </a:r>
-            <a:r>
-              <a:rPr lang="ca-ES" dirty="0" err="1" smtClean="0"/>
-              <a:t>collectionId</a:t>
-            </a:r>
-            <a:r>
-              <a:rPr lang="ca-ES" dirty="0" smtClean="0"/>
-              <a:t>}/</a:t>
-            </a:r>
-            <a:r>
-              <a:rPr lang="ca-ES" dirty="0" err="1" smtClean="0"/>
-              <a:t>map</a:t>
-            </a:r>
-            <a:r>
-              <a:rPr lang="ca-ES" dirty="0" smtClean="0"/>
-              <a:t>/{</a:t>
-            </a:r>
-            <a:r>
-              <a:rPr lang="ca-ES" dirty="0" err="1" smtClean="0"/>
-              <a:t>styleId</a:t>
-            </a:r>
-            <a:r>
-              <a:rPr lang="ca-ES" dirty="0" smtClean="0"/>
-              <a:t>}/</a:t>
-            </a:r>
-            <a:r>
-              <a:rPr lang="ca-ES" dirty="0" err="1" smtClean="0"/>
-              <a:t>tiles</a:t>
-            </a:r>
-            <a:r>
-              <a:rPr lang="ca-ES" dirty="0" smtClean="0"/>
-              <a:t>/{</a:t>
-            </a:r>
-            <a:r>
-              <a:rPr lang="ca-ES" dirty="0" err="1" smtClean="0"/>
-              <a:t>tileMatrixSetId</a:t>
-            </a:r>
-            <a:r>
-              <a:rPr lang="ca-ES" dirty="0" smtClean="0"/>
-              <a:t>}? </a:t>
-            </a:r>
-            <a:r>
-              <a:rPr lang="ca-ES" dirty="0" err="1" smtClean="0"/>
-              <a:t>checkPoint</a:t>
-            </a:r>
-            <a:r>
-              <a:rPr lang="ca-ES" dirty="0" smtClean="0"/>
-              <a:t>={</a:t>
-            </a:r>
-            <a:r>
-              <a:rPr lang="ca-ES" dirty="0" err="1" smtClean="0"/>
-              <a:t>checkPointId</a:t>
-            </a:r>
-            <a:r>
-              <a:rPr lang="ca-ES" dirty="0" smtClean="0"/>
-              <a:t>}</a:t>
-            </a:r>
-            <a:endParaRPr lang="ca-ES" dirty="0"/>
           </a:p>
         </p:txBody>
       </p:sp>
@@ -7444,6 +7070,709 @@
 </file>
 
 <file path=ppt/slides/slide12.xml><?xml version="1.0" encoding="utf-8"?>
+<p:sld xmlns:a="http://schemas.openxmlformats.org/drawingml/2006/main" xmlns:r="http://schemas.openxmlformats.org/officeDocument/2006/relationships" xmlns:p="http://schemas.openxmlformats.org/presentationml/2006/main">
+  <p:cSld>
+    <p:spTree>
+      <p:nvGrpSpPr>
+        <p:cNvPr id="1" name=""/>
+        <p:cNvGrpSpPr/>
+        <p:nvPr/>
+      </p:nvGrpSpPr>
+      <p:grpSpPr>
+        <a:xfrm>
+          <a:off x="0" y="0"/>
+          <a:ext cx="0" cy="0"/>
+          <a:chOff x="0" y="0"/>
+          <a:chExt cx="0" cy="0"/>
+        </a:xfrm>
+      </p:grpSpPr>
+      <p:sp>
+        <p:nvSpPr>
+          <p:cNvPr id="2" name="1 Título"/>
+          <p:cNvSpPr>
+            <a:spLocks noGrp="1"/>
+          </p:cNvSpPr>
+          <p:nvPr>
+            <p:ph type="title"/>
+          </p:nvPr>
+        </p:nvSpPr>
+        <p:spPr/>
+        <p:txBody>
+          <a:bodyPr>
+            <a:normAutofit fontScale="90000"/>
+          </a:bodyPr>
+          <a:lstStyle/>
+          <a:p>
+            <a:r>
+              <a:rPr lang="en-US" noProof="0" dirty="0" smtClean="0"/>
+              <a:t>Division of the work in two deliverables</a:t>
+            </a:r>
+            <a:endParaRPr lang="en-US" noProof="0" dirty="0"/>
+          </a:p>
+        </p:txBody>
+      </p:sp>
+      <p:sp>
+        <p:nvSpPr>
+          <p:cNvPr id="7" name="6 Marcador de contenido"/>
+          <p:cNvSpPr>
+            <a:spLocks noGrp="1"/>
+          </p:cNvSpPr>
+          <p:nvPr>
+            <p:ph sz="half" idx="1"/>
+          </p:nvPr>
+        </p:nvSpPr>
+        <p:spPr/>
+        <p:txBody>
+          <a:bodyPr>
+            <a:normAutofit fontScale="92500" lnSpcReduction="10000"/>
+          </a:bodyPr>
+          <a:lstStyle/>
+          <a:p>
+            <a:r>
+              <a:rPr lang="en-US" noProof="0" dirty="0" smtClean="0"/>
+              <a:t>Tiles</a:t>
+            </a:r>
+          </a:p>
+          <a:p>
+            <a:pPr lvl="1"/>
+            <a:r>
+              <a:rPr lang="en-US" noProof="0" dirty="0" smtClean="0"/>
+              <a:t>Core</a:t>
+            </a:r>
+          </a:p>
+          <a:p>
+            <a:pPr lvl="1"/>
+            <a:r>
+              <a:rPr lang="en-US" noProof="0" dirty="0" smtClean="0"/>
+              <a:t>TMS</a:t>
+            </a:r>
+          </a:p>
+          <a:p>
+            <a:pPr lvl="1"/>
+            <a:r>
+              <a:rPr lang="en-US" noProof="0" dirty="0" smtClean="0"/>
+              <a:t>Collections</a:t>
+            </a:r>
+          </a:p>
+          <a:p>
+            <a:pPr lvl="1"/>
+            <a:r>
+              <a:rPr lang="en-US" noProof="0" dirty="0" err="1" smtClean="0"/>
+              <a:t>Multitiles</a:t>
+            </a:r>
+            <a:endParaRPr lang="en-US" noProof="0" dirty="0" smtClean="0"/>
+          </a:p>
+          <a:p>
+            <a:pPr lvl="1"/>
+            <a:r>
+              <a:rPr lang="en-US" noProof="0" dirty="0" smtClean="0"/>
+              <a:t>Collections </a:t>
+            </a:r>
+            <a:r>
+              <a:rPr lang="en-US" noProof="0" dirty="0" err="1" smtClean="0"/>
+              <a:t>multitiles</a:t>
+            </a:r>
+            <a:endParaRPr lang="en-US" noProof="0" dirty="0" smtClean="0"/>
+          </a:p>
+          <a:p>
+            <a:r>
+              <a:rPr lang="en-US" noProof="0" dirty="0" smtClean="0"/>
+              <a:t>Maps</a:t>
+            </a:r>
+          </a:p>
+          <a:p>
+            <a:pPr lvl="1"/>
+            <a:r>
+              <a:rPr lang="en-US" noProof="0" dirty="0" smtClean="0"/>
+              <a:t>Core</a:t>
+            </a:r>
+          </a:p>
+          <a:p>
+            <a:pPr lvl="1"/>
+            <a:r>
+              <a:rPr lang="en-US" noProof="0" dirty="0" smtClean="0"/>
+              <a:t>Styles</a:t>
+            </a:r>
+          </a:p>
+          <a:p>
+            <a:pPr lvl="1"/>
+            <a:r>
+              <a:rPr lang="en-US" noProof="0" dirty="0" smtClean="0"/>
+              <a:t>Maps</a:t>
+            </a:r>
+          </a:p>
+          <a:p>
+            <a:pPr lvl="1"/>
+            <a:r>
+              <a:rPr lang="en-US" noProof="0" dirty="0" smtClean="0"/>
+              <a:t>Collections</a:t>
+            </a:r>
+          </a:p>
+          <a:p>
+            <a:pPr lvl="1"/>
+            <a:endParaRPr lang="en-US" noProof="0" dirty="0"/>
+          </a:p>
+        </p:txBody>
+      </p:sp>
+      <p:sp>
+        <p:nvSpPr>
+          <p:cNvPr id="8" name="7 Marcador de contenido"/>
+          <p:cNvSpPr>
+            <a:spLocks noGrp="1"/>
+          </p:cNvSpPr>
+          <p:nvPr>
+            <p:ph sz="half" idx="2"/>
+          </p:nvPr>
+        </p:nvSpPr>
+        <p:spPr/>
+        <p:txBody>
+          <a:bodyPr>
+            <a:normAutofit fontScale="92500" lnSpcReduction="10000"/>
+          </a:bodyPr>
+          <a:lstStyle/>
+          <a:p>
+            <a:r>
+              <a:rPr lang="en-US" noProof="0" dirty="0" smtClean="0"/>
+              <a:t>Image API</a:t>
+            </a:r>
+          </a:p>
+          <a:p>
+            <a:r>
+              <a:rPr lang="en-US" noProof="0" dirty="0" smtClean="0"/>
+              <a:t>Checkpoint</a:t>
+            </a:r>
+          </a:p>
+          <a:p>
+            <a:pPr lvl="1"/>
+            <a:r>
+              <a:rPr lang="en-US" noProof="0" dirty="0" smtClean="0"/>
+              <a:t>Core</a:t>
+            </a:r>
+          </a:p>
+          <a:p>
+            <a:pPr lvl="1"/>
+            <a:r>
+              <a:rPr lang="en-US" noProof="0" dirty="0" smtClean="0"/>
+              <a:t>Tiles</a:t>
+            </a:r>
+            <a:endParaRPr lang="en-US" noProof="0" dirty="0"/>
+          </a:p>
+        </p:txBody>
+      </p:sp>
+    </p:spTree>
+  </p:cSld>
+  <p:clrMapOvr>
+    <a:masterClrMapping/>
+  </p:clrMapOvr>
+</p:sld>
+</file>
+
+<file path=ppt/slides/slide13.xml><?xml version="1.0" encoding="utf-8"?>
+<p:sld xmlns:a="http://schemas.openxmlformats.org/drawingml/2006/main" xmlns:r="http://schemas.openxmlformats.org/officeDocument/2006/relationships" xmlns:p="http://schemas.openxmlformats.org/presentationml/2006/main">
+  <p:cSld>
+    <p:spTree>
+      <p:nvGrpSpPr>
+        <p:cNvPr id="1" name=""/>
+        <p:cNvGrpSpPr/>
+        <p:nvPr/>
+      </p:nvGrpSpPr>
+      <p:grpSpPr>
+        <a:xfrm>
+          <a:off x="0" y="0"/>
+          <a:ext cx="0" cy="0"/>
+          <a:chOff x="0" y="0"/>
+          <a:chExt cx="0" cy="0"/>
+        </a:xfrm>
+      </p:grpSpPr>
+      <p:sp>
+        <p:nvSpPr>
+          <p:cNvPr id="2" name="1 Título"/>
+          <p:cNvSpPr>
+            <a:spLocks noGrp="1"/>
+          </p:cNvSpPr>
+          <p:nvPr>
+            <p:ph type="title"/>
+          </p:nvPr>
+        </p:nvSpPr>
+        <p:spPr/>
+        <p:txBody>
+          <a:bodyPr/>
+          <a:lstStyle/>
+          <a:p>
+            <a:r>
+              <a:rPr lang="ca-ES" dirty="0" err="1" smtClean="0"/>
+              <a:t>Checkpoint</a:t>
+            </a:r>
+            <a:endParaRPr lang="ca-ES" dirty="0"/>
+          </a:p>
+        </p:txBody>
+      </p:sp>
+      <p:sp>
+        <p:nvSpPr>
+          <p:cNvPr id="3" name="2 Marcador de texto"/>
+          <p:cNvSpPr>
+            <a:spLocks noGrp="1"/>
+          </p:cNvSpPr>
+          <p:nvPr>
+            <p:ph type="body" idx="1"/>
+          </p:nvPr>
+        </p:nvSpPr>
+        <p:spPr/>
+        <p:txBody>
+          <a:bodyPr/>
+          <a:lstStyle/>
+          <a:p>
+            <a:r>
+              <a:rPr lang="ca-ES" dirty="0" err="1" smtClean="0"/>
+              <a:t>Features</a:t>
+            </a:r>
+            <a:endParaRPr lang="ca-ES" dirty="0"/>
+          </a:p>
+        </p:txBody>
+      </p:sp>
+      <p:sp>
+        <p:nvSpPr>
+          <p:cNvPr id="4" name="3 Marcador de contenido"/>
+          <p:cNvSpPr>
+            <a:spLocks noGrp="1"/>
+          </p:cNvSpPr>
+          <p:nvPr>
+            <p:ph sz="half" idx="2"/>
+          </p:nvPr>
+        </p:nvSpPr>
+        <p:spPr>
+          <a:xfrm>
+            <a:off x="457200" y="2174875"/>
+            <a:ext cx="8291264" cy="3951288"/>
+          </a:xfrm>
+        </p:spPr>
+        <p:txBody>
+          <a:bodyPr/>
+          <a:lstStyle/>
+          <a:p>
+            <a:r>
+              <a:rPr lang="ca-ES" dirty="0" smtClean="0"/>
+              <a:t>/</a:t>
+            </a:r>
+            <a:r>
+              <a:rPr lang="ca-ES" dirty="0" err="1" smtClean="0"/>
+              <a:t>collections</a:t>
+            </a:r>
+            <a:r>
+              <a:rPr lang="ca-ES" dirty="0" smtClean="0"/>
+              <a:t>/{</a:t>
+            </a:r>
+            <a:r>
+              <a:rPr lang="ca-ES" dirty="0" err="1" smtClean="0"/>
+              <a:t>collectionId</a:t>
+            </a:r>
+            <a:r>
+              <a:rPr lang="ca-ES" dirty="0" smtClean="0"/>
+              <a:t>}/</a:t>
+            </a:r>
+            <a:r>
+              <a:rPr lang="ca-ES" dirty="0" err="1" smtClean="0"/>
+              <a:t>changesets</a:t>
+            </a:r>
+            <a:r>
+              <a:rPr lang="ca-ES" dirty="0" smtClean="0"/>
+              <a:t>/{</a:t>
+            </a:r>
+            <a:r>
+              <a:rPr lang="ca-ES" dirty="0" err="1" smtClean="0"/>
+              <a:t>checkpointId</a:t>
+            </a:r>
+            <a:r>
+              <a:rPr lang="ca-ES" dirty="0" smtClean="0"/>
+              <a:t>}</a:t>
+            </a:r>
+          </a:p>
+          <a:p>
+            <a:r>
+              <a:rPr lang="ca-ES" dirty="0" smtClean="0"/>
+              <a:t>/</a:t>
+            </a:r>
+            <a:r>
+              <a:rPr lang="ca-ES" dirty="0" err="1" smtClean="0"/>
+              <a:t>collections</a:t>
+            </a:r>
+            <a:r>
+              <a:rPr lang="ca-ES" dirty="0" smtClean="0"/>
+              <a:t>/{</a:t>
+            </a:r>
+            <a:r>
+              <a:rPr lang="ca-ES" dirty="0" err="1" smtClean="0"/>
+              <a:t>collectionId</a:t>
+            </a:r>
+            <a:r>
+              <a:rPr lang="ca-ES" dirty="0" smtClean="0"/>
+              <a:t>}/</a:t>
+            </a:r>
+            <a:r>
+              <a:rPr lang="ca-ES" dirty="0" err="1" smtClean="0"/>
+              <a:t>changesets</a:t>
+            </a:r>
+            <a:r>
+              <a:rPr lang="ca-ES" dirty="0" smtClean="0"/>
+              <a:t>/{</a:t>
+            </a:r>
+            <a:r>
+              <a:rPr lang="ca-ES" dirty="0" err="1" smtClean="0"/>
+              <a:t>checkpointId</a:t>
+            </a:r>
+            <a:r>
+              <a:rPr lang="ca-ES" dirty="0" smtClean="0"/>
+              <a:t>}/</a:t>
+            </a:r>
+            <a:r>
+              <a:rPr lang="ca-ES" dirty="0" err="1" smtClean="0"/>
+              <a:t>features</a:t>
+            </a:r>
+            <a:endParaRPr lang="ca-ES" dirty="0" smtClean="0"/>
+          </a:p>
+          <a:p>
+            <a:r>
+              <a:rPr lang="ca-ES" dirty="0" smtClean="0"/>
+              <a:t>/</a:t>
+            </a:r>
+            <a:r>
+              <a:rPr lang="ca-ES" dirty="0" err="1" smtClean="0"/>
+              <a:t>collections</a:t>
+            </a:r>
+            <a:r>
+              <a:rPr lang="ca-ES" dirty="0" smtClean="0"/>
+              <a:t>/{</a:t>
+            </a:r>
+            <a:r>
+              <a:rPr lang="ca-ES" dirty="0" err="1" smtClean="0"/>
+              <a:t>collectionId</a:t>
+            </a:r>
+            <a:r>
+              <a:rPr lang="ca-ES" dirty="0" smtClean="0"/>
+              <a:t>}/</a:t>
+            </a:r>
+            <a:r>
+              <a:rPr lang="ca-ES" dirty="0" err="1" smtClean="0"/>
+              <a:t>items</a:t>
+            </a:r>
+            <a:r>
+              <a:rPr lang="ca-ES" dirty="0" smtClean="0"/>
+              <a:t>?</a:t>
+            </a:r>
+            <a:r>
+              <a:rPr lang="ca-ES" dirty="0" err="1" smtClean="0"/>
+              <a:t>checkPoint</a:t>
+            </a:r>
+            <a:r>
+              <a:rPr lang="ca-ES" dirty="0" smtClean="0"/>
+              <a:t>={</a:t>
+            </a:r>
+            <a:r>
+              <a:rPr lang="ca-ES" dirty="0" err="1" smtClean="0"/>
+              <a:t>checkPointId</a:t>
+            </a:r>
+            <a:r>
+              <a:rPr lang="ca-ES" dirty="0" smtClean="0"/>
+              <a:t>}</a:t>
+            </a:r>
+          </a:p>
+          <a:p>
+            <a:r>
+              <a:rPr lang="ca-ES" strike="sngStrike" dirty="0" smtClean="0">
+                <a:solidFill>
+                  <a:schemeClr val="bg1">
+                    <a:lumMod val="50000"/>
+                  </a:schemeClr>
+                </a:solidFill>
+              </a:rPr>
+              <a:t>/</a:t>
+            </a:r>
+            <a:r>
+              <a:rPr lang="ca-ES" strike="sngStrike" dirty="0" err="1" smtClean="0">
+                <a:solidFill>
+                  <a:schemeClr val="bg1">
+                    <a:lumMod val="50000"/>
+                  </a:schemeClr>
+                </a:solidFill>
+              </a:rPr>
+              <a:t>collections</a:t>
+            </a:r>
+            <a:r>
+              <a:rPr lang="ca-ES" strike="sngStrike" dirty="0" smtClean="0">
+                <a:solidFill>
+                  <a:schemeClr val="bg1">
+                    <a:lumMod val="50000"/>
+                  </a:schemeClr>
+                </a:solidFill>
+              </a:rPr>
+              <a:t>/{</a:t>
+            </a:r>
+            <a:r>
+              <a:rPr lang="ca-ES" strike="sngStrike" dirty="0" err="1" smtClean="0">
+                <a:solidFill>
+                  <a:schemeClr val="bg1">
+                    <a:lumMod val="50000"/>
+                  </a:schemeClr>
+                </a:solidFill>
+              </a:rPr>
+              <a:t>collectionId</a:t>
+            </a:r>
+            <a:r>
+              <a:rPr lang="ca-ES" strike="sngStrike" dirty="0" smtClean="0">
+                <a:solidFill>
+                  <a:schemeClr val="bg1">
+                    <a:lumMod val="50000"/>
+                  </a:schemeClr>
+                </a:solidFill>
+              </a:rPr>
+              <a:t>}/</a:t>
+            </a:r>
+            <a:r>
+              <a:rPr lang="ca-ES" strike="sngStrike" dirty="0" err="1" smtClean="0">
+                <a:solidFill>
+                  <a:schemeClr val="bg1">
+                    <a:lumMod val="50000"/>
+                  </a:schemeClr>
+                </a:solidFill>
+              </a:rPr>
+              <a:t>items</a:t>
+            </a:r>
+            <a:r>
+              <a:rPr lang="ca-ES" strike="sngStrike" dirty="0" smtClean="0">
+                <a:solidFill>
+                  <a:schemeClr val="bg1">
+                    <a:lumMod val="50000"/>
+                  </a:schemeClr>
+                </a:solidFill>
+              </a:rPr>
+              <a:t>/</a:t>
+            </a:r>
+            <a:r>
+              <a:rPr lang="ca-ES" strike="sngStrike" dirty="0" err="1" smtClean="0">
+                <a:solidFill>
+                  <a:schemeClr val="bg1">
+                    <a:lumMod val="50000"/>
+                  </a:schemeClr>
+                </a:solidFill>
+              </a:rPr>
+              <a:t>checkPoint</a:t>
+            </a:r>
+            <a:r>
+              <a:rPr lang="ca-ES" strike="sngStrike" dirty="0" smtClean="0">
+                <a:solidFill>
+                  <a:schemeClr val="bg1">
+                    <a:lumMod val="50000"/>
+                  </a:schemeClr>
+                </a:solidFill>
+              </a:rPr>
+              <a:t>/{</a:t>
+            </a:r>
+            <a:r>
+              <a:rPr lang="ca-ES" strike="sngStrike" dirty="0" err="1" smtClean="0">
+                <a:solidFill>
+                  <a:schemeClr val="bg1">
+                    <a:lumMod val="50000"/>
+                  </a:schemeClr>
+                </a:solidFill>
+              </a:rPr>
+              <a:t>checkPointId</a:t>
+            </a:r>
+            <a:r>
+              <a:rPr lang="ca-ES" strike="sngStrike" dirty="0" smtClean="0">
+                <a:solidFill>
+                  <a:schemeClr val="bg1">
+                    <a:lumMod val="50000"/>
+                  </a:schemeClr>
+                </a:solidFill>
+              </a:rPr>
+              <a:t>}</a:t>
+            </a:r>
+          </a:p>
+          <a:p>
+            <a:endParaRPr lang="ca-ES" dirty="0"/>
+          </a:p>
+        </p:txBody>
+      </p:sp>
+      <p:sp>
+        <p:nvSpPr>
+          <p:cNvPr id="5" name="4 Marcador de texto"/>
+          <p:cNvSpPr>
+            <a:spLocks noGrp="1"/>
+          </p:cNvSpPr>
+          <p:nvPr>
+            <p:ph type="body" sz="quarter" idx="3"/>
+          </p:nvPr>
+        </p:nvSpPr>
+        <p:spPr>
+          <a:xfrm>
+            <a:off x="395536" y="3717032"/>
+            <a:ext cx="4041775" cy="639762"/>
+          </a:xfrm>
+        </p:spPr>
+        <p:txBody>
+          <a:bodyPr/>
+          <a:lstStyle/>
+          <a:p>
+            <a:r>
+              <a:rPr lang="ca-ES" dirty="0" err="1" smtClean="0"/>
+              <a:t>Tiles</a:t>
+            </a:r>
+            <a:endParaRPr lang="ca-ES" dirty="0"/>
+          </a:p>
+        </p:txBody>
+      </p:sp>
+      <p:sp>
+        <p:nvSpPr>
+          <p:cNvPr id="6" name="5 Marcador de contenido"/>
+          <p:cNvSpPr>
+            <a:spLocks noGrp="1"/>
+          </p:cNvSpPr>
+          <p:nvPr>
+            <p:ph sz="quarter" idx="4"/>
+          </p:nvPr>
+        </p:nvSpPr>
+        <p:spPr>
+          <a:xfrm>
+            <a:off x="467543" y="4437111"/>
+            <a:ext cx="8219257" cy="1689051"/>
+          </a:xfrm>
+        </p:spPr>
+        <p:txBody>
+          <a:bodyPr>
+            <a:normAutofit lnSpcReduction="10000"/>
+          </a:bodyPr>
+          <a:lstStyle/>
+          <a:p>
+            <a:r>
+              <a:rPr lang="ca-ES" dirty="0" smtClean="0"/>
+              <a:t>??</a:t>
+            </a:r>
+          </a:p>
+          <a:p>
+            <a:r>
+              <a:rPr lang="ca-ES" dirty="0" smtClean="0"/>
+              <a:t>/</a:t>
+            </a:r>
+            <a:r>
+              <a:rPr lang="ca-ES" dirty="0" err="1" smtClean="0"/>
+              <a:t>collections</a:t>
+            </a:r>
+            <a:r>
+              <a:rPr lang="ca-ES" dirty="0" smtClean="0"/>
+              <a:t>/{</a:t>
+            </a:r>
+            <a:r>
+              <a:rPr lang="ca-ES" dirty="0" err="1" smtClean="0"/>
+              <a:t>collectionId</a:t>
+            </a:r>
+            <a:r>
+              <a:rPr lang="ca-ES" dirty="0" smtClean="0"/>
+              <a:t>}/</a:t>
+            </a:r>
+            <a:r>
+              <a:rPr lang="ca-ES" dirty="0" err="1" smtClean="0"/>
+              <a:t>changesets</a:t>
+            </a:r>
+            <a:r>
+              <a:rPr lang="ca-ES" dirty="0" smtClean="0"/>
+              <a:t>/{</a:t>
+            </a:r>
+            <a:r>
+              <a:rPr lang="ca-ES" dirty="0" err="1" smtClean="0"/>
+              <a:t>checkpointId</a:t>
+            </a:r>
+            <a:r>
+              <a:rPr lang="ca-ES" dirty="0" smtClean="0"/>
+              <a:t>}/</a:t>
+            </a:r>
+            <a:r>
+              <a:rPr lang="ca-ES" dirty="0" err="1" smtClean="0"/>
+              <a:t>tiles</a:t>
+            </a:r>
+            <a:endParaRPr lang="ca-ES" dirty="0" smtClean="0"/>
+          </a:p>
+          <a:p>
+            <a:r>
+              <a:rPr lang="ca-ES" dirty="0" smtClean="0"/>
+              <a:t>/</a:t>
+            </a:r>
+            <a:r>
+              <a:rPr lang="ca-ES" dirty="0" err="1" smtClean="0"/>
+              <a:t>collections</a:t>
+            </a:r>
+            <a:r>
+              <a:rPr lang="ca-ES" dirty="0" smtClean="0"/>
+              <a:t>/{</a:t>
+            </a:r>
+            <a:r>
+              <a:rPr lang="ca-ES" dirty="0" err="1" smtClean="0"/>
+              <a:t>collectionId</a:t>
+            </a:r>
+            <a:r>
+              <a:rPr lang="ca-ES" dirty="0" smtClean="0"/>
+              <a:t>}/</a:t>
+            </a:r>
+            <a:r>
+              <a:rPr lang="ca-ES" dirty="0" err="1" smtClean="0"/>
+              <a:t>map</a:t>
+            </a:r>
+            <a:r>
+              <a:rPr lang="ca-ES" dirty="0" smtClean="0"/>
+              <a:t>/{</a:t>
+            </a:r>
+            <a:r>
+              <a:rPr lang="ca-ES" dirty="0" err="1" smtClean="0"/>
+              <a:t>styleId</a:t>
+            </a:r>
+            <a:r>
+              <a:rPr lang="ca-ES" dirty="0" smtClean="0"/>
+              <a:t>}/</a:t>
+            </a:r>
+            <a:r>
+              <a:rPr lang="ca-ES" dirty="0" err="1" smtClean="0"/>
+              <a:t>tiles</a:t>
+            </a:r>
+            <a:r>
+              <a:rPr lang="ca-ES" dirty="0" smtClean="0"/>
+              <a:t>/{</a:t>
+            </a:r>
+            <a:r>
+              <a:rPr lang="ca-ES" dirty="0" err="1" smtClean="0"/>
+              <a:t>tileMatrixSetId</a:t>
+            </a:r>
+            <a:r>
+              <a:rPr lang="ca-ES" dirty="0" smtClean="0"/>
+              <a:t>}? </a:t>
+            </a:r>
+            <a:r>
+              <a:rPr lang="ca-ES" dirty="0" err="1" smtClean="0"/>
+              <a:t>checkPoint</a:t>
+            </a:r>
+            <a:r>
+              <a:rPr lang="ca-ES" dirty="0" smtClean="0"/>
+              <a:t>={</a:t>
+            </a:r>
+            <a:r>
+              <a:rPr lang="ca-ES" dirty="0" err="1" smtClean="0"/>
+              <a:t>checkPointId</a:t>
+            </a:r>
+            <a:r>
+              <a:rPr lang="ca-ES" dirty="0" smtClean="0"/>
+              <a:t>}</a:t>
+            </a:r>
+            <a:endParaRPr lang="ca-ES" dirty="0"/>
+          </a:p>
+        </p:txBody>
+      </p:sp>
+    </p:spTree>
+  </p:cSld>
+  <p:clrMapOvr>
+    <a:masterClrMapping/>
+  </p:clrMapOvr>
+</p:sld>
+</file>
+
+<file path=ppt/slides/slide14.xml><?xml version="1.0" encoding="utf-8"?>
 <p:sld xmlns:a="http://schemas.openxmlformats.org/drawingml/2006/main" xmlns:r="http://schemas.openxmlformats.org/officeDocument/2006/relationships" xmlns:p="http://schemas.openxmlformats.org/presentationml/2006/main">
   <p:cSld>
     <p:spTree>
@@ -7540,7 +7869,7 @@
 </p:sld>
 </file>
 
-<file path=ppt/slides/slide13.xml><?xml version="1.0" encoding="utf-8"?>
+<file path=ppt/slides/slide15.xml><?xml version="1.0" encoding="utf-8"?>
 <p:sld xmlns:a="http://schemas.openxmlformats.org/drawingml/2006/main" xmlns:r="http://schemas.openxmlformats.org/officeDocument/2006/relationships" xmlns:p="http://schemas.openxmlformats.org/presentationml/2006/main">
   <p:cSld>
     <p:spTree>
@@ -7639,7 +7968,7 @@
 </p:sld>
 </file>
 
-<file path=ppt/slides/slide14.xml><?xml version="1.0" encoding="utf-8"?>
+<file path=ppt/slides/slide16.xml><?xml version="1.0" encoding="utf-8"?>
 <p:sld xmlns:a="http://schemas.openxmlformats.org/drawingml/2006/main" xmlns:r="http://schemas.openxmlformats.org/officeDocument/2006/relationships" xmlns:p="http://schemas.openxmlformats.org/presentationml/2006/main">
   <p:cSld>
     <p:spTree>
@@ -8424,7 +8753,6 @@
               <a:rPr lang="en-US" dirty="0" smtClean="0"/>
               <a:t>Tiles Checkpoint</a:t>
             </a:r>
-            <a:endParaRPr lang="en-US" dirty="0" smtClean="0"/>
           </a:p>
         </p:txBody>
       </p:sp>

</xml_diff>

<commit_message>
Added link for collections to every collection
</commit_message>
<xml_diff>
--- a/standard/images/diagrams.pptx
+++ b/standard/images/diagrams.pptx
@@ -21,6 +21,12 @@
     <p:sldId id="257" r:id="rId15"/>
     <p:sldId id="258" r:id="rId16"/>
     <p:sldId id="259" r:id="rId17"/>
+    <p:sldId id="273" r:id="rId18"/>
+    <p:sldId id="272" r:id="rId19"/>
+    <p:sldId id="276" r:id="rId20"/>
+    <p:sldId id="275" r:id="rId21"/>
+    <p:sldId id="274" r:id="rId22"/>
+    <p:sldId id="277" r:id="rId23"/>
   </p:sldIdLst>
   <p:sldSz cx="9144000" cy="6858000" type="screen4x3"/>
   <p:notesSz cx="6858000" cy="9144000"/>
@@ -304,7 +310,7 @@
             <a:fld id="{7A847CFC-816F-41D0-AAC0-9BF4FEBC753E}" type="datetimeFigureOut">
               <a:rPr lang="es-ES" smtClean="0"/>
               <a:pPr/>
-              <a:t>16/08/2019</a:t>
+              <a:t>23/08/2019</a:t>
             </a:fld>
             <a:endParaRPr lang="es-ES"/>
           </a:p>
@@ -396,7 +402,7 @@
             <a:fld id="{7A847CFC-816F-41D0-AAC0-9BF4FEBC753E}" type="datetimeFigureOut">
               <a:rPr lang="es-ES" smtClean="0"/>
               <a:pPr/>
-              <a:t>16/08/2019</a:t>
+              <a:t>23/08/2019</a:t>
             </a:fld>
             <a:endParaRPr lang="es-ES"/>
           </a:p>
@@ -670,7 +676,7 @@
             <a:fld id="{7A847CFC-816F-41D0-AAC0-9BF4FEBC753E}" type="datetimeFigureOut">
               <a:rPr lang="es-ES" smtClean="0"/>
               <a:pPr/>
-              <a:t>16/08/2019</a:t>
+              <a:t>23/08/2019</a:t>
             </a:fld>
             <a:endParaRPr lang="es-ES"/>
           </a:p>
@@ -920,7 +926,7 @@
             <a:fld id="{7A847CFC-816F-41D0-AAC0-9BF4FEBC753E}" type="datetimeFigureOut">
               <a:rPr lang="es-ES" smtClean="0"/>
               <a:pPr/>
-              <a:t>16/08/2019</a:t>
+              <a:t>23/08/2019</a:t>
             </a:fld>
             <a:endParaRPr lang="es-ES"/>
           </a:p>
@@ -1087,7 +1093,7 @@
             <a:fld id="{7A847CFC-816F-41D0-AAC0-9BF4FEBC753E}" type="datetimeFigureOut">
               <a:rPr lang="es-ES" smtClean="0"/>
               <a:pPr/>
-              <a:t>16/08/2019</a:t>
+              <a:t>23/08/2019</a:t>
             </a:fld>
             <a:endParaRPr lang="es-ES"/>
           </a:p>
@@ -1264,7 +1270,7 @@
             <a:fld id="{7A847CFC-816F-41D0-AAC0-9BF4FEBC753E}" type="datetimeFigureOut">
               <a:rPr lang="es-ES" smtClean="0"/>
               <a:pPr/>
-              <a:t>16/08/2019</a:t>
+              <a:t>23/08/2019</a:t>
             </a:fld>
             <a:endParaRPr lang="es-ES"/>
           </a:p>
@@ -1431,7 +1437,7 @@
             <a:fld id="{7A847CFC-816F-41D0-AAC0-9BF4FEBC753E}" type="datetimeFigureOut">
               <a:rPr lang="es-ES" smtClean="0"/>
               <a:pPr/>
-              <a:t>16/08/2019</a:t>
+              <a:t>23/08/2019</a:t>
             </a:fld>
             <a:endParaRPr lang="es-ES"/>
           </a:p>
@@ -1674,7 +1680,7 @@
             <a:fld id="{7A847CFC-816F-41D0-AAC0-9BF4FEBC753E}" type="datetimeFigureOut">
               <a:rPr lang="es-ES" smtClean="0"/>
               <a:pPr/>
-              <a:t>16/08/2019</a:t>
+              <a:t>23/08/2019</a:t>
             </a:fld>
             <a:endParaRPr lang="es-ES"/>
           </a:p>
@@ -1959,7 +1965,7 @@
             <a:fld id="{7A847CFC-816F-41D0-AAC0-9BF4FEBC753E}" type="datetimeFigureOut">
               <a:rPr lang="es-ES" smtClean="0"/>
               <a:pPr/>
-              <a:t>16/08/2019</a:t>
+              <a:t>23/08/2019</a:t>
             </a:fld>
             <a:endParaRPr lang="es-ES"/>
           </a:p>
@@ -2249,7 +2255,7 @@
             <a:fld id="{7A847CFC-816F-41D0-AAC0-9BF4FEBC753E}" type="datetimeFigureOut">
               <a:rPr lang="es-ES" smtClean="0"/>
               <a:pPr/>
-              <a:t>16/08/2019</a:t>
+              <a:t>23/08/2019</a:t>
             </a:fld>
             <a:endParaRPr lang="es-ES"/>
           </a:p>
@@ -2653,7 +2659,7 @@
             <a:fld id="{7A847CFC-816F-41D0-AAC0-9BF4FEBC753E}" type="datetimeFigureOut">
               <a:rPr lang="es-ES" smtClean="0"/>
               <a:pPr/>
-              <a:t>16/08/2019</a:t>
+              <a:t>23/08/2019</a:t>
             </a:fld>
             <a:endParaRPr lang="es-ES"/>
           </a:p>
@@ -3243,7 +3249,7 @@
             <a:fld id="{7A847CFC-816F-41D0-AAC0-9BF4FEBC753E}" type="datetimeFigureOut">
               <a:rPr lang="es-ES" smtClean="0"/>
               <a:pPr/>
-              <a:t>16/08/2019</a:t>
+              <a:t>23/08/2019</a:t>
             </a:fld>
             <a:endParaRPr lang="es-ES"/>
           </a:p>
@@ -4112,7 +4118,7 @@
             <a:fld id="{7A847CFC-816F-41D0-AAC0-9BF4FEBC753E}" type="datetimeFigureOut">
               <a:rPr lang="es-ES" smtClean="0"/>
               <a:pPr/>
-              <a:t>16/08/2019</a:t>
+              <a:t>23/08/2019</a:t>
             </a:fld>
             <a:endParaRPr lang="es-ES"/>
           </a:p>
@@ -4227,7 +4233,7 @@
             <a:fld id="{7A847CFC-816F-41D0-AAC0-9BF4FEBC753E}" type="datetimeFigureOut">
               <a:rPr lang="es-ES" smtClean="0"/>
               <a:pPr/>
-              <a:t>16/08/2019</a:t>
+              <a:t>23/08/2019</a:t>
             </a:fld>
             <a:endParaRPr lang="es-ES"/>
           </a:p>
@@ -4437,7 +4443,7 @@
             <a:fld id="{7A847CFC-816F-41D0-AAC0-9BF4FEBC753E}" type="datetimeFigureOut">
               <a:rPr lang="es-ES" smtClean="0"/>
               <a:pPr/>
-              <a:t>16/08/2019</a:t>
+              <a:t>23/08/2019</a:t>
             </a:fld>
             <a:endParaRPr lang="es-ES"/>
           </a:p>
@@ -6668,7 +6674,6 @@
               <a:rPr lang="en-US" noProof="0" smtClean="0"/>
               <a:t>Any request for resources can communicate a checkpoint to the client.</a:t>
             </a:r>
-            <a:endParaRPr lang="en-US" noProof="0" smtClean="0"/>
           </a:p>
         </p:txBody>
       </p:sp>
@@ -8061,6 +8066,928 @@
           </a:ln>
         </p:spPr>
       </p:pic>
+    </p:spTree>
+  </p:cSld>
+  <p:clrMapOvr>
+    <a:masterClrMapping/>
+  </p:clrMapOvr>
+</p:sld>
+</file>
+
+<file path=ppt/slides/slide17.xml><?xml version="1.0" encoding="utf-8"?>
+<p:sld xmlns:a="http://schemas.openxmlformats.org/drawingml/2006/main" xmlns:r="http://schemas.openxmlformats.org/officeDocument/2006/relationships" xmlns:p="http://schemas.openxmlformats.org/presentationml/2006/main">
+  <p:cSld>
+    <p:spTree>
+      <p:nvGrpSpPr>
+        <p:cNvPr id="1" name=""/>
+        <p:cNvGrpSpPr/>
+        <p:nvPr/>
+      </p:nvGrpSpPr>
+      <p:grpSpPr>
+        <a:xfrm>
+          <a:off x="0" y="0"/>
+          <a:ext cx="0" cy="0"/>
+          <a:chOff x="0" y="0"/>
+          <a:chExt cx="0" cy="0"/>
+        </a:xfrm>
+      </p:grpSpPr>
+      <p:sp>
+        <p:nvSpPr>
+          <p:cNvPr id="2" name="1 Título"/>
+          <p:cNvSpPr>
+            <a:spLocks noGrp="1"/>
+          </p:cNvSpPr>
+          <p:nvPr>
+            <p:ph type="title"/>
+          </p:nvPr>
+        </p:nvSpPr>
+        <p:spPr/>
+        <p:txBody>
+          <a:bodyPr/>
+          <a:lstStyle/>
+          <a:p>
+            <a:r>
+              <a:rPr lang="ca-ES" dirty="0" err="1" smtClean="0"/>
+              <a:t>Map</a:t>
+            </a:r>
+            <a:r>
+              <a:rPr lang="ca-ES" dirty="0" smtClean="0"/>
+              <a:t> and </a:t>
+            </a:r>
+            <a:r>
+              <a:rPr lang="ca-ES" dirty="0" err="1" smtClean="0"/>
+              <a:t>tiles</a:t>
+            </a:r>
+            <a:r>
+              <a:rPr lang="ca-ES" dirty="0" smtClean="0"/>
+              <a:t> API</a:t>
+            </a:r>
+            <a:endParaRPr lang="ca-ES" dirty="0"/>
+          </a:p>
+        </p:txBody>
+      </p:sp>
+      <p:sp>
+        <p:nvSpPr>
+          <p:cNvPr id="3" name="2 Marcador de contenido"/>
+          <p:cNvSpPr>
+            <a:spLocks noGrp="1"/>
+          </p:cNvSpPr>
+          <p:nvPr>
+            <p:ph idx="1"/>
+          </p:nvPr>
+        </p:nvSpPr>
+        <p:spPr/>
+        <p:txBody>
+          <a:bodyPr/>
+          <a:lstStyle/>
+          <a:p>
+            <a:r>
+              <a:rPr lang="ca-ES" dirty="0" smtClean="0">
+                <a:hlinkClick r:id="rId2"/>
+              </a:rPr>
+              <a:t>https://htmlpreview.github.io/?https://</a:t>
+            </a:r>
+            <a:r>
+              <a:rPr lang="ca-ES" dirty="0" smtClean="0">
+                <a:hlinkClick r:id="rId2"/>
+              </a:rPr>
+              <a:t>github.com/opengeospatial/OGC-API-Map-Tiles/blob/master/standard/OAPI_MapsTiles.html</a:t>
+            </a:r>
+            <a:endParaRPr lang="ca-ES" dirty="0"/>
+          </a:p>
+        </p:txBody>
+      </p:sp>
+    </p:spTree>
+  </p:cSld>
+  <p:clrMapOvr>
+    <a:masterClrMapping/>
+  </p:clrMapOvr>
+</p:sld>
+</file>
+
+<file path=ppt/slides/slide18.xml><?xml version="1.0" encoding="utf-8"?>
+<p:sld xmlns:a="http://schemas.openxmlformats.org/drawingml/2006/main" xmlns:r="http://schemas.openxmlformats.org/officeDocument/2006/relationships" xmlns:p="http://schemas.openxmlformats.org/presentationml/2006/main">
+  <p:cSld>
+    <p:spTree>
+      <p:nvGrpSpPr>
+        <p:cNvPr id="1" name=""/>
+        <p:cNvGrpSpPr/>
+        <p:nvPr/>
+      </p:nvGrpSpPr>
+      <p:grpSpPr>
+        <a:xfrm>
+          <a:off x="0" y="0"/>
+          <a:ext cx="0" cy="0"/>
+          <a:chOff x="0" y="0"/>
+          <a:chExt cx="0" cy="0"/>
+        </a:xfrm>
+      </p:grpSpPr>
+      <p:sp>
+        <p:nvSpPr>
+          <p:cNvPr id="2" name="1 Título"/>
+          <p:cNvSpPr>
+            <a:spLocks noGrp="1"/>
+          </p:cNvSpPr>
+          <p:nvPr>
+            <p:ph type="title"/>
+          </p:nvPr>
+        </p:nvSpPr>
+        <p:spPr/>
+        <p:txBody>
+          <a:bodyPr/>
+          <a:lstStyle/>
+          <a:p>
+            <a:r>
+              <a:rPr lang="ca-ES" dirty="0" err="1" smtClean="0"/>
+              <a:t>Current</a:t>
+            </a:r>
+            <a:endParaRPr lang="ca-ES" dirty="0"/>
+          </a:p>
+        </p:txBody>
+      </p:sp>
+      <p:sp>
+        <p:nvSpPr>
+          <p:cNvPr id="3" name="2 Marcador de contenido"/>
+          <p:cNvSpPr>
+            <a:spLocks noGrp="1"/>
+          </p:cNvSpPr>
+          <p:nvPr>
+            <p:ph idx="1"/>
+          </p:nvPr>
+        </p:nvSpPr>
+        <p:spPr/>
+        <p:txBody>
+          <a:bodyPr>
+            <a:normAutofit fontScale="70000" lnSpcReduction="20000"/>
+          </a:bodyPr>
+          <a:lstStyle/>
+          <a:p>
+            <a:r>
+              <a:rPr lang="ca-ES" dirty="0" err="1" smtClean="0"/>
+              <a:t>Landing</a:t>
+            </a:r>
+            <a:r>
+              <a:rPr lang="ca-ES" dirty="0" smtClean="0"/>
+              <a:t> </a:t>
+            </a:r>
+            <a:r>
+              <a:rPr lang="ca-ES" dirty="0" err="1" smtClean="0"/>
+              <a:t>page</a:t>
+            </a:r>
+            <a:r>
+              <a:rPr lang="ca-ES" dirty="0" smtClean="0"/>
+              <a:t> </a:t>
+            </a:r>
+            <a:r>
+              <a:rPr lang="ca-ES" dirty="0" err="1" smtClean="0"/>
+              <a:t>links</a:t>
+            </a:r>
+            <a:r>
+              <a:rPr lang="ca-ES" dirty="0" smtClean="0"/>
+              <a:t> to:</a:t>
+            </a:r>
+          </a:p>
+          <a:p>
+            <a:pPr lvl="1"/>
+            <a:r>
+              <a:rPr lang="ca-ES" dirty="0" smtClean="0"/>
+              <a:t>/</a:t>
+            </a:r>
+            <a:r>
+              <a:rPr lang="ca-ES" dirty="0" err="1" smtClean="0"/>
+              <a:t>collections</a:t>
+            </a:r>
+            <a:endParaRPr lang="ca-ES" dirty="0" smtClean="0"/>
+          </a:p>
+          <a:p>
+            <a:pPr lvl="1"/>
+            <a:r>
+              <a:rPr lang="ca-ES" dirty="0" smtClean="0"/>
+              <a:t>/</a:t>
+            </a:r>
+            <a:r>
+              <a:rPr lang="ca-ES" dirty="0" err="1" smtClean="0"/>
+              <a:t>tileMatrixSets</a:t>
+            </a:r>
+            <a:endParaRPr lang="ca-ES" dirty="0" smtClean="0"/>
+          </a:p>
+          <a:p>
+            <a:r>
+              <a:rPr lang="ca-ES" dirty="0" smtClean="0"/>
+              <a:t>/</a:t>
+            </a:r>
+            <a:r>
+              <a:rPr lang="ca-ES" dirty="0" err="1" smtClean="0"/>
+              <a:t>tileMatrixSets</a:t>
+            </a:r>
+            <a:r>
+              <a:rPr lang="ca-ES" dirty="0" smtClean="0"/>
+              <a:t> </a:t>
+            </a:r>
+            <a:r>
+              <a:rPr lang="ca-ES" dirty="0" err="1" smtClean="0"/>
+              <a:t>links</a:t>
+            </a:r>
+            <a:r>
+              <a:rPr lang="ca-ES" dirty="0" smtClean="0"/>
+              <a:t> to</a:t>
+            </a:r>
+          </a:p>
+          <a:p>
+            <a:pPr lvl="1"/>
+            <a:r>
+              <a:rPr lang="ca-ES" dirty="0" smtClean="0"/>
+              <a:t>/</a:t>
+            </a:r>
+            <a:r>
+              <a:rPr lang="ca-ES" dirty="0" err="1" smtClean="0"/>
+              <a:t>tileMatrixSet</a:t>
+            </a:r>
+            <a:r>
+              <a:rPr lang="ca-ES" dirty="0" smtClean="0"/>
+              <a:t>/</a:t>
+            </a:r>
+            <a:r>
+              <a:rPr lang="ca-ES" dirty="0" err="1" smtClean="0"/>
+              <a:t>myTileMateixSets</a:t>
+            </a:r>
+            <a:r>
+              <a:rPr lang="ca-ES" dirty="0" smtClean="0"/>
+              <a:t>   (</a:t>
+            </a:r>
+            <a:r>
+              <a:rPr lang="ca-ES" dirty="0" err="1" smtClean="0"/>
+              <a:t>leaf</a:t>
+            </a:r>
+            <a:r>
+              <a:rPr lang="ca-ES" dirty="0" smtClean="0"/>
+              <a:t>).</a:t>
+            </a:r>
+            <a:r>
+              <a:rPr lang="ca-ES" dirty="0" smtClean="0"/>
+              <a:t>  </a:t>
+            </a:r>
+          </a:p>
+          <a:p>
+            <a:r>
+              <a:rPr lang="ca-ES" dirty="0" smtClean="0"/>
+              <a:t>/</a:t>
+            </a:r>
+            <a:r>
+              <a:rPr lang="ca-ES" dirty="0" err="1" smtClean="0"/>
+              <a:t>collections</a:t>
+            </a:r>
+            <a:r>
+              <a:rPr lang="ca-ES" dirty="0" smtClean="0"/>
+              <a:t> </a:t>
+            </a:r>
+            <a:r>
+              <a:rPr lang="ca-ES" dirty="0" err="1" smtClean="0"/>
+              <a:t>links</a:t>
+            </a:r>
+            <a:r>
+              <a:rPr lang="ca-ES" dirty="0" smtClean="0"/>
+              <a:t> to</a:t>
+            </a:r>
+            <a:r>
+              <a:rPr lang="ca-ES" dirty="0" smtClean="0"/>
+              <a:t>:</a:t>
+            </a:r>
+          </a:p>
+          <a:p>
+            <a:pPr lvl="1"/>
+            <a:r>
+              <a:rPr lang="ca-ES" dirty="0" smtClean="0"/>
+              <a:t>/</a:t>
+            </a:r>
+            <a:r>
+              <a:rPr lang="ca-ES" dirty="0" err="1" smtClean="0"/>
+              <a:t>collections</a:t>
+            </a:r>
+            <a:r>
+              <a:rPr lang="ca-ES" dirty="0" smtClean="0"/>
+              <a:t>/</a:t>
+            </a:r>
+            <a:r>
+              <a:rPr lang="ca-ES" dirty="0" err="1" smtClean="0"/>
+              <a:t>myCollectionsIds</a:t>
+            </a:r>
+            <a:r>
+              <a:rPr lang="ca-ES" dirty="0" smtClean="0"/>
+              <a:t>   (</a:t>
+            </a:r>
+            <a:r>
+              <a:rPr lang="ca-ES" dirty="0" err="1" smtClean="0"/>
+              <a:t>specific</a:t>
+            </a:r>
+            <a:r>
+              <a:rPr lang="ca-ES" dirty="0" smtClean="0"/>
+              <a:t> content in </a:t>
+            </a:r>
+            <a:r>
+              <a:rPr lang="ca-ES" dirty="0" err="1" smtClean="0"/>
+              <a:t>the</a:t>
+            </a:r>
+            <a:r>
+              <a:rPr lang="ca-ES" dirty="0" smtClean="0"/>
+              <a:t> </a:t>
+            </a:r>
+            <a:r>
+              <a:rPr lang="ca-ES" dirty="0" err="1" smtClean="0"/>
+              <a:t>response</a:t>
+            </a:r>
+            <a:r>
+              <a:rPr lang="ca-ES" dirty="0" smtClean="0"/>
+              <a:t> </a:t>
+            </a:r>
+            <a:r>
+              <a:rPr lang="ca-ES" dirty="0" err="1" smtClean="0"/>
+              <a:t>will</a:t>
+            </a:r>
+            <a:r>
+              <a:rPr lang="ca-ES" dirty="0" smtClean="0"/>
+              <a:t> be </a:t>
+            </a:r>
+            <a:r>
+              <a:rPr lang="ca-ES" dirty="0" err="1" smtClean="0"/>
+              <a:t>moved</a:t>
+            </a:r>
+            <a:r>
+              <a:rPr lang="ca-ES" dirty="0" smtClean="0"/>
+              <a:t> to /</a:t>
+            </a:r>
+            <a:r>
+              <a:rPr lang="ca-ES" dirty="0" err="1" smtClean="0"/>
+              <a:t>collections</a:t>
+            </a:r>
+            <a:r>
+              <a:rPr lang="ca-ES" dirty="0" smtClean="0"/>
+              <a:t>/{</a:t>
+            </a:r>
+            <a:r>
+              <a:rPr lang="ca-ES" dirty="0" err="1" smtClean="0"/>
+              <a:t>collectionId</a:t>
+            </a:r>
+            <a:r>
+              <a:rPr lang="ca-ES" dirty="0" smtClean="0"/>
+              <a:t>}/</a:t>
+            </a:r>
+            <a:r>
+              <a:rPr lang="ca-ES" dirty="0" err="1" smtClean="0"/>
+              <a:t>tiles</a:t>
+            </a:r>
+            <a:r>
+              <a:rPr lang="ca-ES" dirty="0" smtClean="0"/>
+              <a:t> and /</a:t>
+            </a:r>
+            <a:r>
+              <a:rPr lang="ca-ES" dirty="0" err="1" smtClean="0"/>
+              <a:t>collections</a:t>
+            </a:r>
+            <a:r>
+              <a:rPr lang="ca-ES" dirty="0" smtClean="0"/>
+              <a:t>/{</a:t>
+            </a:r>
+            <a:r>
+              <a:rPr lang="ca-ES" dirty="0" err="1" smtClean="0"/>
+              <a:t>collectionId</a:t>
+            </a:r>
+            <a:r>
+              <a:rPr lang="ca-ES" dirty="0" smtClean="0"/>
+              <a:t>}/</a:t>
+            </a:r>
+            <a:r>
+              <a:rPr lang="ca-ES" dirty="0" err="1" smtClean="0"/>
+              <a:t>map</a:t>
+            </a:r>
+            <a:r>
+              <a:rPr lang="ca-ES" dirty="0" smtClean="0"/>
+              <a:t>. </a:t>
+            </a:r>
+            <a:r>
+              <a:rPr lang="ca-ES" dirty="0" err="1" smtClean="0"/>
+              <a:t>TBD</a:t>
+            </a:r>
+            <a:r>
+              <a:rPr lang="ca-ES" dirty="0" smtClean="0"/>
+              <a:t>)</a:t>
+            </a:r>
+          </a:p>
+          <a:p>
+            <a:r>
+              <a:rPr lang="ca-ES" dirty="0" smtClean="0"/>
+              <a:t>/</a:t>
+            </a:r>
+            <a:r>
+              <a:rPr lang="ca-ES" dirty="0" err="1" smtClean="0"/>
+              <a:t>collections</a:t>
+            </a:r>
+            <a:r>
+              <a:rPr lang="ca-ES" dirty="0" smtClean="0"/>
+              <a:t>/{</a:t>
+            </a:r>
+            <a:r>
+              <a:rPr lang="ca-ES" dirty="0" err="1" smtClean="0"/>
+              <a:t>collectionId</a:t>
+            </a:r>
+            <a:r>
+              <a:rPr lang="ca-ES" dirty="0" smtClean="0"/>
+              <a:t>} </a:t>
+            </a:r>
+            <a:r>
+              <a:rPr lang="ca-ES" dirty="0" err="1" smtClean="0"/>
+              <a:t>links</a:t>
+            </a:r>
+            <a:r>
+              <a:rPr lang="ca-ES" dirty="0" smtClean="0"/>
+              <a:t> to:</a:t>
+            </a:r>
+          </a:p>
+          <a:p>
+            <a:pPr lvl="1"/>
+            <a:r>
+              <a:rPr lang="ca-ES" dirty="0" smtClean="0"/>
+              <a:t>/</a:t>
+            </a:r>
+            <a:r>
+              <a:rPr lang="ca-ES" dirty="0" err="1" smtClean="0"/>
+              <a:t>collections</a:t>
+            </a:r>
+            <a:r>
+              <a:rPr lang="ca-ES" dirty="0" smtClean="0"/>
+              <a:t>/{</a:t>
+            </a:r>
+            <a:r>
+              <a:rPr lang="ca-ES" dirty="0" err="1" smtClean="0"/>
+              <a:t>collectionId</a:t>
+            </a:r>
+            <a:r>
+              <a:rPr lang="ca-ES" dirty="0" smtClean="0"/>
+              <a:t>}/</a:t>
+            </a:r>
+            <a:r>
+              <a:rPr lang="ca-ES" dirty="0" err="1" smtClean="0"/>
+              <a:t>tiles</a:t>
+            </a:r>
+            <a:r>
+              <a:rPr lang="ca-ES" dirty="0" smtClean="0"/>
+              <a:t>/</a:t>
+            </a:r>
+            <a:r>
+              <a:rPr lang="ca-ES" dirty="0" err="1" smtClean="0"/>
+              <a:t>myTileMatrixSetId</a:t>
+            </a:r>
+            <a:r>
+              <a:rPr lang="ca-ES" dirty="0" smtClean="0"/>
+              <a:t>/{</a:t>
+            </a:r>
+            <a:r>
+              <a:rPr lang="ca-ES" dirty="0" err="1" smtClean="0"/>
+              <a:t>tileMatrix</a:t>
+            </a:r>
+            <a:r>
+              <a:rPr lang="ca-ES" dirty="0" smtClean="0"/>
+              <a:t>}/{</a:t>
+            </a:r>
+            <a:r>
+              <a:rPr lang="ca-ES" dirty="0" err="1" smtClean="0"/>
+              <a:t>tileCol</a:t>
+            </a:r>
+            <a:r>
+              <a:rPr lang="ca-ES" dirty="0" smtClean="0"/>
+              <a:t>}/{</a:t>
+            </a:r>
+            <a:r>
+              <a:rPr lang="ca-ES" dirty="0" err="1" smtClean="0"/>
+              <a:t>tileRow</a:t>
+            </a:r>
+            <a:r>
+              <a:rPr lang="ca-ES" dirty="0" smtClean="0"/>
+              <a:t>}   (</a:t>
+            </a:r>
+            <a:r>
+              <a:rPr lang="ca-ES" dirty="0" err="1" smtClean="0"/>
+              <a:t>leaf</a:t>
+            </a:r>
+            <a:r>
+              <a:rPr lang="ca-ES" dirty="0" smtClean="0"/>
+              <a:t>)</a:t>
+            </a:r>
+          </a:p>
+          <a:p>
+            <a:pPr lvl="1"/>
+            <a:r>
+              <a:rPr lang="ca-ES" dirty="0" smtClean="0"/>
+              <a:t>/</a:t>
+            </a:r>
+            <a:r>
+              <a:rPr lang="ca-ES" dirty="0" err="1" smtClean="0"/>
+              <a:t>collections</a:t>
+            </a:r>
+            <a:r>
+              <a:rPr lang="ca-ES" dirty="0" smtClean="0"/>
+              <a:t>/{</a:t>
+            </a:r>
+            <a:r>
+              <a:rPr lang="ca-ES" dirty="0" err="1" smtClean="0"/>
+              <a:t>collectionId</a:t>
+            </a:r>
+            <a:r>
+              <a:rPr lang="ca-ES" dirty="0" smtClean="0"/>
+              <a:t>}/</a:t>
+            </a:r>
+            <a:r>
+              <a:rPr lang="ca-ES" dirty="0" err="1" smtClean="0"/>
+              <a:t>map</a:t>
+            </a:r>
+            <a:r>
+              <a:rPr lang="ca-ES" dirty="0" smtClean="0"/>
+              <a:t>/</a:t>
+            </a:r>
+            <a:r>
+              <a:rPr lang="ca-ES" dirty="0" err="1" smtClean="0"/>
+              <a:t>myStyleId</a:t>
+            </a:r>
+            <a:r>
+              <a:rPr lang="ca-ES" dirty="0" smtClean="0"/>
+              <a:t>   (</a:t>
+            </a:r>
+            <a:r>
+              <a:rPr lang="ca-ES" dirty="0" err="1" smtClean="0"/>
+              <a:t>leaf</a:t>
+            </a:r>
+            <a:r>
+              <a:rPr lang="ca-ES" dirty="0" smtClean="0"/>
+              <a:t>)</a:t>
+            </a:r>
+            <a:br>
+              <a:rPr lang="ca-ES" dirty="0" smtClean="0"/>
+            </a:br>
+            <a:endParaRPr lang="ca-ES" dirty="0" smtClean="0"/>
+          </a:p>
+        </p:txBody>
+      </p:sp>
+    </p:spTree>
+  </p:cSld>
+  <p:clrMapOvr>
+    <a:masterClrMapping/>
+  </p:clrMapOvr>
+</p:sld>
+</file>
+
+<file path=ppt/slides/slide19.xml><?xml version="1.0" encoding="utf-8"?>
+<p:sld xmlns:a="http://schemas.openxmlformats.org/drawingml/2006/main" xmlns:r="http://schemas.openxmlformats.org/officeDocument/2006/relationships" xmlns:p="http://schemas.openxmlformats.org/presentationml/2006/main">
+  <p:cSld>
+    <p:spTree>
+      <p:nvGrpSpPr>
+        <p:cNvPr id="1" name=""/>
+        <p:cNvGrpSpPr/>
+        <p:nvPr/>
+      </p:nvGrpSpPr>
+      <p:grpSpPr>
+        <a:xfrm>
+          <a:off x="0" y="0"/>
+          <a:ext cx="0" cy="0"/>
+          <a:chOff x="0" y="0"/>
+          <a:chExt cx="0" cy="0"/>
+        </a:xfrm>
+      </p:grpSpPr>
+      <p:sp>
+        <p:nvSpPr>
+          <p:cNvPr id="2" name="1 Título"/>
+          <p:cNvSpPr>
+            <a:spLocks noGrp="1"/>
+          </p:cNvSpPr>
+          <p:nvPr>
+            <p:ph type="title"/>
+          </p:nvPr>
+        </p:nvSpPr>
+        <p:spPr/>
+        <p:txBody>
+          <a:bodyPr/>
+          <a:lstStyle/>
+          <a:p>
+            <a:r>
+              <a:rPr lang="ca-ES" dirty="0" err="1" smtClean="0"/>
+              <a:t>Remaining</a:t>
+            </a:r>
+            <a:r>
+              <a:rPr lang="ca-ES" dirty="0" smtClean="0"/>
+              <a:t> </a:t>
+            </a:r>
+            <a:r>
+              <a:rPr lang="ca-ES" dirty="0" err="1" smtClean="0"/>
+              <a:t>questions</a:t>
+            </a:r>
+            <a:endParaRPr lang="ca-ES" dirty="0"/>
+          </a:p>
+        </p:txBody>
+      </p:sp>
+      <p:sp>
+        <p:nvSpPr>
+          <p:cNvPr id="3" name="2 Marcador de contenido"/>
+          <p:cNvSpPr>
+            <a:spLocks noGrp="1"/>
+          </p:cNvSpPr>
+          <p:nvPr>
+            <p:ph idx="1"/>
+          </p:nvPr>
+        </p:nvSpPr>
+        <p:spPr/>
+        <p:txBody>
+          <a:bodyPr/>
+          <a:lstStyle/>
+          <a:p>
+            <a:r>
+              <a:rPr lang="ca-ES" dirty="0" err="1" smtClean="0"/>
+              <a:t>What</a:t>
+            </a:r>
+            <a:r>
+              <a:rPr lang="ca-ES" dirty="0" smtClean="0"/>
+              <a:t> </a:t>
+            </a:r>
+            <a:r>
+              <a:rPr lang="ca-ES" dirty="0" err="1" smtClean="0"/>
+              <a:t>happens</a:t>
+            </a:r>
+            <a:r>
+              <a:rPr lang="ca-ES" dirty="0" smtClean="0"/>
+              <a:t> </a:t>
+            </a:r>
+            <a:r>
+              <a:rPr lang="ca-ES" dirty="0" err="1" smtClean="0"/>
+              <a:t>with</a:t>
+            </a:r>
+            <a:endParaRPr lang="ca-ES" dirty="0" smtClean="0"/>
+          </a:p>
+          <a:p>
+            <a:pPr lvl="1"/>
+            <a:r>
+              <a:rPr lang="ca-ES" dirty="0" smtClean="0">
+                <a:solidFill>
+                  <a:srgbClr val="FF0000"/>
+                </a:solidFill>
+              </a:rPr>
+              <a:t>/</a:t>
+            </a:r>
+            <a:r>
+              <a:rPr lang="ca-ES" dirty="0" err="1" smtClean="0">
+                <a:solidFill>
+                  <a:srgbClr val="FF0000"/>
+                </a:solidFill>
+              </a:rPr>
+              <a:t>collections</a:t>
+            </a:r>
+            <a:r>
+              <a:rPr lang="ca-ES" dirty="0" smtClean="0">
+                <a:solidFill>
+                  <a:srgbClr val="FF0000"/>
+                </a:solidFill>
+              </a:rPr>
+              <a:t>/{</a:t>
+            </a:r>
+            <a:r>
+              <a:rPr lang="ca-ES" dirty="0" err="1" smtClean="0">
+                <a:solidFill>
+                  <a:srgbClr val="FF0000"/>
+                </a:solidFill>
+              </a:rPr>
+              <a:t>collectionId</a:t>
+            </a:r>
+            <a:r>
+              <a:rPr lang="ca-ES" dirty="0" smtClean="0">
+                <a:solidFill>
+                  <a:srgbClr val="FF0000"/>
+                </a:solidFill>
+              </a:rPr>
+              <a:t>}/</a:t>
+            </a:r>
+            <a:r>
+              <a:rPr lang="ca-ES" dirty="0" err="1" smtClean="0">
+                <a:solidFill>
+                  <a:srgbClr val="FF0000"/>
+                </a:solidFill>
+              </a:rPr>
+              <a:t>tiles</a:t>
+            </a:r>
+            <a:endParaRPr lang="ca-ES" dirty="0" smtClean="0">
+              <a:solidFill>
+                <a:srgbClr val="FF0000"/>
+              </a:solidFill>
+            </a:endParaRPr>
+          </a:p>
+          <a:p>
+            <a:pPr lvl="1"/>
+            <a:endParaRPr lang="ca-ES" dirty="0" smtClean="0">
+              <a:solidFill>
+                <a:srgbClr val="FF0000"/>
+              </a:solidFill>
+            </a:endParaRPr>
+          </a:p>
+          <a:p>
+            <a:r>
+              <a:rPr lang="ca-ES" dirty="0" smtClean="0"/>
+              <a:t>How to </a:t>
+            </a:r>
+            <a:r>
+              <a:rPr lang="ca-ES" dirty="0" err="1" smtClean="0"/>
+              <a:t>advertise</a:t>
+            </a:r>
+            <a:r>
+              <a:rPr lang="ca-ES" dirty="0" smtClean="0"/>
+              <a:t> </a:t>
+            </a:r>
+            <a:r>
+              <a:rPr lang="ca-ES" dirty="0" err="1" smtClean="0"/>
+              <a:t>tiles</a:t>
+            </a:r>
+            <a:r>
+              <a:rPr lang="ca-ES" dirty="0" smtClean="0"/>
+              <a:t> </a:t>
+            </a:r>
+            <a:r>
+              <a:rPr lang="ca-ES" dirty="0" err="1" smtClean="0"/>
+              <a:t>from</a:t>
+            </a:r>
+            <a:r>
+              <a:rPr lang="ca-ES" dirty="0" smtClean="0"/>
+              <a:t> </a:t>
+            </a:r>
+            <a:r>
+              <a:rPr lang="ca-ES" dirty="0" err="1" smtClean="0"/>
+              <a:t>multiple</a:t>
+            </a:r>
+            <a:r>
+              <a:rPr lang="ca-ES" dirty="0" smtClean="0"/>
+              <a:t> </a:t>
+            </a:r>
+            <a:r>
+              <a:rPr lang="ca-ES" dirty="0" err="1" smtClean="0"/>
+              <a:t>collections</a:t>
+            </a:r>
+            <a:r>
+              <a:rPr lang="ca-ES" dirty="0" smtClean="0"/>
+              <a:t>? </a:t>
+            </a:r>
+            <a:r>
+              <a:rPr lang="ca-ES" dirty="0" err="1" smtClean="0"/>
+              <a:t>Where</a:t>
+            </a:r>
+            <a:r>
+              <a:rPr lang="ca-ES" dirty="0" smtClean="0"/>
+              <a:t> </a:t>
+            </a:r>
+            <a:r>
+              <a:rPr lang="ca-ES" dirty="0" err="1" smtClean="0"/>
+              <a:t>are</a:t>
+            </a:r>
+            <a:r>
+              <a:rPr lang="ca-ES" dirty="0" smtClean="0"/>
+              <a:t> </a:t>
+            </a:r>
+            <a:r>
+              <a:rPr lang="ca-ES" dirty="0" err="1" smtClean="0"/>
+              <a:t>we</a:t>
+            </a:r>
+            <a:r>
+              <a:rPr lang="ca-ES" dirty="0" smtClean="0"/>
+              <a:t> </a:t>
+            </a:r>
+            <a:r>
+              <a:rPr lang="ca-ES" dirty="0" err="1" smtClean="0"/>
+              <a:t>including</a:t>
+            </a:r>
+            <a:r>
+              <a:rPr lang="ca-ES" dirty="0" smtClean="0"/>
+              <a:t> </a:t>
+            </a:r>
+            <a:r>
+              <a:rPr lang="ca-ES" dirty="0" err="1" smtClean="0"/>
+              <a:t>the</a:t>
+            </a:r>
+            <a:r>
+              <a:rPr lang="ca-ES" dirty="0" smtClean="0"/>
+              <a:t> </a:t>
+            </a:r>
+            <a:r>
+              <a:rPr lang="ca-ES" dirty="0" err="1" smtClean="0"/>
+              <a:t>link</a:t>
+            </a:r>
+            <a:r>
+              <a:rPr lang="ca-ES" dirty="0" smtClean="0"/>
+              <a:t>?</a:t>
+            </a:r>
+            <a:r>
+              <a:rPr lang="ca-ES" dirty="0" smtClean="0">
+                <a:solidFill>
+                  <a:srgbClr val="FF0000"/>
+                </a:solidFill>
+              </a:rPr>
+              <a:t> </a:t>
+            </a:r>
+          </a:p>
+          <a:p>
+            <a:pPr lvl="1"/>
+            <a:r>
+              <a:rPr lang="ca-ES" dirty="0" smtClean="0">
+                <a:solidFill>
+                  <a:srgbClr val="FF0000"/>
+                </a:solidFill>
+              </a:rPr>
+              <a:t>/</a:t>
+            </a:r>
+            <a:r>
+              <a:rPr lang="ca-ES" dirty="0" err="1" smtClean="0">
+                <a:solidFill>
+                  <a:srgbClr val="FF0000"/>
+                </a:solidFill>
+              </a:rPr>
+              <a:t>tiles</a:t>
+            </a:r>
+            <a:r>
+              <a:rPr lang="ca-ES" dirty="0" smtClean="0">
+                <a:solidFill>
+                  <a:srgbClr val="FF0000"/>
+                </a:solidFill>
+              </a:rPr>
+              <a:t>/{</a:t>
+            </a:r>
+            <a:r>
+              <a:rPr lang="ca-ES" dirty="0" err="1" smtClean="0">
+                <a:solidFill>
+                  <a:srgbClr val="FF0000"/>
+                </a:solidFill>
+              </a:rPr>
+              <a:t>tileMatrixSetId</a:t>
+            </a:r>
+            <a:r>
+              <a:rPr lang="ca-ES" dirty="0" smtClean="0">
+                <a:solidFill>
+                  <a:srgbClr val="FF0000"/>
+                </a:solidFill>
+              </a:rPr>
+              <a:t>}/{</a:t>
+            </a:r>
+            <a:r>
+              <a:rPr lang="ca-ES" dirty="0" err="1" smtClean="0">
+                <a:solidFill>
+                  <a:srgbClr val="FF0000"/>
+                </a:solidFill>
+              </a:rPr>
+              <a:t>tileMatrix</a:t>
+            </a:r>
+            <a:r>
+              <a:rPr lang="ca-ES" dirty="0" smtClean="0">
+                <a:solidFill>
+                  <a:srgbClr val="FF0000"/>
+                </a:solidFill>
+              </a:rPr>
+              <a:t>}/{</a:t>
+            </a:r>
+            <a:r>
+              <a:rPr lang="ca-ES" dirty="0" err="1" smtClean="0">
+                <a:solidFill>
+                  <a:srgbClr val="FF0000"/>
+                </a:solidFill>
+              </a:rPr>
+              <a:t>tileRow</a:t>
+            </a:r>
+            <a:r>
+              <a:rPr lang="ca-ES" dirty="0" smtClean="0">
+                <a:solidFill>
+                  <a:srgbClr val="FF0000"/>
+                </a:solidFill>
+              </a:rPr>
+              <a:t>}</a:t>
+            </a:r>
+            <a:r>
+              <a:rPr lang="ca-ES" dirty="0" smtClean="0">
+                <a:solidFill>
+                  <a:srgbClr val="FF0000"/>
+                </a:solidFill>
+              </a:rPr>
+              <a:t> /{</a:t>
+            </a:r>
+            <a:r>
+              <a:rPr lang="ca-ES" dirty="0" err="1" smtClean="0">
+                <a:solidFill>
+                  <a:srgbClr val="FF0000"/>
+                </a:solidFill>
+              </a:rPr>
+              <a:t>tileCol</a:t>
+            </a:r>
+            <a:r>
+              <a:rPr lang="ca-ES" dirty="0" smtClean="0">
+                <a:solidFill>
+                  <a:srgbClr val="FF0000"/>
+                </a:solidFill>
+              </a:rPr>
+              <a:t>}</a:t>
+            </a:r>
+            <a:endParaRPr lang="ca-ES" dirty="0"/>
+          </a:p>
+        </p:txBody>
+      </p:sp>
     </p:spTree>
   </p:cSld>
   <p:clrMapOvr>
@@ -9095,6 +10022,2546 @@
       </p:par>
     </p:tnLst>
   </p:timing>
+</p:sld>
+</file>
+
+<file path=ppt/slides/slide20.xml><?xml version="1.0" encoding="utf-8"?>
+<p:sld xmlns:a="http://schemas.openxmlformats.org/drawingml/2006/main" xmlns:r="http://schemas.openxmlformats.org/officeDocument/2006/relationships" xmlns:p="http://schemas.openxmlformats.org/presentationml/2006/main">
+  <p:cSld>
+    <p:spTree>
+      <p:nvGrpSpPr>
+        <p:cNvPr id="1" name=""/>
+        <p:cNvGrpSpPr/>
+        <p:nvPr/>
+      </p:nvGrpSpPr>
+      <p:grpSpPr>
+        <a:xfrm>
+          <a:off x="0" y="0"/>
+          <a:ext cx="0" cy="0"/>
+          <a:chOff x="0" y="0"/>
+          <a:chExt cx="0" cy="0"/>
+        </a:xfrm>
+      </p:grpSpPr>
+      <p:sp>
+        <p:nvSpPr>
+          <p:cNvPr id="2" name="1 Título"/>
+          <p:cNvSpPr>
+            <a:spLocks noGrp="1"/>
+          </p:cNvSpPr>
+          <p:nvPr>
+            <p:ph type="title"/>
+          </p:nvPr>
+        </p:nvSpPr>
+        <p:spPr/>
+        <p:txBody>
+          <a:bodyPr/>
+          <a:lstStyle/>
+          <a:p>
+            <a:r>
+              <a:rPr lang="ca-ES" dirty="0" err="1" smtClean="0"/>
+              <a:t>Proposal</a:t>
+            </a:r>
+            <a:r>
+              <a:rPr lang="ca-ES" dirty="0" smtClean="0"/>
+              <a:t> (</a:t>
+            </a:r>
+            <a:r>
+              <a:rPr lang="ca-ES" dirty="0" err="1" smtClean="0"/>
+              <a:t>alternative</a:t>
+            </a:r>
+            <a:r>
+              <a:rPr lang="ca-ES" dirty="0" smtClean="0"/>
+              <a:t> A)</a:t>
+            </a:r>
+            <a:endParaRPr lang="ca-ES" dirty="0"/>
+          </a:p>
+        </p:txBody>
+      </p:sp>
+      <p:sp>
+        <p:nvSpPr>
+          <p:cNvPr id="3" name="2 Marcador de contenido"/>
+          <p:cNvSpPr>
+            <a:spLocks noGrp="1"/>
+          </p:cNvSpPr>
+          <p:nvPr>
+            <p:ph idx="1"/>
+          </p:nvPr>
+        </p:nvSpPr>
+        <p:spPr>
+          <a:xfrm>
+            <a:off x="457200" y="1600200"/>
+            <a:ext cx="8229600" cy="4997152"/>
+          </a:xfrm>
+        </p:spPr>
+        <p:txBody>
+          <a:bodyPr>
+            <a:normAutofit fontScale="55000" lnSpcReduction="20000"/>
+          </a:bodyPr>
+          <a:lstStyle/>
+          <a:p>
+            <a:r>
+              <a:rPr lang="ca-ES" dirty="0" err="1" smtClean="0"/>
+              <a:t>Landing</a:t>
+            </a:r>
+            <a:r>
+              <a:rPr lang="ca-ES" dirty="0" smtClean="0"/>
+              <a:t> </a:t>
+            </a:r>
+            <a:r>
+              <a:rPr lang="ca-ES" dirty="0" err="1" smtClean="0"/>
+              <a:t>page</a:t>
+            </a:r>
+            <a:r>
+              <a:rPr lang="ca-ES" dirty="0" smtClean="0"/>
+              <a:t> </a:t>
+            </a:r>
+            <a:r>
+              <a:rPr lang="ca-ES" dirty="0" err="1" smtClean="0"/>
+              <a:t>links</a:t>
+            </a:r>
+            <a:r>
+              <a:rPr lang="ca-ES" dirty="0" smtClean="0"/>
+              <a:t> to:</a:t>
+            </a:r>
+          </a:p>
+          <a:p>
+            <a:pPr lvl="1"/>
+            <a:r>
+              <a:rPr lang="ca-ES" dirty="0" smtClean="0"/>
+              <a:t>/</a:t>
+            </a:r>
+            <a:r>
+              <a:rPr lang="ca-ES" dirty="0" err="1" smtClean="0"/>
+              <a:t>collections</a:t>
+            </a:r>
+            <a:endParaRPr lang="ca-ES" dirty="0" smtClean="0"/>
+          </a:p>
+          <a:p>
+            <a:pPr lvl="1"/>
+            <a:r>
+              <a:rPr lang="ca-ES" dirty="0" smtClean="0"/>
+              <a:t>/</a:t>
+            </a:r>
+            <a:r>
+              <a:rPr lang="ca-ES" dirty="0" err="1" smtClean="0"/>
+              <a:t>tileMatrixSets</a:t>
+            </a:r>
+            <a:endParaRPr lang="ca-ES" dirty="0" smtClean="0"/>
+          </a:p>
+          <a:p>
+            <a:pPr lvl="1"/>
+            <a:r>
+              <a:rPr lang="ca-ES" dirty="0" smtClean="0">
+                <a:solidFill>
+                  <a:srgbClr val="FF0000"/>
+                </a:solidFill>
+              </a:rPr>
+              <a:t>/</a:t>
+            </a:r>
+            <a:r>
+              <a:rPr lang="ca-ES" dirty="0" err="1" smtClean="0">
+                <a:solidFill>
+                  <a:srgbClr val="FF0000"/>
+                </a:solidFill>
+              </a:rPr>
+              <a:t>tiles</a:t>
+            </a:r>
+            <a:r>
+              <a:rPr lang="ca-ES" dirty="0" smtClean="0">
+                <a:solidFill>
+                  <a:srgbClr val="FF0000"/>
+                </a:solidFill>
+              </a:rPr>
+              <a:t>/</a:t>
+            </a:r>
+            <a:r>
+              <a:rPr lang="ca-ES" dirty="0" err="1" smtClean="0">
+                <a:solidFill>
+                  <a:srgbClr val="FF0000"/>
+                </a:solidFill>
+              </a:rPr>
+              <a:t>myTileMatrixSetId</a:t>
+            </a:r>
+            <a:r>
+              <a:rPr lang="ca-ES" dirty="0" smtClean="0">
+                <a:solidFill>
+                  <a:srgbClr val="FF0000"/>
+                </a:solidFill>
+              </a:rPr>
+              <a:t>     (NEW)  </a:t>
+            </a:r>
+            <a:r>
+              <a:rPr lang="ca-ES" dirty="0" err="1" smtClean="0">
+                <a:solidFill>
+                  <a:srgbClr val="FF0000"/>
+                </a:solidFill>
+              </a:rPr>
+              <a:t>This</a:t>
+            </a:r>
+            <a:r>
+              <a:rPr lang="ca-ES" dirty="0" smtClean="0">
+                <a:solidFill>
+                  <a:srgbClr val="FF0000"/>
+                </a:solidFill>
+              </a:rPr>
+              <a:t> is for </a:t>
+            </a:r>
+            <a:r>
+              <a:rPr lang="ca-ES" dirty="0" err="1" smtClean="0">
+                <a:solidFill>
+                  <a:srgbClr val="FF0000"/>
+                </a:solidFill>
+              </a:rPr>
+              <a:t>make</a:t>
+            </a:r>
+            <a:r>
+              <a:rPr lang="ca-ES" dirty="0" smtClean="0">
+                <a:solidFill>
+                  <a:srgbClr val="FF0000"/>
+                </a:solidFill>
+              </a:rPr>
+              <a:t> evident </a:t>
+            </a:r>
+            <a:r>
+              <a:rPr lang="ca-ES" dirty="0" err="1" smtClean="0">
+                <a:solidFill>
+                  <a:srgbClr val="FF0000"/>
+                </a:solidFill>
+              </a:rPr>
+              <a:t>that</a:t>
+            </a:r>
+            <a:r>
+              <a:rPr lang="ca-ES" dirty="0" smtClean="0">
+                <a:solidFill>
+                  <a:srgbClr val="FF0000"/>
+                </a:solidFill>
+              </a:rPr>
+              <a:t> </a:t>
+            </a:r>
+            <a:r>
+              <a:rPr lang="ca-ES" dirty="0" err="1" smtClean="0">
+                <a:solidFill>
+                  <a:srgbClr val="FF0000"/>
+                </a:solidFill>
+              </a:rPr>
+              <a:t>tiles</a:t>
+            </a:r>
+            <a:r>
+              <a:rPr lang="ca-ES" dirty="0" smtClean="0">
+                <a:solidFill>
+                  <a:srgbClr val="FF0000"/>
+                </a:solidFill>
+              </a:rPr>
+              <a:t> of </a:t>
+            </a:r>
+            <a:r>
+              <a:rPr lang="ca-ES" dirty="0" err="1" smtClean="0">
+                <a:solidFill>
+                  <a:srgbClr val="FF0000"/>
+                </a:solidFill>
+              </a:rPr>
+              <a:t>multiple</a:t>
+            </a:r>
+            <a:r>
+              <a:rPr lang="ca-ES" dirty="0" smtClean="0">
+                <a:solidFill>
+                  <a:srgbClr val="FF0000"/>
+                </a:solidFill>
+              </a:rPr>
+              <a:t> </a:t>
+            </a:r>
+            <a:r>
+              <a:rPr lang="ca-ES" dirty="0" err="1" smtClean="0">
+                <a:solidFill>
+                  <a:srgbClr val="FF0000"/>
+                </a:solidFill>
+              </a:rPr>
+              <a:t>collections</a:t>
+            </a:r>
+            <a:r>
+              <a:rPr lang="ca-ES" dirty="0" smtClean="0">
+                <a:solidFill>
+                  <a:srgbClr val="FF0000"/>
+                </a:solidFill>
+              </a:rPr>
+              <a:t> </a:t>
+            </a:r>
+            <a:r>
+              <a:rPr lang="ca-ES" dirty="0" err="1" smtClean="0">
+                <a:solidFill>
+                  <a:srgbClr val="FF0000"/>
+                </a:solidFill>
+              </a:rPr>
+              <a:t>are</a:t>
+            </a:r>
+            <a:r>
+              <a:rPr lang="ca-ES" dirty="0" smtClean="0">
+                <a:solidFill>
+                  <a:srgbClr val="FF0000"/>
+                </a:solidFill>
+              </a:rPr>
+              <a:t> </a:t>
+            </a:r>
+            <a:r>
+              <a:rPr lang="ca-ES" dirty="0" err="1" smtClean="0">
+                <a:solidFill>
+                  <a:srgbClr val="FF0000"/>
+                </a:solidFill>
+              </a:rPr>
+              <a:t>available</a:t>
+            </a:r>
+            <a:r>
+              <a:rPr lang="ca-ES" dirty="0" smtClean="0">
+                <a:solidFill>
+                  <a:srgbClr val="FF0000"/>
+                </a:solidFill>
+              </a:rPr>
+              <a:t>. </a:t>
+            </a:r>
+            <a:r>
+              <a:rPr lang="ca-ES" dirty="0" err="1" smtClean="0">
+                <a:solidFill>
+                  <a:srgbClr val="FF0000"/>
+                </a:solidFill>
+              </a:rPr>
+              <a:t>This</a:t>
+            </a:r>
+            <a:r>
+              <a:rPr lang="ca-ES" dirty="0" smtClean="0">
+                <a:solidFill>
+                  <a:srgbClr val="FF0000"/>
+                </a:solidFill>
+              </a:rPr>
+              <a:t> </a:t>
+            </a:r>
+            <a:r>
+              <a:rPr lang="ca-ES" dirty="0" err="1" smtClean="0">
+                <a:solidFill>
+                  <a:srgbClr val="FF0000"/>
+                </a:solidFill>
+              </a:rPr>
+              <a:t>link</a:t>
+            </a:r>
+            <a:r>
+              <a:rPr lang="ca-ES" dirty="0" smtClean="0">
+                <a:solidFill>
+                  <a:srgbClr val="FF0000"/>
+                </a:solidFill>
+              </a:rPr>
+              <a:t> </a:t>
+            </a:r>
+            <a:r>
+              <a:rPr lang="ca-ES" dirty="0" err="1" smtClean="0">
+                <a:solidFill>
+                  <a:srgbClr val="FF0000"/>
+                </a:solidFill>
+              </a:rPr>
+              <a:t>will</a:t>
+            </a:r>
+            <a:r>
+              <a:rPr lang="ca-ES" dirty="0" smtClean="0">
+                <a:solidFill>
+                  <a:srgbClr val="FF0000"/>
+                </a:solidFill>
+              </a:rPr>
+              <a:t> </a:t>
+            </a:r>
+            <a:r>
+              <a:rPr lang="ca-ES" dirty="0" err="1" smtClean="0">
+                <a:solidFill>
+                  <a:srgbClr val="FF0000"/>
+                </a:solidFill>
+              </a:rPr>
+              <a:t>return</a:t>
+            </a:r>
+            <a:r>
+              <a:rPr lang="ca-ES" dirty="0" smtClean="0">
+                <a:solidFill>
+                  <a:srgbClr val="FF0000"/>
+                </a:solidFill>
+              </a:rPr>
+              <a:t> </a:t>
+            </a:r>
+            <a:r>
+              <a:rPr lang="ca-ES" dirty="0" err="1" smtClean="0">
+                <a:solidFill>
+                  <a:srgbClr val="FF0000"/>
+                </a:solidFill>
+              </a:rPr>
+              <a:t>the</a:t>
+            </a:r>
+            <a:r>
+              <a:rPr lang="ca-ES" dirty="0" smtClean="0">
+                <a:solidFill>
+                  <a:srgbClr val="FF0000"/>
+                </a:solidFill>
+              </a:rPr>
+              <a:t> "</a:t>
+            </a:r>
+            <a:r>
+              <a:rPr lang="ca-ES" dirty="0" err="1" smtClean="0">
+                <a:solidFill>
+                  <a:srgbClr val="FF0000"/>
+                </a:solidFill>
+              </a:rPr>
+              <a:t>quasi-all</a:t>
+            </a:r>
+            <a:r>
+              <a:rPr lang="ca-ES" dirty="0" smtClean="0">
+                <a:solidFill>
+                  <a:srgbClr val="FF0000"/>
+                </a:solidFill>
+              </a:rPr>
+              <a:t> </a:t>
+            </a:r>
+            <a:r>
+              <a:rPr lang="ca-ES" dirty="0" err="1" smtClean="0">
+                <a:solidFill>
+                  <a:srgbClr val="FF0000"/>
+                </a:solidFill>
+              </a:rPr>
+              <a:t>collections</a:t>
+            </a:r>
+            <a:r>
+              <a:rPr lang="ca-ES" dirty="0" smtClean="0">
+                <a:solidFill>
+                  <a:srgbClr val="FF0000"/>
+                </a:solidFill>
+              </a:rPr>
+              <a:t>" </a:t>
+            </a:r>
+            <a:r>
+              <a:rPr lang="ca-ES" dirty="0" err="1" smtClean="0">
+                <a:solidFill>
+                  <a:srgbClr val="FF0000"/>
+                </a:solidFill>
+              </a:rPr>
+              <a:t>tiles</a:t>
+            </a:r>
+            <a:r>
+              <a:rPr lang="ca-ES" dirty="0" smtClean="0">
+                <a:solidFill>
+                  <a:srgbClr val="FF0000"/>
+                </a:solidFill>
+              </a:rPr>
+              <a:t> (</a:t>
+            </a:r>
+            <a:r>
+              <a:rPr lang="ca-ES" dirty="0" err="1" smtClean="0">
+                <a:solidFill>
+                  <a:srgbClr val="FF0000"/>
+                </a:solidFill>
+              </a:rPr>
+              <a:t>because</a:t>
+            </a:r>
+            <a:r>
+              <a:rPr lang="ca-ES" dirty="0" smtClean="0">
+                <a:solidFill>
+                  <a:srgbClr val="FF0000"/>
+                </a:solidFill>
+              </a:rPr>
+              <a:t> </a:t>
+            </a:r>
+            <a:r>
+              <a:rPr lang="ca-ES" dirty="0" err="1" smtClean="0">
+                <a:solidFill>
+                  <a:srgbClr val="FF0000"/>
+                </a:solidFill>
+              </a:rPr>
+              <a:t>query</a:t>
+            </a:r>
+            <a:r>
+              <a:rPr lang="ca-ES" dirty="0" smtClean="0">
+                <a:solidFill>
+                  <a:srgbClr val="FF0000"/>
+                </a:solidFill>
+              </a:rPr>
+              <a:t> </a:t>
+            </a:r>
+            <a:r>
+              <a:rPr lang="ca-ES" dirty="0" err="1" smtClean="0">
+                <a:solidFill>
+                  <a:srgbClr val="FF0000"/>
+                </a:solidFill>
+              </a:rPr>
+              <a:t>parameters</a:t>
+            </a:r>
+            <a:r>
+              <a:rPr lang="ca-ES" dirty="0" smtClean="0">
+                <a:solidFill>
+                  <a:srgbClr val="FF0000"/>
+                </a:solidFill>
+              </a:rPr>
+              <a:t> </a:t>
+            </a:r>
+            <a:r>
+              <a:rPr lang="ca-ES" dirty="0" err="1" smtClean="0">
+                <a:solidFill>
+                  <a:srgbClr val="FF0000"/>
+                </a:solidFill>
+              </a:rPr>
+              <a:t>are</a:t>
+            </a:r>
+            <a:r>
+              <a:rPr lang="ca-ES" dirty="0" smtClean="0">
+                <a:solidFill>
+                  <a:srgbClr val="FF0000"/>
+                </a:solidFill>
+              </a:rPr>
+              <a:t> </a:t>
+            </a:r>
+            <a:r>
+              <a:rPr lang="ca-ES" dirty="0" err="1" smtClean="0">
+                <a:solidFill>
+                  <a:srgbClr val="FF0000"/>
+                </a:solidFill>
+              </a:rPr>
+              <a:t>not</a:t>
+            </a:r>
+            <a:r>
+              <a:rPr lang="ca-ES" dirty="0" smtClean="0">
+                <a:solidFill>
+                  <a:srgbClr val="FF0000"/>
+                </a:solidFill>
+              </a:rPr>
+              <a:t> </a:t>
+            </a:r>
+            <a:r>
+              <a:rPr lang="ca-ES" dirty="0" err="1" smtClean="0">
+                <a:solidFill>
+                  <a:srgbClr val="FF0000"/>
+                </a:solidFill>
+              </a:rPr>
+              <a:t>shown</a:t>
+            </a:r>
+            <a:r>
+              <a:rPr lang="ca-ES" dirty="0" smtClean="0">
+                <a:solidFill>
+                  <a:srgbClr val="FF0000"/>
+                </a:solidFill>
+              </a:rPr>
+              <a:t>)</a:t>
+            </a:r>
+          </a:p>
+          <a:p>
+            <a:pPr lvl="1"/>
+            <a:r>
+              <a:rPr lang="ca-ES" dirty="0" smtClean="0">
+                <a:solidFill>
+                  <a:srgbClr val="FF0000"/>
+                </a:solidFill>
+              </a:rPr>
+              <a:t>/</a:t>
+            </a:r>
+            <a:r>
+              <a:rPr lang="ca-ES" dirty="0" err="1" smtClean="0">
+                <a:solidFill>
+                  <a:srgbClr val="FF0000"/>
+                </a:solidFill>
+              </a:rPr>
+              <a:t>map</a:t>
+            </a:r>
+            <a:r>
+              <a:rPr lang="ca-ES" dirty="0" smtClean="0">
+                <a:solidFill>
+                  <a:srgbClr val="FF0000"/>
+                </a:solidFill>
+              </a:rPr>
+              <a:t>       (NEW)  </a:t>
+            </a:r>
+            <a:r>
+              <a:rPr lang="ca-ES" dirty="0" err="1" smtClean="0">
+                <a:solidFill>
+                  <a:srgbClr val="FF0000"/>
+                </a:solidFill>
+              </a:rPr>
+              <a:t>This</a:t>
+            </a:r>
+            <a:r>
+              <a:rPr lang="ca-ES" dirty="0" smtClean="0">
+                <a:solidFill>
+                  <a:srgbClr val="FF0000"/>
+                </a:solidFill>
+              </a:rPr>
+              <a:t> is for </a:t>
+            </a:r>
+            <a:r>
+              <a:rPr lang="ca-ES" dirty="0" err="1" smtClean="0">
+                <a:solidFill>
+                  <a:srgbClr val="FF0000"/>
+                </a:solidFill>
+              </a:rPr>
+              <a:t>make</a:t>
+            </a:r>
+            <a:r>
+              <a:rPr lang="ca-ES" dirty="0" smtClean="0">
+                <a:solidFill>
+                  <a:srgbClr val="FF0000"/>
+                </a:solidFill>
+              </a:rPr>
+              <a:t> evident </a:t>
+            </a:r>
+            <a:r>
+              <a:rPr lang="ca-ES" dirty="0" err="1" smtClean="0">
+                <a:solidFill>
+                  <a:srgbClr val="FF0000"/>
+                </a:solidFill>
+              </a:rPr>
+              <a:t>that</a:t>
+            </a:r>
+            <a:r>
+              <a:rPr lang="ca-ES" dirty="0" smtClean="0">
+                <a:solidFill>
+                  <a:srgbClr val="FF0000"/>
+                </a:solidFill>
+              </a:rPr>
+              <a:t> </a:t>
+            </a:r>
+            <a:r>
+              <a:rPr lang="ca-ES" dirty="0" err="1" smtClean="0">
+                <a:solidFill>
+                  <a:srgbClr val="FF0000"/>
+                </a:solidFill>
+              </a:rPr>
+              <a:t>maps</a:t>
+            </a:r>
+            <a:r>
+              <a:rPr lang="ca-ES" dirty="0" smtClean="0">
+                <a:solidFill>
+                  <a:srgbClr val="FF0000"/>
+                </a:solidFill>
+              </a:rPr>
+              <a:t> of </a:t>
+            </a:r>
+            <a:r>
+              <a:rPr lang="ca-ES" dirty="0" err="1" smtClean="0">
+                <a:solidFill>
+                  <a:srgbClr val="FF0000"/>
+                </a:solidFill>
+              </a:rPr>
+              <a:t>multiple</a:t>
+            </a:r>
+            <a:r>
+              <a:rPr lang="ca-ES" dirty="0" smtClean="0">
+                <a:solidFill>
+                  <a:srgbClr val="FF0000"/>
+                </a:solidFill>
+              </a:rPr>
+              <a:t> </a:t>
+            </a:r>
+            <a:r>
+              <a:rPr lang="ca-ES" dirty="0" err="1" smtClean="0">
+                <a:solidFill>
+                  <a:srgbClr val="FF0000"/>
+                </a:solidFill>
+              </a:rPr>
+              <a:t>collections</a:t>
+            </a:r>
+            <a:r>
+              <a:rPr lang="ca-ES" dirty="0" smtClean="0">
+                <a:solidFill>
+                  <a:srgbClr val="FF0000"/>
+                </a:solidFill>
+              </a:rPr>
+              <a:t> </a:t>
+            </a:r>
+            <a:r>
+              <a:rPr lang="ca-ES" dirty="0" err="1" smtClean="0">
+                <a:solidFill>
+                  <a:srgbClr val="FF0000"/>
+                </a:solidFill>
+              </a:rPr>
+              <a:t>are</a:t>
+            </a:r>
+            <a:r>
+              <a:rPr lang="ca-ES" dirty="0" smtClean="0">
+                <a:solidFill>
+                  <a:srgbClr val="FF0000"/>
+                </a:solidFill>
+              </a:rPr>
+              <a:t> </a:t>
+            </a:r>
+            <a:r>
+              <a:rPr lang="ca-ES" dirty="0" err="1" smtClean="0">
+                <a:solidFill>
+                  <a:srgbClr val="FF0000"/>
+                </a:solidFill>
+              </a:rPr>
+              <a:t>available</a:t>
+            </a:r>
+            <a:r>
+              <a:rPr lang="ca-ES" dirty="0" smtClean="0">
+                <a:solidFill>
+                  <a:srgbClr val="FF0000"/>
+                </a:solidFill>
+              </a:rPr>
+              <a:t>. </a:t>
+            </a:r>
+            <a:r>
+              <a:rPr lang="ca-ES" dirty="0" err="1" smtClean="0">
+                <a:solidFill>
+                  <a:srgbClr val="FF0000"/>
+                </a:solidFill>
+              </a:rPr>
+              <a:t>This</a:t>
+            </a:r>
+            <a:r>
+              <a:rPr lang="ca-ES" dirty="0" smtClean="0">
+                <a:solidFill>
+                  <a:srgbClr val="FF0000"/>
+                </a:solidFill>
+              </a:rPr>
+              <a:t> </a:t>
+            </a:r>
+            <a:r>
+              <a:rPr lang="ca-ES" dirty="0" err="1" smtClean="0">
+                <a:solidFill>
+                  <a:srgbClr val="FF0000"/>
+                </a:solidFill>
+              </a:rPr>
+              <a:t>link</a:t>
+            </a:r>
+            <a:r>
+              <a:rPr lang="ca-ES" dirty="0" smtClean="0">
+                <a:solidFill>
+                  <a:srgbClr val="FF0000"/>
+                </a:solidFill>
+              </a:rPr>
+              <a:t> </a:t>
+            </a:r>
+            <a:r>
+              <a:rPr lang="ca-ES" dirty="0" err="1" smtClean="0">
+                <a:solidFill>
+                  <a:srgbClr val="FF0000"/>
+                </a:solidFill>
+              </a:rPr>
+              <a:t>will</a:t>
+            </a:r>
+            <a:r>
+              <a:rPr lang="ca-ES" dirty="0" smtClean="0">
+                <a:solidFill>
+                  <a:srgbClr val="FF0000"/>
+                </a:solidFill>
+              </a:rPr>
+              <a:t> </a:t>
+            </a:r>
+            <a:r>
+              <a:rPr lang="ca-ES" dirty="0" err="1" smtClean="0">
+                <a:solidFill>
+                  <a:srgbClr val="FF0000"/>
+                </a:solidFill>
+              </a:rPr>
+              <a:t>return</a:t>
+            </a:r>
+            <a:r>
+              <a:rPr lang="ca-ES" dirty="0" smtClean="0">
+                <a:solidFill>
+                  <a:srgbClr val="FF0000"/>
+                </a:solidFill>
+              </a:rPr>
+              <a:t> </a:t>
+            </a:r>
+            <a:r>
+              <a:rPr lang="ca-ES" dirty="0" err="1" smtClean="0">
+                <a:solidFill>
+                  <a:srgbClr val="FF0000"/>
+                </a:solidFill>
+              </a:rPr>
+              <a:t>the</a:t>
+            </a:r>
+            <a:r>
+              <a:rPr lang="ca-ES" dirty="0" smtClean="0">
+                <a:solidFill>
+                  <a:srgbClr val="FF0000"/>
+                </a:solidFill>
+              </a:rPr>
+              <a:t> "</a:t>
+            </a:r>
+            <a:r>
+              <a:rPr lang="ca-ES" dirty="0" err="1" smtClean="0">
+                <a:solidFill>
+                  <a:srgbClr val="FF0000"/>
+                </a:solidFill>
+              </a:rPr>
+              <a:t>quasi-all</a:t>
+            </a:r>
+            <a:r>
+              <a:rPr lang="ca-ES" dirty="0" smtClean="0">
+                <a:solidFill>
+                  <a:srgbClr val="FF0000"/>
+                </a:solidFill>
+              </a:rPr>
+              <a:t> </a:t>
+            </a:r>
+            <a:r>
+              <a:rPr lang="ca-ES" dirty="0" err="1" smtClean="0">
+                <a:solidFill>
+                  <a:srgbClr val="FF0000"/>
+                </a:solidFill>
+              </a:rPr>
+              <a:t>collections</a:t>
+            </a:r>
+            <a:r>
+              <a:rPr lang="ca-ES" dirty="0" smtClean="0">
+                <a:solidFill>
+                  <a:srgbClr val="FF0000"/>
+                </a:solidFill>
+              </a:rPr>
+              <a:t>" </a:t>
+            </a:r>
+            <a:r>
+              <a:rPr lang="ca-ES" dirty="0" err="1" smtClean="0">
+                <a:solidFill>
+                  <a:srgbClr val="FF0000"/>
+                </a:solidFill>
+              </a:rPr>
+              <a:t>map</a:t>
+            </a:r>
+            <a:r>
+              <a:rPr lang="ca-ES" dirty="0" smtClean="0">
+                <a:solidFill>
+                  <a:srgbClr val="FF0000"/>
+                </a:solidFill>
+              </a:rPr>
+              <a:t> (</a:t>
+            </a:r>
+            <a:r>
+              <a:rPr lang="ca-ES" dirty="0" err="1" smtClean="0">
+                <a:solidFill>
+                  <a:srgbClr val="FF0000"/>
+                </a:solidFill>
+              </a:rPr>
+              <a:t>because</a:t>
+            </a:r>
+            <a:r>
+              <a:rPr lang="ca-ES" dirty="0" smtClean="0">
+                <a:solidFill>
+                  <a:srgbClr val="FF0000"/>
+                </a:solidFill>
+              </a:rPr>
+              <a:t> </a:t>
+            </a:r>
+            <a:r>
+              <a:rPr lang="ca-ES" dirty="0" err="1" smtClean="0">
+                <a:solidFill>
+                  <a:srgbClr val="FF0000"/>
+                </a:solidFill>
+              </a:rPr>
+              <a:t>query</a:t>
+            </a:r>
+            <a:r>
+              <a:rPr lang="ca-ES" dirty="0" smtClean="0">
+                <a:solidFill>
+                  <a:srgbClr val="FF0000"/>
+                </a:solidFill>
+              </a:rPr>
+              <a:t> </a:t>
+            </a:r>
+            <a:r>
+              <a:rPr lang="ca-ES" dirty="0" err="1" smtClean="0">
+                <a:solidFill>
+                  <a:srgbClr val="FF0000"/>
+                </a:solidFill>
+              </a:rPr>
+              <a:t>parameters</a:t>
+            </a:r>
+            <a:r>
+              <a:rPr lang="ca-ES" dirty="0" smtClean="0">
+                <a:solidFill>
+                  <a:srgbClr val="FF0000"/>
+                </a:solidFill>
+              </a:rPr>
+              <a:t> </a:t>
+            </a:r>
+            <a:r>
+              <a:rPr lang="ca-ES" dirty="0" err="1" smtClean="0">
+                <a:solidFill>
+                  <a:srgbClr val="FF0000"/>
+                </a:solidFill>
+              </a:rPr>
+              <a:t>are</a:t>
+            </a:r>
+            <a:r>
+              <a:rPr lang="ca-ES" dirty="0" smtClean="0">
+                <a:solidFill>
+                  <a:srgbClr val="FF0000"/>
+                </a:solidFill>
+              </a:rPr>
+              <a:t> </a:t>
+            </a:r>
+            <a:r>
+              <a:rPr lang="ca-ES" dirty="0" err="1" smtClean="0">
+                <a:solidFill>
+                  <a:srgbClr val="FF0000"/>
+                </a:solidFill>
+              </a:rPr>
+              <a:t>not</a:t>
+            </a:r>
+            <a:r>
+              <a:rPr lang="ca-ES" dirty="0" smtClean="0">
+                <a:solidFill>
+                  <a:srgbClr val="FF0000"/>
+                </a:solidFill>
+              </a:rPr>
+              <a:t> </a:t>
+            </a:r>
+            <a:r>
+              <a:rPr lang="ca-ES" dirty="0" err="1" smtClean="0">
+                <a:solidFill>
+                  <a:srgbClr val="FF0000"/>
+                </a:solidFill>
+              </a:rPr>
+              <a:t>shown</a:t>
+            </a:r>
+            <a:r>
+              <a:rPr lang="ca-ES" dirty="0" smtClean="0">
+                <a:solidFill>
+                  <a:srgbClr val="FF0000"/>
+                </a:solidFill>
+              </a:rPr>
+              <a:t>)</a:t>
+            </a:r>
+          </a:p>
+          <a:p>
+            <a:r>
+              <a:rPr lang="ca-ES" dirty="0" smtClean="0"/>
+              <a:t>/</a:t>
+            </a:r>
+            <a:r>
+              <a:rPr lang="ca-ES" dirty="0" err="1" smtClean="0"/>
+              <a:t>tileMatrixSets</a:t>
+            </a:r>
+            <a:r>
+              <a:rPr lang="ca-ES" dirty="0" smtClean="0"/>
+              <a:t> </a:t>
+            </a:r>
+            <a:r>
+              <a:rPr lang="ca-ES" dirty="0" err="1" smtClean="0"/>
+              <a:t>links</a:t>
+            </a:r>
+            <a:r>
+              <a:rPr lang="ca-ES" dirty="0" smtClean="0"/>
+              <a:t> to</a:t>
+            </a:r>
+          </a:p>
+          <a:p>
+            <a:pPr lvl="1"/>
+            <a:r>
+              <a:rPr lang="ca-ES" dirty="0" smtClean="0"/>
+              <a:t>/</a:t>
+            </a:r>
+            <a:r>
+              <a:rPr lang="ca-ES" dirty="0" err="1" smtClean="0"/>
+              <a:t>tileMatrixSet</a:t>
+            </a:r>
+            <a:r>
+              <a:rPr lang="ca-ES" dirty="0" smtClean="0"/>
+              <a:t>/</a:t>
+            </a:r>
+            <a:r>
+              <a:rPr lang="ca-ES" dirty="0" err="1" smtClean="0"/>
+              <a:t>myTileMateixSets</a:t>
+            </a:r>
+            <a:r>
+              <a:rPr lang="ca-ES" dirty="0" smtClean="0"/>
+              <a:t>   (</a:t>
+            </a:r>
+            <a:r>
+              <a:rPr lang="ca-ES" dirty="0" err="1" smtClean="0"/>
+              <a:t>leaf</a:t>
+            </a:r>
+            <a:r>
+              <a:rPr lang="ca-ES" dirty="0" smtClean="0"/>
+              <a:t>).</a:t>
+            </a:r>
+            <a:r>
+              <a:rPr lang="ca-ES" dirty="0" smtClean="0"/>
+              <a:t>  </a:t>
+            </a:r>
+          </a:p>
+          <a:p>
+            <a:r>
+              <a:rPr lang="ca-ES" dirty="0" smtClean="0"/>
+              <a:t>/</a:t>
+            </a:r>
+            <a:r>
+              <a:rPr lang="ca-ES" dirty="0" err="1" smtClean="0"/>
+              <a:t>collections</a:t>
+            </a:r>
+            <a:r>
+              <a:rPr lang="ca-ES" dirty="0" smtClean="0"/>
+              <a:t> </a:t>
+            </a:r>
+            <a:r>
+              <a:rPr lang="ca-ES" dirty="0" err="1" smtClean="0"/>
+              <a:t>links</a:t>
+            </a:r>
+            <a:r>
+              <a:rPr lang="ca-ES" dirty="0" smtClean="0"/>
+              <a:t> to</a:t>
+            </a:r>
+            <a:r>
+              <a:rPr lang="ca-ES" dirty="0" smtClean="0"/>
+              <a:t>:</a:t>
+            </a:r>
+          </a:p>
+          <a:p>
+            <a:pPr lvl="1"/>
+            <a:r>
+              <a:rPr lang="ca-ES" dirty="0" smtClean="0"/>
+              <a:t>/</a:t>
+            </a:r>
+            <a:r>
+              <a:rPr lang="ca-ES" dirty="0" err="1" smtClean="0"/>
+              <a:t>collections</a:t>
+            </a:r>
+            <a:r>
+              <a:rPr lang="ca-ES" dirty="0" smtClean="0"/>
+              <a:t>/</a:t>
+            </a:r>
+            <a:r>
+              <a:rPr lang="ca-ES" dirty="0" err="1" smtClean="0"/>
+              <a:t>myCollectionsIds</a:t>
+            </a:r>
+            <a:r>
+              <a:rPr lang="ca-ES" dirty="0" smtClean="0"/>
+              <a:t>   (</a:t>
+            </a:r>
+            <a:r>
+              <a:rPr lang="ca-ES" dirty="0" err="1" smtClean="0"/>
+              <a:t>specific</a:t>
+            </a:r>
+            <a:r>
+              <a:rPr lang="ca-ES" dirty="0" smtClean="0"/>
+              <a:t> content in </a:t>
+            </a:r>
+            <a:r>
+              <a:rPr lang="ca-ES" dirty="0" err="1" smtClean="0"/>
+              <a:t>the</a:t>
+            </a:r>
+            <a:r>
+              <a:rPr lang="ca-ES" dirty="0" smtClean="0"/>
+              <a:t> </a:t>
+            </a:r>
+            <a:r>
+              <a:rPr lang="ca-ES" dirty="0" err="1" smtClean="0"/>
+              <a:t>response</a:t>
+            </a:r>
+            <a:r>
+              <a:rPr lang="ca-ES" dirty="0" smtClean="0"/>
+              <a:t> </a:t>
+            </a:r>
+            <a:r>
+              <a:rPr lang="ca-ES" dirty="0" err="1" smtClean="0"/>
+              <a:t>will</a:t>
+            </a:r>
+            <a:r>
+              <a:rPr lang="ca-ES" dirty="0" smtClean="0"/>
+              <a:t> be </a:t>
+            </a:r>
+            <a:r>
+              <a:rPr lang="ca-ES" dirty="0" err="1" smtClean="0"/>
+              <a:t>moved</a:t>
+            </a:r>
+            <a:r>
+              <a:rPr lang="ca-ES" dirty="0" smtClean="0"/>
+              <a:t> to /</a:t>
+            </a:r>
+            <a:r>
+              <a:rPr lang="ca-ES" dirty="0" err="1" smtClean="0"/>
+              <a:t>collections</a:t>
+            </a:r>
+            <a:r>
+              <a:rPr lang="ca-ES" dirty="0" smtClean="0"/>
+              <a:t>/{</a:t>
+            </a:r>
+            <a:r>
+              <a:rPr lang="ca-ES" dirty="0" err="1" smtClean="0"/>
+              <a:t>collectionId</a:t>
+            </a:r>
+            <a:r>
+              <a:rPr lang="ca-ES" dirty="0" smtClean="0"/>
+              <a:t>}/</a:t>
+            </a:r>
+            <a:r>
+              <a:rPr lang="ca-ES" dirty="0" err="1" smtClean="0"/>
+              <a:t>tiles</a:t>
+            </a:r>
+            <a:r>
+              <a:rPr lang="ca-ES" dirty="0" smtClean="0"/>
+              <a:t> and /</a:t>
+            </a:r>
+            <a:r>
+              <a:rPr lang="ca-ES" dirty="0" err="1" smtClean="0"/>
+              <a:t>collections</a:t>
+            </a:r>
+            <a:r>
+              <a:rPr lang="ca-ES" dirty="0" smtClean="0"/>
+              <a:t>/{</a:t>
+            </a:r>
+            <a:r>
+              <a:rPr lang="ca-ES" dirty="0" err="1" smtClean="0"/>
+              <a:t>collectionId</a:t>
+            </a:r>
+            <a:r>
+              <a:rPr lang="ca-ES" dirty="0" smtClean="0"/>
+              <a:t>}/</a:t>
+            </a:r>
+            <a:r>
+              <a:rPr lang="ca-ES" dirty="0" err="1" smtClean="0"/>
+              <a:t>map</a:t>
+            </a:r>
+            <a:r>
+              <a:rPr lang="ca-ES" dirty="0" smtClean="0"/>
+              <a:t>. </a:t>
+            </a:r>
+            <a:r>
+              <a:rPr lang="ca-ES" dirty="0" err="1" smtClean="0"/>
+              <a:t>TBD</a:t>
+            </a:r>
+            <a:r>
+              <a:rPr lang="ca-ES" dirty="0" smtClean="0"/>
+              <a:t>)</a:t>
+            </a:r>
+          </a:p>
+          <a:p>
+            <a:r>
+              <a:rPr lang="ca-ES" dirty="0" smtClean="0"/>
+              <a:t>/</a:t>
+            </a:r>
+            <a:r>
+              <a:rPr lang="ca-ES" dirty="0" err="1" smtClean="0"/>
+              <a:t>collections</a:t>
+            </a:r>
+            <a:r>
+              <a:rPr lang="ca-ES" dirty="0" smtClean="0"/>
+              <a:t>/{</a:t>
+            </a:r>
+            <a:r>
+              <a:rPr lang="ca-ES" dirty="0" err="1" smtClean="0"/>
+              <a:t>collectionId</a:t>
+            </a:r>
+            <a:r>
+              <a:rPr lang="ca-ES" dirty="0" smtClean="0"/>
+              <a:t>} </a:t>
+            </a:r>
+            <a:r>
+              <a:rPr lang="ca-ES" dirty="0" err="1" smtClean="0"/>
+              <a:t>links</a:t>
+            </a:r>
+            <a:r>
+              <a:rPr lang="ca-ES" dirty="0" smtClean="0"/>
+              <a:t> to:</a:t>
+            </a:r>
+          </a:p>
+          <a:p>
+            <a:pPr lvl="1"/>
+            <a:r>
+              <a:rPr lang="ca-ES" dirty="0" smtClean="0">
+                <a:solidFill>
+                  <a:srgbClr val="FF0000"/>
+                </a:solidFill>
+              </a:rPr>
+              <a:t>/</a:t>
+            </a:r>
+            <a:r>
+              <a:rPr lang="ca-ES" dirty="0" err="1" smtClean="0">
+                <a:solidFill>
+                  <a:srgbClr val="FF0000"/>
+                </a:solidFill>
+              </a:rPr>
+              <a:t>collections</a:t>
+            </a:r>
+            <a:r>
+              <a:rPr lang="ca-ES" dirty="0" smtClean="0">
+                <a:solidFill>
+                  <a:srgbClr val="FF0000"/>
+                </a:solidFill>
+              </a:rPr>
+              <a:t>/{</a:t>
+            </a:r>
+            <a:r>
+              <a:rPr lang="ca-ES" dirty="0" err="1" smtClean="0">
+                <a:solidFill>
+                  <a:srgbClr val="FF0000"/>
+                </a:solidFill>
+              </a:rPr>
+              <a:t>collectionId</a:t>
+            </a:r>
+            <a:r>
+              <a:rPr lang="ca-ES" dirty="0" smtClean="0">
+                <a:solidFill>
+                  <a:srgbClr val="FF0000"/>
+                </a:solidFill>
+              </a:rPr>
+              <a:t>}/</a:t>
+            </a:r>
+            <a:r>
+              <a:rPr lang="ca-ES" dirty="0" err="1" smtClean="0">
+                <a:solidFill>
+                  <a:srgbClr val="FF0000"/>
+                </a:solidFill>
+              </a:rPr>
+              <a:t>tiles</a:t>
+            </a:r>
+            <a:r>
+              <a:rPr lang="ca-ES" dirty="0" smtClean="0">
+                <a:solidFill>
+                  <a:srgbClr val="FF0000"/>
+                </a:solidFill>
+              </a:rPr>
+              <a:t>   (NEW and </a:t>
+            </a:r>
+            <a:r>
+              <a:rPr lang="ca-ES" dirty="0" err="1" smtClean="0">
+                <a:solidFill>
+                  <a:srgbClr val="FF0000"/>
+                </a:solidFill>
+              </a:rPr>
+              <a:t>TBD</a:t>
+            </a:r>
+            <a:r>
+              <a:rPr lang="ca-ES" dirty="0" smtClean="0">
+                <a:solidFill>
+                  <a:srgbClr val="FF0000"/>
+                </a:solidFill>
+              </a:rPr>
+              <a:t>: </a:t>
+            </a:r>
+            <a:r>
+              <a:rPr lang="ca-ES" dirty="0" err="1" smtClean="0">
+                <a:solidFill>
+                  <a:srgbClr val="FF0000"/>
+                </a:solidFill>
+              </a:rPr>
+              <a:t>returns</a:t>
+            </a:r>
+            <a:r>
+              <a:rPr lang="ca-ES" dirty="0" smtClean="0">
+                <a:solidFill>
+                  <a:srgbClr val="FF0000"/>
+                </a:solidFill>
+              </a:rPr>
+              <a:t> </a:t>
+            </a:r>
+            <a:r>
+              <a:rPr lang="ca-ES" dirty="0" err="1" smtClean="0">
+                <a:solidFill>
+                  <a:srgbClr val="FF0000"/>
+                </a:solidFill>
+              </a:rPr>
+              <a:t>specific</a:t>
+            </a:r>
+            <a:r>
+              <a:rPr lang="ca-ES" dirty="0" smtClean="0">
+                <a:solidFill>
+                  <a:srgbClr val="FF0000"/>
+                </a:solidFill>
+              </a:rPr>
+              <a:t> content </a:t>
+            </a:r>
+            <a:r>
+              <a:rPr lang="ca-ES" dirty="0" err="1" smtClean="0">
+                <a:solidFill>
+                  <a:srgbClr val="FF0000"/>
+                </a:solidFill>
+              </a:rPr>
+              <a:t>about</a:t>
+            </a:r>
+            <a:r>
+              <a:rPr lang="ca-ES" dirty="0" smtClean="0">
+                <a:solidFill>
+                  <a:srgbClr val="FF0000"/>
+                </a:solidFill>
+              </a:rPr>
+              <a:t> </a:t>
+            </a:r>
+            <a:r>
+              <a:rPr lang="ca-ES" dirty="0" err="1" smtClean="0">
+                <a:solidFill>
+                  <a:srgbClr val="FF0000"/>
+                </a:solidFill>
+              </a:rPr>
+              <a:t>tile</a:t>
+            </a:r>
+            <a:r>
+              <a:rPr lang="ca-ES" dirty="0" smtClean="0">
+                <a:solidFill>
+                  <a:srgbClr val="FF0000"/>
+                </a:solidFill>
+              </a:rPr>
+              <a:t> </a:t>
+            </a:r>
+            <a:r>
+              <a:rPr lang="ca-ES" dirty="0" err="1" smtClean="0">
+                <a:solidFill>
+                  <a:srgbClr val="FF0000"/>
+                </a:solidFill>
+              </a:rPr>
+              <a:t>support</a:t>
+            </a:r>
+            <a:r>
+              <a:rPr lang="ca-ES" dirty="0" smtClean="0">
+                <a:solidFill>
+                  <a:srgbClr val="FF0000"/>
+                </a:solidFill>
+              </a:rPr>
+              <a:t> for </a:t>
+            </a:r>
+            <a:r>
+              <a:rPr lang="ca-ES" dirty="0" err="1" smtClean="0">
+                <a:solidFill>
+                  <a:srgbClr val="FF0000"/>
+                </a:solidFill>
+              </a:rPr>
+              <a:t>this</a:t>
+            </a:r>
+            <a:r>
+              <a:rPr lang="ca-ES" dirty="0" smtClean="0">
+                <a:solidFill>
+                  <a:srgbClr val="FF0000"/>
+                </a:solidFill>
+              </a:rPr>
+              <a:t> </a:t>
+            </a:r>
+            <a:r>
+              <a:rPr lang="ca-ES" dirty="0" err="1" smtClean="0">
+                <a:solidFill>
+                  <a:srgbClr val="FF0000"/>
+                </a:solidFill>
+              </a:rPr>
+              <a:t>collection</a:t>
+            </a:r>
+            <a:r>
+              <a:rPr lang="ca-ES" dirty="0" smtClean="0">
+                <a:solidFill>
+                  <a:srgbClr val="FF0000"/>
+                </a:solidFill>
+              </a:rPr>
+              <a:t>: </a:t>
+            </a:r>
+            <a:r>
+              <a:rPr lang="ca-ES" dirty="0" err="1" smtClean="0">
+                <a:solidFill>
+                  <a:srgbClr val="FF0000"/>
+                </a:solidFill>
+              </a:rPr>
+              <a:t>tileMatrixSetLink</a:t>
+            </a:r>
+            <a:r>
+              <a:rPr lang="ca-ES" dirty="0" smtClean="0">
+                <a:solidFill>
+                  <a:srgbClr val="FF0000"/>
+                </a:solidFill>
+              </a:rPr>
+              <a:t>...)</a:t>
+            </a:r>
+          </a:p>
+          <a:p>
+            <a:pPr lvl="1"/>
+            <a:r>
+              <a:rPr lang="ca-ES" dirty="0" smtClean="0"/>
+              <a:t>/</a:t>
+            </a:r>
+            <a:r>
+              <a:rPr lang="ca-ES" dirty="0" err="1" smtClean="0"/>
+              <a:t>collections</a:t>
+            </a:r>
+            <a:r>
+              <a:rPr lang="ca-ES" dirty="0" smtClean="0"/>
+              <a:t>/{</a:t>
+            </a:r>
+            <a:r>
+              <a:rPr lang="ca-ES" dirty="0" err="1" smtClean="0"/>
+              <a:t>collectionId</a:t>
+            </a:r>
+            <a:r>
+              <a:rPr lang="ca-ES" dirty="0" smtClean="0"/>
+              <a:t>}/</a:t>
+            </a:r>
+            <a:r>
+              <a:rPr lang="ca-ES" dirty="0" err="1" smtClean="0"/>
+              <a:t>tiles</a:t>
+            </a:r>
+            <a:r>
+              <a:rPr lang="ca-ES" dirty="0" smtClean="0"/>
+              <a:t>/</a:t>
+            </a:r>
+            <a:r>
+              <a:rPr lang="ca-ES" dirty="0" err="1" smtClean="0"/>
+              <a:t>myTileMatrixSetId</a:t>
+            </a:r>
+            <a:r>
+              <a:rPr lang="ca-ES" dirty="0" smtClean="0"/>
+              <a:t>/{</a:t>
+            </a:r>
+            <a:r>
+              <a:rPr lang="ca-ES" dirty="0" err="1" smtClean="0"/>
+              <a:t>tileMatrix</a:t>
+            </a:r>
+            <a:r>
+              <a:rPr lang="ca-ES" dirty="0" smtClean="0"/>
+              <a:t>}/{</a:t>
+            </a:r>
+            <a:r>
+              <a:rPr lang="ca-ES" dirty="0" err="1" smtClean="0"/>
+              <a:t>tileCol</a:t>
+            </a:r>
+            <a:r>
+              <a:rPr lang="ca-ES" dirty="0" smtClean="0"/>
+              <a:t>}/{</a:t>
+            </a:r>
+            <a:r>
+              <a:rPr lang="ca-ES" dirty="0" err="1" smtClean="0"/>
+              <a:t>tileRow</a:t>
+            </a:r>
+            <a:r>
+              <a:rPr lang="ca-ES" dirty="0" smtClean="0"/>
+              <a:t>}   (</a:t>
+            </a:r>
+            <a:r>
+              <a:rPr lang="ca-ES" dirty="0" err="1" smtClean="0"/>
+              <a:t>leaf</a:t>
+            </a:r>
+            <a:r>
+              <a:rPr lang="ca-ES" dirty="0" smtClean="0"/>
+              <a:t>)</a:t>
+            </a:r>
+          </a:p>
+          <a:p>
+            <a:pPr lvl="1"/>
+            <a:r>
+              <a:rPr lang="ca-ES" dirty="0" smtClean="0">
+                <a:solidFill>
+                  <a:srgbClr val="FF0000"/>
+                </a:solidFill>
+              </a:rPr>
+              <a:t>/</a:t>
+            </a:r>
+            <a:r>
+              <a:rPr lang="ca-ES" dirty="0" err="1" smtClean="0">
+                <a:solidFill>
+                  <a:srgbClr val="FF0000"/>
+                </a:solidFill>
+              </a:rPr>
+              <a:t>collections</a:t>
+            </a:r>
+            <a:r>
+              <a:rPr lang="ca-ES" dirty="0" smtClean="0">
+                <a:solidFill>
+                  <a:srgbClr val="FF0000"/>
+                </a:solidFill>
+              </a:rPr>
+              <a:t>/{</a:t>
+            </a:r>
+            <a:r>
+              <a:rPr lang="ca-ES" dirty="0" err="1" smtClean="0">
+                <a:solidFill>
+                  <a:srgbClr val="FF0000"/>
+                </a:solidFill>
+              </a:rPr>
+              <a:t>collectionId</a:t>
+            </a:r>
+            <a:r>
+              <a:rPr lang="ca-ES" dirty="0" smtClean="0">
+                <a:solidFill>
+                  <a:srgbClr val="FF0000"/>
+                </a:solidFill>
+              </a:rPr>
+              <a:t>/</a:t>
+            </a:r>
+            <a:r>
+              <a:rPr lang="ca-ES" dirty="0" err="1" smtClean="0">
+                <a:solidFill>
+                  <a:srgbClr val="FF0000"/>
+                </a:solidFill>
+              </a:rPr>
+              <a:t>map</a:t>
+            </a:r>
+            <a:r>
+              <a:rPr lang="ca-ES" dirty="0" smtClean="0">
+                <a:solidFill>
+                  <a:srgbClr val="FF0000"/>
+                </a:solidFill>
+              </a:rPr>
+              <a:t>    (NEW and </a:t>
+            </a:r>
+            <a:r>
+              <a:rPr lang="ca-ES" dirty="0" err="1" smtClean="0">
+                <a:solidFill>
+                  <a:srgbClr val="FF0000"/>
+                </a:solidFill>
+              </a:rPr>
+              <a:t>TBD</a:t>
+            </a:r>
+            <a:r>
+              <a:rPr lang="ca-ES" dirty="0" smtClean="0">
+                <a:solidFill>
+                  <a:srgbClr val="FF0000"/>
+                </a:solidFill>
+              </a:rPr>
+              <a:t>: </a:t>
+            </a:r>
+            <a:r>
+              <a:rPr lang="ca-ES" dirty="0" err="1" smtClean="0">
+                <a:solidFill>
+                  <a:srgbClr val="FF0000"/>
+                </a:solidFill>
+              </a:rPr>
+              <a:t>returns</a:t>
+            </a:r>
+            <a:r>
+              <a:rPr lang="ca-ES" dirty="0" smtClean="0">
+                <a:solidFill>
+                  <a:srgbClr val="FF0000"/>
+                </a:solidFill>
+              </a:rPr>
+              <a:t> </a:t>
+            </a:r>
+            <a:r>
+              <a:rPr lang="ca-ES" dirty="0" err="1" smtClean="0">
+                <a:solidFill>
+                  <a:srgbClr val="FF0000"/>
+                </a:solidFill>
+              </a:rPr>
+              <a:t>specific</a:t>
+            </a:r>
+            <a:r>
+              <a:rPr lang="ca-ES" dirty="0" smtClean="0">
+                <a:solidFill>
+                  <a:srgbClr val="FF0000"/>
+                </a:solidFill>
+              </a:rPr>
+              <a:t> content </a:t>
+            </a:r>
+            <a:r>
+              <a:rPr lang="ca-ES" dirty="0" err="1" smtClean="0">
+                <a:solidFill>
+                  <a:srgbClr val="FF0000"/>
+                </a:solidFill>
+              </a:rPr>
+              <a:t>about</a:t>
+            </a:r>
+            <a:r>
+              <a:rPr lang="ca-ES" dirty="0" smtClean="0">
+                <a:solidFill>
+                  <a:srgbClr val="FF0000"/>
+                </a:solidFill>
+              </a:rPr>
+              <a:t> </a:t>
+            </a:r>
+            <a:r>
+              <a:rPr lang="ca-ES" dirty="0" err="1" smtClean="0">
+                <a:solidFill>
+                  <a:srgbClr val="FF0000"/>
+                </a:solidFill>
+              </a:rPr>
+              <a:t>map</a:t>
+            </a:r>
+            <a:r>
+              <a:rPr lang="ca-ES" dirty="0" smtClean="0">
+                <a:solidFill>
+                  <a:srgbClr val="FF0000"/>
+                </a:solidFill>
+              </a:rPr>
+              <a:t> </a:t>
+            </a:r>
+            <a:r>
+              <a:rPr lang="ca-ES" dirty="0" err="1" smtClean="0">
+                <a:solidFill>
+                  <a:srgbClr val="FF0000"/>
+                </a:solidFill>
+              </a:rPr>
+              <a:t>support</a:t>
+            </a:r>
+            <a:r>
+              <a:rPr lang="ca-ES" dirty="0" smtClean="0">
+                <a:solidFill>
+                  <a:srgbClr val="FF0000"/>
+                </a:solidFill>
+              </a:rPr>
+              <a:t> for </a:t>
+            </a:r>
+            <a:r>
+              <a:rPr lang="ca-ES" dirty="0" err="1" smtClean="0">
+                <a:solidFill>
+                  <a:srgbClr val="FF0000"/>
+                </a:solidFill>
+              </a:rPr>
+              <a:t>this</a:t>
+            </a:r>
+            <a:r>
+              <a:rPr lang="ca-ES" dirty="0" smtClean="0">
+                <a:solidFill>
+                  <a:srgbClr val="FF0000"/>
+                </a:solidFill>
+              </a:rPr>
+              <a:t> </a:t>
+            </a:r>
+            <a:r>
+              <a:rPr lang="ca-ES" dirty="0" err="1" smtClean="0">
+                <a:solidFill>
+                  <a:srgbClr val="FF0000"/>
+                </a:solidFill>
+              </a:rPr>
+              <a:t>collection</a:t>
+            </a:r>
+            <a:r>
+              <a:rPr lang="ca-ES" dirty="0" smtClean="0">
+                <a:solidFill>
+                  <a:srgbClr val="FF0000"/>
+                </a:solidFill>
+              </a:rPr>
+              <a:t>.</a:t>
+            </a:r>
+          </a:p>
+          <a:p>
+            <a:pPr lvl="1"/>
+            <a:r>
+              <a:rPr lang="ca-ES" dirty="0" smtClean="0"/>
+              <a:t>/</a:t>
+            </a:r>
+            <a:r>
+              <a:rPr lang="ca-ES" dirty="0" err="1" smtClean="0"/>
+              <a:t>collections</a:t>
+            </a:r>
+            <a:r>
+              <a:rPr lang="ca-ES" dirty="0" smtClean="0"/>
+              <a:t>/{</a:t>
+            </a:r>
+            <a:r>
+              <a:rPr lang="ca-ES" dirty="0" err="1" smtClean="0"/>
+              <a:t>collectionId</a:t>
+            </a:r>
+            <a:r>
+              <a:rPr lang="ca-ES" dirty="0" smtClean="0"/>
+              <a:t>}/</a:t>
+            </a:r>
+            <a:r>
+              <a:rPr lang="ca-ES" dirty="0" err="1" smtClean="0"/>
+              <a:t>map</a:t>
+            </a:r>
+            <a:r>
+              <a:rPr lang="ca-ES" dirty="0" smtClean="0"/>
+              <a:t>/</a:t>
+            </a:r>
+            <a:r>
+              <a:rPr lang="ca-ES" dirty="0" err="1" smtClean="0"/>
+              <a:t>myStyleId</a:t>
+            </a:r>
+            <a:r>
+              <a:rPr lang="ca-ES" dirty="0" smtClean="0"/>
+              <a:t>   (</a:t>
+            </a:r>
+            <a:r>
+              <a:rPr lang="ca-ES" dirty="0" err="1" smtClean="0"/>
+              <a:t>leaf</a:t>
+            </a:r>
+            <a:r>
+              <a:rPr lang="ca-ES" dirty="0" smtClean="0"/>
+              <a:t>)</a:t>
+            </a:r>
+            <a:br>
+              <a:rPr lang="ca-ES" dirty="0" smtClean="0"/>
+            </a:br>
+            <a:endParaRPr lang="ca-ES" dirty="0" smtClean="0"/>
+          </a:p>
+        </p:txBody>
+      </p:sp>
+    </p:spTree>
+  </p:cSld>
+  <p:clrMapOvr>
+    <a:masterClrMapping/>
+  </p:clrMapOvr>
+</p:sld>
+</file>
+
+<file path=ppt/slides/slide21.xml><?xml version="1.0" encoding="utf-8"?>
+<p:sld xmlns:a="http://schemas.openxmlformats.org/drawingml/2006/main" xmlns:r="http://schemas.openxmlformats.org/officeDocument/2006/relationships" xmlns:p="http://schemas.openxmlformats.org/presentationml/2006/main">
+  <p:cSld>
+    <p:spTree>
+      <p:nvGrpSpPr>
+        <p:cNvPr id="1" name=""/>
+        <p:cNvGrpSpPr/>
+        <p:nvPr/>
+      </p:nvGrpSpPr>
+      <p:grpSpPr>
+        <a:xfrm>
+          <a:off x="0" y="0"/>
+          <a:ext cx="0" cy="0"/>
+          <a:chOff x="0" y="0"/>
+          <a:chExt cx="0" cy="0"/>
+        </a:xfrm>
+      </p:grpSpPr>
+      <p:sp>
+        <p:nvSpPr>
+          <p:cNvPr id="2" name="1 Título"/>
+          <p:cNvSpPr>
+            <a:spLocks noGrp="1"/>
+          </p:cNvSpPr>
+          <p:nvPr>
+            <p:ph type="title"/>
+          </p:nvPr>
+        </p:nvSpPr>
+        <p:spPr/>
+        <p:txBody>
+          <a:bodyPr>
+            <a:normAutofit/>
+          </a:bodyPr>
+          <a:lstStyle/>
+          <a:p>
+            <a:pPr lvl="0"/>
+            <a:r>
+              <a:rPr lang="ca-ES" dirty="0" err="1" smtClean="0"/>
+              <a:t>Proposal</a:t>
+            </a:r>
+            <a:r>
+              <a:rPr lang="ca-ES" dirty="0" smtClean="0"/>
+              <a:t> (</a:t>
+            </a:r>
+            <a:r>
+              <a:rPr lang="ca-ES" dirty="0" err="1" smtClean="0"/>
+              <a:t>alternative</a:t>
+            </a:r>
+            <a:r>
+              <a:rPr lang="ca-ES" dirty="0" smtClean="0"/>
+              <a:t> </a:t>
+            </a:r>
+            <a:r>
+              <a:rPr lang="ca-ES" dirty="0" smtClean="0"/>
+              <a:t>B)</a:t>
+            </a:r>
+            <a:endParaRPr lang="ca-ES" dirty="0"/>
+          </a:p>
+        </p:txBody>
+      </p:sp>
+      <p:sp>
+        <p:nvSpPr>
+          <p:cNvPr id="3" name="2 Marcador de contenido"/>
+          <p:cNvSpPr>
+            <a:spLocks noGrp="1"/>
+          </p:cNvSpPr>
+          <p:nvPr>
+            <p:ph idx="1"/>
+          </p:nvPr>
+        </p:nvSpPr>
+        <p:spPr>
+          <a:xfrm>
+            <a:off x="457200" y="1600200"/>
+            <a:ext cx="8229600" cy="4997152"/>
+          </a:xfrm>
+        </p:spPr>
+        <p:txBody>
+          <a:bodyPr>
+            <a:normAutofit fontScale="62500" lnSpcReduction="20000"/>
+          </a:bodyPr>
+          <a:lstStyle/>
+          <a:p>
+            <a:r>
+              <a:rPr lang="ca-ES" dirty="0" err="1" smtClean="0"/>
+              <a:t>Landing</a:t>
+            </a:r>
+            <a:r>
+              <a:rPr lang="ca-ES" dirty="0" smtClean="0"/>
+              <a:t> </a:t>
+            </a:r>
+            <a:r>
+              <a:rPr lang="ca-ES" dirty="0" err="1" smtClean="0"/>
+              <a:t>page</a:t>
+            </a:r>
+            <a:r>
+              <a:rPr lang="ca-ES" dirty="0" smtClean="0"/>
+              <a:t> </a:t>
+            </a:r>
+            <a:r>
+              <a:rPr lang="ca-ES" dirty="0" err="1" smtClean="0"/>
+              <a:t>links</a:t>
+            </a:r>
+            <a:r>
+              <a:rPr lang="ca-ES" dirty="0" smtClean="0"/>
+              <a:t> to:</a:t>
+            </a:r>
+          </a:p>
+          <a:p>
+            <a:pPr lvl="1"/>
+            <a:r>
+              <a:rPr lang="ca-ES" dirty="0" err="1" smtClean="0"/>
+              <a:t>Like</a:t>
+            </a:r>
+            <a:r>
+              <a:rPr lang="ca-ES" dirty="0" smtClean="0"/>
+              <a:t> in </a:t>
+            </a:r>
+            <a:r>
+              <a:rPr lang="ca-ES" dirty="0" err="1" smtClean="0"/>
+              <a:t>alternative</a:t>
+            </a:r>
+            <a:r>
+              <a:rPr lang="ca-ES" dirty="0" smtClean="0"/>
+              <a:t> A</a:t>
+            </a:r>
+            <a:endParaRPr lang="ca-ES" dirty="0" smtClean="0">
+              <a:solidFill>
+                <a:srgbClr val="FF0000"/>
+              </a:solidFill>
+            </a:endParaRPr>
+          </a:p>
+          <a:p>
+            <a:r>
+              <a:rPr lang="ca-ES" dirty="0" smtClean="0"/>
+              <a:t>/</a:t>
+            </a:r>
+            <a:r>
+              <a:rPr lang="ca-ES" dirty="0" err="1" smtClean="0"/>
+              <a:t>tileMatrixSets</a:t>
+            </a:r>
+            <a:r>
+              <a:rPr lang="ca-ES" dirty="0" smtClean="0"/>
+              <a:t> </a:t>
+            </a:r>
+            <a:r>
+              <a:rPr lang="ca-ES" dirty="0" err="1" smtClean="0"/>
+              <a:t>links</a:t>
+            </a:r>
+            <a:r>
+              <a:rPr lang="ca-ES" dirty="0" smtClean="0"/>
+              <a:t> to</a:t>
+            </a:r>
+          </a:p>
+          <a:p>
+            <a:pPr lvl="1"/>
+            <a:r>
+              <a:rPr lang="ca-ES" dirty="0" err="1" smtClean="0"/>
+              <a:t>Like</a:t>
+            </a:r>
+            <a:r>
+              <a:rPr lang="ca-ES" dirty="0" smtClean="0"/>
+              <a:t> in </a:t>
+            </a:r>
+            <a:r>
+              <a:rPr lang="ca-ES" dirty="0" err="1" smtClean="0"/>
+              <a:t>alternative</a:t>
+            </a:r>
+            <a:r>
+              <a:rPr lang="ca-ES" dirty="0" smtClean="0"/>
+              <a:t> A</a:t>
+            </a:r>
+            <a:endParaRPr lang="ca-ES" dirty="0" smtClean="0">
+              <a:solidFill>
+                <a:srgbClr val="FF0000"/>
+              </a:solidFill>
+            </a:endParaRPr>
+          </a:p>
+          <a:p>
+            <a:r>
+              <a:rPr lang="ca-ES" dirty="0" smtClean="0"/>
+              <a:t>/</a:t>
+            </a:r>
+            <a:r>
+              <a:rPr lang="ca-ES" dirty="0" err="1" smtClean="0"/>
+              <a:t>collections</a:t>
+            </a:r>
+            <a:r>
+              <a:rPr lang="ca-ES" dirty="0" smtClean="0"/>
+              <a:t> </a:t>
+            </a:r>
+            <a:r>
+              <a:rPr lang="ca-ES" dirty="0" err="1" smtClean="0"/>
+              <a:t>links</a:t>
+            </a:r>
+            <a:r>
+              <a:rPr lang="ca-ES" dirty="0" smtClean="0"/>
+              <a:t> to:</a:t>
+            </a:r>
+          </a:p>
+          <a:p>
+            <a:pPr lvl="1"/>
+            <a:r>
+              <a:rPr lang="ca-ES" dirty="0" err="1" smtClean="0"/>
+              <a:t>Like</a:t>
+            </a:r>
+            <a:r>
+              <a:rPr lang="ca-ES" dirty="0" smtClean="0"/>
+              <a:t> in </a:t>
+            </a:r>
+            <a:r>
+              <a:rPr lang="ca-ES" dirty="0" err="1" smtClean="0"/>
+              <a:t>alternative</a:t>
+            </a:r>
+            <a:r>
+              <a:rPr lang="ca-ES" dirty="0" smtClean="0"/>
+              <a:t> </a:t>
+            </a:r>
+            <a:r>
+              <a:rPr lang="ca-ES" dirty="0" smtClean="0"/>
+              <a:t>A</a:t>
+            </a:r>
+          </a:p>
+          <a:p>
+            <a:r>
+              <a:rPr lang="ca-ES" dirty="0" smtClean="0"/>
+              <a:t>/</a:t>
+            </a:r>
+            <a:r>
+              <a:rPr lang="ca-ES" dirty="0" err="1" smtClean="0"/>
+              <a:t>collections</a:t>
+            </a:r>
+            <a:r>
+              <a:rPr lang="ca-ES" dirty="0" smtClean="0"/>
+              <a:t>/{</a:t>
+            </a:r>
+            <a:r>
+              <a:rPr lang="ca-ES" dirty="0" err="1" smtClean="0"/>
+              <a:t>collectionId</a:t>
+            </a:r>
+            <a:r>
+              <a:rPr lang="ca-ES" dirty="0" smtClean="0"/>
+              <a:t>} </a:t>
+            </a:r>
+            <a:r>
+              <a:rPr lang="ca-ES" dirty="0" err="1" smtClean="0"/>
+              <a:t>links</a:t>
+            </a:r>
+            <a:r>
+              <a:rPr lang="ca-ES" dirty="0" smtClean="0"/>
+              <a:t> to:</a:t>
+            </a:r>
+          </a:p>
+          <a:p>
+            <a:pPr lvl="1"/>
+            <a:r>
+              <a:rPr lang="ca-ES" dirty="0" smtClean="0"/>
+              <a:t>/</a:t>
+            </a:r>
+            <a:r>
+              <a:rPr lang="ca-ES" dirty="0" err="1" smtClean="0"/>
+              <a:t>collections</a:t>
+            </a:r>
+            <a:r>
+              <a:rPr lang="ca-ES" dirty="0" smtClean="0"/>
+              <a:t>/{</a:t>
+            </a:r>
+            <a:r>
+              <a:rPr lang="ca-ES" dirty="0" err="1" smtClean="0"/>
+              <a:t>collectionId</a:t>
+            </a:r>
+            <a:r>
+              <a:rPr lang="ca-ES" dirty="0" smtClean="0"/>
+              <a:t>}/</a:t>
+            </a:r>
+            <a:r>
+              <a:rPr lang="ca-ES" dirty="0" err="1" smtClean="0"/>
+              <a:t>tiles</a:t>
+            </a:r>
+            <a:r>
+              <a:rPr lang="ca-ES" dirty="0" smtClean="0"/>
+              <a:t>   (NEW and </a:t>
+            </a:r>
+            <a:r>
+              <a:rPr lang="ca-ES" dirty="0" err="1" smtClean="0"/>
+              <a:t>TBD</a:t>
+            </a:r>
+            <a:r>
+              <a:rPr lang="ca-ES" dirty="0" smtClean="0"/>
+              <a:t>: </a:t>
+            </a:r>
+            <a:r>
+              <a:rPr lang="ca-ES" dirty="0" err="1" smtClean="0"/>
+              <a:t>returns</a:t>
+            </a:r>
+            <a:r>
+              <a:rPr lang="ca-ES" dirty="0" smtClean="0"/>
+              <a:t> </a:t>
+            </a:r>
+            <a:r>
+              <a:rPr lang="ca-ES" dirty="0" err="1" smtClean="0"/>
+              <a:t>specific</a:t>
+            </a:r>
+            <a:r>
+              <a:rPr lang="ca-ES" dirty="0" smtClean="0"/>
+              <a:t> content </a:t>
+            </a:r>
+            <a:r>
+              <a:rPr lang="ca-ES" dirty="0" err="1" smtClean="0"/>
+              <a:t>about</a:t>
+            </a:r>
+            <a:r>
+              <a:rPr lang="ca-ES" dirty="0" smtClean="0"/>
+              <a:t> </a:t>
+            </a:r>
+            <a:r>
+              <a:rPr lang="ca-ES" dirty="0" err="1" smtClean="0"/>
+              <a:t>tile</a:t>
+            </a:r>
+            <a:r>
+              <a:rPr lang="ca-ES" dirty="0" smtClean="0"/>
+              <a:t> </a:t>
+            </a:r>
+            <a:r>
+              <a:rPr lang="ca-ES" dirty="0" err="1" smtClean="0"/>
+              <a:t>support</a:t>
+            </a:r>
+            <a:r>
+              <a:rPr lang="ca-ES" dirty="0" smtClean="0"/>
+              <a:t> for </a:t>
+            </a:r>
+            <a:r>
+              <a:rPr lang="ca-ES" dirty="0" err="1" smtClean="0"/>
+              <a:t>this</a:t>
+            </a:r>
+            <a:r>
+              <a:rPr lang="ca-ES" dirty="0" smtClean="0"/>
+              <a:t> </a:t>
+            </a:r>
+            <a:r>
+              <a:rPr lang="ca-ES" dirty="0" err="1" smtClean="0"/>
+              <a:t>collection</a:t>
+            </a:r>
+            <a:r>
+              <a:rPr lang="ca-ES" dirty="0" smtClean="0"/>
+              <a:t>: </a:t>
+            </a:r>
+            <a:r>
+              <a:rPr lang="ca-ES" dirty="0" err="1" smtClean="0"/>
+              <a:t>tileMatrixSetLink</a:t>
+            </a:r>
+            <a:r>
+              <a:rPr lang="ca-ES" dirty="0" smtClean="0"/>
+              <a:t>...)</a:t>
+            </a:r>
+          </a:p>
+          <a:p>
+            <a:pPr lvl="1"/>
+            <a:r>
+              <a:rPr lang="ca-ES" dirty="0" smtClean="0"/>
+              <a:t>/</a:t>
+            </a:r>
+            <a:r>
+              <a:rPr lang="ca-ES" dirty="0" err="1" smtClean="0"/>
+              <a:t>collections</a:t>
+            </a:r>
+            <a:r>
+              <a:rPr lang="ca-ES" dirty="0" smtClean="0"/>
+              <a:t>/{</a:t>
+            </a:r>
+            <a:r>
+              <a:rPr lang="ca-ES" dirty="0" err="1" smtClean="0"/>
+              <a:t>collectionId</a:t>
+            </a:r>
+            <a:r>
+              <a:rPr lang="ca-ES" dirty="0" smtClean="0"/>
+              <a:t>/</a:t>
+            </a:r>
+            <a:r>
+              <a:rPr lang="ca-ES" dirty="0" err="1" smtClean="0"/>
+              <a:t>map</a:t>
+            </a:r>
+            <a:r>
+              <a:rPr lang="ca-ES" dirty="0" smtClean="0"/>
+              <a:t>    (NEW and </a:t>
+            </a:r>
+            <a:r>
+              <a:rPr lang="ca-ES" dirty="0" err="1" smtClean="0"/>
+              <a:t>TBD</a:t>
+            </a:r>
+            <a:r>
+              <a:rPr lang="ca-ES" dirty="0" smtClean="0"/>
+              <a:t>: </a:t>
+            </a:r>
+            <a:r>
+              <a:rPr lang="ca-ES" dirty="0" err="1" smtClean="0"/>
+              <a:t>returns</a:t>
+            </a:r>
+            <a:r>
+              <a:rPr lang="ca-ES" dirty="0" smtClean="0"/>
+              <a:t> </a:t>
+            </a:r>
+            <a:r>
+              <a:rPr lang="ca-ES" dirty="0" err="1" smtClean="0"/>
+              <a:t>specific</a:t>
+            </a:r>
+            <a:r>
+              <a:rPr lang="ca-ES" dirty="0" smtClean="0"/>
+              <a:t> content </a:t>
+            </a:r>
+            <a:r>
+              <a:rPr lang="ca-ES" dirty="0" err="1" smtClean="0"/>
+              <a:t>about</a:t>
+            </a:r>
+            <a:r>
+              <a:rPr lang="ca-ES" dirty="0" smtClean="0"/>
+              <a:t> </a:t>
+            </a:r>
+            <a:r>
+              <a:rPr lang="ca-ES" dirty="0" err="1" smtClean="0"/>
+              <a:t>map</a:t>
+            </a:r>
+            <a:r>
+              <a:rPr lang="ca-ES" dirty="0" smtClean="0"/>
+              <a:t> </a:t>
+            </a:r>
+            <a:r>
+              <a:rPr lang="ca-ES" dirty="0" err="1" smtClean="0"/>
+              <a:t>support</a:t>
+            </a:r>
+            <a:r>
+              <a:rPr lang="ca-ES" dirty="0" smtClean="0"/>
+              <a:t> for </a:t>
+            </a:r>
+            <a:r>
+              <a:rPr lang="ca-ES" dirty="0" err="1" smtClean="0"/>
+              <a:t>this</a:t>
+            </a:r>
+            <a:r>
+              <a:rPr lang="ca-ES" dirty="0" smtClean="0"/>
+              <a:t> </a:t>
+            </a:r>
+            <a:r>
+              <a:rPr lang="ca-ES" dirty="0" err="1" smtClean="0"/>
+              <a:t>collection</a:t>
+            </a:r>
+            <a:endParaRPr lang="ca-ES" dirty="0" smtClean="0"/>
+          </a:p>
+          <a:p>
+            <a:r>
+              <a:rPr lang="ca-ES" dirty="0" smtClean="0"/>
+              <a:t>/</a:t>
+            </a:r>
+            <a:r>
+              <a:rPr lang="ca-ES" dirty="0" err="1" smtClean="0"/>
+              <a:t>collections</a:t>
+            </a:r>
+            <a:r>
+              <a:rPr lang="ca-ES" dirty="0" smtClean="0"/>
+              <a:t>/{</a:t>
+            </a:r>
+            <a:r>
+              <a:rPr lang="ca-ES" dirty="0" err="1" smtClean="0"/>
+              <a:t>collectionId</a:t>
+            </a:r>
+            <a:r>
+              <a:rPr lang="ca-ES" dirty="0" smtClean="0"/>
+              <a:t>}/</a:t>
+            </a:r>
+            <a:r>
+              <a:rPr lang="ca-ES" dirty="0" err="1" smtClean="0"/>
+              <a:t>tiles</a:t>
+            </a:r>
+            <a:r>
+              <a:rPr lang="ca-ES" dirty="0" smtClean="0"/>
+              <a:t> </a:t>
+            </a:r>
+            <a:r>
+              <a:rPr lang="ca-ES" dirty="0" err="1" smtClean="0"/>
+              <a:t>links</a:t>
+            </a:r>
+            <a:r>
+              <a:rPr lang="ca-ES" dirty="0" smtClean="0"/>
+              <a:t> to:</a:t>
+            </a:r>
+          </a:p>
+          <a:p>
+            <a:pPr lvl="1"/>
+            <a:r>
+              <a:rPr lang="ca-ES" dirty="0" smtClean="0"/>
+              <a:t>/</a:t>
+            </a:r>
+            <a:r>
+              <a:rPr lang="ca-ES" dirty="0" err="1" smtClean="0"/>
+              <a:t>collections</a:t>
+            </a:r>
+            <a:r>
+              <a:rPr lang="ca-ES" dirty="0" smtClean="0"/>
+              <a:t>/{</a:t>
+            </a:r>
+            <a:r>
+              <a:rPr lang="ca-ES" dirty="0" err="1" smtClean="0"/>
+              <a:t>collectionId</a:t>
+            </a:r>
+            <a:r>
+              <a:rPr lang="ca-ES" dirty="0" smtClean="0"/>
+              <a:t>}/</a:t>
+            </a:r>
+            <a:r>
+              <a:rPr lang="ca-ES" dirty="0" err="1" smtClean="0"/>
+              <a:t>tiles</a:t>
+            </a:r>
+            <a:r>
+              <a:rPr lang="ca-ES" dirty="0" smtClean="0"/>
+              <a:t>/</a:t>
+            </a:r>
+            <a:r>
+              <a:rPr lang="ca-ES" dirty="0" err="1" smtClean="0"/>
+              <a:t>myTileMatrixSetId</a:t>
+            </a:r>
+            <a:r>
+              <a:rPr lang="ca-ES" dirty="0" smtClean="0"/>
+              <a:t>/{</a:t>
+            </a:r>
+            <a:r>
+              <a:rPr lang="ca-ES" dirty="0" err="1" smtClean="0"/>
+              <a:t>tileMatrix</a:t>
+            </a:r>
+            <a:r>
+              <a:rPr lang="ca-ES" dirty="0" smtClean="0"/>
+              <a:t>}/{</a:t>
+            </a:r>
+            <a:r>
+              <a:rPr lang="ca-ES" dirty="0" err="1" smtClean="0"/>
+              <a:t>tileCol</a:t>
+            </a:r>
+            <a:r>
+              <a:rPr lang="ca-ES" dirty="0" smtClean="0"/>
+              <a:t>}/{</a:t>
+            </a:r>
+            <a:r>
+              <a:rPr lang="ca-ES" dirty="0" err="1" smtClean="0"/>
+              <a:t>tileRow</a:t>
+            </a:r>
+            <a:r>
+              <a:rPr lang="ca-ES" dirty="0" smtClean="0"/>
+              <a:t>}   (</a:t>
+            </a:r>
+            <a:r>
+              <a:rPr lang="ca-ES" dirty="0" err="1" smtClean="0"/>
+              <a:t>leaf</a:t>
+            </a:r>
+            <a:r>
+              <a:rPr lang="ca-ES" dirty="0" smtClean="0"/>
+              <a:t>)</a:t>
+            </a:r>
+          </a:p>
+          <a:p>
+            <a:pPr lvl="0"/>
+            <a:r>
+              <a:rPr lang="ca-ES" dirty="0" smtClean="0"/>
+              <a:t>/</a:t>
+            </a:r>
+            <a:r>
+              <a:rPr lang="ca-ES" dirty="0" err="1" smtClean="0"/>
+              <a:t>collections</a:t>
+            </a:r>
+            <a:r>
+              <a:rPr lang="ca-ES" dirty="0" smtClean="0"/>
+              <a:t>/{</a:t>
+            </a:r>
+            <a:r>
+              <a:rPr lang="ca-ES" dirty="0" err="1" smtClean="0"/>
+              <a:t>collectionId</a:t>
+            </a:r>
+            <a:r>
+              <a:rPr lang="ca-ES" dirty="0" smtClean="0"/>
+              <a:t>/</a:t>
+            </a:r>
+            <a:r>
+              <a:rPr lang="ca-ES" dirty="0" err="1" smtClean="0"/>
+              <a:t>map</a:t>
+            </a:r>
+            <a:r>
+              <a:rPr lang="ca-ES" dirty="0" smtClean="0"/>
+              <a:t>   </a:t>
+            </a:r>
+            <a:r>
+              <a:rPr lang="ca-ES" dirty="0" err="1" smtClean="0"/>
+              <a:t>links</a:t>
+            </a:r>
+            <a:r>
+              <a:rPr lang="ca-ES" baseline="0" dirty="0" smtClean="0"/>
+              <a:t> to:</a:t>
+            </a:r>
+            <a:endParaRPr lang="ca-ES" dirty="0" smtClean="0"/>
+          </a:p>
+          <a:p>
+            <a:pPr lvl="1"/>
+            <a:r>
+              <a:rPr lang="ca-ES" dirty="0" smtClean="0"/>
+              <a:t>/</a:t>
+            </a:r>
+            <a:r>
+              <a:rPr lang="ca-ES" dirty="0" err="1" smtClean="0"/>
+              <a:t>collections</a:t>
+            </a:r>
+            <a:r>
+              <a:rPr lang="ca-ES" dirty="0" smtClean="0"/>
+              <a:t>/{</a:t>
+            </a:r>
+            <a:r>
+              <a:rPr lang="ca-ES" dirty="0" err="1" smtClean="0"/>
+              <a:t>collectionId</a:t>
+            </a:r>
+            <a:r>
+              <a:rPr lang="ca-ES" dirty="0" smtClean="0"/>
+              <a:t>}/</a:t>
+            </a:r>
+            <a:r>
+              <a:rPr lang="ca-ES" dirty="0" err="1" smtClean="0"/>
+              <a:t>map</a:t>
+            </a:r>
+            <a:r>
+              <a:rPr lang="ca-ES" dirty="0" smtClean="0"/>
+              <a:t>/</a:t>
+            </a:r>
+            <a:r>
+              <a:rPr lang="ca-ES" dirty="0" err="1" smtClean="0"/>
+              <a:t>myStyleId</a:t>
+            </a:r>
+            <a:r>
+              <a:rPr lang="ca-ES" dirty="0" smtClean="0"/>
+              <a:t>   (</a:t>
+            </a:r>
+            <a:r>
+              <a:rPr lang="ca-ES" dirty="0" err="1" smtClean="0"/>
+              <a:t>leaf</a:t>
+            </a:r>
+            <a:r>
+              <a:rPr lang="ca-ES" dirty="0" smtClean="0"/>
+              <a:t>)</a:t>
+            </a:r>
+            <a:br>
+              <a:rPr lang="ca-ES" dirty="0" smtClean="0"/>
+            </a:br>
+            <a:endParaRPr lang="ca-ES" dirty="0"/>
+          </a:p>
+        </p:txBody>
+      </p:sp>
+    </p:spTree>
+  </p:cSld>
+  <p:clrMapOvr>
+    <a:masterClrMapping/>
+  </p:clrMapOvr>
+</p:sld>
+</file>
+
+<file path=ppt/slides/slide22.xml><?xml version="1.0" encoding="utf-8"?>
+<p:sld xmlns:a="http://schemas.openxmlformats.org/drawingml/2006/main" xmlns:r="http://schemas.openxmlformats.org/officeDocument/2006/relationships" xmlns:p="http://schemas.openxmlformats.org/presentationml/2006/main">
+  <p:cSld>
+    <p:spTree>
+      <p:nvGrpSpPr>
+        <p:cNvPr id="1" name=""/>
+        <p:cNvGrpSpPr/>
+        <p:nvPr/>
+      </p:nvGrpSpPr>
+      <p:grpSpPr>
+        <a:xfrm>
+          <a:off x="0" y="0"/>
+          <a:ext cx="0" cy="0"/>
+          <a:chOff x="0" y="0"/>
+          <a:chExt cx="0" cy="0"/>
+        </a:xfrm>
+      </p:grpSpPr>
+      <p:sp>
+        <p:nvSpPr>
+          <p:cNvPr id="2" name="1 Título"/>
+          <p:cNvSpPr>
+            <a:spLocks noGrp="1"/>
+          </p:cNvSpPr>
+          <p:nvPr>
+            <p:ph type="title"/>
+          </p:nvPr>
+        </p:nvSpPr>
+        <p:spPr/>
+        <p:txBody>
+          <a:bodyPr/>
+          <a:lstStyle/>
+          <a:p>
+            <a:r>
+              <a:rPr lang="ca-ES" dirty="0" err="1" smtClean="0"/>
+              <a:t>Next</a:t>
+            </a:r>
+            <a:endParaRPr lang="ca-ES" dirty="0"/>
+          </a:p>
+        </p:txBody>
+      </p:sp>
+      <p:sp>
+        <p:nvSpPr>
+          <p:cNvPr id="3" name="2 Marcador de contenido"/>
+          <p:cNvSpPr>
+            <a:spLocks noGrp="1"/>
+          </p:cNvSpPr>
+          <p:nvPr>
+            <p:ph idx="1"/>
+          </p:nvPr>
+        </p:nvSpPr>
+        <p:spPr/>
+        <p:txBody>
+          <a:bodyPr/>
+          <a:lstStyle/>
+          <a:p>
+            <a:r>
+              <a:rPr lang="ca-ES" dirty="0" err="1" smtClean="0"/>
+              <a:t>Close</a:t>
+            </a:r>
+            <a:r>
+              <a:rPr lang="ca-ES" dirty="0" smtClean="0"/>
+              <a:t> discussions on OGC API </a:t>
+            </a:r>
+            <a:r>
+              <a:rPr lang="ca-ES" dirty="0" err="1" smtClean="0"/>
+              <a:t>maps</a:t>
+            </a:r>
+            <a:r>
+              <a:rPr lang="ca-ES" dirty="0" smtClean="0"/>
+              <a:t> and </a:t>
+            </a:r>
+            <a:r>
+              <a:rPr lang="ca-ES" dirty="0" err="1" smtClean="0"/>
+              <a:t>tiles</a:t>
+            </a:r>
+            <a:endParaRPr lang="ca-ES" dirty="0" smtClean="0"/>
+          </a:p>
+          <a:p>
+            <a:r>
+              <a:rPr lang="ca-ES" dirty="0" err="1" smtClean="0"/>
+              <a:t>Produce</a:t>
+            </a:r>
+            <a:r>
+              <a:rPr lang="ca-ES" dirty="0" smtClean="0"/>
+              <a:t> </a:t>
+            </a:r>
+            <a:r>
+              <a:rPr lang="ca-ES" dirty="0" err="1" smtClean="0"/>
+              <a:t>the</a:t>
+            </a:r>
+            <a:r>
+              <a:rPr lang="ca-ES" dirty="0" smtClean="0"/>
+              <a:t> </a:t>
+            </a:r>
+            <a:r>
+              <a:rPr lang="ca-ES" dirty="0" err="1" smtClean="0"/>
+              <a:t>specification</a:t>
+            </a:r>
+            <a:r>
+              <a:rPr lang="ca-ES" dirty="0" smtClean="0"/>
+              <a:t> of </a:t>
+            </a:r>
+            <a:r>
+              <a:rPr lang="ca-ES" dirty="0" err="1" smtClean="0"/>
+              <a:t>the</a:t>
+            </a:r>
+            <a:r>
+              <a:rPr lang="ca-ES" dirty="0" smtClean="0"/>
+              <a:t> OGC API </a:t>
+            </a:r>
+            <a:r>
+              <a:rPr lang="ca-ES" dirty="0" err="1" smtClean="0"/>
+              <a:t>Image</a:t>
+            </a:r>
+            <a:endParaRPr lang="ca-ES" dirty="0" smtClean="0"/>
+          </a:p>
+          <a:p>
+            <a:pPr lvl="1"/>
+            <a:r>
+              <a:rPr lang="ca-ES" dirty="0" err="1" smtClean="0"/>
+              <a:t>That</a:t>
+            </a:r>
+            <a:r>
+              <a:rPr lang="ca-ES" dirty="0" smtClean="0"/>
+              <a:t> </a:t>
+            </a:r>
+            <a:r>
+              <a:rPr lang="ca-ES" dirty="0" err="1" smtClean="0"/>
+              <a:t>describes</a:t>
+            </a:r>
+            <a:r>
+              <a:rPr lang="ca-ES" dirty="0" smtClean="0"/>
+              <a:t> </a:t>
+            </a:r>
+            <a:r>
+              <a:rPr lang="ca-ES" dirty="0" err="1" smtClean="0"/>
+              <a:t>the</a:t>
+            </a:r>
+            <a:r>
+              <a:rPr lang="ca-ES" dirty="0" smtClean="0"/>
+              <a:t> </a:t>
+            </a:r>
+            <a:r>
+              <a:rPr lang="ca-ES" dirty="0" err="1" smtClean="0"/>
+              <a:t>Swagger</a:t>
+            </a:r>
+            <a:r>
+              <a:rPr lang="ca-ES" dirty="0" smtClean="0"/>
+              <a:t> </a:t>
+            </a:r>
+            <a:r>
+              <a:rPr lang="ca-ES" dirty="0" err="1" smtClean="0"/>
+              <a:t>HUB</a:t>
+            </a:r>
+            <a:endParaRPr lang="ca-ES" dirty="0" smtClean="0"/>
+          </a:p>
+          <a:p>
+            <a:r>
+              <a:rPr lang="ca-ES" dirty="0" err="1" smtClean="0"/>
+              <a:t>Produce</a:t>
+            </a:r>
+            <a:r>
+              <a:rPr lang="ca-ES" dirty="0" smtClean="0"/>
+              <a:t> </a:t>
+            </a:r>
+            <a:r>
+              <a:rPr lang="ca-ES" dirty="0" err="1" smtClean="0"/>
+              <a:t>the</a:t>
+            </a:r>
+            <a:r>
+              <a:rPr lang="ca-ES" dirty="0" smtClean="0"/>
+              <a:t> </a:t>
+            </a:r>
+            <a:r>
+              <a:rPr lang="ca-ES" dirty="0" err="1" smtClean="0"/>
+              <a:t>two</a:t>
+            </a:r>
+            <a:r>
+              <a:rPr lang="ca-ES" dirty="0" smtClean="0"/>
+              <a:t> </a:t>
+            </a:r>
+            <a:r>
+              <a:rPr lang="ca-ES" dirty="0" err="1" smtClean="0"/>
+              <a:t>Dxx</a:t>
+            </a:r>
+            <a:r>
+              <a:rPr lang="ca-ES" dirty="0" smtClean="0"/>
+              <a:t> </a:t>
+            </a:r>
+            <a:r>
+              <a:rPr lang="ca-ES" dirty="0" err="1" smtClean="0"/>
+              <a:t>specifications</a:t>
+            </a:r>
+            <a:r>
+              <a:rPr lang="ca-ES" dirty="0" smtClean="0"/>
+              <a:t> </a:t>
+            </a:r>
+            <a:r>
+              <a:rPr lang="ca-ES" dirty="0" err="1" smtClean="0"/>
+              <a:t>using</a:t>
+            </a:r>
+            <a:r>
+              <a:rPr lang="ca-ES" dirty="0" smtClean="0"/>
+              <a:t> all </a:t>
+            </a:r>
+            <a:r>
+              <a:rPr lang="ca-ES" dirty="0" err="1" smtClean="0"/>
+              <a:t>the</a:t>
+            </a:r>
+            <a:r>
+              <a:rPr lang="ca-ES" dirty="0" smtClean="0"/>
+              <a:t> content </a:t>
+            </a:r>
+            <a:r>
+              <a:rPr lang="ca-ES" dirty="0" err="1" smtClean="0"/>
+              <a:t>agreed</a:t>
+            </a:r>
+            <a:r>
+              <a:rPr lang="ca-ES" dirty="0" smtClean="0"/>
+              <a:t>.</a:t>
+            </a:r>
+            <a:endParaRPr lang="ca-ES" dirty="0"/>
+          </a:p>
+        </p:txBody>
+      </p:sp>
+    </p:spTree>
+  </p:cSld>
+  <p:clrMapOvr>
+    <a:masterClrMapping/>
+  </p:clrMapOvr>
 </p:sld>
 </file>
 

</xml_diff>